<commit_message>
Added the move step forward function.
</commit_message>
<xml_diff>
--- a/doc/designDoc.pptx
+++ b/doc/designDoc.pptx
@@ -3464,7 +3464,7 @@
           <a:p>
             <a:r>
               <a:rPr lang="en-US" sz="4000" b="1" dirty="0"/>
-              <a:t>5S</a:t>
+              <a:t>3S</a:t>
             </a:r>
             <a:endParaRPr lang="en-SG" sz="4000" b="1" dirty="0"/>
           </a:p>
@@ -3808,6 +3808,129 @@
           <a:p>
             <a:pPr algn="ctr"/>
             <a:endParaRPr lang="en-SG"/>
+          </a:p>
+        </p:txBody>
+      </p:sp>
+      <p:sp>
+        <p:nvSpPr>
+          <p:cNvPr id="3" name="Rectangle 2">
+            <a:extLst>
+              <a:ext uri="{FF2B5EF4-FFF2-40B4-BE49-F238E27FC236}">
+                <a16:creationId xmlns:a16="http://schemas.microsoft.com/office/drawing/2014/main" id="{F9CFB370-FCA6-C364-9640-A64F9BF53C02}"/>
+              </a:ext>
+            </a:extLst>
+          </p:cNvPr>
+          <p:cNvSpPr/>
+          <p:nvPr/>
+        </p:nvSpPr>
+        <p:spPr>
+          <a:xfrm>
+            <a:off x="1258645" y="3844901"/>
+            <a:ext cx="1785769" cy="761105"/>
+          </a:xfrm>
+          <a:prstGeom prst="rect">
+            <a:avLst/>
+          </a:prstGeom>
+          <a:solidFill>
+            <a:schemeClr val="bg1">
+              <a:lumMod val="85000"/>
+            </a:schemeClr>
+          </a:solidFill>
+        </p:spPr>
+        <p:style>
+          <a:lnRef idx="2">
+            <a:schemeClr val="accent6">
+              <a:shade val="15000"/>
+            </a:schemeClr>
+          </a:lnRef>
+          <a:fillRef idx="1">
+            <a:schemeClr val="accent6"/>
+          </a:fillRef>
+          <a:effectRef idx="0">
+            <a:schemeClr val="accent6"/>
+          </a:effectRef>
+          <a:fontRef idx="minor">
+            <a:schemeClr val="lt1"/>
+          </a:fontRef>
+        </p:style>
+        <p:txBody>
+          <a:bodyPr rtlCol="0" anchor="ctr"/>
+          <a:lstStyle/>
+          <a:p>
+            <a:pPr algn="ctr"/>
+            <a:endParaRPr lang="en-SG"/>
+          </a:p>
+        </p:txBody>
+      </p:sp>
+      <p:pic>
+        <p:nvPicPr>
+          <p:cNvPr id="4" name="Graphic 3" descr="Beginning with solid fill">
+            <a:extLst>
+              <a:ext uri="{FF2B5EF4-FFF2-40B4-BE49-F238E27FC236}">
+                <a16:creationId xmlns:a16="http://schemas.microsoft.com/office/drawing/2014/main" id="{6797D78D-07F9-00BB-7214-1C5DE82101B7}"/>
+              </a:ext>
+            </a:extLst>
+          </p:cNvPr>
+          <p:cNvPicPr>
+            <a:picLocks noChangeAspect="1"/>
+          </p:cNvPicPr>
+          <p:nvPr/>
+        </p:nvPicPr>
+        <p:blipFill>
+          <a:blip r:embed="rId2">
+            <a:extLst>
+              <a:ext uri="{96DAC541-7B7A-43D3-8B79-37D633B846F1}">
+                <asvg:svgBlip xmlns:asvg="http://schemas.microsoft.com/office/drawing/2016/SVG/main" r:embed="rId3"/>
+              </a:ext>
+            </a:extLst>
+          </a:blip>
+          <a:stretch>
+            <a:fillRect/>
+          </a:stretch>
+        </p:blipFill>
+        <p:spPr>
+          <a:xfrm flipH="1">
+            <a:off x="2151529" y="3849070"/>
+            <a:ext cx="761105" cy="761105"/>
+          </a:xfrm>
+          <a:prstGeom prst="rect">
+            <a:avLst/>
+          </a:prstGeom>
+        </p:spPr>
+      </p:pic>
+      <p:sp>
+        <p:nvSpPr>
+          <p:cNvPr id="9" name="TextBox 8">
+            <a:extLst>
+              <a:ext uri="{FF2B5EF4-FFF2-40B4-BE49-F238E27FC236}">
+                <a16:creationId xmlns:a16="http://schemas.microsoft.com/office/drawing/2014/main" id="{251A1A76-B844-4A36-E1D7-802DB9281CD7}"/>
+              </a:ext>
+            </a:extLst>
+          </p:cNvPr>
+          <p:cNvSpPr txBox="1"/>
+          <p:nvPr/>
+        </p:nvSpPr>
+        <p:spPr>
+          <a:xfrm>
+            <a:off x="1442089" y="3871510"/>
+            <a:ext cx="761105" cy="707886"/>
+          </a:xfrm>
+          <a:prstGeom prst="rect">
+            <a:avLst/>
+          </a:prstGeom>
+          <a:noFill/>
+        </p:spPr>
+        <p:txBody>
+          <a:bodyPr wrap="square" rtlCol="0">
+            <a:spAutoFit/>
+          </a:bodyPr>
+          <a:lstStyle/>
+          <a:p>
+            <a:r>
+              <a:rPr lang="en-US" sz="4000" b="1" dirty="0"/>
+              <a:t>3S</a:t>
+            </a:r>
+            <a:endParaRPr lang="en-SG" sz="4000" b="1" dirty="0"/>
           </a:p>
         </p:txBody>
       </p:sp>

</xml_diff>

<commit_message>
update the design document and add the logo.
</commit_message>
<xml_diff>
--- a/doc/designDoc.pptx
+++ b/doc/designDoc.pptx
@@ -6,6 +6,7 @@
   </p:sldMasterIdLst>
   <p:sldIdLst>
     <p:sldId id="256" r:id="rId2"/>
+    <p:sldId id="257" r:id="rId3"/>
   </p:sldIdLst>
   <p:sldSz cx="12192000" cy="6858000"/>
   <p:notesSz cx="6858000" cy="9144000"/>
@@ -261,7 +262,7 @@
           <a:p>
             <a:fld id="{5568BA03-6613-4DAC-9DC1-5FD1D61FA6E8}" type="datetimeFigureOut">
               <a:rPr lang="en-SG" smtClean="0"/>
-              <a:t>1/8/2024</a:t>
+              <a:t>2/8/2024</a:t>
             </a:fld>
             <a:endParaRPr lang="en-SG"/>
           </a:p>
@@ -461,7 +462,7 @@
           <a:p>
             <a:fld id="{5568BA03-6613-4DAC-9DC1-5FD1D61FA6E8}" type="datetimeFigureOut">
               <a:rPr lang="en-SG" smtClean="0"/>
-              <a:t>1/8/2024</a:t>
+              <a:t>2/8/2024</a:t>
             </a:fld>
             <a:endParaRPr lang="en-SG"/>
           </a:p>
@@ -671,7 +672,7 @@
           <a:p>
             <a:fld id="{5568BA03-6613-4DAC-9DC1-5FD1D61FA6E8}" type="datetimeFigureOut">
               <a:rPr lang="en-SG" smtClean="0"/>
-              <a:t>1/8/2024</a:t>
+              <a:t>2/8/2024</a:t>
             </a:fld>
             <a:endParaRPr lang="en-SG"/>
           </a:p>
@@ -871,7 +872,7 @@
           <a:p>
             <a:fld id="{5568BA03-6613-4DAC-9DC1-5FD1D61FA6E8}" type="datetimeFigureOut">
               <a:rPr lang="en-SG" smtClean="0"/>
-              <a:t>1/8/2024</a:t>
+              <a:t>2/8/2024</a:t>
             </a:fld>
             <a:endParaRPr lang="en-SG"/>
           </a:p>
@@ -1147,7 +1148,7 @@
           <a:p>
             <a:fld id="{5568BA03-6613-4DAC-9DC1-5FD1D61FA6E8}" type="datetimeFigureOut">
               <a:rPr lang="en-SG" smtClean="0"/>
-              <a:t>1/8/2024</a:t>
+              <a:t>2/8/2024</a:t>
             </a:fld>
             <a:endParaRPr lang="en-SG"/>
           </a:p>
@@ -1415,7 +1416,7 @@
           <a:p>
             <a:fld id="{5568BA03-6613-4DAC-9DC1-5FD1D61FA6E8}" type="datetimeFigureOut">
               <a:rPr lang="en-SG" smtClean="0"/>
-              <a:t>1/8/2024</a:t>
+              <a:t>2/8/2024</a:t>
             </a:fld>
             <a:endParaRPr lang="en-SG"/>
           </a:p>
@@ -1830,7 +1831,7 @@
           <a:p>
             <a:fld id="{5568BA03-6613-4DAC-9DC1-5FD1D61FA6E8}" type="datetimeFigureOut">
               <a:rPr lang="en-SG" smtClean="0"/>
-              <a:t>1/8/2024</a:t>
+              <a:t>2/8/2024</a:t>
             </a:fld>
             <a:endParaRPr lang="en-SG"/>
           </a:p>
@@ -1972,7 +1973,7 @@
           <a:p>
             <a:fld id="{5568BA03-6613-4DAC-9DC1-5FD1D61FA6E8}" type="datetimeFigureOut">
               <a:rPr lang="en-SG" smtClean="0"/>
-              <a:t>1/8/2024</a:t>
+              <a:t>2/8/2024</a:t>
             </a:fld>
             <a:endParaRPr lang="en-SG"/>
           </a:p>
@@ -2085,7 +2086,7 @@
           <a:p>
             <a:fld id="{5568BA03-6613-4DAC-9DC1-5FD1D61FA6E8}" type="datetimeFigureOut">
               <a:rPr lang="en-SG" smtClean="0"/>
-              <a:t>1/8/2024</a:t>
+              <a:t>2/8/2024</a:t>
             </a:fld>
             <a:endParaRPr lang="en-SG"/>
           </a:p>
@@ -2398,7 +2399,7 @@
           <a:p>
             <a:fld id="{5568BA03-6613-4DAC-9DC1-5FD1D61FA6E8}" type="datetimeFigureOut">
               <a:rPr lang="en-SG" smtClean="0"/>
-              <a:t>1/8/2024</a:t>
+              <a:t>2/8/2024</a:t>
             </a:fld>
             <a:endParaRPr lang="en-SG"/>
           </a:p>
@@ -2687,7 +2688,7 @@
           <a:p>
             <a:fld id="{5568BA03-6613-4DAC-9DC1-5FD1D61FA6E8}" type="datetimeFigureOut">
               <a:rPr lang="en-SG" smtClean="0"/>
-              <a:t>1/8/2024</a:t>
+              <a:t>2/8/2024</a:t>
             </a:fld>
             <a:endParaRPr lang="en-SG"/>
           </a:p>
@@ -2930,7 +2931,7 @@
           <a:p>
             <a:fld id="{5568BA03-6613-4DAC-9DC1-5FD1D61FA6E8}" type="datetimeFigureOut">
               <a:rPr lang="en-SG" smtClean="0"/>
-              <a:t>1/8/2024</a:t>
+              <a:t>2/8/2024</a:t>
             </a:fld>
             <a:endParaRPr lang="en-SG"/>
           </a:p>
@@ -3938,6 +3939,612 @@
     <p:extLst>
       <p:ext uri="{BB962C8B-B14F-4D97-AF65-F5344CB8AC3E}">
         <p14:creationId xmlns:p14="http://schemas.microsoft.com/office/powerpoint/2010/main" val="1620527816"/>
+      </p:ext>
+    </p:extLst>
+  </p:cSld>
+  <p:clrMapOvr>
+    <a:masterClrMapping/>
+  </p:clrMapOvr>
+</p:sld>
+</file>
+
+<file path=ppt/slides/slide2.xml><?xml version="1.0" encoding="utf-8"?>
+<p:sld xmlns:a="http://schemas.openxmlformats.org/drawingml/2006/main" xmlns:r="http://schemas.openxmlformats.org/officeDocument/2006/relationships" xmlns:p="http://schemas.openxmlformats.org/presentationml/2006/main">
+  <p:cSld>
+    <p:spTree>
+      <p:nvGrpSpPr>
+        <p:cNvPr id="1" name=""/>
+        <p:cNvGrpSpPr/>
+        <p:nvPr/>
+      </p:nvGrpSpPr>
+      <p:grpSpPr>
+        <a:xfrm>
+          <a:off x="0" y="0"/>
+          <a:ext cx="0" cy="0"/>
+          <a:chOff x="0" y="0"/>
+          <a:chExt cx="0" cy="0"/>
+        </a:xfrm>
+      </p:grpSpPr>
+      <p:sp>
+        <p:nvSpPr>
+          <p:cNvPr id="7" name="Rectangle 6">
+            <a:extLst>
+              <a:ext uri="{FF2B5EF4-FFF2-40B4-BE49-F238E27FC236}">
+                <a16:creationId xmlns:a16="http://schemas.microsoft.com/office/drawing/2014/main" id="{6954E589-2CC5-C3D5-55F0-A7DA31486041}"/>
+              </a:ext>
+            </a:extLst>
+          </p:cNvPr>
+          <p:cNvSpPr/>
+          <p:nvPr/>
+        </p:nvSpPr>
+        <p:spPr>
+          <a:xfrm>
+            <a:off x="3309771" y="1168427"/>
+            <a:ext cx="1278404" cy="1638095"/>
+          </a:xfrm>
+          <a:prstGeom prst="rect">
+            <a:avLst/>
+          </a:prstGeom>
+          <a:noFill/>
+          <a:ln>
+            <a:prstDash val="sysDash"/>
+          </a:ln>
+        </p:spPr>
+        <p:style>
+          <a:lnRef idx="2">
+            <a:schemeClr val="accent1">
+              <a:shade val="15000"/>
+            </a:schemeClr>
+          </a:lnRef>
+          <a:fillRef idx="1">
+            <a:schemeClr val="accent1"/>
+          </a:fillRef>
+          <a:effectRef idx="0">
+            <a:schemeClr val="accent1"/>
+          </a:effectRef>
+          <a:fontRef idx="minor">
+            <a:schemeClr val="lt1"/>
+          </a:fontRef>
+        </p:style>
+        <p:txBody>
+          <a:bodyPr rtlCol="0" anchor="ctr"/>
+          <a:lstStyle/>
+          <a:p>
+            <a:pPr algn="ctr"/>
+            <a:endParaRPr lang="en-SG"/>
+          </a:p>
+        </p:txBody>
+      </p:sp>
+      <p:pic>
+        <p:nvPicPr>
+          <p:cNvPr id="5" name="Picture 4">
+            <a:extLst>
+              <a:ext uri="{FF2B5EF4-FFF2-40B4-BE49-F238E27FC236}">
+                <a16:creationId xmlns:a16="http://schemas.microsoft.com/office/drawing/2014/main" id="{7ED315C2-042D-8CA1-834C-95B0D3C59D76}"/>
+              </a:ext>
+            </a:extLst>
+          </p:cNvPr>
+          <p:cNvPicPr>
+            <a:picLocks noChangeAspect="1"/>
+          </p:cNvPicPr>
+          <p:nvPr/>
+        </p:nvPicPr>
+        <p:blipFill>
+          <a:blip r:embed="rId2"/>
+          <a:stretch>
+            <a:fillRect/>
+          </a:stretch>
+        </p:blipFill>
+        <p:spPr>
+          <a:xfrm>
+            <a:off x="1414532" y="1168427"/>
+            <a:ext cx="1895238" cy="1638095"/>
+          </a:xfrm>
+          <a:prstGeom prst="rect">
+            <a:avLst/>
+          </a:prstGeom>
+        </p:spPr>
+      </p:pic>
+      <p:pic>
+        <p:nvPicPr>
+          <p:cNvPr id="1026" name="Picture 2" descr="symbol">
+            <a:extLst>
+              <a:ext uri="{FF2B5EF4-FFF2-40B4-BE49-F238E27FC236}">
+                <a16:creationId xmlns:a16="http://schemas.microsoft.com/office/drawing/2014/main" id="{B7529C5A-88E6-9CA9-A76D-31868FA79A0D}"/>
+              </a:ext>
+            </a:extLst>
+          </p:cNvPr>
+          <p:cNvPicPr>
+            <a:picLocks noChangeAspect="1" noChangeArrowheads="1"/>
+          </p:cNvPicPr>
+          <p:nvPr/>
+        </p:nvPicPr>
+        <p:blipFill>
+          <a:blip r:embed="rId3">
+            <a:lum bright="70000" contrast="-70000"/>
+            <a:extLst>
+              <a:ext uri="{28A0092B-C50C-407E-A947-70E740481C1C}">
+                <a14:useLocalDpi xmlns:a14="http://schemas.microsoft.com/office/drawing/2010/main" val="0"/>
+              </a:ext>
+            </a:extLst>
+          </a:blip>
+          <a:srcRect/>
+          <a:stretch>
+            <a:fillRect/>
+          </a:stretch>
+        </p:blipFill>
+        <p:spPr bwMode="auto">
+          <a:xfrm rot="2604443">
+            <a:off x="2821776" y="915110"/>
+            <a:ext cx="1046549" cy="1046549"/>
+          </a:xfrm>
+          <a:prstGeom prst="rect">
+            <a:avLst/>
+          </a:prstGeom>
+          <a:noFill/>
+          <a:extLst>
+            <a:ext uri="{909E8E84-426E-40DD-AFC4-6F175D3DCCD1}">
+              <a14:hiddenFill xmlns:a14="http://schemas.microsoft.com/office/drawing/2010/main">
+                <a:solidFill>
+                  <a:srgbClr val="FFFFFF"/>
+                </a:solidFill>
+              </a14:hiddenFill>
+            </a:ext>
+          </a:extLst>
+        </p:spPr>
+      </p:pic>
+      <p:pic>
+        <p:nvPicPr>
+          <p:cNvPr id="1028" name="Picture 4" descr="104,005 Building Plans Icon Royalty ...">
+            <a:extLst>
+              <a:ext uri="{FF2B5EF4-FFF2-40B4-BE49-F238E27FC236}">
+                <a16:creationId xmlns:a16="http://schemas.microsoft.com/office/drawing/2014/main" id="{A87FE95D-D948-E5AD-9026-2B9F3A9B0395}"/>
+              </a:ext>
+            </a:extLst>
+          </p:cNvPr>
+          <p:cNvPicPr>
+            <a:picLocks noChangeAspect="1" noChangeArrowheads="1"/>
+          </p:cNvPicPr>
+          <p:nvPr/>
+        </p:nvPicPr>
+        <p:blipFill rotWithShape="1">
+          <a:blip r:embed="rId4">
+            <a:extLst>
+              <a:ext uri="{28A0092B-C50C-407E-A947-70E740481C1C}">
+                <a14:useLocalDpi xmlns:a14="http://schemas.microsoft.com/office/drawing/2010/main" val="0"/>
+              </a:ext>
+            </a:extLst>
+          </a:blip>
+          <a:srcRect b="16144"/>
+          <a:stretch/>
+        </p:blipFill>
+        <p:spPr bwMode="auto">
+          <a:xfrm>
+            <a:off x="3455800" y="1544087"/>
+            <a:ext cx="1079651" cy="963487"/>
+          </a:xfrm>
+          <a:prstGeom prst="rect">
+            <a:avLst/>
+          </a:prstGeom>
+          <a:noFill/>
+          <a:extLst>
+            <a:ext uri="{909E8E84-426E-40DD-AFC4-6F175D3DCCD1}">
+              <a14:hiddenFill xmlns:a14="http://schemas.microsoft.com/office/drawing/2010/main">
+                <a:solidFill>
+                  <a:srgbClr val="FFFFFF"/>
+                </a:solidFill>
+              </a14:hiddenFill>
+            </a:ext>
+          </a:extLst>
+        </p:spPr>
+      </p:pic>
+      <p:pic>
+        <p:nvPicPr>
+          <p:cNvPr id="6" name="Picture 2" descr="symbol">
+            <a:extLst>
+              <a:ext uri="{FF2B5EF4-FFF2-40B4-BE49-F238E27FC236}">
+                <a16:creationId xmlns:a16="http://schemas.microsoft.com/office/drawing/2014/main" id="{D47EB2ED-12DC-3951-1348-A1DD01BDD8F8}"/>
+              </a:ext>
+            </a:extLst>
+          </p:cNvPr>
+          <p:cNvPicPr>
+            <a:picLocks noChangeAspect="1" noChangeArrowheads="1"/>
+          </p:cNvPicPr>
+          <p:nvPr/>
+        </p:nvPicPr>
+        <p:blipFill>
+          <a:blip r:embed="rId3">
+            <a:duotone>
+              <a:prstClr val="black"/>
+              <a:srgbClr val="D9C3A5">
+                <a:tint val="50000"/>
+                <a:satMod val="180000"/>
+              </a:srgbClr>
+            </a:duotone>
+            <a:extLst>
+              <a:ext uri="{28A0092B-C50C-407E-A947-70E740481C1C}">
+                <a14:useLocalDpi xmlns:a14="http://schemas.microsoft.com/office/drawing/2010/main" val="0"/>
+              </a:ext>
+            </a:extLst>
+          </a:blip>
+          <a:srcRect/>
+          <a:stretch>
+            <a:fillRect/>
+          </a:stretch>
+        </p:blipFill>
+        <p:spPr bwMode="auto">
+          <a:xfrm rot="2604443">
+            <a:off x="5754675" y="2031168"/>
+            <a:ext cx="1019664" cy="1019664"/>
+          </a:xfrm>
+          <a:prstGeom prst="rect">
+            <a:avLst/>
+          </a:prstGeom>
+          <a:noFill/>
+          <a:extLst>
+            <a:ext uri="{909E8E84-426E-40DD-AFC4-6F175D3DCCD1}">
+              <a14:hiddenFill xmlns:a14="http://schemas.microsoft.com/office/drawing/2010/main">
+                <a:solidFill>
+                  <a:srgbClr val="FFFFFF"/>
+                </a:solidFill>
+              </a14:hiddenFill>
+            </a:ext>
+          </a:extLst>
+        </p:spPr>
+      </p:pic>
+      <p:pic>
+        <p:nvPicPr>
+          <p:cNvPr id="8" name="Picture 2" descr="symbol">
+            <a:extLst>
+              <a:ext uri="{FF2B5EF4-FFF2-40B4-BE49-F238E27FC236}">
+                <a16:creationId xmlns:a16="http://schemas.microsoft.com/office/drawing/2014/main" id="{CFFE89F4-05AF-CC41-86E1-32052D726932}"/>
+              </a:ext>
+            </a:extLst>
+          </p:cNvPr>
+          <p:cNvPicPr>
+            <a:picLocks noChangeAspect="1" noChangeArrowheads="1"/>
+          </p:cNvPicPr>
+          <p:nvPr/>
+        </p:nvPicPr>
+        <p:blipFill>
+          <a:blip r:embed="rId3">
+            <a:lum bright="70000" contrast="-70000"/>
+            <a:extLst>
+              <a:ext uri="{28A0092B-C50C-407E-A947-70E740481C1C}">
+                <a14:useLocalDpi xmlns:a14="http://schemas.microsoft.com/office/drawing/2010/main" val="0"/>
+              </a:ext>
+            </a:extLst>
+          </a:blip>
+          <a:srcRect/>
+          <a:stretch>
+            <a:fillRect/>
+          </a:stretch>
+        </p:blipFill>
+        <p:spPr bwMode="auto">
+          <a:xfrm rot="2604443">
+            <a:off x="5771542" y="1112233"/>
+            <a:ext cx="984549" cy="984549"/>
+          </a:xfrm>
+          <a:prstGeom prst="rect">
+            <a:avLst/>
+          </a:prstGeom>
+          <a:noFill/>
+          <a:extLst>
+            <a:ext uri="{909E8E84-426E-40DD-AFC4-6F175D3DCCD1}">
+              <a14:hiddenFill xmlns:a14="http://schemas.microsoft.com/office/drawing/2010/main">
+                <a:solidFill>
+                  <a:srgbClr val="FFFFFF"/>
+                </a:solidFill>
+              </a14:hiddenFill>
+            </a:ext>
+          </a:extLst>
+        </p:spPr>
+      </p:pic>
+      <p:pic>
+        <p:nvPicPr>
+          <p:cNvPr id="12" name="Picture 11">
+            <a:extLst>
+              <a:ext uri="{FF2B5EF4-FFF2-40B4-BE49-F238E27FC236}">
+                <a16:creationId xmlns:a16="http://schemas.microsoft.com/office/drawing/2014/main" id="{595C8A80-03C8-7B8F-4D6E-5E3B1C721F10}"/>
+              </a:ext>
+            </a:extLst>
+          </p:cNvPr>
+          <p:cNvPicPr>
+            <a:picLocks noChangeAspect="1"/>
+          </p:cNvPicPr>
+          <p:nvPr/>
+        </p:nvPicPr>
+        <p:blipFill>
+          <a:blip r:embed="rId5"/>
+          <a:stretch>
+            <a:fillRect/>
+          </a:stretch>
+        </p:blipFill>
+        <p:spPr>
+          <a:xfrm>
+            <a:off x="3320804" y="1273189"/>
+            <a:ext cx="790476" cy="304762"/>
+          </a:xfrm>
+          <a:prstGeom prst="rect">
+            <a:avLst/>
+          </a:prstGeom>
+        </p:spPr>
+      </p:pic>
+      <p:sp>
+        <p:nvSpPr>
+          <p:cNvPr id="13" name="Oval 12">
+            <a:extLst>
+              <a:ext uri="{FF2B5EF4-FFF2-40B4-BE49-F238E27FC236}">
+                <a16:creationId xmlns:a16="http://schemas.microsoft.com/office/drawing/2014/main" id="{0034B140-8C27-2EAE-85AE-B61689CF008F}"/>
+              </a:ext>
+            </a:extLst>
+          </p:cNvPr>
+          <p:cNvSpPr/>
+          <p:nvPr/>
+        </p:nvSpPr>
+        <p:spPr>
+          <a:xfrm>
+            <a:off x="4178241" y="1230108"/>
+            <a:ext cx="154666" cy="199476"/>
+          </a:xfrm>
+          <a:prstGeom prst="ellipse">
+            <a:avLst/>
+          </a:prstGeom>
+        </p:spPr>
+        <p:style>
+          <a:lnRef idx="2">
+            <a:schemeClr val="accent1">
+              <a:shade val="15000"/>
+            </a:schemeClr>
+          </a:lnRef>
+          <a:fillRef idx="1">
+            <a:schemeClr val="accent1"/>
+          </a:fillRef>
+          <a:effectRef idx="0">
+            <a:schemeClr val="accent1"/>
+          </a:effectRef>
+          <a:fontRef idx="minor">
+            <a:schemeClr val="lt1"/>
+          </a:fontRef>
+        </p:style>
+        <p:txBody>
+          <a:bodyPr rtlCol="0" anchor="ctr"/>
+          <a:lstStyle/>
+          <a:p>
+            <a:pPr algn="ctr"/>
+            <a:endParaRPr lang="en-SG"/>
+          </a:p>
+        </p:txBody>
+      </p:sp>
+      <p:cxnSp>
+        <p:nvCxnSpPr>
+          <p:cNvPr id="15" name="Connector: Curved 14">
+            <a:extLst>
+              <a:ext uri="{FF2B5EF4-FFF2-40B4-BE49-F238E27FC236}">
+                <a16:creationId xmlns:a16="http://schemas.microsoft.com/office/drawing/2014/main" id="{FB42D5ED-49DA-2D55-F3D0-A97625097D4A}"/>
+              </a:ext>
+            </a:extLst>
+          </p:cNvPr>
+          <p:cNvCxnSpPr>
+            <a:cxnSpLocks/>
+            <a:stCxn id="13" idx="2"/>
+            <a:endCxn id="17" idx="6"/>
+          </p:cNvCxnSpPr>
+          <p:nvPr/>
+        </p:nvCxnSpPr>
+        <p:spPr>
+          <a:xfrm rot="10800000" flipH="1" flipV="1">
+            <a:off x="4178240" y="1329845"/>
+            <a:ext cx="223933" cy="678637"/>
+          </a:xfrm>
+          <a:prstGeom prst="curvedConnector5">
+            <a:avLst>
+              <a:gd name="adj1" fmla="val -102084"/>
+              <a:gd name="adj2" fmla="val 50000"/>
+              <a:gd name="adj3" fmla="val 154803"/>
+            </a:avLst>
+          </a:prstGeom>
+          <a:ln>
+            <a:prstDash val="sysDash"/>
+          </a:ln>
+        </p:spPr>
+        <p:style>
+          <a:lnRef idx="2">
+            <a:schemeClr val="accent1"/>
+          </a:lnRef>
+          <a:fillRef idx="0">
+            <a:schemeClr val="accent1"/>
+          </a:fillRef>
+          <a:effectRef idx="1">
+            <a:schemeClr val="accent1"/>
+          </a:effectRef>
+          <a:fontRef idx="minor">
+            <a:schemeClr val="tx1"/>
+          </a:fontRef>
+        </p:style>
+      </p:cxnSp>
+      <p:sp>
+        <p:nvSpPr>
+          <p:cNvPr id="17" name="Oval 16">
+            <a:extLst>
+              <a:ext uri="{FF2B5EF4-FFF2-40B4-BE49-F238E27FC236}">
+                <a16:creationId xmlns:a16="http://schemas.microsoft.com/office/drawing/2014/main" id="{DC1FD776-4F86-CDF7-E10E-C3DF2E770247}"/>
+              </a:ext>
+            </a:extLst>
+          </p:cNvPr>
+          <p:cNvSpPr/>
+          <p:nvPr/>
+        </p:nvSpPr>
+        <p:spPr>
+          <a:xfrm>
+            <a:off x="4247508" y="1908745"/>
+            <a:ext cx="154666" cy="199476"/>
+          </a:xfrm>
+          <a:prstGeom prst="ellipse">
+            <a:avLst/>
+          </a:prstGeom>
+          <a:solidFill>
+            <a:srgbClr val="C00000"/>
+          </a:solidFill>
+        </p:spPr>
+        <p:style>
+          <a:lnRef idx="2">
+            <a:schemeClr val="accent1">
+              <a:shade val="15000"/>
+            </a:schemeClr>
+          </a:lnRef>
+          <a:fillRef idx="1">
+            <a:schemeClr val="accent1"/>
+          </a:fillRef>
+          <a:effectRef idx="0">
+            <a:schemeClr val="accent1"/>
+          </a:effectRef>
+          <a:fontRef idx="minor">
+            <a:schemeClr val="lt1"/>
+          </a:fontRef>
+        </p:style>
+        <p:txBody>
+          <a:bodyPr rtlCol="0" anchor="ctr"/>
+          <a:lstStyle/>
+          <a:p>
+            <a:pPr algn="ctr"/>
+            <a:endParaRPr lang="en-SG"/>
+          </a:p>
+        </p:txBody>
+      </p:sp>
+      <p:sp>
+        <p:nvSpPr>
+          <p:cNvPr id="24" name="Multiplication Sign 23">
+            <a:extLst>
+              <a:ext uri="{FF2B5EF4-FFF2-40B4-BE49-F238E27FC236}">
+                <a16:creationId xmlns:a16="http://schemas.microsoft.com/office/drawing/2014/main" id="{E79F7221-F8BE-E9D8-3087-B21C0D236548}"/>
+              </a:ext>
+            </a:extLst>
+          </p:cNvPr>
+          <p:cNvSpPr/>
+          <p:nvPr/>
+        </p:nvSpPr>
+        <p:spPr>
+          <a:xfrm>
+            <a:off x="3701570" y="1577951"/>
+            <a:ext cx="366276" cy="357854"/>
+          </a:xfrm>
+          <a:prstGeom prst="mathMultiply">
+            <a:avLst/>
+          </a:prstGeom>
+          <a:solidFill>
+            <a:srgbClr val="C00000"/>
+          </a:solidFill>
+        </p:spPr>
+        <p:style>
+          <a:lnRef idx="2">
+            <a:schemeClr val="accent1">
+              <a:shade val="15000"/>
+            </a:schemeClr>
+          </a:lnRef>
+          <a:fillRef idx="1">
+            <a:schemeClr val="accent1"/>
+          </a:fillRef>
+          <a:effectRef idx="0">
+            <a:schemeClr val="accent1"/>
+          </a:effectRef>
+          <a:fontRef idx="minor">
+            <a:schemeClr val="lt1"/>
+          </a:fontRef>
+        </p:style>
+        <p:txBody>
+          <a:bodyPr rtlCol="0" anchor="ctr"/>
+          <a:lstStyle/>
+          <a:p>
+            <a:pPr algn="ctr"/>
+            <a:endParaRPr lang="en-SG"/>
+          </a:p>
+        </p:txBody>
+      </p:sp>
+      <p:sp>
+        <p:nvSpPr>
+          <p:cNvPr id="25" name="TextBox 24">
+            <a:extLst>
+              <a:ext uri="{FF2B5EF4-FFF2-40B4-BE49-F238E27FC236}">
+                <a16:creationId xmlns:a16="http://schemas.microsoft.com/office/drawing/2014/main" id="{56BEE8D5-B228-A527-B6DE-81BAD0CBF2C0}"/>
+              </a:ext>
+            </a:extLst>
+          </p:cNvPr>
+          <p:cNvSpPr txBox="1"/>
+          <p:nvPr/>
+        </p:nvSpPr>
+        <p:spPr>
+          <a:xfrm>
+            <a:off x="2692936" y="2463234"/>
+            <a:ext cx="821273" cy="369332"/>
+          </a:xfrm>
+          <a:prstGeom prst="rect">
+            <a:avLst/>
+          </a:prstGeom>
+          <a:noFill/>
+        </p:spPr>
+        <p:txBody>
+          <a:bodyPr wrap="square" rtlCol="0">
+            <a:spAutoFit/>
+          </a:bodyPr>
+          <a:lstStyle/>
+          <a:p>
+            <a:r>
+              <a:rPr lang="en-US" b="1" dirty="0">
+                <a:solidFill>
+                  <a:schemeClr val="bg1"/>
+                </a:solidFill>
+              </a:rPr>
+              <a:t>2D-S</a:t>
+            </a:r>
+            <a:endParaRPr lang="en-SG" b="1" dirty="0">
+              <a:solidFill>
+                <a:schemeClr val="bg1"/>
+              </a:solidFill>
+            </a:endParaRPr>
+          </a:p>
+        </p:txBody>
+      </p:sp>
+      <p:sp>
+        <p:nvSpPr>
+          <p:cNvPr id="27" name="TextBox 26">
+            <a:extLst>
+              <a:ext uri="{FF2B5EF4-FFF2-40B4-BE49-F238E27FC236}">
+                <a16:creationId xmlns:a16="http://schemas.microsoft.com/office/drawing/2014/main" id="{E14729B1-9BDB-E3EC-1176-466C9A1574E5}"/>
+              </a:ext>
+            </a:extLst>
+          </p:cNvPr>
+          <p:cNvSpPr txBox="1"/>
+          <p:nvPr/>
+        </p:nvSpPr>
+        <p:spPr>
+          <a:xfrm>
+            <a:off x="3267241" y="2463234"/>
+            <a:ext cx="1441466" cy="369332"/>
+          </a:xfrm>
+          <a:prstGeom prst="rect">
+            <a:avLst/>
+          </a:prstGeom>
+          <a:noFill/>
+        </p:spPr>
+        <p:txBody>
+          <a:bodyPr wrap="square" rtlCol="0">
+            <a:spAutoFit/>
+          </a:bodyPr>
+          <a:lstStyle/>
+          <a:p>
+            <a:r>
+              <a:rPr lang="en-US" b="1" dirty="0" err="1"/>
+              <a:t>imulation</a:t>
+            </a:r>
+            <a:endParaRPr lang="en-SG" b="1" dirty="0"/>
+          </a:p>
+        </p:txBody>
+      </p:sp>
+    </p:spTree>
+    <p:extLst>
+      <p:ext uri="{BB962C8B-B14F-4D97-AF65-F5344CB8AC3E}">
+        <p14:creationId xmlns:p14="http://schemas.microsoft.com/office/powerpoint/2010/main" val="3394299434"/>
       </p:ext>
     </p:extLst>
   </p:cSld>

</xml_diff>

<commit_message>
update the manual movement control function.
</commit_message>
<xml_diff>
--- a/doc/designDoc.pptx
+++ b/doc/designDoc.pptx
@@ -262,7 +262,7 @@
           <a:p>
             <a:fld id="{5568BA03-6613-4DAC-9DC1-5FD1D61FA6E8}" type="datetimeFigureOut">
               <a:rPr lang="en-SG" smtClean="0"/>
-              <a:t>2/8/2024</a:t>
+              <a:t>4/8/2024</a:t>
             </a:fld>
             <a:endParaRPr lang="en-SG"/>
           </a:p>
@@ -462,7 +462,7 @@
           <a:p>
             <a:fld id="{5568BA03-6613-4DAC-9DC1-5FD1D61FA6E8}" type="datetimeFigureOut">
               <a:rPr lang="en-SG" smtClean="0"/>
-              <a:t>2/8/2024</a:t>
+              <a:t>4/8/2024</a:t>
             </a:fld>
             <a:endParaRPr lang="en-SG"/>
           </a:p>
@@ -672,7 +672,7 @@
           <a:p>
             <a:fld id="{5568BA03-6613-4DAC-9DC1-5FD1D61FA6E8}" type="datetimeFigureOut">
               <a:rPr lang="en-SG" smtClean="0"/>
-              <a:t>2/8/2024</a:t>
+              <a:t>4/8/2024</a:t>
             </a:fld>
             <a:endParaRPr lang="en-SG"/>
           </a:p>
@@ -872,7 +872,7 @@
           <a:p>
             <a:fld id="{5568BA03-6613-4DAC-9DC1-5FD1D61FA6E8}" type="datetimeFigureOut">
               <a:rPr lang="en-SG" smtClean="0"/>
-              <a:t>2/8/2024</a:t>
+              <a:t>4/8/2024</a:t>
             </a:fld>
             <a:endParaRPr lang="en-SG"/>
           </a:p>
@@ -1148,7 +1148,7 @@
           <a:p>
             <a:fld id="{5568BA03-6613-4DAC-9DC1-5FD1D61FA6E8}" type="datetimeFigureOut">
               <a:rPr lang="en-SG" smtClean="0"/>
-              <a:t>2/8/2024</a:t>
+              <a:t>4/8/2024</a:t>
             </a:fld>
             <a:endParaRPr lang="en-SG"/>
           </a:p>
@@ -1416,7 +1416,7 @@
           <a:p>
             <a:fld id="{5568BA03-6613-4DAC-9DC1-5FD1D61FA6E8}" type="datetimeFigureOut">
               <a:rPr lang="en-SG" smtClean="0"/>
-              <a:t>2/8/2024</a:t>
+              <a:t>4/8/2024</a:t>
             </a:fld>
             <a:endParaRPr lang="en-SG"/>
           </a:p>
@@ -1831,7 +1831,7 @@
           <a:p>
             <a:fld id="{5568BA03-6613-4DAC-9DC1-5FD1D61FA6E8}" type="datetimeFigureOut">
               <a:rPr lang="en-SG" smtClean="0"/>
-              <a:t>2/8/2024</a:t>
+              <a:t>4/8/2024</a:t>
             </a:fld>
             <a:endParaRPr lang="en-SG"/>
           </a:p>
@@ -1973,7 +1973,7 @@
           <a:p>
             <a:fld id="{5568BA03-6613-4DAC-9DC1-5FD1D61FA6E8}" type="datetimeFigureOut">
               <a:rPr lang="en-SG" smtClean="0"/>
-              <a:t>2/8/2024</a:t>
+              <a:t>4/8/2024</a:t>
             </a:fld>
             <a:endParaRPr lang="en-SG"/>
           </a:p>
@@ -2086,7 +2086,7 @@
           <a:p>
             <a:fld id="{5568BA03-6613-4DAC-9DC1-5FD1D61FA6E8}" type="datetimeFigureOut">
               <a:rPr lang="en-SG" smtClean="0"/>
-              <a:t>2/8/2024</a:t>
+              <a:t>4/8/2024</a:t>
             </a:fld>
             <a:endParaRPr lang="en-SG"/>
           </a:p>
@@ -2399,7 +2399,7 @@
           <a:p>
             <a:fld id="{5568BA03-6613-4DAC-9DC1-5FD1D61FA6E8}" type="datetimeFigureOut">
               <a:rPr lang="en-SG" smtClean="0"/>
-              <a:t>2/8/2024</a:t>
+              <a:t>4/8/2024</a:t>
             </a:fld>
             <a:endParaRPr lang="en-SG"/>
           </a:p>
@@ -2688,7 +2688,7 @@
           <a:p>
             <a:fld id="{5568BA03-6613-4DAC-9DC1-5FD1D61FA6E8}" type="datetimeFigureOut">
               <a:rPr lang="en-SG" smtClean="0"/>
-              <a:t>2/8/2024</a:t>
+              <a:t>4/8/2024</a:t>
             </a:fld>
             <a:endParaRPr lang="en-SG"/>
           </a:p>
@@ -2931,7 +2931,7 @@
           <a:p>
             <a:fld id="{5568BA03-6613-4DAC-9DC1-5FD1D61FA6E8}" type="datetimeFigureOut">
               <a:rPr lang="en-SG" smtClean="0"/>
-              <a:t>2/8/2024</a:t>
+              <a:t>4/8/2024</a:t>
             </a:fld>
             <a:endParaRPr lang="en-SG"/>
           </a:p>
@@ -3362,7 +3362,7 @@
         </p:nvSpPr>
         <p:spPr>
           <a:xfrm>
-            <a:off x="1258645" y="2373840"/>
+            <a:off x="1085390" y="756796"/>
             <a:ext cx="1785769" cy="761105"/>
           </a:xfrm>
           <a:prstGeom prst="rect">
@@ -3427,7 +3427,7 @@
         </p:blipFill>
         <p:spPr>
           <a:xfrm>
-            <a:off x="1336636" y="2373840"/>
+            <a:off x="1163381" y="756796"/>
             <a:ext cx="761105" cy="761105"/>
           </a:xfrm>
           <a:prstGeom prst="rect">
@@ -3449,7 +3449,7 @@
         </p:nvSpPr>
         <p:spPr>
           <a:xfrm>
-            <a:off x="2097741" y="2431228"/>
+            <a:off x="1924486" y="814184"/>
             <a:ext cx="761105" cy="707886"/>
           </a:xfrm>
           <a:prstGeom prst="rect">
@@ -3485,7 +3485,7 @@
         </p:nvSpPr>
         <p:spPr>
           <a:xfrm>
-            <a:off x="3603436" y="2373839"/>
+            <a:off x="3430181" y="756795"/>
             <a:ext cx="1785769" cy="761105"/>
           </a:xfrm>
           <a:prstGeom prst="rect">
@@ -3550,7 +3550,7 @@
         </p:blipFill>
         <p:spPr>
           <a:xfrm>
-            <a:off x="4206359" y="2464430"/>
+            <a:off x="4033104" y="847386"/>
             <a:ext cx="579922" cy="579922"/>
           </a:xfrm>
           <a:prstGeom prst="rect">
@@ -3572,7 +3572,7 @@
         </p:nvSpPr>
         <p:spPr>
           <a:xfrm>
-            <a:off x="5948227" y="2373838"/>
+            <a:off x="5774972" y="756794"/>
             <a:ext cx="1785769" cy="761105"/>
           </a:xfrm>
           <a:prstGeom prst="rect">
@@ -3637,7 +3637,7 @@
         </p:blipFill>
         <p:spPr>
           <a:xfrm>
-            <a:off x="6517862" y="2431141"/>
+            <a:off x="6344607" y="814097"/>
             <a:ext cx="613211" cy="613211"/>
           </a:xfrm>
           <a:prstGeom prst="rect">
@@ -3659,7 +3659,7 @@
         </p:nvSpPr>
         <p:spPr>
           <a:xfrm>
-            <a:off x="8463465" y="2402599"/>
+            <a:off x="8290210" y="785555"/>
             <a:ext cx="1785769" cy="761105"/>
           </a:xfrm>
           <a:prstGeom prst="rect">
@@ -3724,7 +3724,7 @@
         </p:blipFill>
         <p:spPr>
           <a:xfrm>
-            <a:off x="8380802" y="2327971"/>
+            <a:off x="8207547" y="710927"/>
             <a:ext cx="914400" cy="914400"/>
           </a:xfrm>
           <a:prstGeom prst="rect">
@@ -3746,7 +3746,7 @@
         </p:nvSpPr>
         <p:spPr>
           <a:xfrm>
-            <a:off x="9075450" y="2521541"/>
+            <a:off x="8902195" y="904497"/>
             <a:ext cx="1227572" cy="523220"/>
           </a:xfrm>
           <a:prstGeom prst="rect">
@@ -3770,10 +3770,10 @@
       </p:sp>
       <p:sp>
         <p:nvSpPr>
-          <p:cNvPr id="2" name="Rectangle 1">
-            <a:extLst>
-              <a:ext uri="{FF2B5EF4-FFF2-40B4-BE49-F238E27FC236}">
-                <a16:creationId xmlns:a16="http://schemas.microsoft.com/office/drawing/2014/main" id="{15AC4E0E-4C8A-A179-6D90-0BA8BDD15591}"/>
+          <p:cNvPr id="3" name="Rectangle 2">
+            <a:extLst>
+              <a:ext uri="{FF2B5EF4-FFF2-40B4-BE49-F238E27FC236}">
+                <a16:creationId xmlns:a16="http://schemas.microsoft.com/office/drawing/2014/main" id="{F9CFB370-FCA6-C364-9640-A64F9BF53C02}"/>
               </a:ext>
             </a:extLst>
           </p:cNvPr>
@@ -3782,51 +3782,7 @@
         </p:nvSpPr>
         <p:spPr>
           <a:xfrm>
-            <a:off x="4398745" y="298383"/>
-            <a:ext cx="577516" cy="625642"/>
-          </a:xfrm>
-          <a:prstGeom prst="rect">
-            <a:avLst/>
-          </a:prstGeom>
-        </p:spPr>
-        <p:style>
-          <a:lnRef idx="1">
-            <a:schemeClr val="accent6"/>
-          </a:lnRef>
-          <a:fillRef idx="2">
-            <a:schemeClr val="accent6"/>
-          </a:fillRef>
-          <a:effectRef idx="1">
-            <a:schemeClr val="accent6"/>
-          </a:effectRef>
-          <a:fontRef idx="minor">
-            <a:schemeClr val="dk1"/>
-          </a:fontRef>
-        </p:style>
-        <p:txBody>
-          <a:bodyPr rtlCol="0" anchor="ctr"/>
-          <a:lstStyle/>
-          <a:p>
-            <a:pPr algn="ctr"/>
-            <a:endParaRPr lang="en-SG"/>
-          </a:p>
-        </p:txBody>
-      </p:sp>
-      <p:sp>
-        <p:nvSpPr>
-          <p:cNvPr id="3" name="Rectangle 2">
-            <a:extLst>
-              <a:ext uri="{FF2B5EF4-FFF2-40B4-BE49-F238E27FC236}">
-                <a16:creationId xmlns:a16="http://schemas.microsoft.com/office/drawing/2014/main" id="{F9CFB370-FCA6-C364-9640-A64F9BF53C02}"/>
-              </a:ext>
-            </a:extLst>
-          </p:cNvPr>
-          <p:cNvSpPr/>
-          <p:nvPr/>
-        </p:nvSpPr>
-        <p:spPr>
-          <a:xfrm>
-            <a:off x="1258645" y="3844901"/>
+            <a:off x="1085390" y="2227857"/>
             <a:ext cx="1785769" cy="761105"/>
           </a:xfrm>
           <a:prstGeom prst="rect">
@@ -3891,7 +3847,7 @@
         </p:blipFill>
         <p:spPr>
           <a:xfrm flipH="1">
-            <a:off x="2151529" y="3849070"/>
+            <a:off x="1978274" y="2232026"/>
             <a:ext cx="761105" cy="761105"/>
           </a:xfrm>
           <a:prstGeom prst="rect">
@@ -3913,7 +3869,7 @@
         </p:nvSpPr>
         <p:spPr>
           <a:xfrm>
-            <a:off x="1442089" y="3871510"/>
+            <a:off x="1268834" y="2254466"/>
             <a:ext cx="761105" cy="707886"/>
           </a:xfrm>
           <a:prstGeom prst="rect">
@@ -3935,6 +3891,273 @@
           </a:p>
         </p:txBody>
       </p:sp>
+      <p:sp>
+        <p:nvSpPr>
+          <p:cNvPr id="12" name="Rectangle 11">
+            <a:extLst>
+              <a:ext uri="{FF2B5EF4-FFF2-40B4-BE49-F238E27FC236}">
+                <a16:creationId xmlns:a16="http://schemas.microsoft.com/office/drawing/2014/main" id="{1EC740C5-A754-FD93-6091-948F1B063CAB}"/>
+              </a:ext>
+            </a:extLst>
+          </p:cNvPr>
+          <p:cNvSpPr/>
+          <p:nvPr/>
+        </p:nvSpPr>
+        <p:spPr>
+          <a:xfrm>
+            <a:off x="5516132" y="2988962"/>
+            <a:ext cx="828475" cy="820591"/>
+          </a:xfrm>
+          <a:prstGeom prst="rect">
+            <a:avLst/>
+          </a:prstGeom>
+          <a:solidFill>
+            <a:schemeClr val="bg1">
+              <a:lumMod val="85000"/>
+            </a:schemeClr>
+          </a:solidFill>
+        </p:spPr>
+        <p:style>
+          <a:lnRef idx="2">
+            <a:schemeClr val="accent6">
+              <a:shade val="15000"/>
+            </a:schemeClr>
+          </a:lnRef>
+          <a:fillRef idx="1">
+            <a:schemeClr val="accent6"/>
+          </a:fillRef>
+          <a:effectRef idx="0">
+            <a:schemeClr val="accent6"/>
+          </a:effectRef>
+          <a:fontRef idx="minor">
+            <a:schemeClr val="lt1"/>
+          </a:fontRef>
+        </p:style>
+        <p:txBody>
+          <a:bodyPr rtlCol="0" anchor="ctr"/>
+          <a:lstStyle/>
+          <a:p>
+            <a:pPr algn="ctr"/>
+            <a:endParaRPr lang="en-SG" dirty="0"/>
+          </a:p>
+        </p:txBody>
+      </p:sp>
+      <p:pic>
+        <p:nvPicPr>
+          <p:cNvPr id="15" name="Graphic 14" descr="Play with solid fill">
+            <a:extLst>
+              <a:ext uri="{FF2B5EF4-FFF2-40B4-BE49-F238E27FC236}">
+                <a16:creationId xmlns:a16="http://schemas.microsoft.com/office/drawing/2014/main" id="{5001FD41-2FEA-9ECE-5599-DDBC0F1A5612}"/>
+              </a:ext>
+            </a:extLst>
+          </p:cNvPr>
+          <p:cNvPicPr>
+            <a:picLocks noChangeAspect="1"/>
+          </p:cNvPicPr>
+          <p:nvPr/>
+        </p:nvPicPr>
+        <p:blipFill>
+          <a:blip r:embed="rId4">
+            <a:extLst>
+              <a:ext uri="{96DAC541-7B7A-43D3-8B79-37D633B846F1}">
+                <asvg:svgBlip xmlns:asvg="http://schemas.microsoft.com/office/drawing/2016/SVG/main" r:embed="rId5"/>
+              </a:ext>
+            </a:extLst>
+          </a:blip>
+          <a:stretch>
+            <a:fillRect/>
+          </a:stretch>
+        </p:blipFill>
+        <p:spPr>
+          <a:xfrm rot="16200000">
+            <a:off x="5640408" y="3109296"/>
+            <a:ext cx="579922" cy="579922"/>
+          </a:xfrm>
+          <a:prstGeom prst="rect">
+            <a:avLst/>
+          </a:prstGeom>
+        </p:spPr>
+      </p:pic>
+      <p:sp>
+        <p:nvSpPr>
+          <p:cNvPr id="18" name="Rectangle 17">
+            <a:extLst>
+              <a:ext uri="{FF2B5EF4-FFF2-40B4-BE49-F238E27FC236}">
+                <a16:creationId xmlns:a16="http://schemas.microsoft.com/office/drawing/2014/main" id="{51909A38-276A-5350-C7E7-CD5268229991}"/>
+              </a:ext>
+            </a:extLst>
+          </p:cNvPr>
+          <p:cNvSpPr/>
+          <p:nvPr/>
+        </p:nvSpPr>
+        <p:spPr>
+          <a:xfrm>
+            <a:off x="7503349" y="2988961"/>
+            <a:ext cx="828475" cy="820591"/>
+          </a:xfrm>
+          <a:prstGeom prst="rect">
+            <a:avLst/>
+          </a:prstGeom>
+          <a:solidFill>
+            <a:schemeClr val="bg1">
+              <a:lumMod val="85000"/>
+            </a:schemeClr>
+          </a:solidFill>
+        </p:spPr>
+        <p:style>
+          <a:lnRef idx="2">
+            <a:schemeClr val="accent6">
+              <a:shade val="15000"/>
+            </a:schemeClr>
+          </a:lnRef>
+          <a:fillRef idx="1">
+            <a:schemeClr val="accent6"/>
+          </a:fillRef>
+          <a:effectRef idx="0">
+            <a:schemeClr val="accent6"/>
+          </a:effectRef>
+          <a:fontRef idx="minor">
+            <a:schemeClr val="lt1"/>
+          </a:fontRef>
+        </p:style>
+        <p:txBody>
+          <a:bodyPr rtlCol="0" anchor="ctr"/>
+          <a:lstStyle/>
+          <a:p>
+            <a:pPr algn="ctr"/>
+            <a:endParaRPr lang="en-SG" dirty="0"/>
+          </a:p>
+        </p:txBody>
+      </p:sp>
+      <p:cxnSp>
+        <p:nvCxnSpPr>
+          <p:cNvPr id="21" name="Straight Arrow Connector 20">
+            <a:extLst>
+              <a:ext uri="{FF2B5EF4-FFF2-40B4-BE49-F238E27FC236}">
+                <a16:creationId xmlns:a16="http://schemas.microsoft.com/office/drawing/2014/main" id="{16B225B7-EC95-79AA-EE58-C032DD11E9C9}"/>
+              </a:ext>
+            </a:extLst>
+          </p:cNvPr>
+          <p:cNvCxnSpPr/>
+          <p:nvPr/>
+        </p:nvCxnSpPr>
+        <p:spPr>
+          <a:xfrm flipV="1">
+            <a:off x="7710643" y="3205379"/>
+            <a:ext cx="413886" cy="387753"/>
+          </a:xfrm>
+          <a:prstGeom prst="straightConnector1">
+            <a:avLst/>
+          </a:prstGeom>
+          <a:ln w="76200">
+            <a:solidFill>
+              <a:schemeClr val="tx1"/>
+            </a:solidFill>
+            <a:tailEnd type="triangle"/>
+          </a:ln>
+        </p:spPr>
+        <p:style>
+          <a:lnRef idx="2">
+            <a:schemeClr val="accent1"/>
+          </a:lnRef>
+          <a:fillRef idx="0">
+            <a:schemeClr val="accent1"/>
+          </a:fillRef>
+          <a:effectRef idx="1">
+            <a:schemeClr val="accent1"/>
+          </a:effectRef>
+          <a:fontRef idx="minor">
+            <a:schemeClr val="tx1"/>
+          </a:fontRef>
+        </p:style>
+      </p:cxnSp>
+      <p:sp>
+        <p:nvSpPr>
+          <p:cNvPr id="22" name="Rectangle 21">
+            <a:extLst>
+              <a:ext uri="{FF2B5EF4-FFF2-40B4-BE49-F238E27FC236}">
+                <a16:creationId xmlns:a16="http://schemas.microsoft.com/office/drawing/2014/main" id="{D94FFDBA-67AD-86BF-0067-70F77762F1A6}"/>
+              </a:ext>
+            </a:extLst>
+          </p:cNvPr>
+          <p:cNvSpPr/>
+          <p:nvPr/>
+        </p:nvSpPr>
+        <p:spPr>
+          <a:xfrm>
+            <a:off x="6543580" y="4872007"/>
+            <a:ext cx="828475" cy="820591"/>
+          </a:xfrm>
+          <a:prstGeom prst="rect">
+            <a:avLst/>
+          </a:prstGeom>
+          <a:solidFill>
+            <a:schemeClr val="bg1">
+              <a:lumMod val="85000"/>
+            </a:schemeClr>
+          </a:solidFill>
+        </p:spPr>
+        <p:style>
+          <a:lnRef idx="2">
+            <a:schemeClr val="accent6">
+              <a:shade val="15000"/>
+            </a:schemeClr>
+          </a:lnRef>
+          <a:fillRef idx="1">
+            <a:schemeClr val="accent6"/>
+          </a:fillRef>
+          <a:effectRef idx="0">
+            <a:schemeClr val="accent6"/>
+          </a:effectRef>
+          <a:fontRef idx="minor">
+            <a:schemeClr val="lt1"/>
+          </a:fontRef>
+        </p:style>
+        <p:txBody>
+          <a:bodyPr rtlCol="0" anchor="ctr"/>
+          <a:lstStyle/>
+          <a:p>
+            <a:pPr algn="ctr"/>
+            <a:endParaRPr lang="en-SG" dirty="0"/>
+          </a:p>
+        </p:txBody>
+      </p:sp>
+      <p:pic>
+        <p:nvPicPr>
+          <p:cNvPr id="24" name="Graphic 23" descr="Compass with solid fill">
+            <a:extLst>
+              <a:ext uri="{FF2B5EF4-FFF2-40B4-BE49-F238E27FC236}">
+                <a16:creationId xmlns:a16="http://schemas.microsoft.com/office/drawing/2014/main" id="{5626DAE7-3334-7639-9B4C-1EE15D6EB9E5}"/>
+              </a:ext>
+            </a:extLst>
+          </p:cNvPr>
+          <p:cNvPicPr>
+            <a:picLocks noChangeAspect="1"/>
+          </p:cNvPicPr>
+          <p:nvPr/>
+        </p:nvPicPr>
+        <p:blipFill>
+          <a:blip r:embed="rId10">
+            <a:extLst>
+              <a:ext uri="{96DAC541-7B7A-43D3-8B79-37D633B846F1}">
+                <asvg:svgBlip xmlns:asvg="http://schemas.microsoft.com/office/drawing/2016/SVG/main" r:embed="rId11"/>
+              </a:ext>
+            </a:extLst>
+          </a:blip>
+          <a:stretch>
+            <a:fillRect/>
+          </a:stretch>
+        </p:blipFill>
+        <p:spPr>
+          <a:xfrm>
+            <a:off x="6543580" y="4872007"/>
+            <a:ext cx="820591" cy="820591"/>
+          </a:xfrm>
+          <a:prstGeom prst="rect">
+            <a:avLst/>
+          </a:prstGeom>
+        </p:spPr>
+      </p:pic>
     </p:spTree>
     <p:extLst>
       <p:ext uri="{BB962C8B-B14F-4D97-AF65-F5344CB8AC3E}">

</xml_diff>

<commit_message>
Added the sensor display panel.
</commit_message>
<xml_diff>
--- a/doc/designDoc.pptx
+++ b/doc/designDoc.pptx
@@ -262,7 +262,7 @@
           <a:p>
             <a:fld id="{5568BA03-6613-4DAC-9DC1-5FD1D61FA6E8}" type="datetimeFigureOut">
               <a:rPr lang="en-SG" smtClean="0"/>
-              <a:t>4/8/2024</a:t>
+              <a:t>5/8/2024</a:t>
             </a:fld>
             <a:endParaRPr lang="en-SG"/>
           </a:p>
@@ -462,7 +462,7 @@
           <a:p>
             <a:fld id="{5568BA03-6613-4DAC-9DC1-5FD1D61FA6E8}" type="datetimeFigureOut">
               <a:rPr lang="en-SG" smtClean="0"/>
-              <a:t>4/8/2024</a:t>
+              <a:t>5/8/2024</a:t>
             </a:fld>
             <a:endParaRPr lang="en-SG"/>
           </a:p>
@@ -672,7 +672,7 @@
           <a:p>
             <a:fld id="{5568BA03-6613-4DAC-9DC1-5FD1D61FA6E8}" type="datetimeFigureOut">
               <a:rPr lang="en-SG" smtClean="0"/>
-              <a:t>4/8/2024</a:t>
+              <a:t>5/8/2024</a:t>
             </a:fld>
             <a:endParaRPr lang="en-SG"/>
           </a:p>
@@ -872,7 +872,7 @@
           <a:p>
             <a:fld id="{5568BA03-6613-4DAC-9DC1-5FD1D61FA6E8}" type="datetimeFigureOut">
               <a:rPr lang="en-SG" smtClean="0"/>
-              <a:t>4/8/2024</a:t>
+              <a:t>5/8/2024</a:t>
             </a:fld>
             <a:endParaRPr lang="en-SG"/>
           </a:p>
@@ -1148,7 +1148,7 @@
           <a:p>
             <a:fld id="{5568BA03-6613-4DAC-9DC1-5FD1D61FA6E8}" type="datetimeFigureOut">
               <a:rPr lang="en-SG" smtClean="0"/>
-              <a:t>4/8/2024</a:t>
+              <a:t>5/8/2024</a:t>
             </a:fld>
             <a:endParaRPr lang="en-SG"/>
           </a:p>
@@ -1416,7 +1416,7 @@
           <a:p>
             <a:fld id="{5568BA03-6613-4DAC-9DC1-5FD1D61FA6E8}" type="datetimeFigureOut">
               <a:rPr lang="en-SG" smtClean="0"/>
-              <a:t>4/8/2024</a:t>
+              <a:t>5/8/2024</a:t>
             </a:fld>
             <a:endParaRPr lang="en-SG"/>
           </a:p>
@@ -1831,7 +1831,7 @@
           <a:p>
             <a:fld id="{5568BA03-6613-4DAC-9DC1-5FD1D61FA6E8}" type="datetimeFigureOut">
               <a:rPr lang="en-SG" smtClean="0"/>
-              <a:t>4/8/2024</a:t>
+              <a:t>5/8/2024</a:t>
             </a:fld>
             <a:endParaRPr lang="en-SG"/>
           </a:p>
@@ -1973,7 +1973,7 @@
           <a:p>
             <a:fld id="{5568BA03-6613-4DAC-9DC1-5FD1D61FA6E8}" type="datetimeFigureOut">
               <a:rPr lang="en-SG" smtClean="0"/>
-              <a:t>4/8/2024</a:t>
+              <a:t>5/8/2024</a:t>
             </a:fld>
             <a:endParaRPr lang="en-SG"/>
           </a:p>
@@ -2086,7 +2086,7 @@
           <a:p>
             <a:fld id="{5568BA03-6613-4DAC-9DC1-5FD1D61FA6E8}" type="datetimeFigureOut">
               <a:rPr lang="en-SG" smtClean="0"/>
-              <a:t>4/8/2024</a:t>
+              <a:t>5/8/2024</a:t>
             </a:fld>
             <a:endParaRPr lang="en-SG"/>
           </a:p>
@@ -2399,7 +2399,7 @@
           <a:p>
             <a:fld id="{5568BA03-6613-4DAC-9DC1-5FD1D61FA6E8}" type="datetimeFigureOut">
               <a:rPr lang="en-SG" smtClean="0"/>
-              <a:t>4/8/2024</a:t>
+              <a:t>5/8/2024</a:t>
             </a:fld>
             <a:endParaRPr lang="en-SG"/>
           </a:p>
@@ -2688,7 +2688,7 @@
           <a:p>
             <a:fld id="{5568BA03-6613-4DAC-9DC1-5FD1D61FA6E8}" type="datetimeFigureOut">
               <a:rPr lang="en-SG" smtClean="0"/>
-              <a:t>4/8/2024</a:t>
+              <a:t>5/8/2024</a:t>
             </a:fld>
             <a:endParaRPr lang="en-SG"/>
           </a:p>
@@ -2931,7 +2931,7 @@
           <a:p>
             <a:fld id="{5568BA03-6613-4DAC-9DC1-5FD1D61FA6E8}" type="datetimeFigureOut">
               <a:rPr lang="en-SG" smtClean="0"/>
-              <a:t>4/8/2024</a:t>
+              <a:t>5/8/2024</a:t>
             </a:fld>
             <a:endParaRPr lang="en-SG"/>
           </a:p>
@@ -4764,6 +4764,702 @@
           </a:p>
         </p:txBody>
       </p:sp>
+      <p:pic>
+        <p:nvPicPr>
+          <p:cNvPr id="9" name="Picture 8">
+            <a:extLst>
+              <a:ext uri="{FF2B5EF4-FFF2-40B4-BE49-F238E27FC236}">
+                <a16:creationId xmlns:a16="http://schemas.microsoft.com/office/drawing/2014/main" id="{A71215A3-63E7-621F-5D90-8EF5E99C4917}"/>
+              </a:ext>
+            </a:extLst>
+          </p:cNvPr>
+          <p:cNvPicPr>
+            <a:picLocks noChangeAspect="1"/>
+          </p:cNvPicPr>
+          <p:nvPr/>
+        </p:nvPicPr>
+        <p:blipFill>
+          <a:blip r:embed="rId6"/>
+          <a:stretch>
+            <a:fillRect/>
+          </a:stretch>
+        </p:blipFill>
+        <p:spPr>
+          <a:xfrm>
+            <a:off x="5784904" y="4654091"/>
+            <a:ext cx="1057470" cy="1066021"/>
+          </a:xfrm>
+          <a:prstGeom prst="rect">
+            <a:avLst/>
+          </a:prstGeom>
+          <a:ln w="6350">
+            <a:solidFill>
+              <a:schemeClr val="tx1"/>
+            </a:solidFill>
+          </a:ln>
+        </p:spPr>
+      </p:pic>
+      <p:sp>
+        <p:nvSpPr>
+          <p:cNvPr id="10" name="Rectangle 9">
+            <a:extLst>
+              <a:ext uri="{FF2B5EF4-FFF2-40B4-BE49-F238E27FC236}">
+                <a16:creationId xmlns:a16="http://schemas.microsoft.com/office/drawing/2014/main" id="{A3ABC89F-008D-BFF8-237D-778E5034F71D}"/>
+              </a:ext>
+            </a:extLst>
+          </p:cNvPr>
+          <p:cNvSpPr/>
+          <p:nvPr/>
+        </p:nvSpPr>
+        <p:spPr>
+          <a:xfrm>
+            <a:off x="4357319" y="4510767"/>
+            <a:ext cx="2602409" cy="1620000"/>
+          </a:xfrm>
+          <a:prstGeom prst="rect">
+            <a:avLst/>
+          </a:prstGeom>
+          <a:noFill/>
+          <a:ln>
+            <a:prstDash val="sysDash"/>
+          </a:ln>
+        </p:spPr>
+        <p:style>
+          <a:lnRef idx="2">
+            <a:schemeClr val="accent1">
+              <a:shade val="15000"/>
+            </a:schemeClr>
+          </a:lnRef>
+          <a:fillRef idx="1">
+            <a:schemeClr val="accent1"/>
+          </a:fillRef>
+          <a:effectRef idx="0">
+            <a:schemeClr val="accent1"/>
+          </a:effectRef>
+          <a:fontRef idx="minor">
+            <a:schemeClr val="lt1"/>
+          </a:fontRef>
+        </p:style>
+        <p:txBody>
+          <a:bodyPr rtlCol="0" anchor="ctr"/>
+          <a:lstStyle/>
+          <a:p>
+            <a:pPr algn="ctr"/>
+            <a:r>
+              <a:rPr lang="en-SG" dirty="0"/>
+              <a:t>\</a:t>
+            </a:r>
+          </a:p>
+        </p:txBody>
+      </p:sp>
+      <p:pic>
+        <p:nvPicPr>
+          <p:cNvPr id="11" name="Picture 10">
+            <a:extLst>
+              <a:ext uri="{FF2B5EF4-FFF2-40B4-BE49-F238E27FC236}">
+                <a16:creationId xmlns:a16="http://schemas.microsoft.com/office/drawing/2014/main" id="{94E4BE58-6930-A70E-5543-FAF123A1DFCF}"/>
+              </a:ext>
+            </a:extLst>
+          </p:cNvPr>
+          <p:cNvPicPr>
+            <a:picLocks noChangeAspect="1"/>
+          </p:cNvPicPr>
+          <p:nvPr/>
+        </p:nvPicPr>
+        <p:blipFill>
+          <a:blip r:embed="rId2"/>
+          <a:stretch>
+            <a:fillRect/>
+          </a:stretch>
+        </p:blipFill>
+        <p:spPr>
+          <a:xfrm>
+            <a:off x="2462081" y="4494865"/>
+            <a:ext cx="1895238" cy="1638095"/>
+          </a:xfrm>
+          <a:prstGeom prst="rect">
+            <a:avLst/>
+          </a:prstGeom>
+        </p:spPr>
+      </p:pic>
+      <p:pic>
+        <p:nvPicPr>
+          <p:cNvPr id="14" name="Picture 4" descr="104,005 Building Plans Icon Royalty ...">
+            <a:extLst>
+              <a:ext uri="{FF2B5EF4-FFF2-40B4-BE49-F238E27FC236}">
+                <a16:creationId xmlns:a16="http://schemas.microsoft.com/office/drawing/2014/main" id="{6F07123A-0361-F613-F20C-444F7AD63A59}"/>
+              </a:ext>
+            </a:extLst>
+          </p:cNvPr>
+          <p:cNvPicPr>
+            <a:picLocks noChangeAspect="1" noChangeArrowheads="1"/>
+          </p:cNvPicPr>
+          <p:nvPr/>
+        </p:nvPicPr>
+        <p:blipFill rotWithShape="1">
+          <a:blip r:embed="rId4">
+            <a:extLst>
+              <a:ext uri="{28A0092B-C50C-407E-A947-70E740481C1C}">
+                <a14:useLocalDpi xmlns:a14="http://schemas.microsoft.com/office/drawing/2010/main" val="0"/>
+              </a:ext>
+            </a:extLst>
+          </a:blip>
+          <a:srcRect b="16144"/>
+          <a:stretch/>
+        </p:blipFill>
+        <p:spPr bwMode="auto">
+          <a:xfrm>
+            <a:off x="4503349" y="4870525"/>
+            <a:ext cx="1079651" cy="963487"/>
+          </a:xfrm>
+          <a:prstGeom prst="rect">
+            <a:avLst/>
+          </a:prstGeom>
+          <a:noFill/>
+          <a:extLst>
+            <a:ext uri="{909E8E84-426E-40DD-AFC4-6F175D3DCCD1}">
+              <a14:hiddenFill xmlns:a14="http://schemas.microsoft.com/office/drawing/2010/main">
+                <a:solidFill>
+                  <a:srgbClr val="FFFFFF"/>
+                </a:solidFill>
+              </a14:hiddenFill>
+            </a:ext>
+          </a:extLst>
+        </p:spPr>
+      </p:pic>
+      <p:sp>
+        <p:nvSpPr>
+          <p:cNvPr id="18" name="Oval 17">
+            <a:extLst>
+              <a:ext uri="{FF2B5EF4-FFF2-40B4-BE49-F238E27FC236}">
+                <a16:creationId xmlns:a16="http://schemas.microsoft.com/office/drawing/2014/main" id="{12786B18-60F3-06EF-523E-FD3E508FCF4C}"/>
+              </a:ext>
+            </a:extLst>
+          </p:cNvPr>
+          <p:cNvSpPr/>
+          <p:nvPr/>
+        </p:nvSpPr>
+        <p:spPr>
+          <a:xfrm>
+            <a:off x="5225790" y="4556546"/>
+            <a:ext cx="154666" cy="199476"/>
+          </a:xfrm>
+          <a:prstGeom prst="ellipse">
+            <a:avLst/>
+          </a:prstGeom>
+        </p:spPr>
+        <p:style>
+          <a:lnRef idx="2">
+            <a:schemeClr val="accent1">
+              <a:shade val="15000"/>
+            </a:schemeClr>
+          </a:lnRef>
+          <a:fillRef idx="1">
+            <a:schemeClr val="accent1"/>
+          </a:fillRef>
+          <a:effectRef idx="0">
+            <a:schemeClr val="accent1"/>
+          </a:effectRef>
+          <a:fontRef idx="minor">
+            <a:schemeClr val="lt1"/>
+          </a:fontRef>
+        </p:style>
+        <p:txBody>
+          <a:bodyPr rtlCol="0" anchor="ctr"/>
+          <a:lstStyle/>
+          <a:p>
+            <a:pPr algn="ctr"/>
+            <a:endParaRPr lang="en-SG"/>
+          </a:p>
+        </p:txBody>
+      </p:sp>
+      <p:sp>
+        <p:nvSpPr>
+          <p:cNvPr id="20" name="Oval 19">
+            <a:extLst>
+              <a:ext uri="{FF2B5EF4-FFF2-40B4-BE49-F238E27FC236}">
+                <a16:creationId xmlns:a16="http://schemas.microsoft.com/office/drawing/2014/main" id="{1ED221F1-BE44-EA5E-9DD9-763A49F775F2}"/>
+              </a:ext>
+            </a:extLst>
+          </p:cNvPr>
+          <p:cNvSpPr/>
+          <p:nvPr/>
+        </p:nvSpPr>
+        <p:spPr>
+          <a:xfrm>
+            <a:off x="5295057" y="5235183"/>
+            <a:ext cx="154666" cy="199476"/>
+          </a:xfrm>
+          <a:prstGeom prst="ellipse">
+            <a:avLst/>
+          </a:prstGeom>
+          <a:solidFill>
+            <a:srgbClr val="C00000"/>
+          </a:solidFill>
+        </p:spPr>
+        <p:style>
+          <a:lnRef idx="2">
+            <a:schemeClr val="accent1">
+              <a:shade val="15000"/>
+            </a:schemeClr>
+          </a:lnRef>
+          <a:fillRef idx="1">
+            <a:schemeClr val="accent1"/>
+          </a:fillRef>
+          <a:effectRef idx="0">
+            <a:schemeClr val="accent1"/>
+          </a:effectRef>
+          <a:fontRef idx="minor">
+            <a:schemeClr val="lt1"/>
+          </a:fontRef>
+        </p:style>
+        <p:txBody>
+          <a:bodyPr rtlCol="0" anchor="ctr"/>
+          <a:lstStyle/>
+          <a:p>
+            <a:pPr algn="ctr"/>
+            <a:endParaRPr lang="en-SG"/>
+          </a:p>
+        </p:txBody>
+      </p:sp>
+      <p:sp>
+        <p:nvSpPr>
+          <p:cNvPr id="21" name="Multiplication Sign 20">
+            <a:extLst>
+              <a:ext uri="{FF2B5EF4-FFF2-40B4-BE49-F238E27FC236}">
+                <a16:creationId xmlns:a16="http://schemas.microsoft.com/office/drawing/2014/main" id="{0998CECD-1019-8361-604B-42C0E476CDCC}"/>
+              </a:ext>
+            </a:extLst>
+          </p:cNvPr>
+          <p:cNvSpPr/>
+          <p:nvPr/>
+        </p:nvSpPr>
+        <p:spPr>
+          <a:xfrm>
+            <a:off x="4749119" y="4904389"/>
+            <a:ext cx="366276" cy="357854"/>
+          </a:xfrm>
+          <a:prstGeom prst="mathMultiply">
+            <a:avLst/>
+          </a:prstGeom>
+          <a:solidFill>
+            <a:srgbClr val="C00000"/>
+          </a:solidFill>
+        </p:spPr>
+        <p:style>
+          <a:lnRef idx="2">
+            <a:schemeClr val="accent1">
+              <a:shade val="15000"/>
+            </a:schemeClr>
+          </a:lnRef>
+          <a:fillRef idx="1">
+            <a:schemeClr val="accent1"/>
+          </a:fillRef>
+          <a:effectRef idx="0">
+            <a:schemeClr val="accent1"/>
+          </a:effectRef>
+          <a:fontRef idx="minor">
+            <a:schemeClr val="lt1"/>
+          </a:fontRef>
+        </p:style>
+        <p:txBody>
+          <a:bodyPr rtlCol="0" anchor="ctr"/>
+          <a:lstStyle/>
+          <a:p>
+            <a:pPr algn="ctr"/>
+            <a:endParaRPr lang="en-SG"/>
+          </a:p>
+        </p:txBody>
+      </p:sp>
+      <p:sp>
+        <p:nvSpPr>
+          <p:cNvPr id="22" name="TextBox 21">
+            <a:extLst>
+              <a:ext uri="{FF2B5EF4-FFF2-40B4-BE49-F238E27FC236}">
+                <a16:creationId xmlns:a16="http://schemas.microsoft.com/office/drawing/2014/main" id="{97E82962-C874-3D4C-5130-A5957BB58A51}"/>
+              </a:ext>
+            </a:extLst>
+          </p:cNvPr>
+          <p:cNvSpPr txBox="1"/>
+          <p:nvPr/>
+        </p:nvSpPr>
+        <p:spPr>
+          <a:xfrm>
+            <a:off x="3716937" y="5798820"/>
+            <a:ext cx="821273" cy="369332"/>
+          </a:xfrm>
+          <a:prstGeom prst="rect">
+            <a:avLst/>
+          </a:prstGeom>
+          <a:noFill/>
+        </p:spPr>
+        <p:txBody>
+          <a:bodyPr wrap="square" rtlCol="0">
+            <a:spAutoFit/>
+          </a:bodyPr>
+          <a:lstStyle/>
+          <a:p>
+            <a:r>
+              <a:rPr lang="en-US" b="1" dirty="0">
+                <a:solidFill>
+                  <a:schemeClr val="bg1"/>
+                </a:solidFill>
+              </a:rPr>
+              <a:t>2D-R</a:t>
+            </a:r>
+            <a:endParaRPr lang="en-SG" b="1" dirty="0">
+              <a:solidFill>
+                <a:schemeClr val="bg1"/>
+              </a:solidFill>
+            </a:endParaRPr>
+          </a:p>
+        </p:txBody>
+      </p:sp>
+      <p:sp>
+        <p:nvSpPr>
+          <p:cNvPr id="23" name="TextBox 22">
+            <a:extLst>
+              <a:ext uri="{FF2B5EF4-FFF2-40B4-BE49-F238E27FC236}">
+                <a16:creationId xmlns:a16="http://schemas.microsoft.com/office/drawing/2014/main" id="{BD89D124-ED6E-6DF0-BE83-C651DF821493}"/>
+              </a:ext>
+            </a:extLst>
+          </p:cNvPr>
+          <p:cNvSpPr txBox="1"/>
+          <p:nvPr/>
+        </p:nvSpPr>
+        <p:spPr>
+          <a:xfrm>
+            <a:off x="4290207" y="5800947"/>
+            <a:ext cx="2695034" cy="369332"/>
+          </a:xfrm>
+          <a:prstGeom prst="rect">
+            <a:avLst/>
+          </a:prstGeom>
+          <a:noFill/>
+        </p:spPr>
+        <p:txBody>
+          <a:bodyPr wrap="square" rtlCol="0">
+            <a:spAutoFit/>
+          </a:bodyPr>
+          <a:lstStyle/>
+          <a:p>
+            <a:r>
+              <a:rPr lang="en-US" b="1" dirty="0" err="1"/>
+              <a:t>obot</a:t>
+            </a:r>
+            <a:r>
+              <a:rPr lang="en-US" b="1" dirty="0"/>
+              <a:t> Simulation System</a:t>
+            </a:r>
+            <a:endParaRPr lang="en-SG" b="1" dirty="0"/>
+          </a:p>
+        </p:txBody>
+      </p:sp>
+      <p:pic>
+        <p:nvPicPr>
+          <p:cNvPr id="26" name="Picture 25">
+            <a:extLst>
+              <a:ext uri="{FF2B5EF4-FFF2-40B4-BE49-F238E27FC236}">
+                <a16:creationId xmlns:a16="http://schemas.microsoft.com/office/drawing/2014/main" id="{6D73081C-7753-581F-170B-42C631A46949}"/>
+              </a:ext>
+            </a:extLst>
+          </p:cNvPr>
+          <p:cNvPicPr>
+            <a:picLocks noChangeAspect="1"/>
+          </p:cNvPicPr>
+          <p:nvPr/>
+        </p:nvPicPr>
+        <p:blipFill>
+          <a:blip r:embed="rId6"/>
+          <a:stretch>
+            <a:fillRect/>
+          </a:stretch>
+        </p:blipFill>
+        <p:spPr>
+          <a:xfrm>
+            <a:off x="8180728" y="2008482"/>
+            <a:ext cx="1072759" cy="1081434"/>
+          </a:xfrm>
+          <a:prstGeom prst="rect">
+            <a:avLst/>
+          </a:prstGeom>
+          <a:ln>
+            <a:noFill/>
+          </a:ln>
+          <a:effectLst>
+            <a:outerShdw blurRad="292100" dist="139700" dir="2700000" algn="tl" rotWithShape="0">
+              <a:srgbClr val="333333">
+                <a:alpha val="65000"/>
+              </a:srgbClr>
+            </a:outerShdw>
+          </a:effectLst>
+        </p:spPr>
+      </p:pic>
+      <p:pic>
+        <p:nvPicPr>
+          <p:cNvPr id="28" name="Picture 2" descr="symbol">
+            <a:extLst>
+              <a:ext uri="{FF2B5EF4-FFF2-40B4-BE49-F238E27FC236}">
+                <a16:creationId xmlns:a16="http://schemas.microsoft.com/office/drawing/2014/main" id="{ACF55636-E271-7DC2-D5B1-BFF580F4D011}"/>
+              </a:ext>
+            </a:extLst>
+          </p:cNvPr>
+          <p:cNvPicPr>
+            <a:picLocks noChangeAspect="1" noChangeArrowheads="1"/>
+          </p:cNvPicPr>
+          <p:nvPr/>
+        </p:nvPicPr>
+        <p:blipFill>
+          <a:blip r:embed="rId3">
+            <a:lum bright="70000" contrast="-70000"/>
+            <a:extLst>
+              <a:ext uri="{28A0092B-C50C-407E-A947-70E740481C1C}">
+                <a14:useLocalDpi xmlns:a14="http://schemas.microsoft.com/office/drawing/2010/main" val="0"/>
+              </a:ext>
+            </a:extLst>
+          </a:blip>
+          <a:srcRect/>
+          <a:stretch>
+            <a:fillRect/>
+          </a:stretch>
+        </p:blipFill>
+        <p:spPr bwMode="auto">
+          <a:xfrm rot="2604443">
+            <a:off x="3847167" y="4223577"/>
+            <a:ext cx="1046549" cy="1046549"/>
+          </a:xfrm>
+          <a:prstGeom prst="rect">
+            <a:avLst/>
+          </a:prstGeom>
+          <a:noFill/>
+          <a:extLst>
+            <a:ext uri="{909E8E84-426E-40DD-AFC4-6F175D3DCCD1}">
+              <a14:hiddenFill xmlns:a14="http://schemas.microsoft.com/office/drawing/2010/main">
+                <a:solidFill>
+                  <a:srgbClr val="FFFFFF"/>
+                </a:solidFill>
+              </a14:hiddenFill>
+            </a:ext>
+          </a:extLst>
+        </p:spPr>
+      </p:pic>
+      <p:pic>
+        <p:nvPicPr>
+          <p:cNvPr id="16" name="Picture 15">
+            <a:extLst>
+              <a:ext uri="{FF2B5EF4-FFF2-40B4-BE49-F238E27FC236}">
+                <a16:creationId xmlns:a16="http://schemas.microsoft.com/office/drawing/2014/main" id="{0A06E750-97FC-9D76-E10B-2B1624FA86C5}"/>
+              </a:ext>
+            </a:extLst>
+          </p:cNvPr>
+          <p:cNvPicPr>
+            <a:picLocks noChangeAspect="1"/>
+          </p:cNvPicPr>
+          <p:nvPr/>
+        </p:nvPicPr>
+        <p:blipFill>
+          <a:blip r:embed="rId5"/>
+          <a:stretch>
+            <a:fillRect/>
+          </a:stretch>
+        </p:blipFill>
+        <p:spPr>
+          <a:xfrm>
+            <a:off x="4357917" y="4582695"/>
+            <a:ext cx="790476" cy="304762"/>
+          </a:xfrm>
+          <a:prstGeom prst="rect">
+            <a:avLst/>
+          </a:prstGeom>
+        </p:spPr>
+      </p:pic>
+      <p:cxnSp>
+        <p:nvCxnSpPr>
+          <p:cNvPr id="19" name="Connector: Curved 18">
+            <a:extLst>
+              <a:ext uri="{FF2B5EF4-FFF2-40B4-BE49-F238E27FC236}">
+                <a16:creationId xmlns:a16="http://schemas.microsoft.com/office/drawing/2014/main" id="{512ECEF9-5EB1-FFD0-09F7-FDEBC8D5109E}"/>
+              </a:ext>
+            </a:extLst>
+          </p:cNvPr>
+          <p:cNvCxnSpPr>
+            <a:cxnSpLocks/>
+            <a:stCxn id="18" idx="2"/>
+            <a:endCxn id="20" idx="6"/>
+          </p:cNvCxnSpPr>
+          <p:nvPr/>
+        </p:nvCxnSpPr>
+        <p:spPr>
+          <a:xfrm rot="10800000" flipH="1" flipV="1">
+            <a:off x="5225789" y="4656283"/>
+            <a:ext cx="223933" cy="678637"/>
+          </a:xfrm>
+          <a:prstGeom prst="curvedConnector5">
+            <a:avLst>
+              <a:gd name="adj1" fmla="val -102084"/>
+              <a:gd name="adj2" fmla="val 50000"/>
+              <a:gd name="adj3" fmla="val 154803"/>
+            </a:avLst>
+          </a:prstGeom>
+          <a:ln>
+            <a:prstDash val="sysDash"/>
+          </a:ln>
+        </p:spPr>
+        <p:style>
+          <a:lnRef idx="2">
+            <a:schemeClr val="accent1"/>
+          </a:lnRef>
+          <a:fillRef idx="0">
+            <a:schemeClr val="accent1"/>
+          </a:fillRef>
+          <a:effectRef idx="1">
+            <a:schemeClr val="accent1"/>
+          </a:effectRef>
+          <a:fontRef idx="minor">
+            <a:schemeClr val="tx1"/>
+          </a:fontRef>
+        </p:style>
+      </p:cxnSp>
+      <p:cxnSp>
+        <p:nvCxnSpPr>
+          <p:cNvPr id="30" name="Straight Connector 29">
+            <a:extLst>
+              <a:ext uri="{FF2B5EF4-FFF2-40B4-BE49-F238E27FC236}">
+                <a16:creationId xmlns:a16="http://schemas.microsoft.com/office/drawing/2014/main" id="{2532CBC2-F7E3-04F2-16ED-3179E13CB75E}"/>
+              </a:ext>
+            </a:extLst>
+          </p:cNvPr>
+          <p:cNvCxnSpPr>
+            <a:cxnSpLocks/>
+            <a:stCxn id="18" idx="6"/>
+          </p:cNvCxnSpPr>
+          <p:nvPr/>
+        </p:nvCxnSpPr>
+        <p:spPr>
+          <a:xfrm>
+            <a:off x="5380456" y="4656284"/>
+            <a:ext cx="404447" cy="0"/>
+          </a:xfrm>
+          <a:prstGeom prst="line">
+            <a:avLst/>
+          </a:prstGeom>
+          <a:ln>
+            <a:solidFill>
+              <a:schemeClr val="tx1">
+                <a:lumMod val="50000"/>
+                <a:lumOff val="50000"/>
+              </a:schemeClr>
+            </a:solidFill>
+          </a:ln>
+        </p:spPr>
+        <p:style>
+          <a:lnRef idx="1">
+            <a:schemeClr val="dk1"/>
+          </a:lnRef>
+          <a:fillRef idx="0">
+            <a:schemeClr val="dk1"/>
+          </a:fillRef>
+          <a:effectRef idx="0">
+            <a:schemeClr val="dk1"/>
+          </a:effectRef>
+          <a:fontRef idx="minor">
+            <a:schemeClr val="tx1"/>
+          </a:fontRef>
+        </p:style>
+      </p:cxnSp>
+      <p:cxnSp>
+        <p:nvCxnSpPr>
+          <p:cNvPr id="43" name="Straight Connector 42">
+            <a:extLst>
+              <a:ext uri="{FF2B5EF4-FFF2-40B4-BE49-F238E27FC236}">
+                <a16:creationId xmlns:a16="http://schemas.microsoft.com/office/drawing/2014/main" id="{F7D63ED4-3740-BA59-3B26-4BB43593BACC}"/>
+              </a:ext>
+            </a:extLst>
+          </p:cNvPr>
+          <p:cNvCxnSpPr>
+            <a:cxnSpLocks/>
+          </p:cNvCxnSpPr>
+          <p:nvPr/>
+        </p:nvCxnSpPr>
+        <p:spPr>
+          <a:xfrm>
+            <a:off x="5683448" y="4887457"/>
+            <a:ext cx="101455" cy="829339"/>
+          </a:xfrm>
+          <a:prstGeom prst="line">
+            <a:avLst/>
+          </a:prstGeom>
+          <a:ln>
+            <a:solidFill>
+              <a:schemeClr val="tx1">
+                <a:lumMod val="50000"/>
+                <a:lumOff val="50000"/>
+              </a:schemeClr>
+            </a:solidFill>
+          </a:ln>
+        </p:spPr>
+        <p:style>
+          <a:lnRef idx="1">
+            <a:schemeClr val="dk1"/>
+          </a:lnRef>
+          <a:fillRef idx="0">
+            <a:schemeClr val="dk1"/>
+          </a:fillRef>
+          <a:effectRef idx="0">
+            <a:schemeClr val="dk1"/>
+          </a:effectRef>
+          <a:fontRef idx="minor">
+            <a:schemeClr val="tx1"/>
+          </a:fontRef>
+        </p:style>
+      </p:cxnSp>
+      <p:cxnSp>
+        <p:nvCxnSpPr>
+          <p:cNvPr id="48" name="Straight Connector 47">
+            <a:extLst>
+              <a:ext uri="{FF2B5EF4-FFF2-40B4-BE49-F238E27FC236}">
+                <a16:creationId xmlns:a16="http://schemas.microsoft.com/office/drawing/2014/main" id="{D086BEDE-A9C4-F5FE-5050-BB4DA756FE1D}"/>
+              </a:ext>
+            </a:extLst>
+          </p:cNvPr>
+          <p:cNvCxnSpPr>
+            <a:cxnSpLocks/>
+            <a:stCxn id="18" idx="6"/>
+          </p:cNvCxnSpPr>
+          <p:nvPr/>
+        </p:nvCxnSpPr>
+        <p:spPr>
+          <a:xfrm>
+            <a:off x="5380456" y="4656284"/>
+            <a:ext cx="302992" cy="231173"/>
+          </a:xfrm>
+          <a:prstGeom prst="line">
+            <a:avLst/>
+          </a:prstGeom>
+          <a:ln>
+            <a:solidFill>
+              <a:schemeClr val="tx1">
+                <a:lumMod val="50000"/>
+                <a:lumOff val="50000"/>
+              </a:schemeClr>
+            </a:solidFill>
+          </a:ln>
+        </p:spPr>
+        <p:style>
+          <a:lnRef idx="1">
+            <a:schemeClr val="dk1"/>
+          </a:lnRef>
+          <a:fillRef idx="0">
+            <a:schemeClr val="dk1"/>
+          </a:fillRef>
+          <a:effectRef idx="0">
+            <a:schemeClr val="dk1"/>
+          </a:effectRef>
+          <a:fontRef idx="minor">
+            <a:schemeClr val="tx1"/>
+          </a:fontRef>
+        </p:style>
+      </p:cxnSp>
     </p:spTree>
     <p:extLst>
       <p:ext uri="{BB962C8B-B14F-4D97-AF65-F5344CB8AC3E}">

</xml_diff>

<commit_message>
Update the sensor simulation description document.
</commit_message>
<xml_diff>
--- a/doc/designDoc.pptx
+++ b/doc/designDoc.pptx
@@ -4,9 +4,13 @@
   <p:sldMasterIdLst>
     <p:sldMasterId id="2147483648" r:id="rId1"/>
   </p:sldMasterIdLst>
+  <p:notesMasterIdLst>
+    <p:notesMasterId r:id="rId5"/>
+  </p:notesMasterIdLst>
   <p:sldIdLst>
     <p:sldId id="256" r:id="rId2"/>
     <p:sldId id="257" r:id="rId3"/>
+    <p:sldId id="258" r:id="rId4"/>
   </p:sldIdLst>
   <p:sldSz cx="12192000" cy="6858000"/>
   <p:notesSz cx="6858000" cy="9144000"/>
@@ -113,6 +117,440 @@
 </p:presentation>
 </file>
 
+<file path=ppt/notesMasters/notesMaster1.xml><?xml version="1.0" encoding="utf-8"?>
+<p:notesMaster xmlns:a="http://schemas.openxmlformats.org/drawingml/2006/main" xmlns:r="http://schemas.openxmlformats.org/officeDocument/2006/relationships" xmlns:p="http://schemas.openxmlformats.org/presentationml/2006/main">
+  <p:cSld>
+    <p:bg>
+      <p:bgRef idx="1001">
+        <a:schemeClr val="bg1"/>
+      </p:bgRef>
+    </p:bg>
+    <p:spTree>
+      <p:nvGrpSpPr>
+        <p:cNvPr id="1" name=""/>
+        <p:cNvGrpSpPr/>
+        <p:nvPr/>
+      </p:nvGrpSpPr>
+      <p:grpSpPr>
+        <a:xfrm>
+          <a:off x="0" y="0"/>
+          <a:ext cx="0" cy="0"/>
+          <a:chOff x="0" y="0"/>
+          <a:chExt cx="0" cy="0"/>
+        </a:xfrm>
+      </p:grpSpPr>
+      <p:sp>
+        <p:nvSpPr>
+          <p:cNvPr id="2" name="Header Placeholder 1"/>
+          <p:cNvSpPr>
+            <a:spLocks noGrp="1"/>
+          </p:cNvSpPr>
+          <p:nvPr>
+            <p:ph type="hdr" sz="quarter"/>
+          </p:nvPr>
+        </p:nvSpPr>
+        <p:spPr>
+          <a:xfrm>
+            <a:off x="0" y="0"/>
+            <a:ext cx="2971800" cy="458788"/>
+          </a:xfrm>
+          <a:prstGeom prst="rect">
+            <a:avLst/>
+          </a:prstGeom>
+        </p:spPr>
+        <p:txBody>
+          <a:bodyPr vert="horz" lIns="91440" tIns="45720" rIns="91440" bIns="45720" rtlCol="0"/>
+          <a:lstStyle>
+            <a:lvl1pPr algn="l">
+              <a:defRPr sz="1200"/>
+            </a:lvl1pPr>
+          </a:lstStyle>
+          <a:p>
+            <a:endParaRPr lang="en-SG"/>
+          </a:p>
+        </p:txBody>
+      </p:sp>
+      <p:sp>
+        <p:nvSpPr>
+          <p:cNvPr id="3" name="Date Placeholder 2"/>
+          <p:cNvSpPr>
+            <a:spLocks noGrp="1"/>
+          </p:cNvSpPr>
+          <p:nvPr>
+            <p:ph type="dt" idx="1"/>
+          </p:nvPr>
+        </p:nvSpPr>
+        <p:spPr>
+          <a:xfrm>
+            <a:off x="3884613" y="0"/>
+            <a:ext cx="2971800" cy="458788"/>
+          </a:xfrm>
+          <a:prstGeom prst="rect">
+            <a:avLst/>
+          </a:prstGeom>
+        </p:spPr>
+        <p:txBody>
+          <a:bodyPr vert="horz" lIns="91440" tIns="45720" rIns="91440" bIns="45720" rtlCol="0"/>
+          <a:lstStyle>
+            <a:lvl1pPr algn="r">
+              <a:defRPr sz="1200"/>
+            </a:lvl1pPr>
+          </a:lstStyle>
+          <a:p>
+            <a:fld id="{0329FBD8-4D87-425A-B74C-7EC553A2947F}" type="datetimeFigureOut">
+              <a:rPr lang="en-SG" smtClean="0"/>
+              <a:t>7/8/2024</a:t>
+            </a:fld>
+            <a:endParaRPr lang="en-SG"/>
+          </a:p>
+        </p:txBody>
+      </p:sp>
+      <p:sp>
+        <p:nvSpPr>
+          <p:cNvPr id="4" name="Slide Image Placeholder 3"/>
+          <p:cNvSpPr>
+            <a:spLocks noGrp="1" noRot="1" noChangeAspect="1"/>
+          </p:cNvSpPr>
+          <p:nvPr>
+            <p:ph type="sldImg" idx="2"/>
+          </p:nvPr>
+        </p:nvSpPr>
+        <p:spPr>
+          <a:xfrm>
+            <a:off x="685800" y="1143000"/>
+            <a:ext cx="5486400" cy="3086100"/>
+          </a:xfrm>
+          <a:prstGeom prst="rect">
+            <a:avLst/>
+          </a:prstGeom>
+          <a:noFill/>
+          <a:ln w="12700">
+            <a:solidFill>
+              <a:prstClr val="black"/>
+            </a:solidFill>
+          </a:ln>
+        </p:spPr>
+        <p:txBody>
+          <a:bodyPr vert="horz" lIns="91440" tIns="45720" rIns="91440" bIns="45720" rtlCol="0" anchor="ctr"/>
+          <a:lstStyle/>
+          <a:p>
+            <a:endParaRPr lang="en-SG"/>
+          </a:p>
+        </p:txBody>
+      </p:sp>
+      <p:sp>
+        <p:nvSpPr>
+          <p:cNvPr id="5" name="Notes Placeholder 4"/>
+          <p:cNvSpPr>
+            <a:spLocks noGrp="1"/>
+          </p:cNvSpPr>
+          <p:nvPr>
+            <p:ph type="body" sz="quarter" idx="3"/>
+          </p:nvPr>
+        </p:nvSpPr>
+        <p:spPr>
+          <a:xfrm>
+            <a:off x="685800" y="4400550"/>
+            <a:ext cx="5486400" cy="3600450"/>
+          </a:xfrm>
+          <a:prstGeom prst="rect">
+            <a:avLst/>
+          </a:prstGeom>
+        </p:spPr>
+        <p:txBody>
+          <a:bodyPr vert="horz" lIns="91440" tIns="45720" rIns="91440" bIns="45720" rtlCol="0"/>
+          <a:lstStyle/>
+          <a:p>
+            <a:pPr lvl="0"/>
+            <a:r>
+              <a:rPr lang="en-US"/>
+              <a:t>Click to edit Master text styles</a:t>
+            </a:r>
+          </a:p>
+          <a:p>
+            <a:pPr lvl="1"/>
+            <a:r>
+              <a:rPr lang="en-US"/>
+              <a:t>Second level</a:t>
+            </a:r>
+          </a:p>
+          <a:p>
+            <a:pPr lvl="2"/>
+            <a:r>
+              <a:rPr lang="en-US"/>
+              <a:t>Third level</a:t>
+            </a:r>
+          </a:p>
+          <a:p>
+            <a:pPr lvl="3"/>
+            <a:r>
+              <a:rPr lang="en-US"/>
+              <a:t>Fourth level</a:t>
+            </a:r>
+          </a:p>
+          <a:p>
+            <a:pPr lvl="4"/>
+            <a:r>
+              <a:rPr lang="en-US"/>
+              <a:t>Fifth level</a:t>
+            </a:r>
+            <a:endParaRPr lang="en-SG"/>
+          </a:p>
+        </p:txBody>
+      </p:sp>
+      <p:sp>
+        <p:nvSpPr>
+          <p:cNvPr id="6" name="Footer Placeholder 5"/>
+          <p:cNvSpPr>
+            <a:spLocks noGrp="1"/>
+          </p:cNvSpPr>
+          <p:nvPr>
+            <p:ph type="ftr" sz="quarter" idx="4"/>
+          </p:nvPr>
+        </p:nvSpPr>
+        <p:spPr>
+          <a:xfrm>
+            <a:off x="0" y="8685213"/>
+            <a:ext cx="2971800" cy="458787"/>
+          </a:xfrm>
+          <a:prstGeom prst="rect">
+            <a:avLst/>
+          </a:prstGeom>
+        </p:spPr>
+        <p:txBody>
+          <a:bodyPr vert="horz" lIns="91440" tIns="45720" rIns="91440" bIns="45720" rtlCol="0" anchor="b"/>
+          <a:lstStyle>
+            <a:lvl1pPr algn="l">
+              <a:defRPr sz="1200"/>
+            </a:lvl1pPr>
+          </a:lstStyle>
+          <a:p>
+            <a:endParaRPr lang="en-SG"/>
+          </a:p>
+        </p:txBody>
+      </p:sp>
+      <p:sp>
+        <p:nvSpPr>
+          <p:cNvPr id="7" name="Slide Number Placeholder 6"/>
+          <p:cNvSpPr>
+            <a:spLocks noGrp="1"/>
+          </p:cNvSpPr>
+          <p:nvPr>
+            <p:ph type="sldNum" sz="quarter" idx="5"/>
+          </p:nvPr>
+        </p:nvSpPr>
+        <p:spPr>
+          <a:xfrm>
+            <a:off x="3884613" y="8685213"/>
+            <a:ext cx="2971800" cy="458787"/>
+          </a:xfrm>
+          <a:prstGeom prst="rect">
+            <a:avLst/>
+          </a:prstGeom>
+        </p:spPr>
+        <p:txBody>
+          <a:bodyPr vert="horz" lIns="91440" tIns="45720" rIns="91440" bIns="45720" rtlCol="0" anchor="b"/>
+          <a:lstStyle>
+            <a:lvl1pPr algn="r">
+              <a:defRPr sz="1200"/>
+            </a:lvl1pPr>
+          </a:lstStyle>
+          <a:p>
+            <a:fld id="{E6801C31-435C-45EB-9063-5EFD94E05898}" type="slidenum">
+              <a:rPr lang="en-SG" smtClean="0"/>
+              <a:t>‹#›</a:t>
+            </a:fld>
+            <a:endParaRPr lang="en-SG"/>
+          </a:p>
+        </p:txBody>
+      </p:sp>
+    </p:spTree>
+    <p:extLst>
+      <p:ext uri="{BB962C8B-B14F-4D97-AF65-F5344CB8AC3E}">
+        <p14:creationId xmlns:p14="http://schemas.microsoft.com/office/powerpoint/2010/main" val="592294565"/>
+      </p:ext>
+    </p:extLst>
+  </p:cSld>
+  <p:clrMap bg1="lt1" tx1="dk1" bg2="lt2" tx2="dk2" accent1="accent1" accent2="accent2" accent3="accent3" accent4="accent4" accent5="accent5" accent6="accent6" hlink="hlink" folHlink="folHlink"/>
+  <p:notesStyle>
+    <a:lvl1pPr marL="0" algn="l" defTabSz="914400" rtl="0" eaLnBrk="1" latinLnBrk="0" hangingPunct="1">
+      <a:defRPr sz="1200" kern="1200">
+        <a:solidFill>
+          <a:schemeClr val="tx1"/>
+        </a:solidFill>
+        <a:latin typeface="+mn-lt"/>
+        <a:ea typeface="+mn-ea"/>
+        <a:cs typeface="+mn-cs"/>
+      </a:defRPr>
+    </a:lvl1pPr>
+    <a:lvl2pPr marL="457200" algn="l" defTabSz="914400" rtl="0" eaLnBrk="1" latinLnBrk="0" hangingPunct="1">
+      <a:defRPr sz="1200" kern="1200">
+        <a:solidFill>
+          <a:schemeClr val="tx1"/>
+        </a:solidFill>
+        <a:latin typeface="+mn-lt"/>
+        <a:ea typeface="+mn-ea"/>
+        <a:cs typeface="+mn-cs"/>
+      </a:defRPr>
+    </a:lvl2pPr>
+    <a:lvl3pPr marL="914400" algn="l" defTabSz="914400" rtl="0" eaLnBrk="1" latinLnBrk="0" hangingPunct="1">
+      <a:defRPr sz="1200" kern="1200">
+        <a:solidFill>
+          <a:schemeClr val="tx1"/>
+        </a:solidFill>
+        <a:latin typeface="+mn-lt"/>
+        <a:ea typeface="+mn-ea"/>
+        <a:cs typeface="+mn-cs"/>
+      </a:defRPr>
+    </a:lvl3pPr>
+    <a:lvl4pPr marL="1371600" algn="l" defTabSz="914400" rtl="0" eaLnBrk="1" latinLnBrk="0" hangingPunct="1">
+      <a:defRPr sz="1200" kern="1200">
+        <a:solidFill>
+          <a:schemeClr val="tx1"/>
+        </a:solidFill>
+        <a:latin typeface="+mn-lt"/>
+        <a:ea typeface="+mn-ea"/>
+        <a:cs typeface="+mn-cs"/>
+      </a:defRPr>
+    </a:lvl4pPr>
+    <a:lvl5pPr marL="1828800" algn="l" defTabSz="914400" rtl="0" eaLnBrk="1" latinLnBrk="0" hangingPunct="1">
+      <a:defRPr sz="1200" kern="1200">
+        <a:solidFill>
+          <a:schemeClr val="tx1"/>
+        </a:solidFill>
+        <a:latin typeface="+mn-lt"/>
+        <a:ea typeface="+mn-ea"/>
+        <a:cs typeface="+mn-cs"/>
+      </a:defRPr>
+    </a:lvl5pPr>
+    <a:lvl6pPr marL="2286000" algn="l" defTabSz="914400" rtl="0" eaLnBrk="1" latinLnBrk="0" hangingPunct="1">
+      <a:defRPr sz="1200" kern="1200">
+        <a:solidFill>
+          <a:schemeClr val="tx1"/>
+        </a:solidFill>
+        <a:latin typeface="+mn-lt"/>
+        <a:ea typeface="+mn-ea"/>
+        <a:cs typeface="+mn-cs"/>
+      </a:defRPr>
+    </a:lvl6pPr>
+    <a:lvl7pPr marL="2743200" algn="l" defTabSz="914400" rtl="0" eaLnBrk="1" latinLnBrk="0" hangingPunct="1">
+      <a:defRPr sz="1200" kern="1200">
+        <a:solidFill>
+          <a:schemeClr val="tx1"/>
+        </a:solidFill>
+        <a:latin typeface="+mn-lt"/>
+        <a:ea typeface="+mn-ea"/>
+        <a:cs typeface="+mn-cs"/>
+      </a:defRPr>
+    </a:lvl7pPr>
+    <a:lvl8pPr marL="3200400" algn="l" defTabSz="914400" rtl="0" eaLnBrk="1" latinLnBrk="0" hangingPunct="1">
+      <a:defRPr sz="1200" kern="1200">
+        <a:solidFill>
+          <a:schemeClr val="tx1"/>
+        </a:solidFill>
+        <a:latin typeface="+mn-lt"/>
+        <a:ea typeface="+mn-ea"/>
+        <a:cs typeface="+mn-cs"/>
+      </a:defRPr>
+    </a:lvl8pPr>
+    <a:lvl9pPr marL="3657600" algn="l" defTabSz="914400" rtl="0" eaLnBrk="1" latinLnBrk="0" hangingPunct="1">
+      <a:defRPr sz="1200" kern="1200">
+        <a:solidFill>
+          <a:schemeClr val="tx1"/>
+        </a:solidFill>
+        <a:latin typeface="+mn-lt"/>
+        <a:ea typeface="+mn-ea"/>
+        <a:cs typeface="+mn-cs"/>
+      </a:defRPr>
+    </a:lvl9pPr>
+  </p:notesStyle>
+</p:notesMaster>
+</file>
+
+<file path=ppt/notesSlides/notesSlide1.xml><?xml version="1.0" encoding="utf-8"?>
+<p:notes xmlns:a="http://schemas.openxmlformats.org/drawingml/2006/main" xmlns:r="http://schemas.openxmlformats.org/officeDocument/2006/relationships" xmlns:p="http://schemas.openxmlformats.org/presentationml/2006/main">
+  <p:cSld>
+    <p:spTree>
+      <p:nvGrpSpPr>
+        <p:cNvPr id="1" name=""/>
+        <p:cNvGrpSpPr/>
+        <p:nvPr/>
+      </p:nvGrpSpPr>
+      <p:grpSpPr>
+        <a:xfrm>
+          <a:off x="0" y="0"/>
+          <a:ext cx="0" cy="0"/>
+          <a:chOff x="0" y="0"/>
+          <a:chExt cx="0" cy="0"/>
+        </a:xfrm>
+      </p:grpSpPr>
+      <p:sp>
+        <p:nvSpPr>
+          <p:cNvPr id="2" name="Slide Image Placeholder 1"/>
+          <p:cNvSpPr>
+            <a:spLocks noGrp="1" noRot="1" noChangeAspect="1"/>
+          </p:cNvSpPr>
+          <p:nvPr>
+            <p:ph type="sldImg"/>
+          </p:nvPr>
+        </p:nvSpPr>
+        <p:spPr/>
+      </p:sp>
+      <p:sp>
+        <p:nvSpPr>
+          <p:cNvPr id="3" name="Notes Placeholder 2"/>
+          <p:cNvSpPr>
+            <a:spLocks noGrp="1"/>
+          </p:cNvSpPr>
+          <p:nvPr>
+            <p:ph type="body" idx="1"/>
+          </p:nvPr>
+        </p:nvSpPr>
+        <p:spPr/>
+        <p:txBody>
+          <a:bodyPr/>
+          <a:lstStyle/>
+          <a:p>
+            <a:endParaRPr lang="en-SG" dirty="0"/>
+          </a:p>
+        </p:txBody>
+      </p:sp>
+      <p:sp>
+        <p:nvSpPr>
+          <p:cNvPr id="4" name="Slide Number Placeholder 3"/>
+          <p:cNvSpPr>
+            <a:spLocks noGrp="1"/>
+          </p:cNvSpPr>
+          <p:nvPr>
+            <p:ph type="sldNum" sz="quarter" idx="5"/>
+          </p:nvPr>
+        </p:nvSpPr>
+        <p:spPr/>
+        <p:txBody>
+          <a:bodyPr/>
+          <a:lstStyle/>
+          <a:p>
+            <a:fld id="{E6801C31-435C-45EB-9063-5EFD94E05898}" type="slidenum">
+              <a:rPr lang="en-SG" smtClean="0"/>
+              <a:t>3</a:t>
+            </a:fld>
+            <a:endParaRPr lang="en-SG"/>
+          </a:p>
+        </p:txBody>
+      </p:sp>
+    </p:spTree>
+    <p:extLst>
+      <p:ext uri="{BB962C8B-B14F-4D97-AF65-F5344CB8AC3E}">
+        <p14:creationId xmlns:p14="http://schemas.microsoft.com/office/powerpoint/2010/main" val="1356575928"/>
+      </p:ext>
+    </p:extLst>
+  </p:cSld>
+  <p:clrMapOvr>
+    <a:masterClrMapping/>
+  </p:clrMapOvr>
+</p:notes>
+</file>
+
 <file path=ppt/slideLayouts/slideLayout1.xml><?xml version="1.0" encoding="utf-8"?>
 <p:sldLayout xmlns:a="http://schemas.openxmlformats.org/drawingml/2006/main" xmlns:r="http://schemas.openxmlformats.org/officeDocument/2006/relationships" xmlns:p="http://schemas.openxmlformats.org/presentationml/2006/main" type="title" preserve="1">
   <p:cSld name="Title Slide">
@@ -262,7 +700,7 @@
           <a:p>
             <a:fld id="{5568BA03-6613-4DAC-9DC1-5FD1D61FA6E8}" type="datetimeFigureOut">
               <a:rPr lang="en-SG" smtClean="0"/>
-              <a:t>5/8/2024</a:t>
+              <a:t>7/8/2024</a:t>
             </a:fld>
             <a:endParaRPr lang="en-SG"/>
           </a:p>
@@ -462,7 +900,7 @@
           <a:p>
             <a:fld id="{5568BA03-6613-4DAC-9DC1-5FD1D61FA6E8}" type="datetimeFigureOut">
               <a:rPr lang="en-SG" smtClean="0"/>
-              <a:t>5/8/2024</a:t>
+              <a:t>7/8/2024</a:t>
             </a:fld>
             <a:endParaRPr lang="en-SG"/>
           </a:p>
@@ -672,7 +1110,7 @@
           <a:p>
             <a:fld id="{5568BA03-6613-4DAC-9DC1-5FD1D61FA6E8}" type="datetimeFigureOut">
               <a:rPr lang="en-SG" smtClean="0"/>
-              <a:t>5/8/2024</a:t>
+              <a:t>7/8/2024</a:t>
             </a:fld>
             <a:endParaRPr lang="en-SG"/>
           </a:p>
@@ -872,7 +1310,7 @@
           <a:p>
             <a:fld id="{5568BA03-6613-4DAC-9DC1-5FD1D61FA6E8}" type="datetimeFigureOut">
               <a:rPr lang="en-SG" smtClean="0"/>
-              <a:t>5/8/2024</a:t>
+              <a:t>7/8/2024</a:t>
             </a:fld>
             <a:endParaRPr lang="en-SG"/>
           </a:p>
@@ -1148,7 +1586,7 @@
           <a:p>
             <a:fld id="{5568BA03-6613-4DAC-9DC1-5FD1D61FA6E8}" type="datetimeFigureOut">
               <a:rPr lang="en-SG" smtClean="0"/>
-              <a:t>5/8/2024</a:t>
+              <a:t>7/8/2024</a:t>
             </a:fld>
             <a:endParaRPr lang="en-SG"/>
           </a:p>
@@ -1416,7 +1854,7 @@
           <a:p>
             <a:fld id="{5568BA03-6613-4DAC-9DC1-5FD1D61FA6E8}" type="datetimeFigureOut">
               <a:rPr lang="en-SG" smtClean="0"/>
-              <a:t>5/8/2024</a:t>
+              <a:t>7/8/2024</a:t>
             </a:fld>
             <a:endParaRPr lang="en-SG"/>
           </a:p>
@@ -1831,7 +2269,7 @@
           <a:p>
             <a:fld id="{5568BA03-6613-4DAC-9DC1-5FD1D61FA6E8}" type="datetimeFigureOut">
               <a:rPr lang="en-SG" smtClean="0"/>
-              <a:t>5/8/2024</a:t>
+              <a:t>7/8/2024</a:t>
             </a:fld>
             <a:endParaRPr lang="en-SG"/>
           </a:p>
@@ -1973,7 +2411,7 @@
           <a:p>
             <a:fld id="{5568BA03-6613-4DAC-9DC1-5FD1D61FA6E8}" type="datetimeFigureOut">
               <a:rPr lang="en-SG" smtClean="0"/>
-              <a:t>5/8/2024</a:t>
+              <a:t>7/8/2024</a:t>
             </a:fld>
             <a:endParaRPr lang="en-SG"/>
           </a:p>
@@ -2086,7 +2524,7 @@
           <a:p>
             <a:fld id="{5568BA03-6613-4DAC-9DC1-5FD1D61FA6E8}" type="datetimeFigureOut">
               <a:rPr lang="en-SG" smtClean="0"/>
-              <a:t>5/8/2024</a:t>
+              <a:t>7/8/2024</a:t>
             </a:fld>
             <a:endParaRPr lang="en-SG"/>
           </a:p>
@@ -2399,7 +2837,7 @@
           <a:p>
             <a:fld id="{5568BA03-6613-4DAC-9DC1-5FD1D61FA6E8}" type="datetimeFigureOut">
               <a:rPr lang="en-SG" smtClean="0"/>
-              <a:t>5/8/2024</a:t>
+              <a:t>7/8/2024</a:t>
             </a:fld>
             <a:endParaRPr lang="en-SG"/>
           </a:p>
@@ -2688,7 +3126,7 @@
           <a:p>
             <a:fld id="{5568BA03-6613-4DAC-9DC1-5FD1D61FA6E8}" type="datetimeFigureOut">
               <a:rPr lang="en-SG" smtClean="0"/>
-              <a:t>5/8/2024</a:t>
+              <a:t>7/8/2024</a:t>
             </a:fld>
             <a:endParaRPr lang="en-SG"/>
           </a:p>
@@ -2931,7 +3369,7 @@
           <a:p>
             <a:fld id="{5568BA03-6613-4DAC-9DC1-5FD1D61FA6E8}" type="datetimeFigureOut">
               <a:rPr lang="en-SG" smtClean="0"/>
-              <a:t>5/8/2024</a:t>
+              <a:t>7/8/2024</a:t>
             </a:fld>
             <a:endParaRPr lang="en-SG"/>
           </a:p>
@@ -5464,6 +5902,2355 @@
     <p:extLst>
       <p:ext uri="{BB962C8B-B14F-4D97-AF65-F5344CB8AC3E}">
         <p14:creationId xmlns:p14="http://schemas.microsoft.com/office/powerpoint/2010/main" val="3394299434"/>
+      </p:ext>
+    </p:extLst>
+  </p:cSld>
+  <p:clrMapOvr>
+    <a:masterClrMapping/>
+  </p:clrMapOvr>
+</p:sld>
+</file>
+
+<file path=ppt/slides/slide3.xml><?xml version="1.0" encoding="utf-8"?>
+<p:sld xmlns:a="http://schemas.openxmlformats.org/drawingml/2006/main" xmlns:r="http://schemas.openxmlformats.org/officeDocument/2006/relationships" xmlns:p="http://schemas.openxmlformats.org/presentationml/2006/main">
+  <p:cSld>
+    <p:spTree>
+      <p:nvGrpSpPr>
+        <p:cNvPr id="1" name=""/>
+        <p:cNvGrpSpPr/>
+        <p:nvPr/>
+      </p:nvGrpSpPr>
+      <p:grpSpPr>
+        <a:xfrm>
+          <a:off x="0" y="0"/>
+          <a:ext cx="0" cy="0"/>
+          <a:chOff x="0" y="0"/>
+          <a:chExt cx="0" cy="0"/>
+        </a:xfrm>
+      </p:grpSpPr>
+      <p:pic>
+        <p:nvPicPr>
+          <p:cNvPr id="150" name="Picture 149">
+            <a:extLst>
+              <a:ext uri="{FF2B5EF4-FFF2-40B4-BE49-F238E27FC236}">
+                <a16:creationId xmlns:a16="http://schemas.microsoft.com/office/drawing/2014/main" id="{A2279AE1-6D6F-6588-B5F2-F6301B49F8C6}"/>
+              </a:ext>
+            </a:extLst>
+          </p:cNvPr>
+          <p:cNvPicPr>
+            <a:picLocks noChangeAspect="1"/>
+          </p:cNvPicPr>
+          <p:nvPr/>
+        </p:nvPicPr>
+        <p:blipFill>
+          <a:blip r:embed="rId3">
+            <a:duotone>
+              <a:schemeClr val="bg2">
+                <a:shade val="45000"/>
+                <a:satMod val="135000"/>
+              </a:schemeClr>
+              <a:prstClr val="white"/>
+            </a:duotone>
+          </a:blip>
+          <a:stretch>
+            <a:fillRect/>
+          </a:stretch>
+        </p:blipFill>
+        <p:spPr>
+          <a:xfrm>
+            <a:off x="7948414" y="3671279"/>
+            <a:ext cx="652591" cy="1256481"/>
+          </a:xfrm>
+          <a:prstGeom prst="rect">
+            <a:avLst/>
+          </a:prstGeom>
+          <a:ln>
+            <a:solidFill>
+              <a:schemeClr val="tx2">
+                <a:lumMod val="75000"/>
+                <a:lumOff val="25000"/>
+              </a:schemeClr>
+            </a:solidFill>
+          </a:ln>
+        </p:spPr>
+      </p:pic>
+      <p:sp>
+        <p:nvSpPr>
+          <p:cNvPr id="84" name="Isosceles Triangle 83">
+            <a:extLst>
+              <a:ext uri="{FF2B5EF4-FFF2-40B4-BE49-F238E27FC236}">
+                <a16:creationId xmlns:a16="http://schemas.microsoft.com/office/drawing/2014/main" id="{82794731-F4E9-0220-7799-A35D63D7D9BB}"/>
+              </a:ext>
+            </a:extLst>
+          </p:cNvPr>
+          <p:cNvSpPr/>
+          <p:nvPr/>
+        </p:nvSpPr>
+        <p:spPr>
+          <a:xfrm rot="10800000">
+            <a:off x="4264496" y="822924"/>
+            <a:ext cx="2233467" cy="1955274"/>
+          </a:xfrm>
+          <a:prstGeom prst="triangle">
+            <a:avLst>
+              <a:gd name="adj" fmla="val 56313"/>
+            </a:avLst>
+          </a:prstGeom>
+          <a:solidFill>
+            <a:schemeClr val="accent6">
+              <a:lumMod val="20000"/>
+              <a:lumOff val="80000"/>
+            </a:schemeClr>
+          </a:solidFill>
+          <a:ln>
+            <a:solidFill>
+              <a:schemeClr val="bg1"/>
+            </a:solidFill>
+          </a:ln>
+        </p:spPr>
+        <p:style>
+          <a:lnRef idx="2">
+            <a:schemeClr val="accent1">
+              <a:shade val="15000"/>
+            </a:schemeClr>
+          </a:lnRef>
+          <a:fillRef idx="1">
+            <a:schemeClr val="accent1"/>
+          </a:fillRef>
+          <a:effectRef idx="0">
+            <a:schemeClr val="accent1"/>
+          </a:effectRef>
+          <a:fontRef idx="minor">
+            <a:schemeClr val="lt1"/>
+          </a:fontRef>
+        </p:style>
+        <p:txBody>
+          <a:bodyPr rtlCol="0" anchor="ctr"/>
+          <a:lstStyle/>
+          <a:p>
+            <a:pPr algn="ctr"/>
+            <a:endParaRPr lang="en-SG" dirty="0"/>
+          </a:p>
+        </p:txBody>
+      </p:sp>
+      <p:pic>
+        <p:nvPicPr>
+          <p:cNvPr id="5" name="Picture 4">
+            <a:extLst>
+              <a:ext uri="{FF2B5EF4-FFF2-40B4-BE49-F238E27FC236}">
+                <a16:creationId xmlns:a16="http://schemas.microsoft.com/office/drawing/2014/main" id="{82175AE8-F038-D016-35F8-7EBE74B521A1}"/>
+              </a:ext>
+            </a:extLst>
+          </p:cNvPr>
+          <p:cNvPicPr>
+            <a:picLocks noChangeAspect="1"/>
+          </p:cNvPicPr>
+          <p:nvPr/>
+        </p:nvPicPr>
+        <p:blipFill>
+          <a:blip r:embed="rId4"/>
+          <a:stretch>
+            <a:fillRect/>
+          </a:stretch>
+        </p:blipFill>
+        <p:spPr>
+          <a:xfrm rot="5400000">
+            <a:off x="4180676" y="3033344"/>
+            <a:ext cx="1674261" cy="1316992"/>
+          </a:xfrm>
+          <a:prstGeom prst="rect">
+            <a:avLst/>
+          </a:prstGeom>
+        </p:spPr>
+      </p:pic>
+      <p:pic>
+        <p:nvPicPr>
+          <p:cNvPr id="7" name="Picture 6">
+            <a:extLst>
+              <a:ext uri="{FF2B5EF4-FFF2-40B4-BE49-F238E27FC236}">
+                <a16:creationId xmlns:a16="http://schemas.microsoft.com/office/drawing/2014/main" id="{D83B0235-A90F-7414-AC22-1D967DDB2F6A}"/>
+              </a:ext>
+            </a:extLst>
+          </p:cNvPr>
+          <p:cNvPicPr>
+            <a:picLocks noChangeAspect="1"/>
+          </p:cNvPicPr>
+          <p:nvPr/>
+        </p:nvPicPr>
+        <p:blipFill>
+          <a:blip r:embed="rId5"/>
+          <a:stretch>
+            <a:fillRect/>
+          </a:stretch>
+        </p:blipFill>
+        <p:spPr>
+          <a:xfrm>
+            <a:off x="5651202" y="3546250"/>
+            <a:ext cx="203148" cy="291179"/>
+          </a:xfrm>
+          <a:prstGeom prst="rect">
+            <a:avLst/>
+          </a:prstGeom>
+        </p:spPr>
+      </p:pic>
+      <p:pic>
+        <p:nvPicPr>
+          <p:cNvPr id="8" name="Picture 7">
+            <a:extLst>
+              <a:ext uri="{FF2B5EF4-FFF2-40B4-BE49-F238E27FC236}">
+                <a16:creationId xmlns:a16="http://schemas.microsoft.com/office/drawing/2014/main" id="{50BE7BAF-3F25-29C5-4AF7-73E8DFFBAF74}"/>
+              </a:ext>
+            </a:extLst>
+          </p:cNvPr>
+          <p:cNvPicPr>
+            <a:picLocks noChangeAspect="1"/>
+          </p:cNvPicPr>
+          <p:nvPr/>
+        </p:nvPicPr>
+        <p:blipFill>
+          <a:blip r:embed="rId5"/>
+          <a:stretch>
+            <a:fillRect/>
+          </a:stretch>
+        </p:blipFill>
+        <p:spPr>
+          <a:xfrm flipH="1">
+            <a:off x="4181263" y="3546249"/>
+            <a:ext cx="203148" cy="291179"/>
+          </a:xfrm>
+          <a:prstGeom prst="rect">
+            <a:avLst/>
+          </a:prstGeom>
+        </p:spPr>
+      </p:pic>
+      <p:pic>
+        <p:nvPicPr>
+          <p:cNvPr id="9" name="Picture 8">
+            <a:extLst>
+              <a:ext uri="{FF2B5EF4-FFF2-40B4-BE49-F238E27FC236}">
+                <a16:creationId xmlns:a16="http://schemas.microsoft.com/office/drawing/2014/main" id="{DAE53B7A-80C0-C065-4E08-F48F62A1A1D3}"/>
+              </a:ext>
+            </a:extLst>
+          </p:cNvPr>
+          <p:cNvPicPr>
+            <a:picLocks noChangeAspect="1"/>
+          </p:cNvPicPr>
+          <p:nvPr/>
+        </p:nvPicPr>
+        <p:blipFill>
+          <a:blip r:embed="rId5"/>
+          <a:stretch>
+            <a:fillRect/>
+          </a:stretch>
+        </p:blipFill>
+        <p:spPr>
+          <a:xfrm rot="5400000">
+            <a:off x="4916231" y="4484956"/>
+            <a:ext cx="203148" cy="291179"/>
+          </a:xfrm>
+          <a:prstGeom prst="rect">
+            <a:avLst/>
+          </a:prstGeom>
+        </p:spPr>
+      </p:pic>
+      <p:pic>
+        <p:nvPicPr>
+          <p:cNvPr id="10" name="Picture 9">
+            <a:extLst>
+              <a:ext uri="{FF2B5EF4-FFF2-40B4-BE49-F238E27FC236}">
+                <a16:creationId xmlns:a16="http://schemas.microsoft.com/office/drawing/2014/main" id="{9DF719D1-B90A-BD12-ED7E-831BC86815AD}"/>
+              </a:ext>
+            </a:extLst>
+          </p:cNvPr>
+          <p:cNvPicPr>
+            <a:picLocks noChangeAspect="1"/>
+          </p:cNvPicPr>
+          <p:nvPr/>
+        </p:nvPicPr>
+        <p:blipFill>
+          <a:blip r:embed="rId5"/>
+          <a:stretch>
+            <a:fillRect/>
+          </a:stretch>
+        </p:blipFill>
+        <p:spPr>
+          <a:xfrm rot="16200000" flipV="1">
+            <a:off x="4707031" y="2657672"/>
+            <a:ext cx="203148" cy="291179"/>
+          </a:xfrm>
+          <a:prstGeom prst="rect">
+            <a:avLst/>
+          </a:prstGeom>
+        </p:spPr>
+      </p:pic>
+      <p:cxnSp>
+        <p:nvCxnSpPr>
+          <p:cNvPr id="12" name="Straight Connector 11">
+            <a:extLst>
+              <a:ext uri="{FF2B5EF4-FFF2-40B4-BE49-F238E27FC236}">
+                <a16:creationId xmlns:a16="http://schemas.microsoft.com/office/drawing/2014/main" id="{1B6CA0E7-8801-832C-55B9-8535CE7FA750}"/>
+              </a:ext>
+            </a:extLst>
+          </p:cNvPr>
+          <p:cNvCxnSpPr/>
+          <p:nvPr/>
+        </p:nvCxnSpPr>
+        <p:spPr>
+          <a:xfrm>
+            <a:off x="2504478" y="752475"/>
+            <a:ext cx="3171825" cy="0"/>
+          </a:xfrm>
+          <a:prstGeom prst="line">
+            <a:avLst/>
+          </a:prstGeom>
+          <a:ln w="38100"/>
+        </p:spPr>
+        <p:style>
+          <a:lnRef idx="2">
+            <a:schemeClr val="accent1"/>
+          </a:lnRef>
+          <a:fillRef idx="0">
+            <a:schemeClr val="accent1"/>
+          </a:fillRef>
+          <a:effectRef idx="1">
+            <a:schemeClr val="accent1"/>
+          </a:effectRef>
+          <a:fontRef idx="minor">
+            <a:schemeClr val="tx1"/>
+          </a:fontRef>
+        </p:style>
+      </p:cxnSp>
+      <p:cxnSp>
+        <p:nvCxnSpPr>
+          <p:cNvPr id="13" name="Straight Connector 12">
+            <a:extLst>
+              <a:ext uri="{FF2B5EF4-FFF2-40B4-BE49-F238E27FC236}">
+                <a16:creationId xmlns:a16="http://schemas.microsoft.com/office/drawing/2014/main" id="{D1D48951-29AA-8D91-8CE8-44781650AA55}"/>
+              </a:ext>
+            </a:extLst>
+          </p:cNvPr>
+          <p:cNvCxnSpPr>
+            <a:cxnSpLocks/>
+          </p:cNvCxnSpPr>
+          <p:nvPr/>
+        </p:nvCxnSpPr>
+        <p:spPr>
+          <a:xfrm flipV="1">
+            <a:off x="2512748" y="752475"/>
+            <a:ext cx="0" cy="4953000"/>
+          </a:xfrm>
+          <a:prstGeom prst="line">
+            <a:avLst/>
+          </a:prstGeom>
+          <a:ln w="38100"/>
+        </p:spPr>
+        <p:style>
+          <a:lnRef idx="2">
+            <a:schemeClr val="accent1"/>
+          </a:lnRef>
+          <a:fillRef idx="0">
+            <a:schemeClr val="accent1"/>
+          </a:fillRef>
+          <a:effectRef idx="1">
+            <a:schemeClr val="accent1"/>
+          </a:effectRef>
+          <a:fontRef idx="minor">
+            <a:schemeClr val="tx1"/>
+          </a:fontRef>
+        </p:style>
+      </p:cxnSp>
+      <p:cxnSp>
+        <p:nvCxnSpPr>
+          <p:cNvPr id="16" name="Straight Connector 15">
+            <a:extLst>
+              <a:ext uri="{FF2B5EF4-FFF2-40B4-BE49-F238E27FC236}">
+                <a16:creationId xmlns:a16="http://schemas.microsoft.com/office/drawing/2014/main" id="{3A3CBB61-A7C0-A136-7E1D-C8802BD62F12}"/>
+              </a:ext>
+            </a:extLst>
+          </p:cNvPr>
+          <p:cNvCxnSpPr>
+            <a:cxnSpLocks/>
+          </p:cNvCxnSpPr>
+          <p:nvPr/>
+        </p:nvCxnSpPr>
+        <p:spPr>
+          <a:xfrm flipV="1">
+            <a:off x="7639428" y="2574003"/>
+            <a:ext cx="0" cy="3055272"/>
+          </a:xfrm>
+          <a:prstGeom prst="line">
+            <a:avLst/>
+          </a:prstGeom>
+          <a:ln w="38100"/>
+        </p:spPr>
+        <p:style>
+          <a:lnRef idx="2">
+            <a:schemeClr val="accent1"/>
+          </a:lnRef>
+          <a:fillRef idx="0">
+            <a:schemeClr val="accent1"/>
+          </a:fillRef>
+          <a:effectRef idx="1">
+            <a:schemeClr val="accent1"/>
+          </a:effectRef>
+          <a:fontRef idx="minor">
+            <a:schemeClr val="tx1"/>
+          </a:fontRef>
+        </p:style>
+      </p:cxnSp>
+      <p:cxnSp>
+        <p:nvCxnSpPr>
+          <p:cNvPr id="18" name="Straight Connector 17">
+            <a:extLst>
+              <a:ext uri="{FF2B5EF4-FFF2-40B4-BE49-F238E27FC236}">
+                <a16:creationId xmlns:a16="http://schemas.microsoft.com/office/drawing/2014/main" id="{2779E7DD-85B2-5D1F-2A5E-9BB5F42717F7}"/>
+              </a:ext>
+            </a:extLst>
+          </p:cNvPr>
+          <p:cNvCxnSpPr>
+            <a:cxnSpLocks/>
+          </p:cNvCxnSpPr>
+          <p:nvPr/>
+        </p:nvCxnSpPr>
+        <p:spPr>
+          <a:xfrm flipH="1">
+            <a:off x="5651202" y="752475"/>
+            <a:ext cx="3150276" cy="0"/>
+          </a:xfrm>
+          <a:prstGeom prst="line">
+            <a:avLst/>
+          </a:prstGeom>
+          <a:ln w="38100"/>
+        </p:spPr>
+        <p:style>
+          <a:lnRef idx="2">
+            <a:schemeClr val="accent1"/>
+          </a:lnRef>
+          <a:fillRef idx="0">
+            <a:schemeClr val="accent1"/>
+          </a:fillRef>
+          <a:effectRef idx="1">
+            <a:schemeClr val="accent1"/>
+          </a:effectRef>
+          <a:fontRef idx="minor">
+            <a:schemeClr val="tx1"/>
+          </a:fontRef>
+        </p:style>
+      </p:cxnSp>
+      <p:cxnSp>
+        <p:nvCxnSpPr>
+          <p:cNvPr id="23" name="Straight Connector 22">
+            <a:extLst>
+              <a:ext uri="{FF2B5EF4-FFF2-40B4-BE49-F238E27FC236}">
+                <a16:creationId xmlns:a16="http://schemas.microsoft.com/office/drawing/2014/main" id="{ECCB6263-2245-E65B-044F-396B2CE066F4}"/>
+              </a:ext>
+            </a:extLst>
+          </p:cNvPr>
+          <p:cNvCxnSpPr>
+            <a:cxnSpLocks/>
+          </p:cNvCxnSpPr>
+          <p:nvPr/>
+        </p:nvCxnSpPr>
+        <p:spPr>
+          <a:xfrm flipV="1">
+            <a:off x="8801478" y="752475"/>
+            <a:ext cx="0" cy="4914900"/>
+          </a:xfrm>
+          <a:prstGeom prst="line">
+            <a:avLst/>
+          </a:prstGeom>
+          <a:ln w="38100"/>
+        </p:spPr>
+        <p:style>
+          <a:lnRef idx="2">
+            <a:schemeClr val="accent1"/>
+          </a:lnRef>
+          <a:fillRef idx="0">
+            <a:schemeClr val="accent1"/>
+          </a:fillRef>
+          <a:effectRef idx="1">
+            <a:schemeClr val="accent1"/>
+          </a:effectRef>
+          <a:fontRef idx="minor">
+            <a:schemeClr val="tx1"/>
+          </a:fontRef>
+        </p:style>
+      </p:cxnSp>
+      <p:cxnSp>
+        <p:nvCxnSpPr>
+          <p:cNvPr id="27" name="Straight Connector 26">
+            <a:extLst>
+              <a:ext uri="{FF2B5EF4-FFF2-40B4-BE49-F238E27FC236}">
+                <a16:creationId xmlns:a16="http://schemas.microsoft.com/office/drawing/2014/main" id="{4C4526B6-BBEA-1F46-F924-40123ECDE631}"/>
+              </a:ext>
+            </a:extLst>
+          </p:cNvPr>
+          <p:cNvCxnSpPr>
+            <a:stCxn id="8" idx="3"/>
+          </p:cNvCxnSpPr>
+          <p:nvPr/>
+        </p:nvCxnSpPr>
+        <p:spPr>
+          <a:xfrm flipH="1" flipV="1">
+            <a:off x="2512748" y="3691838"/>
+            <a:ext cx="1668515" cy="1"/>
+          </a:xfrm>
+          <a:prstGeom prst="line">
+            <a:avLst/>
+          </a:prstGeom>
+          <a:ln>
+            <a:prstDash val="sysDash"/>
+          </a:ln>
+        </p:spPr>
+        <p:style>
+          <a:lnRef idx="2">
+            <a:schemeClr val="accent1"/>
+          </a:lnRef>
+          <a:fillRef idx="0">
+            <a:schemeClr val="accent1"/>
+          </a:fillRef>
+          <a:effectRef idx="1">
+            <a:schemeClr val="accent1"/>
+          </a:effectRef>
+          <a:fontRef idx="minor">
+            <a:schemeClr val="tx1"/>
+          </a:fontRef>
+        </p:style>
+      </p:cxnSp>
+      <p:cxnSp>
+        <p:nvCxnSpPr>
+          <p:cNvPr id="28" name="Straight Connector 27">
+            <a:extLst>
+              <a:ext uri="{FF2B5EF4-FFF2-40B4-BE49-F238E27FC236}">
+                <a16:creationId xmlns:a16="http://schemas.microsoft.com/office/drawing/2014/main" id="{BA173883-5B04-F532-1395-E3C0D4AF8181}"/>
+              </a:ext>
+            </a:extLst>
+          </p:cNvPr>
+          <p:cNvCxnSpPr>
+            <a:cxnSpLocks/>
+          </p:cNvCxnSpPr>
+          <p:nvPr/>
+        </p:nvCxnSpPr>
+        <p:spPr>
+          <a:xfrm flipH="1" flipV="1">
+            <a:off x="5854350" y="3691837"/>
+            <a:ext cx="1765209" cy="1"/>
+          </a:xfrm>
+          <a:prstGeom prst="line">
+            <a:avLst/>
+          </a:prstGeom>
+          <a:ln>
+            <a:prstDash val="sysDash"/>
+          </a:ln>
+        </p:spPr>
+        <p:style>
+          <a:lnRef idx="2">
+            <a:schemeClr val="accent1"/>
+          </a:lnRef>
+          <a:fillRef idx="0">
+            <a:schemeClr val="accent1"/>
+          </a:fillRef>
+          <a:effectRef idx="1">
+            <a:schemeClr val="accent1"/>
+          </a:effectRef>
+          <a:fontRef idx="minor">
+            <a:schemeClr val="tx1"/>
+          </a:fontRef>
+        </p:style>
+      </p:cxnSp>
+      <p:cxnSp>
+        <p:nvCxnSpPr>
+          <p:cNvPr id="30" name="Straight Connector 29">
+            <a:extLst>
+              <a:ext uri="{FF2B5EF4-FFF2-40B4-BE49-F238E27FC236}">
+                <a16:creationId xmlns:a16="http://schemas.microsoft.com/office/drawing/2014/main" id="{308B040A-F23F-7DB4-2B99-E37A966F06D1}"/>
+              </a:ext>
+            </a:extLst>
+          </p:cNvPr>
+          <p:cNvCxnSpPr>
+            <a:cxnSpLocks/>
+            <a:endCxn id="10" idx="3"/>
+          </p:cNvCxnSpPr>
+          <p:nvPr/>
+        </p:nvCxnSpPr>
+        <p:spPr>
+          <a:xfrm>
+            <a:off x="4808605" y="752475"/>
+            <a:ext cx="0" cy="1949213"/>
+          </a:xfrm>
+          <a:prstGeom prst="line">
+            <a:avLst/>
+          </a:prstGeom>
+          <a:ln>
+            <a:prstDash val="sysDash"/>
+          </a:ln>
+        </p:spPr>
+        <p:style>
+          <a:lnRef idx="2">
+            <a:schemeClr val="accent1"/>
+          </a:lnRef>
+          <a:fillRef idx="0">
+            <a:schemeClr val="accent1"/>
+          </a:fillRef>
+          <a:effectRef idx="1">
+            <a:schemeClr val="accent1"/>
+          </a:effectRef>
+          <a:fontRef idx="minor">
+            <a:schemeClr val="tx1"/>
+          </a:fontRef>
+        </p:style>
+      </p:cxnSp>
+      <p:cxnSp>
+        <p:nvCxnSpPr>
+          <p:cNvPr id="33" name="Straight Connector 32">
+            <a:extLst>
+              <a:ext uri="{FF2B5EF4-FFF2-40B4-BE49-F238E27FC236}">
+                <a16:creationId xmlns:a16="http://schemas.microsoft.com/office/drawing/2014/main" id="{4ED40060-366A-1439-7739-EBE14B06D6AD}"/>
+              </a:ext>
+            </a:extLst>
+          </p:cNvPr>
+          <p:cNvCxnSpPr>
+            <a:cxnSpLocks/>
+          </p:cNvCxnSpPr>
+          <p:nvPr/>
+        </p:nvCxnSpPr>
+        <p:spPr>
+          <a:xfrm>
+            <a:off x="5017805" y="4775437"/>
+            <a:ext cx="0" cy="930038"/>
+          </a:xfrm>
+          <a:prstGeom prst="line">
+            <a:avLst/>
+          </a:prstGeom>
+          <a:ln>
+            <a:prstDash val="sysDash"/>
+          </a:ln>
+        </p:spPr>
+        <p:style>
+          <a:lnRef idx="2">
+            <a:schemeClr val="accent1"/>
+          </a:lnRef>
+          <a:fillRef idx="0">
+            <a:schemeClr val="accent1"/>
+          </a:fillRef>
+          <a:effectRef idx="1">
+            <a:schemeClr val="accent1"/>
+          </a:effectRef>
+          <a:fontRef idx="minor">
+            <a:schemeClr val="tx1"/>
+          </a:fontRef>
+        </p:style>
+      </p:cxnSp>
+      <p:pic>
+        <p:nvPicPr>
+          <p:cNvPr id="36" name="Picture 35">
+            <a:extLst>
+              <a:ext uri="{FF2B5EF4-FFF2-40B4-BE49-F238E27FC236}">
+                <a16:creationId xmlns:a16="http://schemas.microsoft.com/office/drawing/2014/main" id="{5DA3B6DF-67AC-6F20-BDAD-B7C4515DCC5E}"/>
+              </a:ext>
+            </a:extLst>
+          </p:cNvPr>
+          <p:cNvPicPr>
+            <a:picLocks noChangeAspect="1"/>
+          </p:cNvPicPr>
+          <p:nvPr/>
+        </p:nvPicPr>
+        <p:blipFill>
+          <a:blip r:embed="rId3">
+            <a:duotone>
+              <a:schemeClr val="accent2">
+                <a:shade val="45000"/>
+                <a:satMod val="135000"/>
+              </a:schemeClr>
+              <a:prstClr val="white"/>
+            </a:duotone>
+          </a:blip>
+          <a:stretch>
+            <a:fillRect/>
+          </a:stretch>
+        </p:blipFill>
+        <p:spPr>
+          <a:xfrm>
+            <a:off x="7776410" y="4326887"/>
+            <a:ext cx="652591" cy="1256481"/>
+          </a:xfrm>
+          <a:prstGeom prst="rect">
+            <a:avLst/>
+          </a:prstGeom>
+          <a:ln>
+            <a:solidFill>
+              <a:srgbClr val="FF0000"/>
+            </a:solidFill>
+          </a:ln>
+        </p:spPr>
+      </p:pic>
+      <p:pic>
+        <p:nvPicPr>
+          <p:cNvPr id="38" name="Graphic 37" descr="Radio microphone with solid fill">
+            <a:extLst>
+              <a:ext uri="{FF2B5EF4-FFF2-40B4-BE49-F238E27FC236}">
+                <a16:creationId xmlns:a16="http://schemas.microsoft.com/office/drawing/2014/main" id="{E6DA893A-E746-2DD8-32EB-66E38F3F1AD3}"/>
+              </a:ext>
+            </a:extLst>
+          </p:cNvPr>
+          <p:cNvPicPr>
+            <a:picLocks noChangeAspect="1"/>
+          </p:cNvPicPr>
+          <p:nvPr/>
+        </p:nvPicPr>
+        <p:blipFill>
+          <a:blip r:embed="rId6">
+            <a:extLst>
+              <a:ext uri="{96DAC541-7B7A-43D3-8B79-37D633B846F1}">
+                <asvg:svgBlip xmlns:asvg="http://schemas.microsoft.com/office/drawing/2016/SVG/main" r:embed="rId7"/>
+              </a:ext>
+            </a:extLst>
+          </a:blip>
+          <a:stretch>
+            <a:fillRect/>
+          </a:stretch>
+        </p:blipFill>
+        <p:spPr>
+          <a:xfrm>
+            <a:off x="4981176" y="3837428"/>
+            <a:ext cx="484260" cy="484260"/>
+          </a:xfrm>
+          <a:prstGeom prst="rect">
+            <a:avLst/>
+          </a:prstGeom>
+        </p:spPr>
+      </p:pic>
+      <p:cxnSp>
+        <p:nvCxnSpPr>
+          <p:cNvPr id="40" name="Straight Connector 39">
+            <a:extLst>
+              <a:ext uri="{FF2B5EF4-FFF2-40B4-BE49-F238E27FC236}">
+                <a16:creationId xmlns:a16="http://schemas.microsoft.com/office/drawing/2014/main" id="{AEA05802-D196-CB3D-ECB2-8A0F0AC71165}"/>
+              </a:ext>
+            </a:extLst>
+          </p:cNvPr>
+          <p:cNvCxnSpPr>
+            <a:cxnSpLocks/>
+          </p:cNvCxnSpPr>
+          <p:nvPr/>
+        </p:nvCxnSpPr>
+        <p:spPr>
+          <a:xfrm>
+            <a:off x="5356499" y="4101639"/>
+            <a:ext cx="2419911" cy="580353"/>
+          </a:xfrm>
+          <a:prstGeom prst="line">
+            <a:avLst/>
+          </a:prstGeom>
+          <a:ln w="12700">
+            <a:prstDash val="sysDash"/>
+          </a:ln>
+        </p:spPr>
+        <p:style>
+          <a:lnRef idx="2">
+            <a:schemeClr val="accent1"/>
+          </a:lnRef>
+          <a:fillRef idx="0">
+            <a:schemeClr val="accent1"/>
+          </a:fillRef>
+          <a:effectRef idx="1">
+            <a:schemeClr val="accent1"/>
+          </a:effectRef>
+          <a:fontRef idx="minor">
+            <a:schemeClr val="tx1"/>
+          </a:fontRef>
+        </p:style>
+      </p:cxnSp>
+      <p:cxnSp>
+        <p:nvCxnSpPr>
+          <p:cNvPr id="42" name="Straight Connector 41">
+            <a:extLst>
+              <a:ext uri="{FF2B5EF4-FFF2-40B4-BE49-F238E27FC236}">
+                <a16:creationId xmlns:a16="http://schemas.microsoft.com/office/drawing/2014/main" id="{69258C94-F756-010F-2D31-2DDAA1B9F8A0}"/>
+              </a:ext>
+            </a:extLst>
+          </p:cNvPr>
+          <p:cNvCxnSpPr>
+            <a:cxnSpLocks/>
+          </p:cNvCxnSpPr>
+          <p:nvPr/>
+        </p:nvCxnSpPr>
+        <p:spPr>
+          <a:xfrm>
+            <a:off x="5356499" y="4101639"/>
+            <a:ext cx="2391441" cy="1133375"/>
+          </a:xfrm>
+          <a:prstGeom prst="line">
+            <a:avLst/>
+          </a:prstGeom>
+          <a:ln w="9525">
+            <a:prstDash val="dash"/>
+          </a:ln>
+        </p:spPr>
+        <p:style>
+          <a:lnRef idx="2">
+            <a:schemeClr val="accent1"/>
+          </a:lnRef>
+          <a:fillRef idx="0">
+            <a:schemeClr val="accent1"/>
+          </a:fillRef>
+          <a:effectRef idx="1">
+            <a:schemeClr val="accent1"/>
+          </a:effectRef>
+          <a:fontRef idx="minor">
+            <a:schemeClr val="tx1"/>
+          </a:fontRef>
+        </p:style>
+      </p:cxnSp>
+      <p:pic>
+        <p:nvPicPr>
+          <p:cNvPr id="49" name="Graphic 48" descr="Voice with solid fill">
+            <a:extLst>
+              <a:ext uri="{FF2B5EF4-FFF2-40B4-BE49-F238E27FC236}">
+                <a16:creationId xmlns:a16="http://schemas.microsoft.com/office/drawing/2014/main" id="{34992381-DF81-A731-F108-B330C81E8F7C}"/>
+              </a:ext>
+            </a:extLst>
+          </p:cNvPr>
+          <p:cNvPicPr>
+            <a:picLocks noChangeAspect="1"/>
+          </p:cNvPicPr>
+          <p:nvPr/>
+        </p:nvPicPr>
+        <p:blipFill>
+          <a:blip r:embed="rId8">
+            <a:extLst>
+              <a:ext uri="{96DAC541-7B7A-43D3-8B79-37D633B846F1}">
+                <asvg:svgBlip xmlns:asvg="http://schemas.microsoft.com/office/drawing/2016/SVG/main" r:embed="rId9"/>
+              </a:ext>
+            </a:extLst>
+          </a:blip>
+          <a:stretch>
+            <a:fillRect/>
+          </a:stretch>
+        </p:blipFill>
+        <p:spPr>
+          <a:xfrm>
+            <a:off x="7747940" y="4589783"/>
+            <a:ext cx="730691" cy="730691"/>
+          </a:xfrm>
+          <a:prstGeom prst="rect">
+            <a:avLst/>
+          </a:prstGeom>
+        </p:spPr>
+      </p:pic>
+      <p:pic>
+        <p:nvPicPr>
+          <p:cNvPr id="55" name="Picture 54">
+            <a:extLst>
+              <a:ext uri="{FF2B5EF4-FFF2-40B4-BE49-F238E27FC236}">
+                <a16:creationId xmlns:a16="http://schemas.microsoft.com/office/drawing/2014/main" id="{14B9CBEC-F9C5-8C3F-7286-287B270956D3}"/>
+              </a:ext>
+            </a:extLst>
+          </p:cNvPr>
+          <p:cNvPicPr>
+            <a:picLocks noChangeAspect="1"/>
+          </p:cNvPicPr>
+          <p:nvPr/>
+        </p:nvPicPr>
+        <p:blipFill>
+          <a:blip r:embed="rId10"/>
+          <a:stretch>
+            <a:fillRect/>
+          </a:stretch>
+        </p:blipFill>
+        <p:spPr>
+          <a:xfrm rot="16200000">
+            <a:off x="5031764" y="2596495"/>
+            <a:ext cx="476190" cy="380952"/>
+          </a:xfrm>
+          <a:prstGeom prst="rect">
+            <a:avLst/>
+          </a:prstGeom>
+        </p:spPr>
+      </p:pic>
+      <p:sp>
+        <p:nvSpPr>
+          <p:cNvPr id="56" name="Rectangle 55">
+            <a:extLst>
+              <a:ext uri="{FF2B5EF4-FFF2-40B4-BE49-F238E27FC236}">
+                <a16:creationId xmlns:a16="http://schemas.microsoft.com/office/drawing/2014/main" id="{278C49DB-B004-5497-BE7B-44C8870F8FE3}"/>
+              </a:ext>
+            </a:extLst>
+          </p:cNvPr>
+          <p:cNvSpPr/>
+          <p:nvPr/>
+        </p:nvSpPr>
+        <p:spPr>
+          <a:xfrm>
+            <a:off x="4941162" y="857250"/>
+            <a:ext cx="1044020" cy="476191"/>
+          </a:xfrm>
+          <a:prstGeom prst="rect">
+            <a:avLst/>
+          </a:prstGeom>
+        </p:spPr>
+        <p:style>
+          <a:lnRef idx="2">
+            <a:schemeClr val="accent1">
+              <a:shade val="15000"/>
+            </a:schemeClr>
+          </a:lnRef>
+          <a:fillRef idx="1">
+            <a:schemeClr val="accent1"/>
+          </a:fillRef>
+          <a:effectRef idx="0">
+            <a:schemeClr val="accent1"/>
+          </a:effectRef>
+          <a:fontRef idx="minor">
+            <a:schemeClr val="lt1"/>
+          </a:fontRef>
+        </p:style>
+        <p:txBody>
+          <a:bodyPr rtlCol="0" anchor="ctr"/>
+          <a:lstStyle/>
+          <a:p>
+            <a:pPr algn="ctr"/>
+            <a:endParaRPr lang="en-SG"/>
+          </a:p>
+        </p:txBody>
+      </p:sp>
+      <p:pic>
+        <p:nvPicPr>
+          <p:cNvPr id="85" name="Picture 84">
+            <a:extLst>
+              <a:ext uri="{FF2B5EF4-FFF2-40B4-BE49-F238E27FC236}">
+                <a16:creationId xmlns:a16="http://schemas.microsoft.com/office/drawing/2014/main" id="{6503942E-DF0E-8506-A221-F8B2855D7BF1}"/>
+              </a:ext>
+            </a:extLst>
+          </p:cNvPr>
+          <p:cNvPicPr>
+            <a:picLocks noChangeAspect="1"/>
+          </p:cNvPicPr>
+          <p:nvPr/>
+        </p:nvPicPr>
+        <p:blipFill>
+          <a:blip r:embed="rId3"/>
+          <a:stretch>
+            <a:fillRect/>
+          </a:stretch>
+        </p:blipFill>
+        <p:spPr>
+          <a:xfrm>
+            <a:off x="6852854" y="786950"/>
+            <a:ext cx="652591" cy="1256481"/>
+          </a:xfrm>
+          <a:prstGeom prst="rect">
+            <a:avLst/>
+          </a:prstGeom>
+          <a:ln w="19050">
+            <a:solidFill>
+              <a:schemeClr val="accent6">
+                <a:lumMod val="50000"/>
+              </a:schemeClr>
+            </a:solidFill>
+          </a:ln>
+        </p:spPr>
+      </p:pic>
+      <p:pic>
+        <p:nvPicPr>
+          <p:cNvPr id="87" name="Graphic 86" descr="Web cam with solid fill">
+            <a:extLst>
+              <a:ext uri="{FF2B5EF4-FFF2-40B4-BE49-F238E27FC236}">
+                <a16:creationId xmlns:a16="http://schemas.microsoft.com/office/drawing/2014/main" id="{C5C746CC-F98C-4CC5-7C0B-ACE5C1C762B4}"/>
+              </a:ext>
+            </a:extLst>
+          </p:cNvPr>
+          <p:cNvPicPr>
+            <a:picLocks noChangeAspect="1"/>
+          </p:cNvPicPr>
+          <p:nvPr/>
+        </p:nvPicPr>
+        <p:blipFill>
+          <a:blip r:embed="rId11">
+            <a:extLst>
+              <a:ext uri="{96DAC541-7B7A-43D3-8B79-37D633B846F1}">
+                <asvg:svgBlip xmlns:asvg="http://schemas.microsoft.com/office/drawing/2016/SVG/main" r:embed="rId12"/>
+              </a:ext>
+            </a:extLst>
+          </a:blip>
+          <a:stretch>
+            <a:fillRect/>
+          </a:stretch>
+        </p:blipFill>
+        <p:spPr>
+          <a:xfrm>
+            <a:off x="4847549" y="3086510"/>
+            <a:ext cx="588673" cy="588673"/>
+          </a:xfrm>
+          <a:prstGeom prst="rect">
+            <a:avLst/>
+          </a:prstGeom>
+        </p:spPr>
+      </p:pic>
+      <p:cxnSp>
+        <p:nvCxnSpPr>
+          <p:cNvPr id="89" name="Straight Connector 88">
+            <a:extLst>
+              <a:ext uri="{FF2B5EF4-FFF2-40B4-BE49-F238E27FC236}">
+                <a16:creationId xmlns:a16="http://schemas.microsoft.com/office/drawing/2014/main" id="{E10FDFD1-A436-B8B7-9931-47469D037CFC}"/>
+              </a:ext>
+            </a:extLst>
+          </p:cNvPr>
+          <p:cNvCxnSpPr>
+            <a:cxnSpLocks/>
+          </p:cNvCxnSpPr>
+          <p:nvPr/>
+        </p:nvCxnSpPr>
+        <p:spPr>
+          <a:xfrm flipV="1">
+            <a:off x="5180519" y="1095345"/>
+            <a:ext cx="1765209" cy="2216405"/>
+          </a:xfrm>
+          <a:prstGeom prst="line">
+            <a:avLst/>
+          </a:prstGeom>
+          <a:ln>
+            <a:solidFill>
+              <a:srgbClr val="00B050"/>
+            </a:solidFill>
+          </a:ln>
+        </p:spPr>
+        <p:style>
+          <a:lnRef idx="2">
+            <a:schemeClr val="accent1"/>
+          </a:lnRef>
+          <a:fillRef idx="0">
+            <a:schemeClr val="accent1"/>
+          </a:fillRef>
+          <a:effectRef idx="1">
+            <a:schemeClr val="accent1"/>
+          </a:effectRef>
+          <a:fontRef idx="minor">
+            <a:schemeClr val="tx1"/>
+          </a:fontRef>
+        </p:style>
+      </p:cxnSp>
+      <p:cxnSp>
+        <p:nvCxnSpPr>
+          <p:cNvPr id="91" name="Straight Connector 90">
+            <a:extLst>
+              <a:ext uri="{FF2B5EF4-FFF2-40B4-BE49-F238E27FC236}">
+                <a16:creationId xmlns:a16="http://schemas.microsoft.com/office/drawing/2014/main" id="{F78FD16A-2B3F-0928-BE3D-9AB9594719D9}"/>
+              </a:ext>
+            </a:extLst>
+          </p:cNvPr>
+          <p:cNvCxnSpPr>
+            <a:cxnSpLocks/>
+          </p:cNvCxnSpPr>
+          <p:nvPr/>
+        </p:nvCxnSpPr>
+        <p:spPr>
+          <a:xfrm flipV="1">
+            <a:off x="5170726" y="1808931"/>
+            <a:ext cx="2008423" cy="1502819"/>
+          </a:xfrm>
+          <a:prstGeom prst="line">
+            <a:avLst/>
+          </a:prstGeom>
+          <a:ln>
+            <a:solidFill>
+              <a:srgbClr val="00B050"/>
+            </a:solidFill>
+          </a:ln>
+        </p:spPr>
+        <p:style>
+          <a:lnRef idx="2">
+            <a:schemeClr val="accent1"/>
+          </a:lnRef>
+          <a:fillRef idx="0">
+            <a:schemeClr val="accent1"/>
+          </a:fillRef>
+          <a:effectRef idx="1">
+            <a:schemeClr val="accent1"/>
+          </a:effectRef>
+          <a:fontRef idx="minor">
+            <a:schemeClr val="tx1"/>
+          </a:fontRef>
+        </p:style>
+      </p:cxnSp>
+      <p:sp>
+        <p:nvSpPr>
+          <p:cNvPr id="95" name="Rectangle 94">
+            <a:extLst>
+              <a:ext uri="{FF2B5EF4-FFF2-40B4-BE49-F238E27FC236}">
+                <a16:creationId xmlns:a16="http://schemas.microsoft.com/office/drawing/2014/main" id="{4F49487D-F631-9BC0-64DB-21B900A67D30}"/>
+              </a:ext>
+            </a:extLst>
+          </p:cNvPr>
+          <p:cNvSpPr/>
+          <p:nvPr/>
+        </p:nvSpPr>
+        <p:spPr>
+          <a:xfrm>
+            <a:off x="6954919" y="1095345"/>
+            <a:ext cx="474582" cy="713586"/>
+          </a:xfrm>
+          <a:prstGeom prst="rect">
+            <a:avLst/>
+          </a:prstGeom>
+          <a:noFill/>
+          <a:ln>
+            <a:solidFill>
+              <a:schemeClr val="accent6">
+                <a:lumMod val="75000"/>
+              </a:schemeClr>
+            </a:solidFill>
+          </a:ln>
+        </p:spPr>
+        <p:style>
+          <a:lnRef idx="2">
+            <a:schemeClr val="accent1">
+              <a:shade val="15000"/>
+            </a:schemeClr>
+          </a:lnRef>
+          <a:fillRef idx="1">
+            <a:schemeClr val="accent1"/>
+          </a:fillRef>
+          <a:effectRef idx="0">
+            <a:schemeClr val="accent1"/>
+          </a:effectRef>
+          <a:fontRef idx="minor">
+            <a:schemeClr val="lt1"/>
+          </a:fontRef>
+        </p:style>
+        <p:txBody>
+          <a:bodyPr rtlCol="0" anchor="ctr"/>
+          <a:lstStyle/>
+          <a:p>
+            <a:pPr algn="ctr"/>
+            <a:endParaRPr lang="en-SG" dirty="0"/>
+          </a:p>
+        </p:txBody>
+      </p:sp>
+      <p:pic>
+        <p:nvPicPr>
+          <p:cNvPr id="99" name="Graphic 98" descr="Voice outline">
+            <a:extLst>
+              <a:ext uri="{FF2B5EF4-FFF2-40B4-BE49-F238E27FC236}">
+                <a16:creationId xmlns:a16="http://schemas.microsoft.com/office/drawing/2014/main" id="{6397C585-3560-27CF-EFEC-55FCB06D4171}"/>
+              </a:ext>
+            </a:extLst>
+          </p:cNvPr>
+          <p:cNvPicPr>
+            <a:picLocks noChangeAspect="1"/>
+          </p:cNvPicPr>
+          <p:nvPr/>
+        </p:nvPicPr>
+        <p:blipFill>
+          <a:blip r:embed="rId13">
+            <a:extLst>
+              <a:ext uri="{96DAC541-7B7A-43D3-8B79-37D633B846F1}">
+                <asvg:svgBlip xmlns:asvg="http://schemas.microsoft.com/office/drawing/2016/SVG/main" r:embed="rId14"/>
+              </a:ext>
+            </a:extLst>
+          </a:blip>
+          <a:stretch>
+            <a:fillRect/>
+          </a:stretch>
+        </p:blipFill>
+        <p:spPr>
+          <a:xfrm>
+            <a:off x="7086217" y="1717678"/>
+            <a:ext cx="471338" cy="471338"/>
+          </a:xfrm>
+          <a:prstGeom prst="rect">
+            <a:avLst/>
+          </a:prstGeom>
+        </p:spPr>
+      </p:pic>
+      <p:cxnSp>
+        <p:nvCxnSpPr>
+          <p:cNvPr id="100" name="Straight Connector 99">
+            <a:extLst>
+              <a:ext uri="{FF2B5EF4-FFF2-40B4-BE49-F238E27FC236}">
+                <a16:creationId xmlns:a16="http://schemas.microsoft.com/office/drawing/2014/main" id="{88086CB9-DB6A-8DEF-B39B-9CAEBE8C4E59}"/>
+              </a:ext>
+            </a:extLst>
+          </p:cNvPr>
+          <p:cNvCxnSpPr>
+            <a:cxnSpLocks/>
+          </p:cNvCxnSpPr>
+          <p:nvPr/>
+        </p:nvCxnSpPr>
+        <p:spPr>
+          <a:xfrm flipV="1">
+            <a:off x="5306869" y="1988102"/>
+            <a:ext cx="1969350" cy="2022441"/>
+          </a:xfrm>
+          <a:prstGeom prst="line">
+            <a:avLst/>
+          </a:prstGeom>
+          <a:ln w="12700">
+            <a:prstDash val="sysDash"/>
+          </a:ln>
+        </p:spPr>
+        <p:style>
+          <a:lnRef idx="2">
+            <a:schemeClr val="accent1"/>
+          </a:lnRef>
+          <a:fillRef idx="0">
+            <a:schemeClr val="accent1"/>
+          </a:fillRef>
+          <a:effectRef idx="1">
+            <a:schemeClr val="accent1"/>
+          </a:effectRef>
+          <a:fontRef idx="minor">
+            <a:schemeClr val="tx1"/>
+          </a:fontRef>
+        </p:style>
+      </p:cxnSp>
+      <p:pic>
+        <p:nvPicPr>
+          <p:cNvPr id="104" name="Graphic 103" descr="Badge Cross outline">
+            <a:extLst>
+              <a:ext uri="{FF2B5EF4-FFF2-40B4-BE49-F238E27FC236}">
+                <a16:creationId xmlns:a16="http://schemas.microsoft.com/office/drawing/2014/main" id="{AC522113-2D4F-8952-CCD0-3E872B41644A}"/>
+              </a:ext>
+            </a:extLst>
+          </p:cNvPr>
+          <p:cNvPicPr>
+            <a:picLocks noChangeAspect="1"/>
+          </p:cNvPicPr>
+          <p:nvPr/>
+        </p:nvPicPr>
+        <p:blipFill>
+          <a:blip r:embed="rId15">
+            <a:extLst>
+              <a:ext uri="{96DAC541-7B7A-43D3-8B79-37D633B846F1}">
+                <asvg:svgBlip xmlns:asvg="http://schemas.microsoft.com/office/drawing/2016/SVG/main" r:embed="rId16"/>
+              </a:ext>
+            </a:extLst>
+          </a:blip>
+          <a:stretch>
+            <a:fillRect/>
+          </a:stretch>
+        </p:blipFill>
+        <p:spPr>
+          <a:xfrm rot="2636227">
+            <a:off x="6713716" y="1001318"/>
+            <a:ext cx="914400" cy="914400"/>
+          </a:xfrm>
+          <a:prstGeom prst="rect">
+            <a:avLst/>
+          </a:prstGeom>
+        </p:spPr>
+      </p:pic>
+      <p:pic>
+        <p:nvPicPr>
+          <p:cNvPr id="107" name="Picture 106">
+            <a:extLst>
+              <a:ext uri="{FF2B5EF4-FFF2-40B4-BE49-F238E27FC236}">
+                <a16:creationId xmlns:a16="http://schemas.microsoft.com/office/drawing/2014/main" id="{780DBAEE-1EDB-ED0E-87C0-ECD52B4E249A}"/>
+              </a:ext>
+            </a:extLst>
+          </p:cNvPr>
+          <p:cNvPicPr>
+            <a:picLocks noChangeAspect="1"/>
+          </p:cNvPicPr>
+          <p:nvPr/>
+        </p:nvPicPr>
+        <p:blipFill>
+          <a:blip r:embed="rId17"/>
+          <a:stretch>
+            <a:fillRect/>
+          </a:stretch>
+        </p:blipFill>
+        <p:spPr>
+          <a:xfrm>
+            <a:off x="2621461" y="4594680"/>
+            <a:ext cx="1088705" cy="1072695"/>
+          </a:xfrm>
+          <a:prstGeom prst="rect">
+            <a:avLst/>
+          </a:prstGeom>
+        </p:spPr>
+      </p:pic>
+      <p:sp>
+        <p:nvSpPr>
+          <p:cNvPr id="108" name="TextBox 107">
+            <a:extLst>
+              <a:ext uri="{FF2B5EF4-FFF2-40B4-BE49-F238E27FC236}">
+                <a16:creationId xmlns:a16="http://schemas.microsoft.com/office/drawing/2014/main" id="{3945DAC1-6A1F-81CB-D47F-2C32446F0E0B}"/>
+              </a:ext>
+            </a:extLst>
+          </p:cNvPr>
+          <p:cNvSpPr txBox="1"/>
+          <p:nvPr/>
+        </p:nvSpPr>
+        <p:spPr>
+          <a:xfrm>
+            <a:off x="3239644" y="3795099"/>
+            <a:ext cx="1304595" cy="430887"/>
+          </a:xfrm>
+          <a:prstGeom prst="rect">
+            <a:avLst/>
+          </a:prstGeom>
+          <a:noFill/>
+        </p:spPr>
+        <p:txBody>
+          <a:bodyPr wrap="square" rtlCol="0">
+            <a:spAutoFit/>
+          </a:bodyPr>
+          <a:lstStyle/>
+          <a:p>
+            <a:r>
+              <a:rPr lang="en-US" sz="1100" b="1" dirty="0"/>
+              <a:t>Robot Left Env Detection Sonar</a:t>
+            </a:r>
+            <a:endParaRPr lang="en-SG" sz="1100" b="1" dirty="0"/>
+          </a:p>
+        </p:txBody>
+      </p:sp>
+      <p:sp>
+        <p:nvSpPr>
+          <p:cNvPr id="109" name="TextBox 108">
+            <a:extLst>
+              <a:ext uri="{FF2B5EF4-FFF2-40B4-BE49-F238E27FC236}">
+                <a16:creationId xmlns:a16="http://schemas.microsoft.com/office/drawing/2014/main" id="{18CB6885-DDA8-1C2C-7903-4C57EA87F8A7}"/>
+              </a:ext>
+            </a:extLst>
+          </p:cNvPr>
+          <p:cNvSpPr txBox="1"/>
+          <p:nvPr/>
+        </p:nvSpPr>
+        <p:spPr>
+          <a:xfrm>
+            <a:off x="3729057" y="4536220"/>
+            <a:ext cx="1304595" cy="430887"/>
+          </a:xfrm>
+          <a:prstGeom prst="rect">
+            <a:avLst/>
+          </a:prstGeom>
+          <a:noFill/>
+        </p:spPr>
+        <p:txBody>
+          <a:bodyPr wrap="square" rtlCol="0">
+            <a:spAutoFit/>
+          </a:bodyPr>
+          <a:lstStyle/>
+          <a:p>
+            <a:r>
+              <a:rPr lang="en-US" sz="1100" b="1" dirty="0"/>
+              <a:t>Robot Back Env Detection Sonar</a:t>
+            </a:r>
+            <a:endParaRPr lang="en-SG" sz="1100" b="1" dirty="0"/>
+          </a:p>
+        </p:txBody>
+      </p:sp>
+      <p:sp>
+        <p:nvSpPr>
+          <p:cNvPr id="110" name="TextBox 109">
+            <a:extLst>
+              <a:ext uri="{FF2B5EF4-FFF2-40B4-BE49-F238E27FC236}">
+                <a16:creationId xmlns:a16="http://schemas.microsoft.com/office/drawing/2014/main" id="{B1D67F13-0168-EF08-03AD-CCCEC94E2267}"/>
+              </a:ext>
+            </a:extLst>
+          </p:cNvPr>
+          <p:cNvSpPr txBox="1"/>
+          <p:nvPr/>
+        </p:nvSpPr>
+        <p:spPr>
+          <a:xfrm>
+            <a:off x="5734940" y="3725782"/>
+            <a:ext cx="1304595" cy="430887"/>
+          </a:xfrm>
+          <a:prstGeom prst="rect">
+            <a:avLst/>
+          </a:prstGeom>
+          <a:noFill/>
+        </p:spPr>
+        <p:txBody>
+          <a:bodyPr wrap="square" rtlCol="0">
+            <a:spAutoFit/>
+          </a:bodyPr>
+          <a:lstStyle/>
+          <a:p>
+            <a:r>
+              <a:rPr lang="en-US" sz="1100" b="1" dirty="0"/>
+              <a:t>Robot Right Env Detection Sonar</a:t>
+            </a:r>
+            <a:endParaRPr lang="en-SG" sz="1100" b="1" dirty="0"/>
+          </a:p>
+        </p:txBody>
+      </p:sp>
+      <p:sp>
+        <p:nvSpPr>
+          <p:cNvPr id="111" name="TextBox 110">
+            <a:extLst>
+              <a:ext uri="{FF2B5EF4-FFF2-40B4-BE49-F238E27FC236}">
+                <a16:creationId xmlns:a16="http://schemas.microsoft.com/office/drawing/2014/main" id="{8828F39A-69DC-BD41-5654-1F5481365BB4}"/>
+              </a:ext>
+            </a:extLst>
+          </p:cNvPr>
+          <p:cNvSpPr txBox="1"/>
+          <p:nvPr/>
+        </p:nvSpPr>
+        <p:spPr>
+          <a:xfrm>
+            <a:off x="3628619" y="2268117"/>
+            <a:ext cx="1304595" cy="430887"/>
+          </a:xfrm>
+          <a:prstGeom prst="rect">
+            <a:avLst/>
+          </a:prstGeom>
+          <a:noFill/>
+        </p:spPr>
+        <p:txBody>
+          <a:bodyPr wrap="square" rtlCol="0">
+            <a:spAutoFit/>
+          </a:bodyPr>
+          <a:lstStyle/>
+          <a:p>
+            <a:r>
+              <a:rPr lang="en-US" sz="1100" b="1" dirty="0"/>
+              <a:t>Robot Front Env Detection Sonar</a:t>
+            </a:r>
+            <a:endParaRPr lang="en-SG" sz="1100" b="1" dirty="0"/>
+          </a:p>
+        </p:txBody>
+      </p:sp>
+      <p:cxnSp>
+        <p:nvCxnSpPr>
+          <p:cNvPr id="113" name="Straight Connector 112">
+            <a:extLst>
+              <a:ext uri="{FF2B5EF4-FFF2-40B4-BE49-F238E27FC236}">
+                <a16:creationId xmlns:a16="http://schemas.microsoft.com/office/drawing/2014/main" id="{A3613CFF-788F-E21D-EF0E-B17177718EF4}"/>
+              </a:ext>
+            </a:extLst>
+          </p:cNvPr>
+          <p:cNvCxnSpPr>
+            <a:cxnSpLocks/>
+          </p:cNvCxnSpPr>
+          <p:nvPr/>
+        </p:nvCxnSpPr>
+        <p:spPr>
+          <a:xfrm>
+            <a:off x="2504478" y="5705475"/>
+            <a:ext cx="6297000" cy="0"/>
+          </a:xfrm>
+          <a:prstGeom prst="line">
+            <a:avLst/>
+          </a:prstGeom>
+          <a:ln w="38100"/>
+        </p:spPr>
+        <p:style>
+          <a:lnRef idx="2">
+            <a:schemeClr val="accent1"/>
+          </a:lnRef>
+          <a:fillRef idx="0">
+            <a:schemeClr val="accent1"/>
+          </a:fillRef>
+          <a:effectRef idx="1">
+            <a:schemeClr val="accent1"/>
+          </a:effectRef>
+          <a:fontRef idx="minor">
+            <a:schemeClr val="tx1"/>
+          </a:fontRef>
+        </p:style>
+      </p:cxnSp>
+      <p:sp>
+        <p:nvSpPr>
+          <p:cNvPr id="115" name="TextBox 114">
+            <a:extLst>
+              <a:ext uri="{FF2B5EF4-FFF2-40B4-BE49-F238E27FC236}">
+                <a16:creationId xmlns:a16="http://schemas.microsoft.com/office/drawing/2014/main" id="{73247960-44EA-A65E-3D0A-EBF2A56C1F65}"/>
+              </a:ext>
+            </a:extLst>
+          </p:cNvPr>
+          <p:cNvSpPr txBox="1"/>
+          <p:nvPr/>
+        </p:nvSpPr>
+        <p:spPr>
+          <a:xfrm>
+            <a:off x="5180519" y="5025012"/>
+            <a:ext cx="1429035" cy="430887"/>
+          </a:xfrm>
+          <a:prstGeom prst="rect">
+            <a:avLst/>
+          </a:prstGeom>
+          <a:noFill/>
+        </p:spPr>
+        <p:txBody>
+          <a:bodyPr wrap="square" rtlCol="0">
+            <a:spAutoFit/>
+          </a:bodyPr>
+          <a:lstStyle/>
+          <a:p>
+            <a:r>
+              <a:rPr lang="en-US" sz="1100" b="1" dirty="0"/>
+              <a:t>360’ LF Sound Direction detector </a:t>
+            </a:r>
+            <a:endParaRPr lang="en-SG" sz="1100" b="1" dirty="0"/>
+          </a:p>
+        </p:txBody>
+      </p:sp>
+      <p:pic>
+        <p:nvPicPr>
+          <p:cNvPr id="116" name="Graphic 115" descr="Radio microphone with solid fill">
+            <a:extLst>
+              <a:ext uri="{FF2B5EF4-FFF2-40B4-BE49-F238E27FC236}">
+                <a16:creationId xmlns:a16="http://schemas.microsoft.com/office/drawing/2014/main" id="{1EE2FD56-78AB-0314-3824-D6C4AEB18195}"/>
+              </a:ext>
+            </a:extLst>
+          </p:cNvPr>
+          <p:cNvPicPr>
+            <a:picLocks noChangeAspect="1"/>
+          </p:cNvPicPr>
+          <p:nvPr/>
+        </p:nvPicPr>
+        <p:blipFill>
+          <a:blip r:embed="rId6">
+            <a:extLst>
+              <a:ext uri="{96DAC541-7B7A-43D3-8B79-37D633B846F1}">
+                <asvg:svgBlip xmlns:asvg="http://schemas.microsoft.com/office/drawing/2016/SVG/main" r:embed="rId7"/>
+              </a:ext>
+            </a:extLst>
+          </a:blip>
+          <a:stretch>
+            <a:fillRect/>
+          </a:stretch>
+        </p:blipFill>
+        <p:spPr>
+          <a:xfrm rot="16200000">
+            <a:off x="4599391" y="3830179"/>
+            <a:ext cx="484260" cy="484260"/>
+          </a:xfrm>
+          <a:prstGeom prst="rect">
+            <a:avLst/>
+          </a:prstGeom>
+        </p:spPr>
+      </p:pic>
+      <p:cxnSp>
+        <p:nvCxnSpPr>
+          <p:cNvPr id="118" name="Straight Arrow Connector 117">
+            <a:extLst>
+              <a:ext uri="{FF2B5EF4-FFF2-40B4-BE49-F238E27FC236}">
+                <a16:creationId xmlns:a16="http://schemas.microsoft.com/office/drawing/2014/main" id="{957A3C61-6AD0-2B09-0BA2-2BDABC08A421}"/>
+              </a:ext>
+            </a:extLst>
+          </p:cNvPr>
+          <p:cNvCxnSpPr>
+            <a:cxnSpLocks/>
+          </p:cNvCxnSpPr>
+          <p:nvPr/>
+        </p:nvCxnSpPr>
+        <p:spPr>
+          <a:xfrm flipV="1">
+            <a:off x="5340653" y="4312404"/>
+            <a:ext cx="796" cy="692245"/>
+          </a:xfrm>
+          <a:prstGeom prst="straightConnector1">
+            <a:avLst/>
+          </a:prstGeom>
+          <a:ln>
+            <a:solidFill>
+              <a:srgbClr val="FF0000"/>
+            </a:solidFill>
+            <a:tailEnd type="triangle"/>
+          </a:ln>
+        </p:spPr>
+        <p:style>
+          <a:lnRef idx="2">
+            <a:schemeClr val="accent1"/>
+          </a:lnRef>
+          <a:fillRef idx="0">
+            <a:schemeClr val="accent1"/>
+          </a:fillRef>
+          <a:effectRef idx="1">
+            <a:schemeClr val="accent1"/>
+          </a:effectRef>
+          <a:fontRef idx="minor">
+            <a:schemeClr val="tx1"/>
+          </a:fontRef>
+        </p:style>
+      </p:cxnSp>
+      <p:pic>
+        <p:nvPicPr>
+          <p:cNvPr id="121" name="Picture 120">
+            <a:extLst>
+              <a:ext uri="{FF2B5EF4-FFF2-40B4-BE49-F238E27FC236}">
+                <a16:creationId xmlns:a16="http://schemas.microsoft.com/office/drawing/2014/main" id="{935720C2-66BB-06DA-0327-E8DB3FDC2A02}"/>
+              </a:ext>
+            </a:extLst>
+          </p:cNvPr>
+          <p:cNvPicPr>
+            <a:picLocks noChangeAspect="1"/>
+          </p:cNvPicPr>
+          <p:nvPr/>
+        </p:nvPicPr>
+        <p:blipFill>
+          <a:blip r:embed="rId18"/>
+          <a:stretch>
+            <a:fillRect/>
+          </a:stretch>
+        </p:blipFill>
+        <p:spPr>
+          <a:xfrm>
+            <a:off x="4538275" y="3168469"/>
+            <a:ext cx="413017" cy="682564"/>
+          </a:xfrm>
+          <a:prstGeom prst="rect">
+            <a:avLst/>
+          </a:prstGeom>
+          <a:ln>
+            <a:solidFill>
+              <a:srgbClr val="0070C0"/>
+            </a:solidFill>
+          </a:ln>
+        </p:spPr>
+      </p:pic>
+      <p:cxnSp>
+        <p:nvCxnSpPr>
+          <p:cNvPr id="122" name="Straight Arrow Connector 121">
+            <a:extLst>
+              <a:ext uri="{FF2B5EF4-FFF2-40B4-BE49-F238E27FC236}">
+                <a16:creationId xmlns:a16="http://schemas.microsoft.com/office/drawing/2014/main" id="{7D9C9B3C-BBEF-9575-23D6-FB35D99D5F91}"/>
+              </a:ext>
+            </a:extLst>
+          </p:cNvPr>
+          <p:cNvCxnSpPr>
+            <a:cxnSpLocks/>
+          </p:cNvCxnSpPr>
+          <p:nvPr/>
+        </p:nvCxnSpPr>
+        <p:spPr>
+          <a:xfrm>
+            <a:off x="3808782" y="3265427"/>
+            <a:ext cx="716889" cy="0"/>
+          </a:xfrm>
+          <a:prstGeom prst="straightConnector1">
+            <a:avLst/>
+          </a:prstGeom>
+          <a:ln>
+            <a:solidFill>
+              <a:srgbClr val="FF0000"/>
+            </a:solidFill>
+            <a:tailEnd type="triangle"/>
+          </a:ln>
+        </p:spPr>
+        <p:style>
+          <a:lnRef idx="2">
+            <a:schemeClr val="accent1"/>
+          </a:lnRef>
+          <a:fillRef idx="0">
+            <a:schemeClr val="accent1"/>
+          </a:fillRef>
+          <a:effectRef idx="1">
+            <a:schemeClr val="accent1"/>
+          </a:effectRef>
+          <a:fontRef idx="minor">
+            <a:schemeClr val="tx1"/>
+          </a:fontRef>
+        </p:style>
+      </p:cxnSp>
+      <p:sp>
+        <p:nvSpPr>
+          <p:cNvPr id="125" name="TextBox 124">
+            <a:extLst>
+              <a:ext uri="{FF2B5EF4-FFF2-40B4-BE49-F238E27FC236}">
+                <a16:creationId xmlns:a16="http://schemas.microsoft.com/office/drawing/2014/main" id="{660E48C8-BD32-0AC5-483F-BCBD9864392E}"/>
+              </a:ext>
+            </a:extLst>
+          </p:cNvPr>
+          <p:cNvSpPr txBox="1"/>
+          <p:nvPr/>
+        </p:nvSpPr>
+        <p:spPr>
+          <a:xfrm>
+            <a:off x="2666032" y="3152127"/>
+            <a:ext cx="1264879" cy="430887"/>
+          </a:xfrm>
+          <a:prstGeom prst="rect">
+            <a:avLst/>
+          </a:prstGeom>
+          <a:noFill/>
+        </p:spPr>
+        <p:txBody>
+          <a:bodyPr wrap="square" rtlCol="0">
+            <a:spAutoFit/>
+          </a:bodyPr>
+          <a:lstStyle/>
+          <a:p>
+            <a:r>
+              <a:rPr lang="en-US" sz="1100" b="1" dirty="0"/>
+              <a:t>UWB indoor position sensor</a:t>
+            </a:r>
+            <a:endParaRPr lang="en-SG" sz="1100" b="1" dirty="0"/>
+          </a:p>
+        </p:txBody>
+      </p:sp>
+      <p:sp>
+        <p:nvSpPr>
+          <p:cNvPr id="126" name="TextBox 125">
+            <a:extLst>
+              <a:ext uri="{FF2B5EF4-FFF2-40B4-BE49-F238E27FC236}">
+                <a16:creationId xmlns:a16="http://schemas.microsoft.com/office/drawing/2014/main" id="{2EAE60E2-B5A7-2D71-275A-451BAA7FA40F}"/>
+              </a:ext>
+            </a:extLst>
+          </p:cNvPr>
+          <p:cNvSpPr txBox="1"/>
+          <p:nvPr/>
+        </p:nvSpPr>
+        <p:spPr>
+          <a:xfrm>
+            <a:off x="6561700" y="4486335"/>
+            <a:ext cx="1077728" cy="430887"/>
+          </a:xfrm>
+          <a:prstGeom prst="rect">
+            <a:avLst/>
+          </a:prstGeom>
+          <a:noFill/>
+        </p:spPr>
+        <p:txBody>
+          <a:bodyPr wrap="square" rtlCol="0">
+            <a:spAutoFit/>
+          </a:bodyPr>
+          <a:lstStyle/>
+          <a:p>
+            <a:r>
+              <a:rPr lang="en-US" sz="1100" b="1" dirty="0">
+                <a:solidFill>
+                  <a:srgbClr val="C00000"/>
+                </a:solidFill>
+              </a:rPr>
+              <a:t>Enemy sound detected</a:t>
+            </a:r>
+            <a:endParaRPr lang="en-SG" sz="1100" b="1" dirty="0">
+              <a:solidFill>
+                <a:srgbClr val="C00000"/>
+              </a:solidFill>
+            </a:endParaRPr>
+          </a:p>
+        </p:txBody>
+      </p:sp>
+      <p:sp>
+        <p:nvSpPr>
+          <p:cNvPr id="127" name="TextBox 126">
+            <a:extLst>
+              <a:ext uri="{FF2B5EF4-FFF2-40B4-BE49-F238E27FC236}">
+                <a16:creationId xmlns:a16="http://schemas.microsoft.com/office/drawing/2014/main" id="{2D91E8AC-E294-6404-2418-F6F5C03C164D}"/>
+              </a:ext>
+            </a:extLst>
+          </p:cNvPr>
+          <p:cNvSpPr txBox="1"/>
+          <p:nvPr/>
+        </p:nvSpPr>
+        <p:spPr>
+          <a:xfrm>
+            <a:off x="6291544" y="2526482"/>
+            <a:ext cx="1077728" cy="430887"/>
+          </a:xfrm>
+          <a:prstGeom prst="rect">
+            <a:avLst/>
+          </a:prstGeom>
+          <a:noFill/>
+        </p:spPr>
+        <p:txBody>
+          <a:bodyPr wrap="square" rtlCol="0">
+            <a:spAutoFit/>
+          </a:bodyPr>
+          <a:lstStyle/>
+          <a:p>
+            <a:r>
+              <a:rPr lang="en-US" sz="1100" b="1" dirty="0">
+                <a:solidFill>
+                  <a:srgbClr val="C00000"/>
+                </a:solidFill>
+              </a:rPr>
+              <a:t>Enemy sound detected</a:t>
+            </a:r>
+            <a:endParaRPr lang="en-SG" sz="1100" b="1" dirty="0">
+              <a:solidFill>
+                <a:srgbClr val="C00000"/>
+              </a:solidFill>
+            </a:endParaRPr>
+          </a:p>
+        </p:txBody>
+      </p:sp>
+      <p:cxnSp>
+        <p:nvCxnSpPr>
+          <p:cNvPr id="128" name="Straight Arrow Connector 127">
+            <a:extLst>
+              <a:ext uri="{FF2B5EF4-FFF2-40B4-BE49-F238E27FC236}">
+                <a16:creationId xmlns:a16="http://schemas.microsoft.com/office/drawing/2014/main" id="{DAA373A9-AEEA-C2BF-284F-1B0F28298187}"/>
+              </a:ext>
+            </a:extLst>
+          </p:cNvPr>
+          <p:cNvCxnSpPr>
+            <a:cxnSpLocks/>
+          </p:cNvCxnSpPr>
+          <p:nvPr/>
+        </p:nvCxnSpPr>
+        <p:spPr>
+          <a:xfrm flipH="1">
+            <a:off x="5319158" y="3382988"/>
+            <a:ext cx="957038" cy="1501"/>
+          </a:xfrm>
+          <a:prstGeom prst="straightConnector1">
+            <a:avLst/>
+          </a:prstGeom>
+          <a:ln>
+            <a:solidFill>
+              <a:srgbClr val="FF0000"/>
+            </a:solidFill>
+            <a:tailEnd type="triangle"/>
+          </a:ln>
+        </p:spPr>
+        <p:style>
+          <a:lnRef idx="2">
+            <a:schemeClr val="accent1"/>
+          </a:lnRef>
+          <a:fillRef idx="0">
+            <a:schemeClr val="accent1"/>
+          </a:fillRef>
+          <a:effectRef idx="1">
+            <a:schemeClr val="accent1"/>
+          </a:effectRef>
+          <a:fontRef idx="minor">
+            <a:schemeClr val="tx1"/>
+          </a:fontRef>
+        </p:style>
+      </p:cxnSp>
+      <p:sp>
+        <p:nvSpPr>
+          <p:cNvPr id="131" name="TextBox 130">
+            <a:extLst>
+              <a:ext uri="{FF2B5EF4-FFF2-40B4-BE49-F238E27FC236}">
+                <a16:creationId xmlns:a16="http://schemas.microsoft.com/office/drawing/2014/main" id="{AE1B2366-82C9-F0CF-C230-3AB3302D142F}"/>
+              </a:ext>
+            </a:extLst>
+          </p:cNvPr>
+          <p:cNvSpPr txBox="1"/>
+          <p:nvPr/>
+        </p:nvSpPr>
+        <p:spPr>
+          <a:xfrm>
+            <a:off x="6292356" y="3037374"/>
+            <a:ext cx="1288805" cy="600164"/>
+          </a:xfrm>
+          <a:prstGeom prst="rect">
+            <a:avLst/>
+          </a:prstGeom>
+          <a:noFill/>
+        </p:spPr>
+        <p:txBody>
+          <a:bodyPr wrap="square" rtlCol="0">
+            <a:spAutoFit/>
+          </a:bodyPr>
+          <a:lstStyle/>
+          <a:p>
+            <a:r>
+              <a:rPr lang="en-US" sz="1100" b="1" dirty="0"/>
+              <a:t>Robot Main Electro Optical Camera </a:t>
+            </a:r>
+            <a:endParaRPr lang="en-SG" sz="1100" b="1" dirty="0"/>
+          </a:p>
+        </p:txBody>
+      </p:sp>
+      <p:sp>
+        <p:nvSpPr>
+          <p:cNvPr id="132" name="TextBox 131">
+            <a:extLst>
+              <a:ext uri="{FF2B5EF4-FFF2-40B4-BE49-F238E27FC236}">
+                <a16:creationId xmlns:a16="http://schemas.microsoft.com/office/drawing/2014/main" id="{66C7AA8E-870D-836E-8ABB-189997EB1ED4}"/>
+              </a:ext>
+            </a:extLst>
+          </p:cNvPr>
+          <p:cNvSpPr txBox="1"/>
+          <p:nvPr/>
+        </p:nvSpPr>
+        <p:spPr>
+          <a:xfrm>
+            <a:off x="4985949" y="974231"/>
+            <a:ext cx="900545" cy="261610"/>
+          </a:xfrm>
+          <a:prstGeom prst="rect">
+            <a:avLst/>
+          </a:prstGeom>
+          <a:noFill/>
+        </p:spPr>
+        <p:txBody>
+          <a:bodyPr wrap="square" rtlCol="0">
+            <a:spAutoFit/>
+          </a:bodyPr>
+          <a:lstStyle/>
+          <a:p>
+            <a:r>
+              <a:rPr lang="en-US" sz="1100" b="1" dirty="0">
+                <a:solidFill>
+                  <a:schemeClr val="bg1"/>
+                </a:solidFill>
+              </a:rPr>
+              <a:t>Obstacle </a:t>
+            </a:r>
+            <a:endParaRPr lang="en-SG" sz="1100" b="1" dirty="0">
+              <a:solidFill>
+                <a:schemeClr val="bg1"/>
+              </a:solidFill>
+            </a:endParaRPr>
+          </a:p>
+        </p:txBody>
+      </p:sp>
+      <p:cxnSp>
+        <p:nvCxnSpPr>
+          <p:cNvPr id="133" name="Straight Arrow Connector 132">
+            <a:extLst>
+              <a:ext uri="{FF2B5EF4-FFF2-40B4-BE49-F238E27FC236}">
+                <a16:creationId xmlns:a16="http://schemas.microsoft.com/office/drawing/2014/main" id="{DAF21A3C-D6E0-9278-62CB-947F8E16877E}"/>
+              </a:ext>
+            </a:extLst>
+          </p:cNvPr>
+          <p:cNvCxnSpPr>
+            <a:cxnSpLocks/>
+          </p:cNvCxnSpPr>
+          <p:nvPr/>
+        </p:nvCxnSpPr>
+        <p:spPr>
+          <a:xfrm>
+            <a:off x="3778047" y="2959684"/>
+            <a:ext cx="1340863" cy="0"/>
+          </a:xfrm>
+          <a:prstGeom prst="straightConnector1">
+            <a:avLst/>
+          </a:prstGeom>
+          <a:ln>
+            <a:solidFill>
+              <a:srgbClr val="FF0000"/>
+            </a:solidFill>
+            <a:tailEnd type="triangle"/>
+          </a:ln>
+        </p:spPr>
+        <p:style>
+          <a:lnRef idx="2">
+            <a:schemeClr val="accent1"/>
+          </a:lnRef>
+          <a:fillRef idx="0">
+            <a:schemeClr val="accent1"/>
+          </a:fillRef>
+          <a:effectRef idx="1">
+            <a:schemeClr val="accent1"/>
+          </a:effectRef>
+          <a:fontRef idx="minor">
+            <a:schemeClr val="tx1"/>
+          </a:fontRef>
+        </p:style>
+      </p:cxnSp>
+      <p:sp>
+        <p:nvSpPr>
+          <p:cNvPr id="139" name="TextBox 138">
+            <a:extLst>
+              <a:ext uri="{FF2B5EF4-FFF2-40B4-BE49-F238E27FC236}">
+                <a16:creationId xmlns:a16="http://schemas.microsoft.com/office/drawing/2014/main" id="{D0E5AF56-DA9D-5CCE-D6A1-AAEE7E9F1CB3}"/>
+              </a:ext>
+            </a:extLst>
+          </p:cNvPr>
+          <p:cNvSpPr txBox="1"/>
+          <p:nvPr/>
+        </p:nvSpPr>
+        <p:spPr>
+          <a:xfrm>
+            <a:off x="2648892" y="2723850"/>
+            <a:ext cx="1567338" cy="430887"/>
+          </a:xfrm>
+          <a:prstGeom prst="rect">
+            <a:avLst/>
+          </a:prstGeom>
+          <a:noFill/>
+        </p:spPr>
+        <p:txBody>
+          <a:bodyPr wrap="square" rtlCol="0">
+            <a:spAutoFit/>
+          </a:bodyPr>
+          <a:lstStyle/>
+          <a:p>
+            <a:r>
+              <a:rPr lang="en-US" sz="1100" b="1" dirty="0"/>
+              <a:t>Robot Front Obstacle detection Lidar</a:t>
+            </a:r>
+            <a:endParaRPr lang="en-SG" sz="1100" b="1" dirty="0"/>
+          </a:p>
+        </p:txBody>
+      </p:sp>
+      <p:sp>
+        <p:nvSpPr>
+          <p:cNvPr id="140" name="TextBox 139">
+            <a:extLst>
+              <a:ext uri="{FF2B5EF4-FFF2-40B4-BE49-F238E27FC236}">
+                <a16:creationId xmlns:a16="http://schemas.microsoft.com/office/drawing/2014/main" id="{A5ADE4D1-0AF0-EDDA-D173-73A3F80C4B64}"/>
+              </a:ext>
+            </a:extLst>
+          </p:cNvPr>
+          <p:cNvSpPr txBox="1"/>
+          <p:nvPr/>
+        </p:nvSpPr>
+        <p:spPr>
+          <a:xfrm>
+            <a:off x="5954495" y="1758129"/>
+            <a:ext cx="1043728" cy="430887"/>
+          </a:xfrm>
+          <a:prstGeom prst="rect">
+            <a:avLst/>
+          </a:prstGeom>
+          <a:noFill/>
+        </p:spPr>
+        <p:txBody>
+          <a:bodyPr wrap="square" rtlCol="0">
+            <a:spAutoFit/>
+          </a:bodyPr>
+          <a:lstStyle/>
+          <a:p>
+            <a:r>
+              <a:rPr lang="en-US" sz="1100" b="1" dirty="0">
+                <a:solidFill>
+                  <a:srgbClr val="C00000"/>
+                </a:solidFill>
+              </a:rPr>
+              <a:t>Enemy visual detected</a:t>
+            </a:r>
+            <a:endParaRPr lang="en-SG" sz="1100" b="1" dirty="0">
+              <a:solidFill>
+                <a:srgbClr val="C00000"/>
+              </a:solidFill>
+            </a:endParaRPr>
+          </a:p>
+        </p:txBody>
+      </p:sp>
+      <p:sp>
+        <p:nvSpPr>
+          <p:cNvPr id="141" name="TextBox 140">
+            <a:extLst>
+              <a:ext uri="{FF2B5EF4-FFF2-40B4-BE49-F238E27FC236}">
+                <a16:creationId xmlns:a16="http://schemas.microsoft.com/office/drawing/2014/main" id="{7AB21E86-408B-BF80-501B-A26AC94D9EF3}"/>
+              </a:ext>
+            </a:extLst>
+          </p:cNvPr>
+          <p:cNvSpPr txBox="1"/>
+          <p:nvPr/>
+        </p:nvSpPr>
+        <p:spPr>
+          <a:xfrm>
+            <a:off x="4889390" y="1423766"/>
+            <a:ext cx="1375035" cy="600164"/>
+          </a:xfrm>
+          <a:prstGeom prst="rect">
+            <a:avLst/>
+          </a:prstGeom>
+          <a:noFill/>
+        </p:spPr>
+        <p:txBody>
+          <a:bodyPr wrap="square" rtlCol="0">
+            <a:spAutoFit/>
+          </a:bodyPr>
+          <a:lstStyle/>
+          <a:p>
+            <a:r>
+              <a:rPr lang="en-US" sz="1100" b="1" dirty="0">
+                <a:solidFill>
+                  <a:schemeClr val="accent6">
+                    <a:lumMod val="75000"/>
+                  </a:schemeClr>
+                </a:solidFill>
+              </a:rPr>
+              <a:t>Obstacle Detection and Avoidance  </a:t>
+            </a:r>
+            <a:endParaRPr lang="en-SG" sz="1100" b="1" dirty="0">
+              <a:solidFill>
+                <a:schemeClr val="accent6">
+                  <a:lumMod val="75000"/>
+                </a:schemeClr>
+              </a:solidFill>
+            </a:endParaRPr>
+          </a:p>
+        </p:txBody>
+      </p:sp>
+      <p:sp>
+        <p:nvSpPr>
+          <p:cNvPr id="146" name="TextBox 145">
+            <a:extLst>
+              <a:ext uri="{FF2B5EF4-FFF2-40B4-BE49-F238E27FC236}">
+                <a16:creationId xmlns:a16="http://schemas.microsoft.com/office/drawing/2014/main" id="{F09CA356-84EA-AAE1-986B-256AB89619BE}"/>
+              </a:ext>
+            </a:extLst>
+          </p:cNvPr>
+          <p:cNvSpPr txBox="1"/>
+          <p:nvPr/>
+        </p:nvSpPr>
+        <p:spPr>
+          <a:xfrm>
+            <a:off x="2552327" y="4209779"/>
+            <a:ext cx="1304595" cy="430887"/>
+          </a:xfrm>
+          <a:prstGeom prst="rect">
+            <a:avLst/>
+          </a:prstGeom>
+          <a:noFill/>
+        </p:spPr>
+        <p:txBody>
+          <a:bodyPr wrap="square" rtlCol="0">
+            <a:spAutoFit/>
+          </a:bodyPr>
+          <a:lstStyle/>
+          <a:p>
+            <a:r>
+              <a:rPr lang="en-US" sz="1100" b="1" dirty="0"/>
+              <a:t>Enemy detection data processer </a:t>
+            </a:r>
+            <a:endParaRPr lang="en-SG" sz="1100" b="1" dirty="0"/>
+          </a:p>
+        </p:txBody>
+      </p:sp>
+      <p:sp>
+        <p:nvSpPr>
+          <p:cNvPr id="148" name="TextBox 147">
+            <a:extLst>
+              <a:ext uri="{FF2B5EF4-FFF2-40B4-BE49-F238E27FC236}">
+                <a16:creationId xmlns:a16="http://schemas.microsoft.com/office/drawing/2014/main" id="{93227C0A-9F26-F5C7-21A3-8B9039EC7F54}"/>
+              </a:ext>
+            </a:extLst>
+          </p:cNvPr>
+          <p:cNvSpPr txBox="1"/>
+          <p:nvPr/>
+        </p:nvSpPr>
+        <p:spPr>
+          <a:xfrm>
+            <a:off x="7723750" y="4010542"/>
+            <a:ext cx="1077728" cy="261610"/>
+          </a:xfrm>
+          <a:prstGeom prst="rect">
+            <a:avLst/>
+          </a:prstGeom>
+          <a:noFill/>
+        </p:spPr>
+        <p:txBody>
+          <a:bodyPr wrap="square" rtlCol="0">
+            <a:spAutoFit/>
+          </a:bodyPr>
+          <a:lstStyle/>
+          <a:p>
+            <a:r>
+              <a:rPr lang="en-US" sz="1100" b="1" dirty="0">
+                <a:solidFill>
+                  <a:srgbClr val="C00000"/>
+                </a:solidFill>
+              </a:rPr>
+              <a:t>Enemy [1]</a:t>
+            </a:r>
+            <a:endParaRPr lang="en-SG" sz="1100" b="1" dirty="0">
+              <a:solidFill>
+                <a:srgbClr val="C00000"/>
+              </a:solidFill>
+            </a:endParaRPr>
+          </a:p>
+        </p:txBody>
+      </p:sp>
+      <p:sp>
+        <p:nvSpPr>
+          <p:cNvPr id="149" name="TextBox 148">
+            <a:extLst>
+              <a:ext uri="{FF2B5EF4-FFF2-40B4-BE49-F238E27FC236}">
+                <a16:creationId xmlns:a16="http://schemas.microsoft.com/office/drawing/2014/main" id="{D79E4B28-08E4-2421-9171-FB02B44F9BDA}"/>
+              </a:ext>
+            </a:extLst>
+          </p:cNvPr>
+          <p:cNvSpPr txBox="1"/>
+          <p:nvPr/>
+        </p:nvSpPr>
+        <p:spPr>
+          <a:xfrm>
+            <a:off x="6779836" y="744114"/>
+            <a:ext cx="1077728" cy="261610"/>
+          </a:xfrm>
+          <a:prstGeom prst="rect">
+            <a:avLst/>
+          </a:prstGeom>
+          <a:noFill/>
+        </p:spPr>
+        <p:txBody>
+          <a:bodyPr wrap="square" rtlCol="0">
+            <a:spAutoFit/>
+          </a:bodyPr>
+          <a:lstStyle/>
+          <a:p>
+            <a:r>
+              <a:rPr lang="en-US" sz="1100" b="1" dirty="0">
+                <a:solidFill>
+                  <a:srgbClr val="C00000"/>
+                </a:solidFill>
+              </a:rPr>
+              <a:t>Enemy [2]</a:t>
+            </a:r>
+            <a:endParaRPr lang="en-SG" sz="1100" b="1" dirty="0">
+              <a:solidFill>
+                <a:srgbClr val="C00000"/>
+              </a:solidFill>
+            </a:endParaRPr>
+          </a:p>
+        </p:txBody>
+      </p:sp>
+      <p:sp>
+        <p:nvSpPr>
+          <p:cNvPr id="151" name="TextBox 150">
+            <a:extLst>
+              <a:ext uri="{FF2B5EF4-FFF2-40B4-BE49-F238E27FC236}">
+                <a16:creationId xmlns:a16="http://schemas.microsoft.com/office/drawing/2014/main" id="{55C5C758-FA34-DB50-5DA4-897DA7C525E6}"/>
+              </a:ext>
+            </a:extLst>
+          </p:cNvPr>
+          <p:cNvSpPr txBox="1"/>
+          <p:nvPr/>
+        </p:nvSpPr>
+        <p:spPr>
+          <a:xfrm>
+            <a:off x="7909585" y="3080764"/>
+            <a:ext cx="1077728" cy="600164"/>
+          </a:xfrm>
+          <a:prstGeom prst="rect">
+            <a:avLst/>
+          </a:prstGeom>
+          <a:noFill/>
+        </p:spPr>
+        <p:txBody>
+          <a:bodyPr wrap="square" rtlCol="0">
+            <a:spAutoFit/>
+          </a:bodyPr>
+          <a:lstStyle/>
+          <a:p>
+            <a:r>
+              <a:rPr lang="en-US" sz="1100" b="1" dirty="0">
+                <a:solidFill>
+                  <a:schemeClr val="accent1">
+                    <a:lumMod val="75000"/>
+                  </a:schemeClr>
+                </a:solidFill>
+              </a:rPr>
+              <a:t>Predict Enemy Position </a:t>
+            </a:r>
+            <a:endParaRPr lang="en-SG" sz="1100" b="1" dirty="0">
+              <a:solidFill>
+                <a:schemeClr val="accent1">
+                  <a:lumMod val="75000"/>
+                </a:schemeClr>
+              </a:solidFill>
+            </a:endParaRPr>
+          </a:p>
+        </p:txBody>
+      </p:sp>
+      <p:sp>
+        <p:nvSpPr>
+          <p:cNvPr id="152" name="TextBox 151">
+            <a:extLst>
+              <a:ext uri="{FF2B5EF4-FFF2-40B4-BE49-F238E27FC236}">
+                <a16:creationId xmlns:a16="http://schemas.microsoft.com/office/drawing/2014/main" id="{52607A33-82A4-2C60-BD85-0F6B511D74F0}"/>
+              </a:ext>
+            </a:extLst>
+          </p:cNvPr>
+          <p:cNvSpPr txBox="1"/>
+          <p:nvPr/>
+        </p:nvSpPr>
+        <p:spPr>
+          <a:xfrm>
+            <a:off x="7501996" y="1523981"/>
+            <a:ext cx="892623" cy="600164"/>
+          </a:xfrm>
+          <a:prstGeom prst="rect">
+            <a:avLst/>
+          </a:prstGeom>
+          <a:noFill/>
+        </p:spPr>
+        <p:txBody>
+          <a:bodyPr wrap="square" rtlCol="0">
+            <a:spAutoFit/>
+          </a:bodyPr>
+          <a:lstStyle/>
+          <a:p>
+            <a:r>
+              <a:rPr lang="en-US" sz="1100" b="1" dirty="0"/>
+              <a:t>Confirmed  Enemy Position </a:t>
+            </a:r>
+            <a:endParaRPr lang="en-SG" sz="1100" b="1" dirty="0"/>
+          </a:p>
+        </p:txBody>
+      </p:sp>
+      <p:sp>
+        <p:nvSpPr>
+          <p:cNvPr id="153" name="TextBox 152">
+            <a:extLst>
+              <a:ext uri="{FF2B5EF4-FFF2-40B4-BE49-F238E27FC236}">
+                <a16:creationId xmlns:a16="http://schemas.microsoft.com/office/drawing/2014/main" id="{366B9BFB-BE41-63D1-809F-1922AA1F80B4}"/>
+              </a:ext>
+            </a:extLst>
+          </p:cNvPr>
+          <p:cNvSpPr txBox="1"/>
+          <p:nvPr/>
+        </p:nvSpPr>
+        <p:spPr>
+          <a:xfrm>
+            <a:off x="4300673" y="4201570"/>
+            <a:ext cx="1253826" cy="307777"/>
+          </a:xfrm>
+          <a:prstGeom prst="rect">
+            <a:avLst/>
+          </a:prstGeom>
+          <a:noFill/>
+        </p:spPr>
+        <p:txBody>
+          <a:bodyPr wrap="square" rtlCol="0">
+            <a:spAutoFit/>
+          </a:bodyPr>
+          <a:lstStyle/>
+          <a:p>
+            <a:r>
+              <a:rPr lang="en-US" sz="1400" b="1" dirty="0"/>
+              <a:t>CQB Robot</a:t>
+            </a:r>
+            <a:endParaRPr lang="en-SG" sz="1400" b="1" dirty="0"/>
+          </a:p>
+        </p:txBody>
+      </p:sp>
+      <p:pic>
+        <p:nvPicPr>
+          <p:cNvPr id="155" name="Picture 154">
+            <a:extLst>
+              <a:ext uri="{FF2B5EF4-FFF2-40B4-BE49-F238E27FC236}">
+                <a16:creationId xmlns:a16="http://schemas.microsoft.com/office/drawing/2014/main" id="{D7B7B6AC-DE97-6027-9719-D055ACA39979}"/>
+              </a:ext>
+            </a:extLst>
+          </p:cNvPr>
+          <p:cNvPicPr>
+            <a:picLocks noChangeAspect="1"/>
+          </p:cNvPicPr>
+          <p:nvPr/>
+        </p:nvPicPr>
+        <p:blipFill>
+          <a:blip r:embed="rId19"/>
+          <a:stretch>
+            <a:fillRect/>
+          </a:stretch>
+        </p:blipFill>
+        <p:spPr>
+          <a:xfrm>
+            <a:off x="2569546" y="857169"/>
+            <a:ext cx="1939318" cy="1037706"/>
+          </a:xfrm>
+          <a:prstGeom prst="rect">
+            <a:avLst/>
+          </a:prstGeom>
+          <a:ln w="6350">
+            <a:solidFill>
+              <a:schemeClr val="tx1"/>
+            </a:solidFill>
+          </a:ln>
+        </p:spPr>
+      </p:pic>
+    </p:spTree>
+    <p:extLst>
+      <p:ext uri="{BB962C8B-B14F-4D97-AF65-F5344CB8AC3E}">
+        <p14:creationId xmlns:p14="http://schemas.microsoft.com/office/powerpoint/2010/main" val="2045153366"/>
       </p:ext>
     </p:extLst>
   </p:cSld>
@@ -5786,4 +8573,319 @@
     </a:ext>
   </a:extLst>
 </a:theme>
+</file>
+
+<file path=ppt/theme/theme2.xml><?xml version="1.0" encoding="utf-8"?>
+<a:theme xmlns:a="http://schemas.openxmlformats.org/drawingml/2006/main" name="Office Theme">
+  <a:themeElements>
+    <a:clrScheme name="Office">
+      <a:dk1>
+        <a:sysClr val="windowText" lastClr="000000"/>
+      </a:dk1>
+      <a:lt1>
+        <a:sysClr val="window" lastClr="FFFFFF"/>
+      </a:lt1>
+      <a:dk2>
+        <a:srgbClr val="0E2841"/>
+      </a:dk2>
+      <a:lt2>
+        <a:srgbClr val="E8E8E8"/>
+      </a:lt2>
+      <a:accent1>
+        <a:srgbClr val="156082"/>
+      </a:accent1>
+      <a:accent2>
+        <a:srgbClr val="E97132"/>
+      </a:accent2>
+      <a:accent3>
+        <a:srgbClr val="196B24"/>
+      </a:accent3>
+      <a:accent4>
+        <a:srgbClr val="0F9ED5"/>
+      </a:accent4>
+      <a:accent5>
+        <a:srgbClr val="A02B93"/>
+      </a:accent5>
+      <a:accent6>
+        <a:srgbClr val="4EA72E"/>
+      </a:accent6>
+      <a:hlink>
+        <a:srgbClr val="467886"/>
+      </a:hlink>
+      <a:folHlink>
+        <a:srgbClr val="96607D"/>
+      </a:folHlink>
+    </a:clrScheme>
+    <a:fontScheme name="Office">
+      <a:majorFont>
+        <a:latin typeface="Aptos Display" panose="02110004020202020204"/>
+        <a:ea typeface=""/>
+        <a:cs typeface=""/>
+        <a:font script="Jpan" typeface="游ゴシック Light"/>
+        <a:font script="Hang" typeface="맑은 고딕"/>
+        <a:font script="Hans" typeface="等线 Light"/>
+        <a:font script="Hant" typeface="新細明體"/>
+        <a:font script="Arab" typeface="Times New Roman"/>
+        <a:font script="Hebr" typeface="Times New Roman"/>
+        <a:font script="Thai" typeface="Angsana New"/>
+        <a:font script="Ethi" typeface="Nyala"/>
+        <a:font script="Beng" typeface="Vrinda"/>
+        <a:font script="Gujr" typeface="Shruti"/>
+        <a:font script="Khmr" typeface="MoolBoran"/>
+        <a:font script="Knda" typeface="Tunga"/>
+        <a:font script="Guru" typeface="Raavi"/>
+        <a:font script="Cans" typeface="Euphemia"/>
+        <a:font script="Cher" typeface="Plantagenet Cherokee"/>
+        <a:font script="Yiii" typeface="Microsoft Yi Baiti"/>
+        <a:font script="Tibt" typeface="Microsoft Himalaya"/>
+        <a:font script="Thaa" typeface="MV Boli"/>
+        <a:font script="Deva" typeface="Mangal"/>
+        <a:font script="Telu" typeface="Gautami"/>
+        <a:font script="Taml" typeface="Latha"/>
+        <a:font script="Syrc" typeface="Estrangelo Edessa"/>
+        <a:font script="Orya" typeface="Kalinga"/>
+        <a:font script="Mlym" typeface="Kartika"/>
+        <a:font script="Laoo" typeface="DokChampa"/>
+        <a:font script="Sinh" typeface="Iskoola Pota"/>
+        <a:font script="Mong" typeface="Mongolian Baiti"/>
+        <a:font script="Viet" typeface="Times New Roman"/>
+        <a:font script="Uigh" typeface="Microsoft Uighur"/>
+        <a:font script="Geor" typeface="Sylfaen"/>
+        <a:font script="Armn" typeface="Arial"/>
+        <a:font script="Bugi" typeface="Leelawadee UI"/>
+        <a:font script="Bopo" typeface="Microsoft JhengHei"/>
+        <a:font script="Java" typeface="Javanese Text"/>
+        <a:font script="Lisu" typeface="Segoe UI"/>
+        <a:font script="Mymr" typeface="Myanmar Text"/>
+        <a:font script="Nkoo" typeface="Ebrima"/>
+        <a:font script="Olck" typeface="Nirmala UI"/>
+        <a:font script="Osma" typeface="Ebrima"/>
+        <a:font script="Phag" typeface="Phagspa"/>
+        <a:font script="Syrn" typeface="Estrangelo Edessa"/>
+        <a:font script="Syrj" typeface="Estrangelo Edessa"/>
+        <a:font script="Syre" typeface="Estrangelo Edessa"/>
+        <a:font script="Sora" typeface="Nirmala UI"/>
+        <a:font script="Tale" typeface="Microsoft Tai Le"/>
+        <a:font script="Talu" typeface="Microsoft New Tai Lue"/>
+        <a:font script="Tfng" typeface="Ebrima"/>
+      </a:majorFont>
+      <a:minorFont>
+        <a:latin typeface="Aptos" panose="02110004020202020204"/>
+        <a:ea typeface=""/>
+        <a:cs typeface=""/>
+        <a:font script="Jpan" typeface="游ゴシック"/>
+        <a:font script="Hang" typeface="맑은 고딕"/>
+        <a:font script="Hans" typeface="等线"/>
+        <a:font script="Hant" typeface="新細明體"/>
+        <a:font script="Arab" typeface="Arial"/>
+        <a:font script="Hebr" typeface="Arial"/>
+        <a:font script="Thai" typeface="Cordia New"/>
+        <a:font script="Ethi" typeface="Nyala"/>
+        <a:font script="Beng" typeface="Vrinda"/>
+        <a:font script="Gujr" typeface="Shruti"/>
+        <a:font script="Khmr" typeface="DaunPenh"/>
+        <a:font script="Knda" typeface="Tunga"/>
+        <a:font script="Guru" typeface="Raavi"/>
+        <a:font script="Cans" typeface="Euphemia"/>
+        <a:font script="Cher" typeface="Plantagenet Cherokee"/>
+        <a:font script="Yiii" typeface="Microsoft Yi Baiti"/>
+        <a:font script="Tibt" typeface="Microsoft Himalaya"/>
+        <a:font script="Thaa" typeface="MV Boli"/>
+        <a:font script="Deva" typeface="Mangal"/>
+        <a:font script="Telu" typeface="Gautami"/>
+        <a:font script="Taml" typeface="Latha"/>
+        <a:font script="Syrc" typeface="Estrangelo Edessa"/>
+        <a:font script="Orya" typeface="Kalinga"/>
+        <a:font script="Mlym" typeface="Kartika"/>
+        <a:font script="Laoo" typeface="DokChampa"/>
+        <a:font script="Sinh" typeface="Iskoola Pota"/>
+        <a:font script="Mong" typeface="Mongolian Baiti"/>
+        <a:font script="Viet" typeface="Arial"/>
+        <a:font script="Uigh" typeface="Microsoft Uighur"/>
+        <a:font script="Geor" typeface="Sylfaen"/>
+        <a:font script="Armn" typeface="Arial"/>
+        <a:font script="Bugi" typeface="Leelawadee UI"/>
+        <a:font script="Bopo" typeface="Microsoft JhengHei"/>
+        <a:font script="Java" typeface="Javanese Text"/>
+        <a:font script="Lisu" typeface="Segoe UI"/>
+        <a:font script="Mymr" typeface="Myanmar Text"/>
+        <a:font script="Nkoo" typeface="Ebrima"/>
+        <a:font script="Olck" typeface="Nirmala UI"/>
+        <a:font script="Osma" typeface="Ebrima"/>
+        <a:font script="Phag" typeface="Phagspa"/>
+        <a:font script="Syrn" typeface="Estrangelo Edessa"/>
+        <a:font script="Syrj" typeface="Estrangelo Edessa"/>
+        <a:font script="Syre" typeface="Estrangelo Edessa"/>
+        <a:font script="Sora" typeface="Nirmala UI"/>
+        <a:font script="Tale" typeface="Microsoft Tai Le"/>
+        <a:font script="Talu" typeface="Microsoft New Tai Lue"/>
+        <a:font script="Tfng" typeface="Ebrima"/>
+      </a:minorFont>
+    </a:fontScheme>
+    <a:fmtScheme name="Office">
+      <a:fillStyleLst>
+        <a:solidFill>
+          <a:schemeClr val="phClr"/>
+        </a:solidFill>
+        <a:gradFill rotWithShape="1">
+          <a:gsLst>
+            <a:gs pos="0">
+              <a:schemeClr val="phClr">
+                <a:lumMod val="110000"/>
+                <a:satMod val="105000"/>
+                <a:tint val="67000"/>
+              </a:schemeClr>
+            </a:gs>
+            <a:gs pos="50000">
+              <a:schemeClr val="phClr">
+                <a:lumMod val="105000"/>
+                <a:satMod val="103000"/>
+                <a:tint val="73000"/>
+              </a:schemeClr>
+            </a:gs>
+            <a:gs pos="100000">
+              <a:schemeClr val="phClr">
+                <a:lumMod val="105000"/>
+                <a:satMod val="109000"/>
+                <a:tint val="81000"/>
+              </a:schemeClr>
+            </a:gs>
+          </a:gsLst>
+          <a:lin ang="5400000" scaled="0"/>
+        </a:gradFill>
+        <a:gradFill rotWithShape="1">
+          <a:gsLst>
+            <a:gs pos="0">
+              <a:schemeClr val="phClr">
+                <a:satMod val="103000"/>
+                <a:lumMod val="102000"/>
+                <a:tint val="94000"/>
+              </a:schemeClr>
+            </a:gs>
+            <a:gs pos="50000">
+              <a:schemeClr val="phClr">
+                <a:satMod val="110000"/>
+                <a:lumMod val="100000"/>
+                <a:shade val="100000"/>
+              </a:schemeClr>
+            </a:gs>
+            <a:gs pos="100000">
+              <a:schemeClr val="phClr">
+                <a:lumMod val="99000"/>
+                <a:satMod val="120000"/>
+                <a:shade val="78000"/>
+              </a:schemeClr>
+            </a:gs>
+          </a:gsLst>
+          <a:lin ang="5400000" scaled="0"/>
+        </a:gradFill>
+      </a:fillStyleLst>
+      <a:lnStyleLst>
+        <a:ln w="12700" cap="flat" cmpd="sng" algn="ctr">
+          <a:solidFill>
+            <a:schemeClr val="phClr"/>
+          </a:solidFill>
+          <a:prstDash val="solid"/>
+          <a:miter lim="800000"/>
+        </a:ln>
+        <a:ln w="19050" cap="flat" cmpd="sng" algn="ctr">
+          <a:solidFill>
+            <a:schemeClr val="phClr"/>
+          </a:solidFill>
+          <a:prstDash val="solid"/>
+          <a:miter lim="800000"/>
+        </a:ln>
+        <a:ln w="25400" cap="flat" cmpd="sng" algn="ctr">
+          <a:solidFill>
+            <a:schemeClr val="phClr"/>
+          </a:solidFill>
+          <a:prstDash val="solid"/>
+          <a:miter lim="800000"/>
+        </a:ln>
+      </a:lnStyleLst>
+      <a:effectStyleLst>
+        <a:effectStyle>
+          <a:effectLst/>
+        </a:effectStyle>
+        <a:effectStyle>
+          <a:effectLst/>
+        </a:effectStyle>
+        <a:effectStyle>
+          <a:effectLst>
+            <a:outerShdw blurRad="57150" dist="19050" dir="5400000" algn="ctr" rotWithShape="0">
+              <a:srgbClr val="000000">
+                <a:alpha val="63000"/>
+              </a:srgbClr>
+            </a:outerShdw>
+          </a:effectLst>
+        </a:effectStyle>
+      </a:effectStyleLst>
+      <a:bgFillStyleLst>
+        <a:solidFill>
+          <a:schemeClr val="phClr"/>
+        </a:solidFill>
+        <a:solidFill>
+          <a:schemeClr val="phClr">
+            <a:tint val="95000"/>
+            <a:satMod val="170000"/>
+          </a:schemeClr>
+        </a:solidFill>
+        <a:gradFill rotWithShape="1">
+          <a:gsLst>
+            <a:gs pos="0">
+              <a:schemeClr val="phClr">
+                <a:tint val="93000"/>
+                <a:satMod val="150000"/>
+                <a:shade val="98000"/>
+                <a:lumMod val="102000"/>
+              </a:schemeClr>
+            </a:gs>
+            <a:gs pos="50000">
+              <a:schemeClr val="phClr">
+                <a:tint val="98000"/>
+                <a:satMod val="130000"/>
+                <a:shade val="90000"/>
+                <a:lumMod val="103000"/>
+              </a:schemeClr>
+            </a:gs>
+            <a:gs pos="100000">
+              <a:schemeClr val="phClr">
+                <a:shade val="63000"/>
+                <a:satMod val="120000"/>
+              </a:schemeClr>
+            </a:gs>
+          </a:gsLst>
+          <a:lin ang="5400000" scaled="0"/>
+        </a:gradFill>
+      </a:bgFillStyleLst>
+    </a:fmtScheme>
+  </a:themeElements>
+  <a:objectDefaults>
+    <a:lnDef>
+      <a:spPr/>
+      <a:bodyPr/>
+      <a:lstStyle/>
+      <a:style>
+        <a:lnRef idx="2">
+          <a:schemeClr val="accent1"/>
+        </a:lnRef>
+        <a:fillRef idx="0">
+          <a:schemeClr val="accent1"/>
+        </a:fillRef>
+        <a:effectRef idx="1">
+          <a:schemeClr val="accent1"/>
+        </a:effectRef>
+        <a:fontRef idx="minor">
+          <a:schemeClr val="tx1"/>
+        </a:fontRef>
+      </a:style>
+    </a:lnDef>
+  </a:objectDefaults>
+  <a:extraClrSchemeLst/>
+  <a:extLst>
+    <a:ext uri="{05A4C25C-085E-4340-85A3-A5531E510DB2}">
+      <thm15:themeFamily xmlns:thm15="http://schemas.microsoft.com/office/thememl/2012/main" name="Office Theme" id="{2E142A2C-CD16-42D6-873A-C26D2A0506FA}" vid="{1BDDFF52-6CD6-40A5-AB3C-68EB2F1E4D0A}"/>
+    </a:ext>
+  </a:extLst>
+</a:theme>
 </file>
</xml_diff>

<commit_message>
update the control panel code and the design of map matrix.
</commit_message>
<xml_diff>
--- a/doc/designDoc.pptx
+++ b/doc/designDoc.pptx
@@ -5,12 +5,14 @@
     <p:sldMasterId id="2147483648" r:id="rId1"/>
   </p:sldMasterIdLst>
   <p:notesMasterIdLst>
-    <p:notesMasterId r:id="rId5"/>
+    <p:notesMasterId r:id="rId7"/>
   </p:notesMasterIdLst>
   <p:sldIdLst>
     <p:sldId id="256" r:id="rId2"/>
     <p:sldId id="257" r:id="rId3"/>
     <p:sldId id="258" r:id="rId4"/>
+    <p:sldId id="259" r:id="rId5"/>
+    <p:sldId id="260" r:id="rId6"/>
   </p:sldIdLst>
   <p:sldSz cx="12192000" cy="6858000"/>
   <p:notesSz cx="6858000" cy="9144000"/>
@@ -199,7 +201,7 @@
           <a:p>
             <a:fld id="{0329FBD8-4D87-425A-B74C-7EC553A2947F}" type="datetimeFigureOut">
               <a:rPr lang="en-SG" smtClean="0"/>
-              <a:t>7/8/2024</a:t>
+              <a:t>8/8/2024</a:t>
             </a:fld>
             <a:endParaRPr lang="en-SG"/>
           </a:p>
@@ -700,7 +702,7 @@
           <a:p>
             <a:fld id="{5568BA03-6613-4DAC-9DC1-5FD1D61FA6E8}" type="datetimeFigureOut">
               <a:rPr lang="en-SG" smtClean="0"/>
-              <a:t>7/8/2024</a:t>
+              <a:t>8/8/2024</a:t>
             </a:fld>
             <a:endParaRPr lang="en-SG"/>
           </a:p>
@@ -900,7 +902,7 @@
           <a:p>
             <a:fld id="{5568BA03-6613-4DAC-9DC1-5FD1D61FA6E8}" type="datetimeFigureOut">
               <a:rPr lang="en-SG" smtClean="0"/>
-              <a:t>7/8/2024</a:t>
+              <a:t>8/8/2024</a:t>
             </a:fld>
             <a:endParaRPr lang="en-SG"/>
           </a:p>
@@ -1110,7 +1112,7 @@
           <a:p>
             <a:fld id="{5568BA03-6613-4DAC-9DC1-5FD1D61FA6E8}" type="datetimeFigureOut">
               <a:rPr lang="en-SG" smtClean="0"/>
-              <a:t>7/8/2024</a:t>
+              <a:t>8/8/2024</a:t>
             </a:fld>
             <a:endParaRPr lang="en-SG"/>
           </a:p>
@@ -1310,7 +1312,7 @@
           <a:p>
             <a:fld id="{5568BA03-6613-4DAC-9DC1-5FD1D61FA6E8}" type="datetimeFigureOut">
               <a:rPr lang="en-SG" smtClean="0"/>
-              <a:t>7/8/2024</a:t>
+              <a:t>8/8/2024</a:t>
             </a:fld>
             <a:endParaRPr lang="en-SG"/>
           </a:p>
@@ -1586,7 +1588,7 @@
           <a:p>
             <a:fld id="{5568BA03-6613-4DAC-9DC1-5FD1D61FA6E8}" type="datetimeFigureOut">
               <a:rPr lang="en-SG" smtClean="0"/>
-              <a:t>7/8/2024</a:t>
+              <a:t>8/8/2024</a:t>
             </a:fld>
             <a:endParaRPr lang="en-SG"/>
           </a:p>
@@ -1854,7 +1856,7 @@
           <a:p>
             <a:fld id="{5568BA03-6613-4DAC-9DC1-5FD1D61FA6E8}" type="datetimeFigureOut">
               <a:rPr lang="en-SG" smtClean="0"/>
-              <a:t>7/8/2024</a:t>
+              <a:t>8/8/2024</a:t>
             </a:fld>
             <a:endParaRPr lang="en-SG"/>
           </a:p>
@@ -2269,7 +2271,7 @@
           <a:p>
             <a:fld id="{5568BA03-6613-4DAC-9DC1-5FD1D61FA6E8}" type="datetimeFigureOut">
               <a:rPr lang="en-SG" smtClean="0"/>
-              <a:t>7/8/2024</a:t>
+              <a:t>8/8/2024</a:t>
             </a:fld>
             <a:endParaRPr lang="en-SG"/>
           </a:p>
@@ -2411,7 +2413,7 @@
           <a:p>
             <a:fld id="{5568BA03-6613-4DAC-9DC1-5FD1D61FA6E8}" type="datetimeFigureOut">
               <a:rPr lang="en-SG" smtClean="0"/>
-              <a:t>7/8/2024</a:t>
+              <a:t>8/8/2024</a:t>
             </a:fld>
             <a:endParaRPr lang="en-SG"/>
           </a:p>
@@ -2524,7 +2526,7 @@
           <a:p>
             <a:fld id="{5568BA03-6613-4DAC-9DC1-5FD1D61FA6E8}" type="datetimeFigureOut">
               <a:rPr lang="en-SG" smtClean="0"/>
-              <a:t>7/8/2024</a:t>
+              <a:t>8/8/2024</a:t>
             </a:fld>
             <a:endParaRPr lang="en-SG"/>
           </a:p>
@@ -2837,7 +2839,7 @@
           <a:p>
             <a:fld id="{5568BA03-6613-4DAC-9DC1-5FD1D61FA6E8}" type="datetimeFigureOut">
               <a:rPr lang="en-SG" smtClean="0"/>
-              <a:t>7/8/2024</a:t>
+              <a:t>8/8/2024</a:t>
             </a:fld>
             <a:endParaRPr lang="en-SG"/>
           </a:p>
@@ -3126,7 +3128,7 @@
           <a:p>
             <a:fld id="{5568BA03-6613-4DAC-9DC1-5FD1D61FA6E8}" type="datetimeFigureOut">
               <a:rPr lang="en-SG" smtClean="0"/>
-              <a:t>7/8/2024</a:t>
+              <a:t>8/8/2024</a:t>
             </a:fld>
             <a:endParaRPr lang="en-SG"/>
           </a:p>
@@ -3369,7 +3371,7 @@
           <a:p>
             <a:fld id="{5568BA03-6613-4DAC-9DC1-5FD1D61FA6E8}" type="datetimeFigureOut">
               <a:rPr lang="en-SG" smtClean="0"/>
-              <a:t>7/8/2024</a:t>
+              <a:t>8/8/2024</a:t>
             </a:fld>
             <a:endParaRPr lang="en-SG"/>
           </a:p>
@@ -8251,6 +8253,3389 @@
     <p:extLst>
       <p:ext uri="{BB962C8B-B14F-4D97-AF65-F5344CB8AC3E}">
         <p14:creationId xmlns:p14="http://schemas.microsoft.com/office/powerpoint/2010/main" val="2045153366"/>
+      </p:ext>
+    </p:extLst>
+  </p:cSld>
+  <p:clrMapOvr>
+    <a:masterClrMapping/>
+  </p:clrMapOvr>
+</p:sld>
+</file>
+
+<file path=ppt/slides/slide4.xml><?xml version="1.0" encoding="utf-8"?>
+<p:sld xmlns:a="http://schemas.openxmlformats.org/drawingml/2006/main" xmlns:r="http://schemas.openxmlformats.org/officeDocument/2006/relationships" xmlns:p="http://schemas.openxmlformats.org/presentationml/2006/main">
+  <p:cSld>
+    <p:spTree>
+      <p:nvGrpSpPr>
+        <p:cNvPr id="1" name=""/>
+        <p:cNvGrpSpPr/>
+        <p:nvPr/>
+      </p:nvGrpSpPr>
+      <p:grpSpPr>
+        <a:xfrm>
+          <a:off x="0" y="0"/>
+          <a:ext cx="0" cy="0"/>
+          <a:chOff x="0" y="0"/>
+          <a:chExt cx="0" cy="0"/>
+        </a:xfrm>
+      </p:grpSpPr>
+      <p:pic>
+        <p:nvPicPr>
+          <p:cNvPr id="5" name="Picture 4">
+            <a:extLst>
+              <a:ext uri="{FF2B5EF4-FFF2-40B4-BE49-F238E27FC236}">
+                <a16:creationId xmlns:a16="http://schemas.microsoft.com/office/drawing/2014/main" id="{7FD51449-B278-20CE-77FB-70D469FBD41A}"/>
+              </a:ext>
+            </a:extLst>
+          </p:cNvPr>
+          <p:cNvPicPr>
+            <a:picLocks noChangeAspect="1"/>
+          </p:cNvPicPr>
+          <p:nvPr/>
+        </p:nvPicPr>
+        <p:blipFill>
+          <a:blip r:embed="rId2">
+            <a:alphaModFix amt="70000"/>
+          </a:blip>
+          <a:stretch>
+            <a:fillRect/>
+          </a:stretch>
+        </p:blipFill>
+        <p:spPr>
+          <a:xfrm>
+            <a:off x="679657" y="692493"/>
+            <a:ext cx="4363981" cy="2410446"/>
+          </a:xfrm>
+          <a:prstGeom prst="rect">
+            <a:avLst/>
+          </a:prstGeom>
+        </p:spPr>
+      </p:pic>
+      <p:sp>
+        <p:nvSpPr>
+          <p:cNvPr id="6" name="Arrow: Down 5">
+            <a:extLst>
+              <a:ext uri="{FF2B5EF4-FFF2-40B4-BE49-F238E27FC236}">
+                <a16:creationId xmlns:a16="http://schemas.microsoft.com/office/drawing/2014/main" id="{5330651F-AA49-3122-682C-339080F5D1F9}"/>
+              </a:ext>
+            </a:extLst>
+          </p:cNvPr>
+          <p:cNvSpPr/>
+          <p:nvPr/>
+        </p:nvSpPr>
+        <p:spPr>
+          <a:xfrm>
+            <a:off x="855163" y="1251284"/>
+            <a:ext cx="144378" cy="539015"/>
+          </a:xfrm>
+          <a:prstGeom prst="downArrow">
+            <a:avLst/>
+          </a:prstGeom>
+          <a:solidFill>
+            <a:srgbClr val="FF0000"/>
+          </a:solidFill>
+        </p:spPr>
+        <p:style>
+          <a:lnRef idx="2">
+            <a:schemeClr val="accent1">
+              <a:shade val="15000"/>
+            </a:schemeClr>
+          </a:lnRef>
+          <a:fillRef idx="1">
+            <a:schemeClr val="accent1"/>
+          </a:fillRef>
+          <a:effectRef idx="0">
+            <a:schemeClr val="accent1"/>
+          </a:effectRef>
+          <a:fontRef idx="minor">
+            <a:schemeClr val="lt1"/>
+          </a:fontRef>
+        </p:style>
+        <p:txBody>
+          <a:bodyPr rtlCol="0" anchor="ctr"/>
+          <a:lstStyle/>
+          <a:p>
+            <a:pPr algn="ctr"/>
+            <a:endParaRPr lang="en-SG"/>
+          </a:p>
+        </p:txBody>
+      </p:sp>
+      <p:sp>
+        <p:nvSpPr>
+          <p:cNvPr id="7" name="Arrow: Down 6">
+            <a:extLst>
+              <a:ext uri="{FF2B5EF4-FFF2-40B4-BE49-F238E27FC236}">
+                <a16:creationId xmlns:a16="http://schemas.microsoft.com/office/drawing/2014/main" id="{78E65165-1ADF-EDEC-DE59-1A2F2B76B613}"/>
+              </a:ext>
+            </a:extLst>
+          </p:cNvPr>
+          <p:cNvSpPr/>
+          <p:nvPr/>
+        </p:nvSpPr>
+        <p:spPr>
+          <a:xfrm>
+            <a:off x="2133720" y="2563924"/>
+            <a:ext cx="144378" cy="539015"/>
+          </a:xfrm>
+          <a:prstGeom prst="downArrow">
+            <a:avLst/>
+          </a:prstGeom>
+          <a:solidFill>
+            <a:srgbClr val="FF0000"/>
+          </a:solidFill>
+        </p:spPr>
+        <p:style>
+          <a:lnRef idx="2">
+            <a:schemeClr val="accent1">
+              <a:shade val="15000"/>
+            </a:schemeClr>
+          </a:lnRef>
+          <a:fillRef idx="1">
+            <a:schemeClr val="accent1"/>
+          </a:fillRef>
+          <a:effectRef idx="0">
+            <a:schemeClr val="accent1"/>
+          </a:effectRef>
+          <a:fontRef idx="minor">
+            <a:schemeClr val="lt1"/>
+          </a:fontRef>
+        </p:style>
+        <p:txBody>
+          <a:bodyPr rtlCol="0" anchor="ctr"/>
+          <a:lstStyle/>
+          <a:p>
+            <a:pPr algn="ctr"/>
+            <a:endParaRPr lang="en-SG"/>
+          </a:p>
+        </p:txBody>
+      </p:sp>
+      <p:sp>
+        <p:nvSpPr>
+          <p:cNvPr id="8" name="Arrow: Down 7">
+            <a:extLst>
+              <a:ext uri="{FF2B5EF4-FFF2-40B4-BE49-F238E27FC236}">
+                <a16:creationId xmlns:a16="http://schemas.microsoft.com/office/drawing/2014/main" id="{F894DBF5-DF03-81FB-E092-509D1B2E397B}"/>
+              </a:ext>
+            </a:extLst>
+          </p:cNvPr>
+          <p:cNvSpPr/>
+          <p:nvPr/>
+        </p:nvSpPr>
+        <p:spPr>
+          <a:xfrm>
+            <a:off x="2709917" y="758042"/>
+            <a:ext cx="139161" cy="269506"/>
+          </a:xfrm>
+          <a:prstGeom prst="downArrow">
+            <a:avLst/>
+          </a:prstGeom>
+          <a:solidFill>
+            <a:srgbClr val="FF0000"/>
+          </a:solidFill>
+        </p:spPr>
+        <p:style>
+          <a:lnRef idx="2">
+            <a:schemeClr val="accent1">
+              <a:shade val="15000"/>
+            </a:schemeClr>
+          </a:lnRef>
+          <a:fillRef idx="1">
+            <a:schemeClr val="accent1"/>
+          </a:fillRef>
+          <a:effectRef idx="0">
+            <a:schemeClr val="accent1"/>
+          </a:effectRef>
+          <a:fontRef idx="minor">
+            <a:schemeClr val="lt1"/>
+          </a:fontRef>
+        </p:style>
+        <p:txBody>
+          <a:bodyPr rtlCol="0" anchor="ctr"/>
+          <a:lstStyle/>
+          <a:p>
+            <a:pPr algn="ctr"/>
+            <a:endParaRPr lang="en-SG"/>
+          </a:p>
+        </p:txBody>
+      </p:sp>
+      <p:pic>
+        <p:nvPicPr>
+          <p:cNvPr id="10" name="Picture 9" descr="A floor plan of a house&#10;&#10;Description automatically generated">
+            <a:extLst>
+              <a:ext uri="{FF2B5EF4-FFF2-40B4-BE49-F238E27FC236}">
+                <a16:creationId xmlns:a16="http://schemas.microsoft.com/office/drawing/2014/main" id="{F3FC4F76-2F51-3963-B5B9-F00D99C12B1B}"/>
+              </a:ext>
+            </a:extLst>
+          </p:cNvPr>
+          <p:cNvPicPr>
+            <a:picLocks noChangeAspect="1"/>
+          </p:cNvPicPr>
+          <p:nvPr/>
+        </p:nvPicPr>
+        <p:blipFill>
+          <a:blip r:embed="rId3">
+            <a:extLst>
+              <a:ext uri="{28A0092B-C50C-407E-A947-70E740481C1C}">
+                <a14:useLocalDpi xmlns:a14="http://schemas.microsoft.com/office/drawing/2010/main" val="0"/>
+              </a:ext>
+            </a:extLst>
+          </a:blip>
+          <a:stretch>
+            <a:fillRect/>
+          </a:stretch>
+        </p:blipFill>
+        <p:spPr>
+          <a:xfrm>
+            <a:off x="679657" y="3429000"/>
+            <a:ext cx="4363981" cy="2335336"/>
+          </a:xfrm>
+          <a:prstGeom prst="rect">
+            <a:avLst/>
+          </a:prstGeom>
+          <a:ln>
+            <a:solidFill>
+              <a:schemeClr val="tx1"/>
+            </a:solidFill>
+            <a:prstDash val="sysDash"/>
+          </a:ln>
+        </p:spPr>
+      </p:pic>
+      <p:cxnSp>
+        <p:nvCxnSpPr>
+          <p:cNvPr id="12" name="Straight Connector 11">
+            <a:extLst>
+              <a:ext uri="{FF2B5EF4-FFF2-40B4-BE49-F238E27FC236}">
+                <a16:creationId xmlns:a16="http://schemas.microsoft.com/office/drawing/2014/main" id="{15075399-4ECF-C9DC-73C9-61ECBD099E2A}"/>
+              </a:ext>
+            </a:extLst>
+          </p:cNvPr>
+          <p:cNvCxnSpPr>
+            <a:cxnSpLocks/>
+            <a:stCxn id="6" idx="2"/>
+            <a:endCxn id="8" idx="2"/>
+          </p:cNvCxnSpPr>
+          <p:nvPr/>
+        </p:nvCxnSpPr>
+        <p:spPr>
+          <a:xfrm flipV="1">
+            <a:off x="927352" y="1027548"/>
+            <a:ext cx="1890982" cy="762751"/>
+          </a:xfrm>
+          <a:prstGeom prst="line">
+            <a:avLst/>
+          </a:prstGeom>
+          <a:ln>
+            <a:solidFill>
+              <a:srgbClr val="FF0000"/>
+            </a:solidFill>
+          </a:ln>
+        </p:spPr>
+        <p:style>
+          <a:lnRef idx="2">
+            <a:schemeClr val="accent1"/>
+          </a:lnRef>
+          <a:fillRef idx="0">
+            <a:schemeClr val="accent1"/>
+          </a:fillRef>
+          <a:effectRef idx="1">
+            <a:schemeClr val="accent1"/>
+          </a:effectRef>
+          <a:fontRef idx="minor">
+            <a:schemeClr val="tx1"/>
+          </a:fontRef>
+        </p:style>
+      </p:cxnSp>
+      <p:cxnSp>
+        <p:nvCxnSpPr>
+          <p:cNvPr id="13" name="Straight Connector 12">
+            <a:extLst>
+              <a:ext uri="{FF2B5EF4-FFF2-40B4-BE49-F238E27FC236}">
+                <a16:creationId xmlns:a16="http://schemas.microsoft.com/office/drawing/2014/main" id="{37C74E81-580C-1CC0-39A5-53A7C1719284}"/>
+              </a:ext>
+            </a:extLst>
+          </p:cNvPr>
+          <p:cNvCxnSpPr>
+            <a:cxnSpLocks/>
+            <a:stCxn id="6" idx="2"/>
+          </p:cNvCxnSpPr>
+          <p:nvPr/>
+        </p:nvCxnSpPr>
+        <p:spPr>
+          <a:xfrm>
+            <a:off x="927352" y="1790299"/>
+            <a:ext cx="1296084" cy="1312640"/>
+          </a:xfrm>
+          <a:prstGeom prst="line">
+            <a:avLst/>
+          </a:prstGeom>
+          <a:ln>
+            <a:solidFill>
+              <a:srgbClr val="FF0000"/>
+            </a:solidFill>
+          </a:ln>
+        </p:spPr>
+        <p:style>
+          <a:lnRef idx="2">
+            <a:schemeClr val="accent1"/>
+          </a:lnRef>
+          <a:fillRef idx="0">
+            <a:schemeClr val="accent1"/>
+          </a:fillRef>
+          <a:effectRef idx="1">
+            <a:schemeClr val="accent1"/>
+          </a:effectRef>
+          <a:fontRef idx="minor">
+            <a:schemeClr val="tx1"/>
+          </a:fontRef>
+        </p:style>
+      </p:cxnSp>
+      <p:sp>
+        <p:nvSpPr>
+          <p:cNvPr id="16" name="TextBox 15">
+            <a:extLst>
+              <a:ext uri="{FF2B5EF4-FFF2-40B4-BE49-F238E27FC236}">
+                <a16:creationId xmlns:a16="http://schemas.microsoft.com/office/drawing/2014/main" id="{89368364-E238-E0F3-E1C5-0D7E76F42D03}"/>
+              </a:ext>
+            </a:extLst>
+          </p:cNvPr>
+          <p:cNvSpPr txBox="1"/>
+          <p:nvPr/>
+        </p:nvSpPr>
+        <p:spPr>
+          <a:xfrm>
+            <a:off x="2295625" y="2714157"/>
+            <a:ext cx="1077728" cy="430887"/>
+          </a:xfrm>
+          <a:prstGeom prst="rect">
+            <a:avLst/>
+          </a:prstGeom>
+          <a:noFill/>
+        </p:spPr>
+        <p:txBody>
+          <a:bodyPr wrap="square" rtlCol="0">
+            <a:spAutoFit/>
+          </a:bodyPr>
+          <a:lstStyle/>
+          <a:p>
+            <a:r>
+              <a:rPr lang="en-US" sz="1100" b="1" dirty="0">
+                <a:solidFill>
+                  <a:srgbClr val="C00000"/>
+                </a:solidFill>
+              </a:rPr>
+              <a:t>UWB location amplifier 01</a:t>
+            </a:r>
+            <a:endParaRPr lang="en-SG" sz="1100" b="1" dirty="0">
+              <a:solidFill>
+                <a:srgbClr val="C00000"/>
+              </a:solidFill>
+            </a:endParaRPr>
+          </a:p>
+        </p:txBody>
+      </p:sp>
+      <p:sp>
+        <p:nvSpPr>
+          <p:cNvPr id="17" name="TextBox 16">
+            <a:extLst>
+              <a:ext uri="{FF2B5EF4-FFF2-40B4-BE49-F238E27FC236}">
+                <a16:creationId xmlns:a16="http://schemas.microsoft.com/office/drawing/2014/main" id="{AD914642-6695-8459-FC0A-B66C7582F09B}"/>
+              </a:ext>
+            </a:extLst>
+          </p:cNvPr>
+          <p:cNvSpPr txBox="1"/>
+          <p:nvPr/>
+        </p:nvSpPr>
+        <p:spPr>
+          <a:xfrm>
+            <a:off x="732294" y="785500"/>
+            <a:ext cx="1077728" cy="430887"/>
+          </a:xfrm>
+          <a:prstGeom prst="rect">
+            <a:avLst/>
+          </a:prstGeom>
+          <a:noFill/>
+        </p:spPr>
+        <p:txBody>
+          <a:bodyPr wrap="square" rtlCol="0">
+            <a:spAutoFit/>
+          </a:bodyPr>
+          <a:lstStyle/>
+          <a:p>
+            <a:r>
+              <a:rPr lang="en-US" sz="1100" b="1" dirty="0">
+                <a:solidFill>
+                  <a:srgbClr val="C00000"/>
+                </a:solidFill>
+              </a:rPr>
+              <a:t>UWB location amplifier 02</a:t>
+            </a:r>
+            <a:endParaRPr lang="en-SG" sz="1100" b="1" dirty="0">
+              <a:solidFill>
+                <a:srgbClr val="C00000"/>
+              </a:solidFill>
+            </a:endParaRPr>
+          </a:p>
+        </p:txBody>
+      </p:sp>
+      <p:sp>
+        <p:nvSpPr>
+          <p:cNvPr id="18" name="TextBox 17">
+            <a:extLst>
+              <a:ext uri="{FF2B5EF4-FFF2-40B4-BE49-F238E27FC236}">
+                <a16:creationId xmlns:a16="http://schemas.microsoft.com/office/drawing/2014/main" id="{A6459CF5-FCB4-893D-EA1F-87FEF0D138E6}"/>
+              </a:ext>
+            </a:extLst>
+          </p:cNvPr>
+          <p:cNvSpPr txBox="1"/>
+          <p:nvPr/>
+        </p:nvSpPr>
+        <p:spPr>
+          <a:xfrm>
+            <a:off x="2868630" y="719331"/>
+            <a:ext cx="1077728" cy="430887"/>
+          </a:xfrm>
+          <a:prstGeom prst="rect">
+            <a:avLst/>
+          </a:prstGeom>
+          <a:noFill/>
+        </p:spPr>
+        <p:txBody>
+          <a:bodyPr wrap="square" rtlCol="0">
+            <a:spAutoFit/>
+          </a:bodyPr>
+          <a:lstStyle/>
+          <a:p>
+            <a:r>
+              <a:rPr lang="en-US" sz="1100" b="1" dirty="0">
+                <a:solidFill>
+                  <a:srgbClr val="C00000"/>
+                </a:solidFill>
+              </a:rPr>
+              <a:t>UWB location amplifier 03</a:t>
+            </a:r>
+            <a:endParaRPr lang="en-SG" sz="1100" b="1" dirty="0">
+              <a:solidFill>
+                <a:srgbClr val="C00000"/>
+              </a:solidFill>
+            </a:endParaRPr>
+          </a:p>
+        </p:txBody>
+      </p:sp>
+      <p:sp>
+        <p:nvSpPr>
+          <p:cNvPr id="19" name="Arrow: Right 18">
+            <a:extLst>
+              <a:ext uri="{FF2B5EF4-FFF2-40B4-BE49-F238E27FC236}">
+                <a16:creationId xmlns:a16="http://schemas.microsoft.com/office/drawing/2014/main" id="{641B2C5C-24BA-6837-3008-69B2962D7F02}"/>
+              </a:ext>
+            </a:extLst>
+          </p:cNvPr>
+          <p:cNvSpPr/>
+          <p:nvPr/>
+        </p:nvSpPr>
+        <p:spPr>
+          <a:xfrm>
+            <a:off x="5125448" y="2161381"/>
+            <a:ext cx="452387" cy="285238"/>
+          </a:xfrm>
+          <a:prstGeom prst="rightArrow">
+            <a:avLst/>
+          </a:prstGeom>
+        </p:spPr>
+        <p:style>
+          <a:lnRef idx="2">
+            <a:schemeClr val="accent1">
+              <a:shade val="15000"/>
+            </a:schemeClr>
+          </a:lnRef>
+          <a:fillRef idx="1">
+            <a:schemeClr val="accent1"/>
+          </a:fillRef>
+          <a:effectRef idx="0">
+            <a:schemeClr val="accent1"/>
+          </a:effectRef>
+          <a:fontRef idx="minor">
+            <a:schemeClr val="lt1"/>
+          </a:fontRef>
+        </p:style>
+        <p:txBody>
+          <a:bodyPr rtlCol="0" anchor="ctr"/>
+          <a:lstStyle/>
+          <a:p>
+            <a:pPr algn="ctr"/>
+            <a:endParaRPr lang="en-SG"/>
+          </a:p>
+        </p:txBody>
+      </p:sp>
+      <p:sp>
+        <p:nvSpPr>
+          <p:cNvPr id="20" name="TextBox 19">
+            <a:extLst>
+              <a:ext uri="{FF2B5EF4-FFF2-40B4-BE49-F238E27FC236}">
+                <a16:creationId xmlns:a16="http://schemas.microsoft.com/office/drawing/2014/main" id="{DDB181E1-88B4-151D-C6D1-79E21D019BAA}"/>
+              </a:ext>
+            </a:extLst>
+          </p:cNvPr>
+          <p:cNvSpPr txBox="1"/>
+          <p:nvPr/>
+        </p:nvSpPr>
+        <p:spPr>
+          <a:xfrm>
+            <a:off x="3532165" y="2641332"/>
+            <a:ext cx="1768921" cy="430887"/>
+          </a:xfrm>
+          <a:prstGeom prst="rect">
+            <a:avLst/>
+          </a:prstGeom>
+          <a:noFill/>
+        </p:spPr>
+        <p:txBody>
+          <a:bodyPr wrap="square" rtlCol="0">
+            <a:spAutoFit/>
+          </a:bodyPr>
+          <a:lstStyle/>
+          <a:p>
+            <a:r>
+              <a:rPr lang="en-US" sz="1100" b="1" dirty="0"/>
+              <a:t>CQB Robot location UWB amplifier config  </a:t>
+            </a:r>
+            <a:endParaRPr lang="en-SG" sz="1100" b="1" dirty="0"/>
+          </a:p>
+        </p:txBody>
+      </p:sp>
+      <p:sp>
+        <p:nvSpPr>
+          <p:cNvPr id="21" name="TextBox 20">
+            <a:extLst>
+              <a:ext uri="{FF2B5EF4-FFF2-40B4-BE49-F238E27FC236}">
+                <a16:creationId xmlns:a16="http://schemas.microsoft.com/office/drawing/2014/main" id="{69044369-1973-479A-E630-90A1F548353A}"/>
+              </a:ext>
+            </a:extLst>
+          </p:cNvPr>
+          <p:cNvSpPr txBox="1"/>
+          <p:nvPr/>
+        </p:nvSpPr>
+        <p:spPr>
+          <a:xfrm>
+            <a:off x="3373353" y="5502726"/>
+            <a:ext cx="1768921" cy="261610"/>
+          </a:xfrm>
+          <a:prstGeom prst="rect">
+            <a:avLst/>
+          </a:prstGeom>
+          <a:noFill/>
+        </p:spPr>
+        <p:txBody>
+          <a:bodyPr wrap="square" rtlCol="0">
+            <a:spAutoFit/>
+          </a:bodyPr>
+          <a:lstStyle/>
+          <a:p>
+            <a:r>
+              <a:rPr lang="en-US" sz="1100" b="1" dirty="0"/>
+              <a:t>Building floor blueprint</a:t>
+            </a:r>
+            <a:endParaRPr lang="en-SG" sz="1100" b="1" dirty="0"/>
+          </a:p>
+        </p:txBody>
+      </p:sp>
+      <p:pic>
+        <p:nvPicPr>
+          <p:cNvPr id="23" name="Picture 22">
+            <a:extLst>
+              <a:ext uri="{FF2B5EF4-FFF2-40B4-BE49-F238E27FC236}">
+                <a16:creationId xmlns:a16="http://schemas.microsoft.com/office/drawing/2014/main" id="{173CC79F-CBA5-F461-ED52-79030471BFAA}"/>
+              </a:ext>
+            </a:extLst>
+          </p:cNvPr>
+          <p:cNvPicPr>
+            <a:picLocks noChangeAspect="1"/>
+          </p:cNvPicPr>
+          <p:nvPr/>
+        </p:nvPicPr>
+        <p:blipFill>
+          <a:blip r:embed="rId4"/>
+          <a:stretch>
+            <a:fillRect/>
+          </a:stretch>
+        </p:blipFill>
+        <p:spPr>
+          <a:xfrm>
+            <a:off x="5727022" y="1569130"/>
+            <a:ext cx="4999890" cy="3351575"/>
+          </a:xfrm>
+          <a:prstGeom prst="rect">
+            <a:avLst/>
+          </a:prstGeom>
+        </p:spPr>
+      </p:pic>
+      <p:sp>
+        <p:nvSpPr>
+          <p:cNvPr id="24" name="TextBox 23">
+            <a:extLst>
+              <a:ext uri="{FF2B5EF4-FFF2-40B4-BE49-F238E27FC236}">
+                <a16:creationId xmlns:a16="http://schemas.microsoft.com/office/drawing/2014/main" id="{C1508FEC-AD97-A648-10F0-0659E21E0413}"/>
+              </a:ext>
+            </a:extLst>
+          </p:cNvPr>
+          <p:cNvSpPr txBox="1"/>
+          <p:nvPr/>
+        </p:nvSpPr>
+        <p:spPr>
+          <a:xfrm>
+            <a:off x="5659645" y="1188635"/>
+            <a:ext cx="3166721" cy="261610"/>
+          </a:xfrm>
+          <a:prstGeom prst="rect">
+            <a:avLst/>
+          </a:prstGeom>
+          <a:noFill/>
+        </p:spPr>
+        <p:txBody>
+          <a:bodyPr wrap="square" rtlCol="0">
+            <a:spAutoFit/>
+          </a:bodyPr>
+          <a:lstStyle/>
+          <a:p>
+            <a:r>
+              <a:rPr lang="en-US" sz="1100" b="1" dirty="0"/>
+              <a:t>Building Floor Environment Coordinate System </a:t>
+            </a:r>
+            <a:endParaRPr lang="en-SG" sz="1100" b="1" dirty="0"/>
+          </a:p>
+        </p:txBody>
+      </p:sp>
+      <p:sp>
+        <p:nvSpPr>
+          <p:cNvPr id="25" name="Cross 24">
+            <a:extLst>
+              <a:ext uri="{FF2B5EF4-FFF2-40B4-BE49-F238E27FC236}">
+                <a16:creationId xmlns:a16="http://schemas.microsoft.com/office/drawing/2014/main" id="{7C599A32-6EB4-1A9F-2BB3-5A0868F3417F}"/>
+              </a:ext>
+            </a:extLst>
+          </p:cNvPr>
+          <p:cNvSpPr/>
+          <p:nvPr/>
+        </p:nvSpPr>
+        <p:spPr>
+          <a:xfrm>
+            <a:off x="2678379" y="3102940"/>
+            <a:ext cx="283103" cy="283956"/>
+          </a:xfrm>
+          <a:prstGeom prst="plus">
+            <a:avLst>
+              <a:gd name="adj" fmla="val 37901"/>
+            </a:avLst>
+          </a:prstGeom>
+        </p:spPr>
+        <p:style>
+          <a:lnRef idx="2">
+            <a:schemeClr val="accent1">
+              <a:shade val="15000"/>
+            </a:schemeClr>
+          </a:lnRef>
+          <a:fillRef idx="1">
+            <a:schemeClr val="accent1"/>
+          </a:fillRef>
+          <a:effectRef idx="0">
+            <a:schemeClr val="accent1"/>
+          </a:effectRef>
+          <a:fontRef idx="minor">
+            <a:schemeClr val="lt1"/>
+          </a:fontRef>
+        </p:style>
+        <p:txBody>
+          <a:bodyPr rtlCol="0" anchor="ctr"/>
+          <a:lstStyle/>
+          <a:p>
+            <a:pPr algn="ctr"/>
+            <a:endParaRPr lang="en-SG"/>
+          </a:p>
+        </p:txBody>
+      </p:sp>
+      <p:sp>
+        <p:nvSpPr>
+          <p:cNvPr id="26" name="Arrow: Right 25">
+            <a:extLst>
+              <a:ext uri="{FF2B5EF4-FFF2-40B4-BE49-F238E27FC236}">
+                <a16:creationId xmlns:a16="http://schemas.microsoft.com/office/drawing/2014/main" id="{1686656F-0134-4F3E-C108-93E93D653B3F}"/>
+              </a:ext>
+            </a:extLst>
+          </p:cNvPr>
+          <p:cNvSpPr/>
+          <p:nvPr/>
+        </p:nvSpPr>
+        <p:spPr>
+          <a:xfrm>
+            <a:off x="5175957" y="4110220"/>
+            <a:ext cx="452387" cy="285238"/>
+          </a:xfrm>
+          <a:prstGeom prst="rightArrow">
+            <a:avLst/>
+          </a:prstGeom>
+        </p:spPr>
+        <p:style>
+          <a:lnRef idx="2">
+            <a:schemeClr val="accent1">
+              <a:shade val="15000"/>
+            </a:schemeClr>
+          </a:lnRef>
+          <a:fillRef idx="1">
+            <a:schemeClr val="accent1"/>
+          </a:fillRef>
+          <a:effectRef idx="0">
+            <a:schemeClr val="accent1"/>
+          </a:effectRef>
+          <a:fontRef idx="minor">
+            <a:schemeClr val="lt1"/>
+          </a:fontRef>
+        </p:style>
+        <p:txBody>
+          <a:bodyPr rtlCol="0" anchor="ctr"/>
+          <a:lstStyle/>
+          <a:p>
+            <a:pPr algn="ctr"/>
+            <a:endParaRPr lang="en-SG"/>
+          </a:p>
+        </p:txBody>
+      </p:sp>
+    </p:spTree>
+    <p:extLst>
+      <p:ext uri="{BB962C8B-B14F-4D97-AF65-F5344CB8AC3E}">
+        <p14:creationId xmlns:p14="http://schemas.microsoft.com/office/powerpoint/2010/main" val="920055556"/>
+      </p:ext>
+    </p:extLst>
+  </p:cSld>
+  <p:clrMapOvr>
+    <a:masterClrMapping/>
+  </p:clrMapOvr>
+</p:sld>
+</file>
+
+<file path=ppt/slides/slide5.xml><?xml version="1.0" encoding="utf-8"?>
+<p:sld xmlns:a="http://schemas.openxmlformats.org/drawingml/2006/main" xmlns:r="http://schemas.openxmlformats.org/officeDocument/2006/relationships" xmlns:p="http://schemas.openxmlformats.org/presentationml/2006/main">
+  <p:cSld>
+    <p:spTree>
+      <p:nvGrpSpPr>
+        <p:cNvPr id="1" name=""/>
+        <p:cNvGrpSpPr/>
+        <p:nvPr/>
+      </p:nvGrpSpPr>
+      <p:grpSpPr>
+        <a:xfrm>
+          <a:off x="0" y="0"/>
+          <a:ext cx="0" cy="0"/>
+          <a:chOff x="0" y="0"/>
+          <a:chExt cx="0" cy="0"/>
+        </a:xfrm>
+      </p:grpSpPr>
+      <p:pic>
+        <p:nvPicPr>
+          <p:cNvPr id="5" name="Picture 4">
+            <a:extLst>
+              <a:ext uri="{FF2B5EF4-FFF2-40B4-BE49-F238E27FC236}">
+                <a16:creationId xmlns:a16="http://schemas.microsoft.com/office/drawing/2014/main" id="{FCE33E45-EAA0-E2B2-2BFA-39340309F2BC}"/>
+              </a:ext>
+            </a:extLst>
+          </p:cNvPr>
+          <p:cNvPicPr>
+            <a:picLocks noChangeAspect="1"/>
+          </p:cNvPicPr>
+          <p:nvPr/>
+        </p:nvPicPr>
+        <p:blipFill>
+          <a:blip r:embed="rId2"/>
+          <a:stretch>
+            <a:fillRect/>
+          </a:stretch>
+        </p:blipFill>
+        <p:spPr>
+          <a:xfrm>
+            <a:off x="5674473" y="730655"/>
+            <a:ext cx="3115463" cy="2698345"/>
+          </a:xfrm>
+          <a:prstGeom prst="rect">
+            <a:avLst/>
+          </a:prstGeom>
+        </p:spPr>
+      </p:pic>
+      <p:pic>
+        <p:nvPicPr>
+          <p:cNvPr id="6" name="Picture 5">
+            <a:extLst>
+              <a:ext uri="{FF2B5EF4-FFF2-40B4-BE49-F238E27FC236}">
+                <a16:creationId xmlns:a16="http://schemas.microsoft.com/office/drawing/2014/main" id="{6CA62081-FF30-332E-DDE0-764B712BCD46}"/>
+              </a:ext>
+            </a:extLst>
+          </p:cNvPr>
+          <p:cNvPicPr>
+            <a:picLocks noChangeAspect="1"/>
+          </p:cNvPicPr>
+          <p:nvPr/>
+        </p:nvPicPr>
+        <p:blipFill>
+          <a:blip r:embed="rId3"/>
+          <a:stretch>
+            <a:fillRect/>
+          </a:stretch>
+        </p:blipFill>
+        <p:spPr>
+          <a:xfrm>
+            <a:off x="706597" y="707031"/>
+            <a:ext cx="4060642" cy="2721969"/>
+          </a:xfrm>
+          <a:prstGeom prst="rect">
+            <a:avLst/>
+          </a:prstGeom>
+        </p:spPr>
+      </p:pic>
+      <p:sp>
+        <p:nvSpPr>
+          <p:cNvPr id="7" name="Arrow: Right 6">
+            <a:extLst>
+              <a:ext uri="{FF2B5EF4-FFF2-40B4-BE49-F238E27FC236}">
+                <a16:creationId xmlns:a16="http://schemas.microsoft.com/office/drawing/2014/main" id="{1E1A3282-B9BC-37C5-08CE-A1389E0956E9}"/>
+              </a:ext>
+            </a:extLst>
+          </p:cNvPr>
+          <p:cNvSpPr/>
+          <p:nvPr/>
+        </p:nvSpPr>
+        <p:spPr>
+          <a:xfrm>
+            <a:off x="5005703" y="1836868"/>
+            <a:ext cx="430306" cy="258184"/>
+          </a:xfrm>
+          <a:prstGeom prst="rightArrow">
+            <a:avLst/>
+          </a:prstGeom>
+        </p:spPr>
+        <p:style>
+          <a:lnRef idx="2">
+            <a:schemeClr val="accent1">
+              <a:shade val="15000"/>
+            </a:schemeClr>
+          </a:lnRef>
+          <a:fillRef idx="1">
+            <a:schemeClr val="accent1"/>
+          </a:fillRef>
+          <a:effectRef idx="0">
+            <a:schemeClr val="accent1"/>
+          </a:effectRef>
+          <a:fontRef idx="minor">
+            <a:schemeClr val="lt1"/>
+          </a:fontRef>
+        </p:style>
+        <p:txBody>
+          <a:bodyPr rtlCol="0" anchor="ctr"/>
+          <a:lstStyle/>
+          <a:p>
+            <a:pPr algn="ctr"/>
+            <a:endParaRPr lang="en-SG"/>
+          </a:p>
+        </p:txBody>
+      </p:sp>
+      <p:sp>
+        <p:nvSpPr>
+          <p:cNvPr id="8" name="TextBox 7">
+            <a:extLst>
+              <a:ext uri="{FF2B5EF4-FFF2-40B4-BE49-F238E27FC236}">
+                <a16:creationId xmlns:a16="http://schemas.microsoft.com/office/drawing/2014/main" id="{37974F57-764F-A903-F832-37CEC9667B0B}"/>
+              </a:ext>
+            </a:extLst>
+          </p:cNvPr>
+          <p:cNvSpPr txBox="1"/>
+          <p:nvPr/>
+        </p:nvSpPr>
+        <p:spPr>
+          <a:xfrm>
+            <a:off x="706597" y="363835"/>
+            <a:ext cx="3166721" cy="261610"/>
+          </a:xfrm>
+          <a:prstGeom prst="rect">
+            <a:avLst/>
+          </a:prstGeom>
+          <a:noFill/>
+        </p:spPr>
+        <p:txBody>
+          <a:bodyPr wrap="square" rtlCol="0">
+            <a:spAutoFit/>
+          </a:bodyPr>
+          <a:lstStyle/>
+          <a:p>
+            <a:r>
+              <a:rPr lang="en-US" sz="1100" b="1" dirty="0"/>
+              <a:t>Building Floor Environment Coordinate System </a:t>
+            </a:r>
+            <a:endParaRPr lang="en-SG" sz="1100" b="1" dirty="0"/>
+          </a:p>
+        </p:txBody>
+      </p:sp>
+      <p:sp>
+        <p:nvSpPr>
+          <p:cNvPr id="9" name="TextBox 8">
+            <a:extLst>
+              <a:ext uri="{FF2B5EF4-FFF2-40B4-BE49-F238E27FC236}">
+                <a16:creationId xmlns:a16="http://schemas.microsoft.com/office/drawing/2014/main" id="{24D48110-3F0A-6F4E-16A0-B321E77AB2CB}"/>
+              </a:ext>
+            </a:extLst>
+          </p:cNvPr>
+          <p:cNvSpPr txBox="1"/>
+          <p:nvPr/>
+        </p:nvSpPr>
+        <p:spPr>
+          <a:xfrm>
+            <a:off x="5554334" y="363835"/>
+            <a:ext cx="3166721" cy="261610"/>
+          </a:xfrm>
+          <a:prstGeom prst="rect">
+            <a:avLst/>
+          </a:prstGeom>
+          <a:noFill/>
+        </p:spPr>
+        <p:txBody>
+          <a:bodyPr wrap="square" rtlCol="0">
+            <a:spAutoFit/>
+          </a:bodyPr>
+          <a:lstStyle/>
+          <a:p>
+            <a:r>
+              <a:rPr lang="en-US" sz="1100" b="1" dirty="0"/>
+              <a:t>Building Floor Environment Map Matrix</a:t>
+            </a:r>
+            <a:endParaRPr lang="en-SG" sz="1100" b="1" dirty="0"/>
+          </a:p>
+        </p:txBody>
+      </p:sp>
+      <p:pic>
+        <p:nvPicPr>
+          <p:cNvPr id="10" name="Picture 9">
+            <a:extLst>
+              <a:ext uri="{FF2B5EF4-FFF2-40B4-BE49-F238E27FC236}">
+                <a16:creationId xmlns:a16="http://schemas.microsoft.com/office/drawing/2014/main" id="{37B2CABF-7CB2-B88A-27C6-BA7E161DE817}"/>
+              </a:ext>
+            </a:extLst>
+          </p:cNvPr>
+          <p:cNvPicPr>
+            <a:picLocks noChangeAspect="1"/>
+          </p:cNvPicPr>
+          <p:nvPr/>
+        </p:nvPicPr>
+        <p:blipFill>
+          <a:blip r:embed="rId4"/>
+          <a:stretch>
+            <a:fillRect/>
+          </a:stretch>
+        </p:blipFill>
+        <p:spPr>
+          <a:xfrm rot="10800000">
+            <a:off x="1253292" y="4735118"/>
+            <a:ext cx="1175085" cy="924335"/>
+          </a:xfrm>
+          <a:prstGeom prst="rect">
+            <a:avLst/>
+          </a:prstGeom>
+        </p:spPr>
+      </p:pic>
+      <p:pic>
+        <p:nvPicPr>
+          <p:cNvPr id="11" name="Picture 10">
+            <a:extLst>
+              <a:ext uri="{FF2B5EF4-FFF2-40B4-BE49-F238E27FC236}">
+                <a16:creationId xmlns:a16="http://schemas.microsoft.com/office/drawing/2014/main" id="{DB8D2E4F-1FD9-233D-C927-485858BE9A0D}"/>
+              </a:ext>
+            </a:extLst>
+          </p:cNvPr>
+          <p:cNvPicPr>
+            <a:picLocks noChangeAspect="1"/>
+          </p:cNvPicPr>
+          <p:nvPr/>
+        </p:nvPicPr>
+        <p:blipFill>
+          <a:blip r:embed="rId5"/>
+          <a:stretch>
+            <a:fillRect/>
+          </a:stretch>
+        </p:blipFill>
+        <p:spPr>
+          <a:xfrm flipV="1">
+            <a:off x="2357334" y="4710859"/>
+            <a:ext cx="203148" cy="291179"/>
+          </a:xfrm>
+          <a:prstGeom prst="rect">
+            <a:avLst/>
+          </a:prstGeom>
+        </p:spPr>
+      </p:pic>
+      <p:pic>
+        <p:nvPicPr>
+          <p:cNvPr id="12" name="Picture 11">
+            <a:extLst>
+              <a:ext uri="{FF2B5EF4-FFF2-40B4-BE49-F238E27FC236}">
+                <a16:creationId xmlns:a16="http://schemas.microsoft.com/office/drawing/2014/main" id="{0CA79632-A20C-E004-C911-3E8C6E91D011}"/>
+              </a:ext>
+            </a:extLst>
+          </p:cNvPr>
+          <p:cNvPicPr>
+            <a:picLocks noChangeAspect="1"/>
+          </p:cNvPicPr>
+          <p:nvPr/>
+        </p:nvPicPr>
+        <p:blipFill>
+          <a:blip r:embed="rId6"/>
+          <a:stretch>
+            <a:fillRect/>
+          </a:stretch>
+        </p:blipFill>
+        <p:spPr>
+          <a:xfrm>
+            <a:off x="2248657" y="5394259"/>
+            <a:ext cx="331491" cy="265193"/>
+          </a:xfrm>
+          <a:prstGeom prst="rect">
+            <a:avLst/>
+          </a:prstGeom>
+        </p:spPr>
+      </p:pic>
+      <p:pic>
+        <p:nvPicPr>
+          <p:cNvPr id="13" name="Graphic 12" descr="Web cam with solid fill">
+            <a:extLst>
+              <a:ext uri="{FF2B5EF4-FFF2-40B4-BE49-F238E27FC236}">
+                <a16:creationId xmlns:a16="http://schemas.microsoft.com/office/drawing/2014/main" id="{9740ECDB-858F-0A0E-B660-CDEED3AA798C}"/>
+              </a:ext>
+            </a:extLst>
+          </p:cNvPr>
+          <p:cNvPicPr>
+            <a:picLocks noChangeAspect="1"/>
+          </p:cNvPicPr>
+          <p:nvPr/>
+        </p:nvPicPr>
+        <p:blipFill>
+          <a:blip r:embed="rId7">
+            <a:extLst>
+              <a:ext uri="{96DAC541-7B7A-43D3-8B79-37D633B846F1}">
+                <asvg:svgBlip xmlns:asvg="http://schemas.microsoft.com/office/drawing/2016/SVG/main" r:embed="rId8"/>
+              </a:ext>
+            </a:extLst>
+          </a:blip>
+          <a:stretch>
+            <a:fillRect/>
+          </a:stretch>
+        </p:blipFill>
+        <p:spPr>
+          <a:xfrm>
+            <a:off x="2179525" y="4977779"/>
+            <a:ext cx="400623" cy="400623"/>
+          </a:xfrm>
+          <a:prstGeom prst="rect">
+            <a:avLst/>
+          </a:prstGeom>
+        </p:spPr>
+      </p:pic>
+      <p:sp>
+        <p:nvSpPr>
+          <p:cNvPr id="16" name="TextBox 15">
+            <a:extLst>
+              <a:ext uri="{FF2B5EF4-FFF2-40B4-BE49-F238E27FC236}">
+                <a16:creationId xmlns:a16="http://schemas.microsoft.com/office/drawing/2014/main" id="{154D9DCD-2179-CE66-E710-2F9AD6E493B7}"/>
+              </a:ext>
+            </a:extLst>
+          </p:cNvPr>
+          <p:cNvSpPr txBox="1"/>
+          <p:nvPr/>
+        </p:nvSpPr>
+        <p:spPr>
+          <a:xfrm>
+            <a:off x="5554334" y="4612007"/>
+            <a:ext cx="322066" cy="246221"/>
+          </a:xfrm>
+          <a:prstGeom prst="rect">
+            <a:avLst/>
+          </a:prstGeom>
+          <a:noFill/>
+        </p:spPr>
+        <p:txBody>
+          <a:bodyPr wrap="square" rtlCol="0">
+            <a:spAutoFit/>
+          </a:bodyPr>
+          <a:lstStyle/>
+          <a:p>
+            <a:r>
+              <a:rPr lang="en-US" sz="1000" b="1" dirty="0"/>
+              <a:t>10</a:t>
+            </a:r>
+            <a:endParaRPr lang="en-SG" sz="1000" b="1" dirty="0"/>
+          </a:p>
+        </p:txBody>
+      </p:sp>
+      <p:sp>
+        <p:nvSpPr>
+          <p:cNvPr id="17" name="TextBox 16">
+            <a:extLst>
+              <a:ext uri="{FF2B5EF4-FFF2-40B4-BE49-F238E27FC236}">
+                <a16:creationId xmlns:a16="http://schemas.microsoft.com/office/drawing/2014/main" id="{64F0A0B2-488D-063B-B064-5E32BDB28F67}"/>
+              </a:ext>
+            </a:extLst>
+          </p:cNvPr>
+          <p:cNvSpPr txBox="1"/>
+          <p:nvPr/>
+        </p:nvSpPr>
+        <p:spPr>
+          <a:xfrm>
+            <a:off x="5554334" y="4755817"/>
+            <a:ext cx="322066" cy="246221"/>
+          </a:xfrm>
+          <a:prstGeom prst="rect">
+            <a:avLst/>
+          </a:prstGeom>
+          <a:noFill/>
+        </p:spPr>
+        <p:txBody>
+          <a:bodyPr wrap="square" rtlCol="0">
+            <a:spAutoFit/>
+          </a:bodyPr>
+          <a:lstStyle/>
+          <a:p>
+            <a:r>
+              <a:rPr lang="en-US" sz="1000" b="1" dirty="0"/>
+              <a:t>10</a:t>
+            </a:r>
+            <a:endParaRPr lang="en-SG" sz="1000" b="1" dirty="0"/>
+          </a:p>
+        </p:txBody>
+      </p:sp>
+      <p:sp>
+        <p:nvSpPr>
+          <p:cNvPr id="18" name="TextBox 17">
+            <a:extLst>
+              <a:ext uri="{FF2B5EF4-FFF2-40B4-BE49-F238E27FC236}">
+                <a16:creationId xmlns:a16="http://schemas.microsoft.com/office/drawing/2014/main" id="{1D9D6A5A-2AAD-D822-38E3-58C8A6D783E9}"/>
+              </a:ext>
+            </a:extLst>
+          </p:cNvPr>
+          <p:cNvSpPr txBox="1"/>
+          <p:nvPr/>
+        </p:nvSpPr>
+        <p:spPr>
+          <a:xfrm>
+            <a:off x="5554334" y="4878927"/>
+            <a:ext cx="322066" cy="246221"/>
+          </a:xfrm>
+          <a:prstGeom prst="rect">
+            <a:avLst/>
+          </a:prstGeom>
+          <a:noFill/>
+        </p:spPr>
+        <p:txBody>
+          <a:bodyPr wrap="square" rtlCol="0">
+            <a:spAutoFit/>
+          </a:bodyPr>
+          <a:lstStyle/>
+          <a:p>
+            <a:r>
+              <a:rPr lang="en-US" sz="1000" b="1" dirty="0"/>
+              <a:t>10</a:t>
+            </a:r>
+            <a:endParaRPr lang="en-SG" sz="1000" b="1" dirty="0"/>
+          </a:p>
+        </p:txBody>
+      </p:sp>
+      <p:sp>
+        <p:nvSpPr>
+          <p:cNvPr id="19" name="TextBox 18">
+            <a:extLst>
+              <a:ext uri="{FF2B5EF4-FFF2-40B4-BE49-F238E27FC236}">
+                <a16:creationId xmlns:a16="http://schemas.microsoft.com/office/drawing/2014/main" id="{06A93D21-DEEA-A494-8F83-25FF278BB3FF}"/>
+              </a:ext>
+            </a:extLst>
+          </p:cNvPr>
+          <p:cNvSpPr txBox="1"/>
+          <p:nvPr/>
+        </p:nvSpPr>
+        <p:spPr>
+          <a:xfrm>
+            <a:off x="5554334" y="5022737"/>
+            <a:ext cx="322066" cy="246221"/>
+          </a:xfrm>
+          <a:prstGeom prst="rect">
+            <a:avLst/>
+          </a:prstGeom>
+          <a:noFill/>
+        </p:spPr>
+        <p:txBody>
+          <a:bodyPr wrap="square" rtlCol="0">
+            <a:spAutoFit/>
+          </a:bodyPr>
+          <a:lstStyle/>
+          <a:p>
+            <a:r>
+              <a:rPr lang="en-US" sz="1000" b="1" dirty="0"/>
+              <a:t>10</a:t>
+            </a:r>
+            <a:endParaRPr lang="en-SG" sz="1000" b="1" dirty="0"/>
+          </a:p>
+        </p:txBody>
+      </p:sp>
+      <p:sp>
+        <p:nvSpPr>
+          <p:cNvPr id="20" name="TextBox 19">
+            <a:extLst>
+              <a:ext uri="{FF2B5EF4-FFF2-40B4-BE49-F238E27FC236}">
+                <a16:creationId xmlns:a16="http://schemas.microsoft.com/office/drawing/2014/main" id="{187FA17A-DF28-4B9D-8B12-AEC68EC71651}"/>
+              </a:ext>
+            </a:extLst>
+          </p:cNvPr>
+          <p:cNvSpPr txBox="1"/>
+          <p:nvPr/>
+        </p:nvSpPr>
+        <p:spPr>
+          <a:xfrm>
+            <a:off x="5554334" y="5157191"/>
+            <a:ext cx="322066" cy="246221"/>
+          </a:xfrm>
+          <a:prstGeom prst="rect">
+            <a:avLst/>
+          </a:prstGeom>
+          <a:noFill/>
+        </p:spPr>
+        <p:txBody>
+          <a:bodyPr wrap="square" rtlCol="0">
+            <a:spAutoFit/>
+          </a:bodyPr>
+          <a:lstStyle/>
+          <a:p>
+            <a:r>
+              <a:rPr lang="en-US" sz="1000" b="1" dirty="0"/>
+              <a:t>10</a:t>
+            </a:r>
+            <a:endParaRPr lang="en-SG" sz="1000" b="1" dirty="0"/>
+          </a:p>
+        </p:txBody>
+      </p:sp>
+      <p:sp>
+        <p:nvSpPr>
+          <p:cNvPr id="21" name="TextBox 20">
+            <a:extLst>
+              <a:ext uri="{FF2B5EF4-FFF2-40B4-BE49-F238E27FC236}">
+                <a16:creationId xmlns:a16="http://schemas.microsoft.com/office/drawing/2014/main" id="{293F3D9A-84DC-281E-4983-FD4E1E5E9BB5}"/>
+              </a:ext>
+            </a:extLst>
+          </p:cNvPr>
+          <p:cNvSpPr txBox="1"/>
+          <p:nvPr/>
+        </p:nvSpPr>
+        <p:spPr>
+          <a:xfrm>
+            <a:off x="5554334" y="5268958"/>
+            <a:ext cx="322066" cy="246221"/>
+          </a:xfrm>
+          <a:prstGeom prst="rect">
+            <a:avLst/>
+          </a:prstGeom>
+          <a:noFill/>
+        </p:spPr>
+        <p:txBody>
+          <a:bodyPr wrap="square" rtlCol="0">
+            <a:spAutoFit/>
+          </a:bodyPr>
+          <a:lstStyle/>
+          <a:p>
+            <a:r>
+              <a:rPr lang="en-US" sz="1000" b="1" dirty="0"/>
+              <a:t>10</a:t>
+            </a:r>
+            <a:endParaRPr lang="en-SG" sz="1000" b="1" dirty="0"/>
+          </a:p>
+        </p:txBody>
+      </p:sp>
+      <p:sp>
+        <p:nvSpPr>
+          <p:cNvPr id="22" name="TextBox 21">
+            <a:extLst>
+              <a:ext uri="{FF2B5EF4-FFF2-40B4-BE49-F238E27FC236}">
+                <a16:creationId xmlns:a16="http://schemas.microsoft.com/office/drawing/2014/main" id="{D3FA71EC-C979-B5C2-ECA9-316D33CB9DDD}"/>
+              </a:ext>
+            </a:extLst>
+          </p:cNvPr>
+          <p:cNvSpPr txBox="1"/>
+          <p:nvPr/>
+        </p:nvSpPr>
+        <p:spPr>
+          <a:xfrm>
+            <a:off x="5554334" y="5383595"/>
+            <a:ext cx="322066" cy="246221"/>
+          </a:xfrm>
+          <a:prstGeom prst="rect">
+            <a:avLst/>
+          </a:prstGeom>
+          <a:noFill/>
+        </p:spPr>
+        <p:txBody>
+          <a:bodyPr wrap="square" rtlCol="0">
+            <a:spAutoFit/>
+          </a:bodyPr>
+          <a:lstStyle/>
+          <a:p>
+            <a:r>
+              <a:rPr lang="en-US" sz="1000" b="1" dirty="0"/>
+              <a:t>10</a:t>
+            </a:r>
+            <a:endParaRPr lang="en-SG" sz="1000" b="1" dirty="0"/>
+          </a:p>
+        </p:txBody>
+      </p:sp>
+      <p:sp>
+        <p:nvSpPr>
+          <p:cNvPr id="23" name="TextBox 22">
+            <a:extLst>
+              <a:ext uri="{FF2B5EF4-FFF2-40B4-BE49-F238E27FC236}">
+                <a16:creationId xmlns:a16="http://schemas.microsoft.com/office/drawing/2014/main" id="{80141C7C-5143-AD98-2148-32A637925225}"/>
+              </a:ext>
+            </a:extLst>
+          </p:cNvPr>
+          <p:cNvSpPr txBox="1"/>
+          <p:nvPr/>
+        </p:nvSpPr>
+        <p:spPr>
+          <a:xfrm>
+            <a:off x="5554334" y="5507867"/>
+            <a:ext cx="322066" cy="246221"/>
+          </a:xfrm>
+          <a:prstGeom prst="rect">
+            <a:avLst/>
+          </a:prstGeom>
+          <a:noFill/>
+        </p:spPr>
+        <p:txBody>
+          <a:bodyPr wrap="square" rtlCol="0">
+            <a:spAutoFit/>
+          </a:bodyPr>
+          <a:lstStyle/>
+          <a:p>
+            <a:r>
+              <a:rPr lang="en-US" sz="1000" b="1" dirty="0"/>
+              <a:t>10</a:t>
+            </a:r>
+            <a:endParaRPr lang="en-SG" sz="1000" b="1" dirty="0"/>
+          </a:p>
+        </p:txBody>
+      </p:sp>
+      <p:sp>
+        <p:nvSpPr>
+          <p:cNvPr id="24" name="TextBox 23">
+            <a:extLst>
+              <a:ext uri="{FF2B5EF4-FFF2-40B4-BE49-F238E27FC236}">
+                <a16:creationId xmlns:a16="http://schemas.microsoft.com/office/drawing/2014/main" id="{2BC1AB3B-85D9-5B9E-2F58-8AE2E828A66C}"/>
+              </a:ext>
+            </a:extLst>
+          </p:cNvPr>
+          <p:cNvSpPr txBox="1"/>
+          <p:nvPr/>
+        </p:nvSpPr>
+        <p:spPr>
+          <a:xfrm>
+            <a:off x="5554334" y="5630977"/>
+            <a:ext cx="322066" cy="246221"/>
+          </a:xfrm>
+          <a:prstGeom prst="rect">
+            <a:avLst/>
+          </a:prstGeom>
+          <a:noFill/>
+        </p:spPr>
+        <p:txBody>
+          <a:bodyPr wrap="square" rtlCol="0">
+            <a:spAutoFit/>
+          </a:bodyPr>
+          <a:lstStyle/>
+          <a:p>
+            <a:r>
+              <a:rPr lang="en-US" sz="1000" b="1" dirty="0"/>
+              <a:t>10</a:t>
+            </a:r>
+            <a:endParaRPr lang="en-SG" sz="1000" b="1" dirty="0"/>
+          </a:p>
+        </p:txBody>
+      </p:sp>
+      <p:sp>
+        <p:nvSpPr>
+          <p:cNvPr id="25" name="TextBox 24">
+            <a:extLst>
+              <a:ext uri="{FF2B5EF4-FFF2-40B4-BE49-F238E27FC236}">
+                <a16:creationId xmlns:a16="http://schemas.microsoft.com/office/drawing/2014/main" id="{2A0AF00F-1DD4-30F8-C0B5-ABCA35B0F4F8}"/>
+              </a:ext>
+            </a:extLst>
+          </p:cNvPr>
+          <p:cNvSpPr txBox="1"/>
+          <p:nvPr/>
+        </p:nvSpPr>
+        <p:spPr>
+          <a:xfrm>
+            <a:off x="2267716" y="4326102"/>
+            <a:ext cx="2429127" cy="261610"/>
+          </a:xfrm>
+          <a:prstGeom prst="rect">
+            <a:avLst/>
+          </a:prstGeom>
+          <a:noFill/>
+        </p:spPr>
+        <p:txBody>
+          <a:bodyPr wrap="square" rtlCol="0">
+            <a:spAutoFit/>
+          </a:bodyPr>
+          <a:lstStyle/>
+          <a:p>
+            <a:r>
+              <a:rPr lang="en-US" sz="1100" b="1" dirty="0"/>
+              <a:t>Robot Front Sonar</a:t>
+            </a:r>
+            <a:endParaRPr lang="en-SG" sz="1100" b="1" dirty="0"/>
+          </a:p>
+        </p:txBody>
+      </p:sp>
+      <p:cxnSp>
+        <p:nvCxnSpPr>
+          <p:cNvPr id="27" name="Straight Arrow Connector 26">
+            <a:extLst>
+              <a:ext uri="{FF2B5EF4-FFF2-40B4-BE49-F238E27FC236}">
+                <a16:creationId xmlns:a16="http://schemas.microsoft.com/office/drawing/2014/main" id="{04E8F233-8A4D-7986-0389-A6F6BF651A4B}"/>
+              </a:ext>
+            </a:extLst>
+          </p:cNvPr>
+          <p:cNvCxnSpPr>
+            <a:cxnSpLocks/>
+            <a:endCxn id="11" idx="2"/>
+          </p:cNvCxnSpPr>
+          <p:nvPr/>
+        </p:nvCxnSpPr>
+        <p:spPr>
+          <a:xfrm>
+            <a:off x="2458908" y="4543830"/>
+            <a:ext cx="0" cy="167029"/>
+          </a:xfrm>
+          <a:prstGeom prst="straightConnector1">
+            <a:avLst/>
+          </a:prstGeom>
+          <a:ln>
+            <a:tailEnd type="triangle"/>
+          </a:ln>
+        </p:spPr>
+        <p:style>
+          <a:lnRef idx="2">
+            <a:schemeClr val="accent1"/>
+          </a:lnRef>
+          <a:fillRef idx="0">
+            <a:schemeClr val="accent1"/>
+          </a:fillRef>
+          <a:effectRef idx="1">
+            <a:schemeClr val="accent1"/>
+          </a:effectRef>
+          <a:fontRef idx="minor">
+            <a:schemeClr val="tx1"/>
+          </a:fontRef>
+        </p:style>
+      </p:cxnSp>
+      <p:sp>
+        <p:nvSpPr>
+          <p:cNvPr id="29" name="TextBox 28">
+            <a:extLst>
+              <a:ext uri="{FF2B5EF4-FFF2-40B4-BE49-F238E27FC236}">
+                <a16:creationId xmlns:a16="http://schemas.microsoft.com/office/drawing/2014/main" id="{5C1650AF-09FF-B232-78DD-15115E7C92C5}"/>
+              </a:ext>
+            </a:extLst>
+          </p:cNvPr>
+          <p:cNvSpPr txBox="1"/>
+          <p:nvPr/>
+        </p:nvSpPr>
+        <p:spPr>
+          <a:xfrm>
+            <a:off x="1762104" y="4153763"/>
+            <a:ext cx="1304595" cy="261610"/>
+          </a:xfrm>
+          <a:prstGeom prst="rect">
+            <a:avLst/>
+          </a:prstGeom>
+          <a:noFill/>
+        </p:spPr>
+        <p:txBody>
+          <a:bodyPr wrap="square" rtlCol="0">
+            <a:spAutoFit/>
+          </a:bodyPr>
+          <a:lstStyle/>
+          <a:p>
+            <a:r>
+              <a:rPr lang="en-US" sz="1100" b="1" dirty="0"/>
+              <a:t>Robot Camera</a:t>
+            </a:r>
+            <a:endParaRPr lang="en-SG" sz="1100" b="1" dirty="0"/>
+          </a:p>
+        </p:txBody>
+      </p:sp>
+      <p:cxnSp>
+        <p:nvCxnSpPr>
+          <p:cNvPr id="31" name="Connector: Elbow 30">
+            <a:extLst>
+              <a:ext uri="{FF2B5EF4-FFF2-40B4-BE49-F238E27FC236}">
+                <a16:creationId xmlns:a16="http://schemas.microsoft.com/office/drawing/2014/main" id="{4D24987D-31ED-7EF4-578A-F4B899F1D079}"/>
+              </a:ext>
+            </a:extLst>
+          </p:cNvPr>
+          <p:cNvCxnSpPr>
+            <a:cxnSpLocks/>
+            <a:endCxn id="13" idx="1"/>
+          </p:cNvCxnSpPr>
+          <p:nvPr/>
+        </p:nvCxnSpPr>
+        <p:spPr>
+          <a:xfrm rot="16200000" flipH="1">
+            <a:off x="1735399" y="4733965"/>
+            <a:ext cx="762718" cy="125534"/>
+          </a:xfrm>
+          <a:prstGeom prst="bentConnector2">
+            <a:avLst/>
+          </a:prstGeom>
+          <a:ln>
+            <a:tailEnd type="triangle"/>
+          </a:ln>
+        </p:spPr>
+        <p:style>
+          <a:lnRef idx="2">
+            <a:schemeClr val="accent1"/>
+          </a:lnRef>
+          <a:fillRef idx="0">
+            <a:schemeClr val="accent1"/>
+          </a:fillRef>
+          <a:effectRef idx="1">
+            <a:schemeClr val="accent1"/>
+          </a:effectRef>
+          <a:fontRef idx="minor">
+            <a:schemeClr val="tx1"/>
+          </a:fontRef>
+        </p:style>
+      </p:cxnSp>
+      <p:sp>
+        <p:nvSpPr>
+          <p:cNvPr id="35" name="TextBox 34">
+            <a:extLst>
+              <a:ext uri="{FF2B5EF4-FFF2-40B4-BE49-F238E27FC236}">
+                <a16:creationId xmlns:a16="http://schemas.microsoft.com/office/drawing/2014/main" id="{75190051-51A2-E224-4BD4-7156D87383CE}"/>
+              </a:ext>
+            </a:extLst>
+          </p:cNvPr>
+          <p:cNvSpPr txBox="1"/>
+          <p:nvPr/>
+        </p:nvSpPr>
+        <p:spPr>
+          <a:xfrm>
+            <a:off x="1444191" y="3917086"/>
+            <a:ext cx="2429127" cy="261610"/>
+          </a:xfrm>
+          <a:prstGeom prst="rect">
+            <a:avLst/>
+          </a:prstGeom>
+          <a:noFill/>
+        </p:spPr>
+        <p:txBody>
+          <a:bodyPr wrap="square" rtlCol="0">
+            <a:spAutoFit/>
+          </a:bodyPr>
+          <a:lstStyle/>
+          <a:p>
+            <a:r>
+              <a:rPr lang="en-US" sz="1100" b="1" dirty="0"/>
+              <a:t>Robot Front Lidar</a:t>
+            </a:r>
+            <a:endParaRPr lang="en-SG" sz="1100" b="1" dirty="0"/>
+          </a:p>
+        </p:txBody>
+      </p:sp>
+      <p:cxnSp>
+        <p:nvCxnSpPr>
+          <p:cNvPr id="36" name="Connector: Elbow 35">
+            <a:extLst>
+              <a:ext uri="{FF2B5EF4-FFF2-40B4-BE49-F238E27FC236}">
+                <a16:creationId xmlns:a16="http://schemas.microsoft.com/office/drawing/2014/main" id="{FD6D6AAB-4FEB-1C1A-5F5E-0B4BF900BD98}"/>
+              </a:ext>
+            </a:extLst>
+          </p:cNvPr>
+          <p:cNvCxnSpPr>
+            <a:cxnSpLocks/>
+            <a:endCxn id="12" idx="1"/>
+          </p:cNvCxnSpPr>
+          <p:nvPr/>
+        </p:nvCxnSpPr>
+        <p:spPr>
+          <a:xfrm rot="16200000" flipH="1">
+            <a:off x="1306989" y="4585188"/>
+            <a:ext cx="1373096" cy="510240"/>
+          </a:xfrm>
+          <a:prstGeom prst="bentConnector2">
+            <a:avLst/>
+          </a:prstGeom>
+          <a:ln>
+            <a:tailEnd type="triangle"/>
+          </a:ln>
+        </p:spPr>
+        <p:style>
+          <a:lnRef idx="2">
+            <a:schemeClr val="accent1"/>
+          </a:lnRef>
+          <a:fillRef idx="0">
+            <a:schemeClr val="accent1"/>
+          </a:fillRef>
+          <a:effectRef idx="1">
+            <a:schemeClr val="accent1"/>
+          </a:effectRef>
+          <a:fontRef idx="minor">
+            <a:schemeClr val="tx1"/>
+          </a:fontRef>
+        </p:style>
+      </p:cxnSp>
+      <p:cxnSp>
+        <p:nvCxnSpPr>
+          <p:cNvPr id="39" name="Straight Arrow Connector 38">
+            <a:extLst>
+              <a:ext uri="{FF2B5EF4-FFF2-40B4-BE49-F238E27FC236}">
+                <a16:creationId xmlns:a16="http://schemas.microsoft.com/office/drawing/2014/main" id="{2363E970-8355-43ED-44C2-C8AAA5836496}"/>
+              </a:ext>
+            </a:extLst>
+          </p:cNvPr>
+          <p:cNvCxnSpPr>
+            <a:cxnSpLocks/>
+          </p:cNvCxnSpPr>
+          <p:nvPr/>
+        </p:nvCxnSpPr>
+        <p:spPr>
+          <a:xfrm>
+            <a:off x="5715367" y="4468038"/>
+            <a:ext cx="0" cy="167029"/>
+          </a:xfrm>
+          <a:prstGeom prst="straightConnector1">
+            <a:avLst/>
+          </a:prstGeom>
+          <a:ln>
+            <a:tailEnd type="triangle"/>
+          </a:ln>
+        </p:spPr>
+        <p:style>
+          <a:lnRef idx="2">
+            <a:schemeClr val="accent1"/>
+          </a:lnRef>
+          <a:fillRef idx="0">
+            <a:schemeClr val="accent1"/>
+          </a:fillRef>
+          <a:effectRef idx="1">
+            <a:schemeClr val="accent1"/>
+          </a:effectRef>
+          <a:fontRef idx="minor">
+            <a:schemeClr val="tx1"/>
+          </a:fontRef>
+        </p:style>
+      </p:cxnSp>
+      <p:sp>
+        <p:nvSpPr>
+          <p:cNvPr id="40" name="TextBox 39">
+            <a:extLst>
+              <a:ext uri="{FF2B5EF4-FFF2-40B4-BE49-F238E27FC236}">
+                <a16:creationId xmlns:a16="http://schemas.microsoft.com/office/drawing/2014/main" id="{6C3DDE6B-5996-2853-C99A-A74AB1B9B075}"/>
+              </a:ext>
+            </a:extLst>
+          </p:cNvPr>
+          <p:cNvSpPr txBox="1"/>
+          <p:nvPr/>
+        </p:nvSpPr>
+        <p:spPr>
+          <a:xfrm>
+            <a:off x="5428614" y="4081920"/>
+            <a:ext cx="1088989" cy="400110"/>
+          </a:xfrm>
+          <a:prstGeom prst="rect">
+            <a:avLst/>
+          </a:prstGeom>
+          <a:noFill/>
+        </p:spPr>
+        <p:txBody>
+          <a:bodyPr wrap="square" rtlCol="0">
+            <a:spAutoFit/>
+          </a:bodyPr>
+          <a:lstStyle/>
+          <a:p>
+            <a:r>
+              <a:rPr lang="en-US" sz="1000" b="1" dirty="0">
+                <a:solidFill>
+                  <a:schemeClr val="accent6">
+                    <a:lumMod val="75000"/>
+                  </a:schemeClr>
+                </a:solidFill>
+              </a:rPr>
+              <a:t>Glass door area in matrix </a:t>
+            </a:r>
+            <a:endParaRPr lang="en-SG" sz="1000" b="1" dirty="0">
+              <a:solidFill>
+                <a:schemeClr val="accent6">
+                  <a:lumMod val="75000"/>
+                </a:schemeClr>
+              </a:solidFill>
+            </a:endParaRPr>
+          </a:p>
+        </p:txBody>
+      </p:sp>
+      <p:cxnSp>
+        <p:nvCxnSpPr>
+          <p:cNvPr id="42" name="Straight Arrow Connector 41">
+            <a:extLst>
+              <a:ext uri="{FF2B5EF4-FFF2-40B4-BE49-F238E27FC236}">
+                <a16:creationId xmlns:a16="http://schemas.microsoft.com/office/drawing/2014/main" id="{E15A4AD0-38FC-456D-8395-20CE05C44291}"/>
+              </a:ext>
+            </a:extLst>
+          </p:cNvPr>
+          <p:cNvCxnSpPr>
+            <a:stCxn id="11" idx="3"/>
+          </p:cNvCxnSpPr>
+          <p:nvPr/>
+        </p:nvCxnSpPr>
+        <p:spPr>
+          <a:xfrm>
+            <a:off x="2560482" y="4856448"/>
+            <a:ext cx="2993852" cy="0"/>
+          </a:xfrm>
+          <a:prstGeom prst="straightConnector1">
+            <a:avLst/>
+          </a:prstGeom>
+          <a:ln w="12700">
+            <a:prstDash val="sysDash"/>
+            <a:tailEnd type="triangle"/>
+          </a:ln>
+        </p:spPr>
+        <p:style>
+          <a:lnRef idx="2">
+            <a:schemeClr val="accent1"/>
+          </a:lnRef>
+          <a:fillRef idx="0">
+            <a:schemeClr val="accent1"/>
+          </a:fillRef>
+          <a:effectRef idx="1">
+            <a:schemeClr val="accent1"/>
+          </a:effectRef>
+          <a:fontRef idx="minor">
+            <a:schemeClr val="tx1"/>
+          </a:fontRef>
+        </p:style>
+      </p:cxnSp>
+      <p:sp>
+        <p:nvSpPr>
+          <p:cNvPr id="43" name="TextBox 42">
+            <a:extLst>
+              <a:ext uri="{FF2B5EF4-FFF2-40B4-BE49-F238E27FC236}">
+                <a16:creationId xmlns:a16="http://schemas.microsoft.com/office/drawing/2014/main" id="{36E1858D-BD4B-D664-6E11-85EC209C22D1}"/>
+              </a:ext>
+            </a:extLst>
+          </p:cNvPr>
+          <p:cNvSpPr txBox="1"/>
+          <p:nvPr/>
+        </p:nvSpPr>
+        <p:spPr>
+          <a:xfrm>
+            <a:off x="6154569" y="5291298"/>
+            <a:ext cx="416828" cy="246221"/>
+          </a:xfrm>
+          <a:prstGeom prst="rect">
+            <a:avLst/>
+          </a:prstGeom>
+          <a:noFill/>
+        </p:spPr>
+        <p:txBody>
+          <a:bodyPr wrap="square" rtlCol="0">
+            <a:spAutoFit/>
+          </a:bodyPr>
+          <a:lstStyle/>
+          <a:p>
+            <a:r>
+              <a:rPr lang="en-US" sz="1000" b="1" dirty="0"/>
+              <a:t>100</a:t>
+            </a:r>
+            <a:endParaRPr lang="en-SG" sz="1000" b="1" dirty="0"/>
+          </a:p>
+        </p:txBody>
+      </p:sp>
+      <p:sp>
+        <p:nvSpPr>
+          <p:cNvPr id="44" name="TextBox 43">
+            <a:extLst>
+              <a:ext uri="{FF2B5EF4-FFF2-40B4-BE49-F238E27FC236}">
+                <a16:creationId xmlns:a16="http://schemas.microsoft.com/office/drawing/2014/main" id="{78B5A045-BB07-87FE-6112-5667973459DC}"/>
+              </a:ext>
+            </a:extLst>
+          </p:cNvPr>
+          <p:cNvSpPr txBox="1"/>
+          <p:nvPr/>
+        </p:nvSpPr>
+        <p:spPr>
+          <a:xfrm>
+            <a:off x="6154569" y="5414408"/>
+            <a:ext cx="416828" cy="246221"/>
+          </a:xfrm>
+          <a:prstGeom prst="rect">
+            <a:avLst/>
+          </a:prstGeom>
+          <a:noFill/>
+        </p:spPr>
+        <p:txBody>
+          <a:bodyPr wrap="square" rtlCol="0">
+            <a:spAutoFit/>
+          </a:bodyPr>
+          <a:lstStyle/>
+          <a:p>
+            <a:r>
+              <a:rPr lang="en-US" sz="1000" b="1" dirty="0"/>
+              <a:t>100</a:t>
+            </a:r>
+            <a:endParaRPr lang="en-SG" sz="1000" b="1" dirty="0"/>
+          </a:p>
+        </p:txBody>
+      </p:sp>
+      <p:sp>
+        <p:nvSpPr>
+          <p:cNvPr id="45" name="TextBox 44">
+            <a:extLst>
+              <a:ext uri="{FF2B5EF4-FFF2-40B4-BE49-F238E27FC236}">
+                <a16:creationId xmlns:a16="http://schemas.microsoft.com/office/drawing/2014/main" id="{F23A762A-62C5-F28B-43FB-9E8C44DBAD03}"/>
+              </a:ext>
+            </a:extLst>
+          </p:cNvPr>
+          <p:cNvSpPr txBox="1"/>
+          <p:nvPr/>
+        </p:nvSpPr>
+        <p:spPr>
+          <a:xfrm>
+            <a:off x="6154569" y="5545686"/>
+            <a:ext cx="416828" cy="246221"/>
+          </a:xfrm>
+          <a:prstGeom prst="rect">
+            <a:avLst/>
+          </a:prstGeom>
+          <a:noFill/>
+        </p:spPr>
+        <p:txBody>
+          <a:bodyPr wrap="square" rtlCol="0">
+            <a:spAutoFit/>
+          </a:bodyPr>
+          <a:lstStyle/>
+          <a:p>
+            <a:r>
+              <a:rPr lang="en-US" sz="1000" b="1" dirty="0"/>
+              <a:t>100</a:t>
+            </a:r>
+            <a:endParaRPr lang="en-SG" sz="1000" b="1" dirty="0"/>
+          </a:p>
+        </p:txBody>
+      </p:sp>
+      <p:sp>
+        <p:nvSpPr>
+          <p:cNvPr id="46" name="TextBox 45">
+            <a:extLst>
+              <a:ext uri="{FF2B5EF4-FFF2-40B4-BE49-F238E27FC236}">
+                <a16:creationId xmlns:a16="http://schemas.microsoft.com/office/drawing/2014/main" id="{87EB05D6-D1D3-F0A7-2D07-691556A5D150}"/>
+              </a:ext>
+            </a:extLst>
+          </p:cNvPr>
+          <p:cNvSpPr txBox="1"/>
+          <p:nvPr/>
+        </p:nvSpPr>
+        <p:spPr>
+          <a:xfrm>
+            <a:off x="6154569" y="5668796"/>
+            <a:ext cx="416828" cy="246221"/>
+          </a:xfrm>
+          <a:prstGeom prst="rect">
+            <a:avLst/>
+          </a:prstGeom>
+          <a:noFill/>
+        </p:spPr>
+        <p:txBody>
+          <a:bodyPr wrap="square" rtlCol="0">
+            <a:spAutoFit/>
+          </a:bodyPr>
+          <a:lstStyle/>
+          <a:p>
+            <a:r>
+              <a:rPr lang="en-US" sz="1000" b="1" dirty="0"/>
+              <a:t>100</a:t>
+            </a:r>
+            <a:endParaRPr lang="en-SG" sz="1000" b="1" dirty="0"/>
+          </a:p>
+        </p:txBody>
+      </p:sp>
+      <p:sp>
+        <p:nvSpPr>
+          <p:cNvPr id="47" name="TextBox 46">
+            <a:extLst>
+              <a:ext uri="{FF2B5EF4-FFF2-40B4-BE49-F238E27FC236}">
+                <a16:creationId xmlns:a16="http://schemas.microsoft.com/office/drawing/2014/main" id="{6FB7DBAC-B633-2335-9283-6D2A8DC8101E}"/>
+              </a:ext>
+            </a:extLst>
+          </p:cNvPr>
+          <p:cNvSpPr txBox="1"/>
+          <p:nvPr/>
+        </p:nvSpPr>
+        <p:spPr>
+          <a:xfrm>
+            <a:off x="5554334" y="5749708"/>
+            <a:ext cx="322066" cy="246221"/>
+          </a:xfrm>
+          <a:prstGeom prst="rect">
+            <a:avLst/>
+          </a:prstGeom>
+          <a:noFill/>
+        </p:spPr>
+        <p:txBody>
+          <a:bodyPr wrap="square" rtlCol="0">
+            <a:spAutoFit/>
+          </a:bodyPr>
+          <a:lstStyle/>
+          <a:p>
+            <a:r>
+              <a:rPr lang="en-US" sz="1000" b="1" dirty="0"/>
+              <a:t>10</a:t>
+            </a:r>
+            <a:endParaRPr lang="en-SG" sz="1000" b="1" dirty="0"/>
+          </a:p>
+        </p:txBody>
+      </p:sp>
+      <p:sp>
+        <p:nvSpPr>
+          <p:cNvPr id="48" name="TextBox 47">
+            <a:extLst>
+              <a:ext uri="{FF2B5EF4-FFF2-40B4-BE49-F238E27FC236}">
+                <a16:creationId xmlns:a16="http://schemas.microsoft.com/office/drawing/2014/main" id="{931028E2-03FB-6F64-8394-F14010B7B133}"/>
+              </a:ext>
+            </a:extLst>
+          </p:cNvPr>
+          <p:cNvSpPr txBox="1"/>
+          <p:nvPr/>
+        </p:nvSpPr>
+        <p:spPr>
+          <a:xfrm>
+            <a:off x="3085163" y="4612122"/>
+            <a:ext cx="1812386" cy="246221"/>
+          </a:xfrm>
+          <a:prstGeom prst="rect">
+            <a:avLst/>
+          </a:prstGeom>
+          <a:noFill/>
+        </p:spPr>
+        <p:txBody>
+          <a:bodyPr wrap="square" rtlCol="0">
+            <a:spAutoFit/>
+          </a:bodyPr>
+          <a:lstStyle/>
+          <a:p>
+            <a:r>
+              <a:rPr lang="en-US" sz="1000" dirty="0"/>
+              <a:t>Sonar reflection distance</a:t>
+            </a:r>
+            <a:endParaRPr lang="en-SG" sz="1000" dirty="0"/>
+          </a:p>
+        </p:txBody>
+      </p:sp>
+      <p:sp>
+        <p:nvSpPr>
+          <p:cNvPr id="49" name="TextBox 48">
+            <a:extLst>
+              <a:ext uri="{FF2B5EF4-FFF2-40B4-BE49-F238E27FC236}">
+                <a16:creationId xmlns:a16="http://schemas.microsoft.com/office/drawing/2014/main" id="{104D1ABD-8B93-4117-D428-CD557B936C5E}"/>
+              </a:ext>
+            </a:extLst>
+          </p:cNvPr>
+          <p:cNvSpPr txBox="1"/>
+          <p:nvPr/>
+        </p:nvSpPr>
+        <p:spPr>
+          <a:xfrm>
+            <a:off x="4561973" y="4587712"/>
+            <a:ext cx="322066" cy="246221"/>
+          </a:xfrm>
+          <a:prstGeom prst="rect">
+            <a:avLst/>
+          </a:prstGeom>
+          <a:noFill/>
+        </p:spPr>
+        <p:txBody>
+          <a:bodyPr wrap="square" rtlCol="0">
+            <a:spAutoFit/>
+          </a:bodyPr>
+          <a:lstStyle/>
+          <a:p>
+            <a:r>
+              <a:rPr lang="en-US" sz="1000" b="1" dirty="0"/>
+              <a:t>0</a:t>
+            </a:r>
+            <a:endParaRPr lang="en-SG" sz="1000" b="1" dirty="0"/>
+          </a:p>
+        </p:txBody>
+      </p:sp>
+      <p:sp>
+        <p:nvSpPr>
+          <p:cNvPr id="50" name="TextBox 49">
+            <a:extLst>
+              <a:ext uri="{FF2B5EF4-FFF2-40B4-BE49-F238E27FC236}">
+                <a16:creationId xmlns:a16="http://schemas.microsoft.com/office/drawing/2014/main" id="{48F0E38E-6435-94B9-7381-38ACCCF77BD6}"/>
+              </a:ext>
+            </a:extLst>
+          </p:cNvPr>
+          <p:cNvSpPr txBox="1"/>
+          <p:nvPr/>
+        </p:nvSpPr>
+        <p:spPr>
+          <a:xfrm>
+            <a:off x="4561973" y="4755160"/>
+            <a:ext cx="322066" cy="246221"/>
+          </a:xfrm>
+          <a:prstGeom prst="rect">
+            <a:avLst/>
+          </a:prstGeom>
+          <a:noFill/>
+        </p:spPr>
+        <p:txBody>
+          <a:bodyPr wrap="square" rtlCol="0">
+            <a:spAutoFit/>
+          </a:bodyPr>
+          <a:lstStyle/>
+          <a:p>
+            <a:r>
+              <a:rPr lang="en-US" sz="1000" b="1" dirty="0"/>
+              <a:t>0</a:t>
+            </a:r>
+            <a:endParaRPr lang="en-SG" sz="1000" b="1" dirty="0"/>
+          </a:p>
+        </p:txBody>
+      </p:sp>
+      <p:sp>
+        <p:nvSpPr>
+          <p:cNvPr id="51" name="TextBox 50">
+            <a:extLst>
+              <a:ext uri="{FF2B5EF4-FFF2-40B4-BE49-F238E27FC236}">
+                <a16:creationId xmlns:a16="http://schemas.microsoft.com/office/drawing/2014/main" id="{2CC9A90D-6634-E5A6-560E-6D8FDF43FBFE}"/>
+              </a:ext>
+            </a:extLst>
+          </p:cNvPr>
+          <p:cNvSpPr txBox="1"/>
+          <p:nvPr/>
+        </p:nvSpPr>
+        <p:spPr>
+          <a:xfrm>
+            <a:off x="4561973" y="4910970"/>
+            <a:ext cx="322066" cy="246221"/>
+          </a:xfrm>
+          <a:prstGeom prst="rect">
+            <a:avLst/>
+          </a:prstGeom>
+          <a:noFill/>
+        </p:spPr>
+        <p:txBody>
+          <a:bodyPr wrap="square" rtlCol="0">
+            <a:spAutoFit/>
+          </a:bodyPr>
+          <a:lstStyle/>
+          <a:p>
+            <a:r>
+              <a:rPr lang="en-US" sz="1000" b="1" dirty="0"/>
+              <a:t>0</a:t>
+            </a:r>
+            <a:endParaRPr lang="en-SG" sz="1000" b="1" dirty="0"/>
+          </a:p>
+        </p:txBody>
+      </p:sp>
+      <p:sp>
+        <p:nvSpPr>
+          <p:cNvPr id="52" name="TextBox 51">
+            <a:extLst>
+              <a:ext uri="{FF2B5EF4-FFF2-40B4-BE49-F238E27FC236}">
+                <a16:creationId xmlns:a16="http://schemas.microsoft.com/office/drawing/2014/main" id="{F2947B33-C10B-0FE4-143D-BE79111F6E4A}"/>
+              </a:ext>
+            </a:extLst>
+          </p:cNvPr>
+          <p:cNvSpPr txBox="1"/>
+          <p:nvPr/>
+        </p:nvSpPr>
+        <p:spPr>
+          <a:xfrm>
+            <a:off x="4561973" y="5074173"/>
+            <a:ext cx="322066" cy="246221"/>
+          </a:xfrm>
+          <a:prstGeom prst="rect">
+            <a:avLst/>
+          </a:prstGeom>
+          <a:noFill/>
+        </p:spPr>
+        <p:txBody>
+          <a:bodyPr wrap="square" rtlCol="0">
+            <a:spAutoFit/>
+          </a:bodyPr>
+          <a:lstStyle/>
+          <a:p>
+            <a:r>
+              <a:rPr lang="en-US" sz="1000" b="1" dirty="0"/>
+              <a:t>0</a:t>
+            </a:r>
+            <a:endParaRPr lang="en-SG" sz="1000" b="1" dirty="0"/>
+          </a:p>
+        </p:txBody>
+      </p:sp>
+      <p:sp>
+        <p:nvSpPr>
+          <p:cNvPr id="53" name="TextBox 52">
+            <a:extLst>
+              <a:ext uri="{FF2B5EF4-FFF2-40B4-BE49-F238E27FC236}">
+                <a16:creationId xmlns:a16="http://schemas.microsoft.com/office/drawing/2014/main" id="{80059245-58F1-2982-8EA4-7884AC19FFE9}"/>
+              </a:ext>
+            </a:extLst>
+          </p:cNvPr>
+          <p:cNvSpPr txBox="1"/>
+          <p:nvPr/>
+        </p:nvSpPr>
+        <p:spPr>
+          <a:xfrm>
+            <a:off x="4560136" y="5238593"/>
+            <a:ext cx="322066" cy="246221"/>
+          </a:xfrm>
+          <a:prstGeom prst="rect">
+            <a:avLst/>
+          </a:prstGeom>
+          <a:noFill/>
+        </p:spPr>
+        <p:txBody>
+          <a:bodyPr wrap="square" rtlCol="0">
+            <a:spAutoFit/>
+          </a:bodyPr>
+          <a:lstStyle/>
+          <a:p>
+            <a:r>
+              <a:rPr lang="en-US" sz="1000" b="1" dirty="0"/>
+              <a:t>0</a:t>
+            </a:r>
+            <a:endParaRPr lang="en-SG" sz="1000" b="1" dirty="0"/>
+          </a:p>
+        </p:txBody>
+      </p:sp>
+      <p:sp>
+        <p:nvSpPr>
+          <p:cNvPr id="54" name="TextBox 53">
+            <a:extLst>
+              <a:ext uri="{FF2B5EF4-FFF2-40B4-BE49-F238E27FC236}">
+                <a16:creationId xmlns:a16="http://schemas.microsoft.com/office/drawing/2014/main" id="{B9571E39-E255-F64E-B6E5-CC7A9AF3FB97}"/>
+              </a:ext>
+            </a:extLst>
+          </p:cNvPr>
+          <p:cNvSpPr txBox="1"/>
+          <p:nvPr/>
+        </p:nvSpPr>
+        <p:spPr>
+          <a:xfrm>
+            <a:off x="4558299" y="5384957"/>
+            <a:ext cx="322066" cy="246221"/>
+          </a:xfrm>
+          <a:prstGeom prst="rect">
+            <a:avLst/>
+          </a:prstGeom>
+          <a:noFill/>
+        </p:spPr>
+        <p:txBody>
+          <a:bodyPr wrap="square" rtlCol="0">
+            <a:spAutoFit/>
+          </a:bodyPr>
+          <a:lstStyle/>
+          <a:p>
+            <a:r>
+              <a:rPr lang="en-US" sz="1000" b="1" dirty="0"/>
+              <a:t>0</a:t>
+            </a:r>
+            <a:endParaRPr lang="en-SG" sz="1000" b="1" dirty="0"/>
+          </a:p>
+        </p:txBody>
+      </p:sp>
+      <p:sp>
+        <p:nvSpPr>
+          <p:cNvPr id="55" name="TextBox 54">
+            <a:extLst>
+              <a:ext uri="{FF2B5EF4-FFF2-40B4-BE49-F238E27FC236}">
+                <a16:creationId xmlns:a16="http://schemas.microsoft.com/office/drawing/2014/main" id="{26CCF1E9-0307-CDE6-A17F-28CF5E3A1347}"/>
+              </a:ext>
+            </a:extLst>
+          </p:cNvPr>
+          <p:cNvSpPr txBox="1"/>
+          <p:nvPr/>
+        </p:nvSpPr>
+        <p:spPr>
+          <a:xfrm>
+            <a:off x="4566960" y="5526123"/>
+            <a:ext cx="322066" cy="246221"/>
+          </a:xfrm>
+          <a:prstGeom prst="rect">
+            <a:avLst/>
+          </a:prstGeom>
+          <a:noFill/>
+        </p:spPr>
+        <p:txBody>
+          <a:bodyPr wrap="square" rtlCol="0">
+            <a:spAutoFit/>
+          </a:bodyPr>
+          <a:lstStyle/>
+          <a:p>
+            <a:r>
+              <a:rPr lang="en-US" sz="1000" b="1" dirty="0"/>
+              <a:t>0</a:t>
+            </a:r>
+            <a:endParaRPr lang="en-SG" sz="1000" b="1" dirty="0"/>
+          </a:p>
+        </p:txBody>
+      </p:sp>
+      <p:sp>
+        <p:nvSpPr>
+          <p:cNvPr id="56" name="TextBox 55">
+            <a:extLst>
+              <a:ext uri="{FF2B5EF4-FFF2-40B4-BE49-F238E27FC236}">
+                <a16:creationId xmlns:a16="http://schemas.microsoft.com/office/drawing/2014/main" id="{FDC6FD59-4AAD-29E8-7D96-3E7498A7003B}"/>
+              </a:ext>
+            </a:extLst>
+          </p:cNvPr>
+          <p:cNvSpPr txBox="1"/>
+          <p:nvPr/>
+        </p:nvSpPr>
+        <p:spPr>
+          <a:xfrm>
+            <a:off x="4566960" y="5675045"/>
+            <a:ext cx="322066" cy="246221"/>
+          </a:xfrm>
+          <a:prstGeom prst="rect">
+            <a:avLst/>
+          </a:prstGeom>
+          <a:noFill/>
+        </p:spPr>
+        <p:txBody>
+          <a:bodyPr wrap="square" rtlCol="0">
+            <a:spAutoFit/>
+          </a:bodyPr>
+          <a:lstStyle/>
+          <a:p>
+            <a:r>
+              <a:rPr lang="en-US" sz="1000" b="1" dirty="0"/>
+              <a:t>0</a:t>
+            </a:r>
+            <a:endParaRPr lang="en-SG" sz="1000" b="1" dirty="0"/>
+          </a:p>
+        </p:txBody>
+      </p:sp>
+      <p:sp>
+        <p:nvSpPr>
+          <p:cNvPr id="57" name="TextBox 56">
+            <a:extLst>
+              <a:ext uri="{FF2B5EF4-FFF2-40B4-BE49-F238E27FC236}">
+                <a16:creationId xmlns:a16="http://schemas.microsoft.com/office/drawing/2014/main" id="{DF3F96E9-CFE3-9DC4-FBC7-6E8051ED8A34}"/>
+              </a:ext>
+            </a:extLst>
+          </p:cNvPr>
+          <p:cNvSpPr txBox="1"/>
+          <p:nvPr/>
+        </p:nvSpPr>
+        <p:spPr>
+          <a:xfrm>
+            <a:off x="4566960" y="5813653"/>
+            <a:ext cx="322066" cy="246221"/>
+          </a:xfrm>
+          <a:prstGeom prst="rect">
+            <a:avLst/>
+          </a:prstGeom>
+          <a:noFill/>
+        </p:spPr>
+        <p:txBody>
+          <a:bodyPr wrap="square" rtlCol="0">
+            <a:spAutoFit/>
+          </a:bodyPr>
+          <a:lstStyle/>
+          <a:p>
+            <a:r>
+              <a:rPr lang="en-US" sz="1000" b="1" dirty="0"/>
+              <a:t>0</a:t>
+            </a:r>
+            <a:endParaRPr lang="en-SG" sz="1000" b="1" dirty="0"/>
+          </a:p>
+        </p:txBody>
+      </p:sp>
+      <p:sp>
+        <p:nvSpPr>
+          <p:cNvPr id="58" name="TextBox 57">
+            <a:extLst>
+              <a:ext uri="{FF2B5EF4-FFF2-40B4-BE49-F238E27FC236}">
+                <a16:creationId xmlns:a16="http://schemas.microsoft.com/office/drawing/2014/main" id="{6269549C-28E7-F341-CC33-2A6E667680A9}"/>
+              </a:ext>
+            </a:extLst>
+          </p:cNvPr>
+          <p:cNvSpPr txBox="1"/>
+          <p:nvPr/>
+        </p:nvSpPr>
+        <p:spPr>
+          <a:xfrm>
+            <a:off x="4323095" y="4081190"/>
+            <a:ext cx="1321001" cy="400110"/>
+          </a:xfrm>
+          <a:prstGeom prst="rect">
+            <a:avLst/>
+          </a:prstGeom>
+          <a:noFill/>
+        </p:spPr>
+        <p:txBody>
+          <a:bodyPr wrap="square" rtlCol="0">
+            <a:spAutoFit/>
+          </a:bodyPr>
+          <a:lstStyle/>
+          <a:p>
+            <a:r>
+              <a:rPr lang="en-US" sz="1000" b="1" dirty="0">
+                <a:solidFill>
+                  <a:schemeClr val="accent6">
+                    <a:lumMod val="75000"/>
+                  </a:schemeClr>
+                </a:solidFill>
+              </a:rPr>
+              <a:t>Empty area in matrix </a:t>
+            </a:r>
+            <a:endParaRPr lang="en-SG" sz="1000" b="1" dirty="0">
+              <a:solidFill>
+                <a:schemeClr val="accent6">
+                  <a:lumMod val="75000"/>
+                </a:schemeClr>
+              </a:solidFill>
+            </a:endParaRPr>
+          </a:p>
+        </p:txBody>
+      </p:sp>
+      <p:cxnSp>
+        <p:nvCxnSpPr>
+          <p:cNvPr id="59" name="Straight Arrow Connector 58">
+            <a:extLst>
+              <a:ext uri="{FF2B5EF4-FFF2-40B4-BE49-F238E27FC236}">
+                <a16:creationId xmlns:a16="http://schemas.microsoft.com/office/drawing/2014/main" id="{A099B1F9-86AF-4E45-72F1-2E0E3BE0764C}"/>
+              </a:ext>
+            </a:extLst>
+          </p:cNvPr>
+          <p:cNvCxnSpPr>
+            <a:cxnSpLocks/>
+          </p:cNvCxnSpPr>
+          <p:nvPr/>
+        </p:nvCxnSpPr>
+        <p:spPr>
+          <a:xfrm>
+            <a:off x="4696843" y="4435319"/>
+            <a:ext cx="0" cy="167029"/>
+          </a:xfrm>
+          <a:prstGeom prst="straightConnector1">
+            <a:avLst/>
+          </a:prstGeom>
+          <a:ln>
+            <a:tailEnd type="triangle"/>
+          </a:ln>
+        </p:spPr>
+        <p:style>
+          <a:lnRef idx="2">
+            <a:schemeClr val="accent1"/>
+          </a:lnRef>
+          <a:fillRef idx="0">
+            <a:schemeClr val="accent1"/>
+          </a:fillRef>
+          <a:effectRef idx="1">
+            <a:schemeClr val="accent1"/>
+          </a:effectRef>
+          <a:fontRef idx="minor">
+            <a:schemeClr val="tx1"/>
+          </a:fontRef>
+        </p:style>
+      </p:cxnSp>
+      <p:sp>
+        <p:nvSpPr>
+          <p:cNvPr id="60" name="TextBox 59">
+            <a:extLst>
+              <a:ext uri="{FF2B5EF4-FFF2-40B4-BE49-F238E27FC236}">
+                <a16:creationId xmlns:a16="http://schemas.microsoft.com/office/drawing/2014/main" id="{0EE44CFE-B057-8350-D0F7-7657CC9B24EA}"/>
+              </a:ext>
+            </a:extLst>
+          </p:cNvPr>
+          <p:cNvSpPr txBox="1"/>
+          <p:nvPr/>
+        </p:nvSpPr>
+        <p:spPr>
+          <a:xfrm>
+            <a:off x="5886672" y="5956974"/>
+            <a:ext cx="1672394" cy="246221"/>
+          </a:xfrm>
+          <a:prstGeom prst="rect">
+            <a:avLst/>
+          </a:prstGeom>
+          <a:noFill/>
+        </p:spPr>
+        <p:txBody>
+          <a:bodyPr wrap="square" rtlCol="0">
+            <a:spAutoFit/>
+          </a:bodyPr>
+          <a:lstStyle/>
+          <a:p>
+            <a:r>
+              <a:rPr lang="en-US" sz="1000" b="1" dirty="0">
+                <a:solidFill>
+                  <a:schemeClr val="accent6">
+                    <a:lumMod val="75000"/>
+                  </a:schemeClr>
+                </a:solidFill>
+              </a:rPr>
+              <a:t>Wood door area in matrix </a:t>
+            </a:r>
+            <a:endParaRPr lang="en-SG" sz="1000" b="1" dirty="0">
+              <a:solidFill>
+                <a:schemeClr val="accent6">
+                  <a:lumMod val="75000"/>
+                </a:schemeClr>
+              </a:solidFill>
+            </a:endParaRPr>
+          </a:p>
+        </p:txBody>
+      </p:sp>
+      <p:cxnSp>
+        <p:nvCxnSpPr>
+          <p:cNvPr id="61" name="Straight Arrow Connector 60">
+            <a:extLst>
+              <a:ext uri="{FF2B5EF4-FFF2-40B4-BE49-F238E27FC236}">
+                <a16:creationId xmlns:a16="http://schemas.microsoft.com/office/drawing/2014/main" id="{AF2BA2C0-9F78-4220-A84F-E713981C1034}"/>
+              </a:ext>
+            </a:extLst>
+          </p:cNvPr>
+          <p:cNvCxnSpPr>
+            <a:cxnSpLocks/>
+          </p:cNvCxnSpPr>
+          <p:nvPr/>
+        </p:nvCxnSpPr>
+        <p:spPr>
+          <a:xfrm flipV="1">
+            <a:off x="6362983" y="5820182"/>
+            <a:ext cx="0" cy="203029"/>
+          </a:xfrm>
+          <a:prstGeom prst="straightConnector1">
+            <a:avLst/>
+          </a:prstGeom>
+          <a:ln>
+            <a:tailEnd type="triangle"/>
+          </a:ln>
+        </p:spPr>
+        <p:style>
+          <a:lnRef idx="2">
+            <a:schemeClr val="accent1"/>
+          </a:lnRef>
+          <a:fillRef idx="0">
+            <a:schemeClr val="accent1"/>
+          </a:fillRef>
+          <a:effectRef idx="1">
+            <a:schemeClr val="accent1"/>
+          </a:effectRef>
+          <a:fontRef idx="minor">
+            <a:schemeClr val="tx1"/>
+          </a:fontRef>
+        </p:style>
+      </p:cxnSp>
+      <p:sp>
+        <p:nvSpPr>
+          <p:cNvPr id="63" name="TextBox 62">
+            <a:extLst>
+              <a:ext uri="{FF2B5EF4-FFF2-40B4-BE49-F238E27FC236}">
+                <a16:creationId xmlns:a16="http://schemas.microsoft.com/office/drawing/2014/main" id="{1D4680D9-459E-47E0-BF38-2B2CE0918599}"/>
+              </a:ext>
+            </a:extLst>
+          </p:cNvPr>
+          <p:cNvSpPr txBox="1"/>
+          <p:nvPr/>
+        </p:nvSpPr>
+        <p:spPr>
+          <a:xfrm>
+            <a:off x="7137693" y="4602348"/>
+            <a:ext cx="398463" cy="246221"/>
+          </a:xfrm>
+          <a:prstGeom prst="rect">
+            <a:avLst/>
+          </a:prstGeom>
+          <a:noFill/>
+        </p:spPr>
+        <p:txBody>
+          <a:bodyPr wrap="square" rtlCol="0">
+            <a:spAutoFit/>
+          </a:bodyPr>
+          <a:lstStyle/>
+          <a:p>
+            <a:r>
+              <a:rPr lang="en-US" sz="1000" b="1" dirty="0"/>
+              <a:t>255</a:t>
+            </a:r>
+            <a:endParaRPr lang="en-SG" sz="1000" b="1" dirty="0"/>
+          </a:p>
+        </p:txBody>
+      </p:sp>
+      <p:sp>
+        <p:nvSpPr>
+          <p:cNvPr id="64" name="TextBox 63">
+            <a:extLst>
+              <a:ext uri="{FF2B5EF4-FFF2-40B4-BE49-F238E27FC236}">
+                <a16:creationId xmlns:a16="http://schemas.microsoft.com/office/drawing/2014/main" id="{81801C22-88A3-0E70-B641-4432D7923376}"/>
+              </a:ext>
+            </a:extLst>
+          </p:cNvPr>
+          <p:cNvSpPr txBox="1"/>
+          <p:nvPr/>
+        </p:nvSpPr>
+        <p:spPr>
+          <a:xfrm>
+            <a:off x="7134401" y="4735117"/>
+            <a:ext cx="398463" cy="246221"/>
+          </a:xfrm>
+          <a:prstGeom prst="rect">
+            <a:avLst/>
+          </a:prstGeom>
+          <a:noFill/>
+        </p:spPr>
+        <p:txBody>
+          <a:bodyPr wrap="square" rtlCol="0">
+            <a:spAutoFit/>
+          </a:bodyPr>
+          <a:lstStyle/>
+          <a:p>
+            <a:r>
+              <a:rPr lang="en-US" sz="1000" b="1" dirty="0"/>
+              <a:t>255</a:t>
+            </a:r>
+            <a:endParaRPr lang="en-SG" sz="1000" b="1" dirty="0"/>
+          </a:p>
+        </p:txBody>
+      </p:sp>
+      <p:sp>
+        <p:nvSpPr>
+          <p:cNvPr id="65" name="TextBox 64">
+            <a:extLst>
+              <a:ext uri="{FF2B5EF4-FFF2-40B4-BE49-F238E27FC236}">
+                <a16:creationId xmlns:a16="http://schemas.microsoft.com/office/drawing/2014/main" id="{4D1DA922-EC6C-D7BF-A0FB-6A89FE9CBA50}"/>
+              </a:ext>
+            </a:extLst>
+          </p:cNvPr>
+          <p:cNvSpPr txBox="1"/>
+          <p:nvPr/>
+        </p:nvSpPr>
+        <p:spPr>
+          <a:xfrm>
+            <a:off x="7137693" y="4878270"/>
+            <a:ext cx="398463" cy="246221"/>
+          </a:xfrm>
+          <a:prstGeom prst="rect">
+            <a:avLst/>
+          </a:prstGeom>
+          <a:noFill/>
+        </p:spPr>
+        <p:txBody>
+          <a:bodyPr wrap="square" rtlCol="0">
+            <a:spAutoFit/>
+          </a:bodyPr>
+          <a:lstStyle/>
+          <a:p>
+            <a:r>
+              <a:rPr lang="en-US" sz="1000" b="1" dirty="0"/>
+              <a:t>255</a:t>
+            </a:r>
+            <a:endParaRPr lang="en-SG" sz="1000" b="1" dirty="0"/>
+          </a:p>
+        </p:txBody>
+      </p:sp>
+      <p:sp>
+        <p:nvSpPr>
+          <p:cNvPr id="66" name="TextBox 65">
+            <a:extLst>
+              <a:ext uri="{FF2B5EF4-FFF2-40B4-BE49-F238E27FC236}">
+                <a16:creationId xmlns:a16="http://schemas.microsoft.com/office/drawing/2014/main" id="{72402460-32C1-3FA9-441D-16D467A9A12B}"/>
+              </a:ext>
+            </a:extLst>
+          </p:cNvPr>
+          <p:cNvSpPr txBox="1"/>
+          <p:nvPr/>
+        </p:nvSpPr>
+        <p:spPr>
+          <a:xfrm>
+            <a:off x="7142231" y="5011039"/>
+            <a:ext cx="398463" cy="246221"/>
+          </a:xfrm>
+          <a:prstGeom prst="rect">
+            <a:avLst/>
+          </a:prstGeom>
+          <a:noFill/>
+        </p:spPr>
+        <p:txBody>
+          <a:bodyPr wrap="square" rtlCol="0">
+            <a:spAutoFit/>
+          </a:bodyPr>
+          <a:lstStyle/>
+          <a:p>
+            <a:r>
+              <a:rPr lang="en-US" sz="1000" b="1" dirty="0"/>
+              <a:t>255</a:t>
+            </a:r>
+            <a:endParaRPr lang="en-SG" sz="1000" b="1" dirty="0"/>
+          </a:p>
+        </p:txBody>
+      </p:sp>
+      <p:sp>
+        <p:nvSpPr>
+          <p:cNvPr id="67" name="TextBox 66">
+            <a:extLst>
+              <a:ext uri="{FF2B5EF4-FFF2-40B4-BE49-F238E27FC236}">
+                <a16:creationId xmlns:a16="http://schemas.microsoft.com/office/drawing/2014/main" id="{F334F655-7897-007D-AEA8-9D22C2A2B02E}"/>
+              </a:ext>
+            </a:extLst>
+          </p:cNvPr>
+          <p:cNvSpPr txBox="1"/>
+          <p:nvPr/>
+        </p:nvSpPr>
+        <p:spPr>
+          <a:xfrm>
+            <a:off x="7142230" y="5130827"/>
+            <a:ext cx="398463" cy="246221"/>
+          </a:xfrm>
+          <a:prstGeom prst="rect">
+            <a:avLst/>
+          </a:prstGeom>
+          <a:noFill/>
+        </p:spPr>
+        <p:txBody>
+          <a:bodyPr wrap="square" rtlCol="0">
+            <a:spAutoFit/>
+          </a:bodyPr>
+          <a:lstStyle/>
+          <a:p>
+            <a:r>
+              <a:rPr lang="en-US" sz="1000" b="1" dirty="0"/>
+              <a:t>255</a:t>
+            </a:r>
+            <a:endParaRPr lang="en-SG" sz="1000" b="1" dirty="0"/>
+          </a:p>
+        </p:txBody>
+      </p:sp>
+      <p:sp>
+        <p:nvSpPr>
+          <p:cNvPr id="68" name="TextBox 67">
+            <a:extLst>
+              <a:ext uri="{FF2B5EF4-FFF2-40B4-BE49-F238E27FC236}">
+                <a16:creationId xmlns:a16="http://schemas.microsoft.com/office/drawing/2014/main" id="{626AF507-3DB4-0D5B-D16A-BA7E2D183FFE}"/>
+              </a:ext>
+            </a:extLst>
+          </p:cNvPr>
+          <p:cNvSpPr txBox="1"/>
+          <p:nvPr/>
+        </p:nvSpPr>
+        <p:spPr>
+          <a:xfrm>
+            <a:off x="7142230" y="5287044"/>
+            <a:ext cx="398463" cy="246221"/>
+          </a:xfrm>
+          <a:prstGeom prst="rect">
+            <a:avLst/>
+          </a:prstGeom>
+          <a:noFill/>
+        </p:spPr>
+        <p:txBody>
+          <a:bodyPr wrap="square" rtlCol="0">
+            <a:spAutoFit/>
+          </a:bodyPr>
+          <a:lstStyle/>
+          <a:p>
+            <a:r>
+              <a:rPr lang="en-US" sz="1000" b="1" dirty="0"/>
+              <a:t>255</a:t>
+            </a:r>
+            <a:endParaRPr lang="en-SG" sz="1000" b="1" dirty="0"/>
+          </a:p>
+        </p:txBody>
+      </p:sp>
+      <p:sp>
+        <p:nvSpPr>
+          <p:cNvPr id="69" name="TextBox 68">
+            <a:extLst>
+              <a:ext uri="{FF2B5EF4-FFF2-40B4-BE49-F238E27FC236}">
+                <a16:creationId xmlns:a16="http://schemas.microsoft.com/office/drawing/2014/main" id="{42A58D5E-5AA8-BDDA-ED81-1B7288CBA3FD}"/>
+              </a:ext>
+            </a:extLst>
+          </p:cNvPr>
+          <p:cNvSpPr txBox="1"/>
+          <p:nvPr/>
+        </p:nvSpPr>
+        <p:spPr>
+          <a:xfrm>
+            <a:off x="7142229" y="5443261"/>
+            <a:ext cx="398463" cy="246221"/>
+          </a:xfrm>
+          <a:prstGeom prst="rect">
+            <a:avLst/>
+          </a:prstGeom>
+          <a:noFill/>
+        </p:spPr>
+        <p:txBody>
+          <a:bodyPr wrap="square" rtlCol="0">
+            <a:spAutoFit/>
+          </a:bodyPr>
+          <a:lstStyle/>
+          <a:p>
+            <a:r>
+              <a:rPr lang="en-US" sz="1000" b="1" dirty="0"/>
+              <a:t>255</a:t>
+            </a:r>
+            <a:endParaRPr lang="en-SG" sz="1000" b="1" dirty="0"/>
+          </a:p>
+        </p:txBody>
+      </p:sp>
+      <p:sp>
+        <p:nvSpPr>
+          <p:cNvPr id="70" name="TextBox 69">
+            <a:extLst>
+              <a:ext uri="{FF2B5EF4-FFF2-40B4-BE49-F238E27FC236}">
+                <a16:creationId xmlns:a16="http://schemas.microsoft.com/office/drawing/2014/main" id="{577A016D-BAB2-5CBB-D035-431C761A3D79}"/>
+              </a:ext>
+            </a:extLst>
+          </p:cNvPr>
+          <p:cNvSpPr txBox="1"/>
+          <p:nvPr/>
+        </p:nvSpPr>
+        <p:spPr>
+          <a:xfrm>
+            <a:off x="7142229" y="5563049"/>
+            <a:ext cx="398463" cy="246221"/>
+          </a:xfrm>
+          <a:prstGeom prst="rect">
+            <a:avLst/>
+          </a:prstGeom>
+          <a:noFill/>
+        </p:spPr>
+        <p:txBody>
+          <a:bodyPr wrap="square" rtlCol="0">
+            <a:spAutoFit/>
+          </a:bodyPr>
+          <a:lstStyle/>
+          <a:p>
+            <a:r>
+              <a:rPr lang="en-US" sz="1000" b="1" dirty="0"/>
+              <a:t>255</a:t>
+            </a:r>
+            <a:endParaRPr lang="en-SG" sz="1000" b="1" dirty="0"/>
+          </a:p>
+        </p:txBody>
+      </p:sp>
+      <p:sp>
+        <p:nvSpPr>
+          <p:cNvPr id="71" name="TextBox 70">
+            <a:extLst>
+              <a:ext uri="{FF2B5EF4-FFF2-40B4-BE49-F238E27FC236}">
+                <a16:creationId xmlns:a16="http://schemas.microsoft.com/office/drawing/2014/main" id="{CC00DBD4-FEA3-8072-BE6C-04B8EA0D315C}"/>
+              </a:ext>
+            </a:extLst>
+          </p:cNvPr>
+          <p:cNvSpPr txBox="1"/>
+          <p:nvPr/>
+        </p:nvSpPr>
+        <p:spPr>
+          <a:xfrm>
+            <a:off x="7134401" y="5733734"/>
+            <a:ext cx="398463" cy="246221"/>
+          </a:xfrm>
+          <a:prstGeom prst="rect">
+            <a:avLst/>
+          </a:prstGeom>
+          <a:noFill/>
+        </p:spPr>
+        <p:txBody>
+          <a:bodyPr wrap="square" rtlCol="0">
+            <a:spAutoFit/>
+          </a:bodyPr>
+          <a:lstStyle/>
+          <a:p>
+            <a:r>
+              <a:rPr lang="en-US" sz="1000" b="1" dirty="0"/>
+              <a:t>255</a:t>
+            </a:r>
+            <a:endParaRPr lang="en-SG" sz="1000" b="1" dirty="0"/>
+          </a:p>
+        </p:txBody>
+      </p:sp>
+      <p:cxnSp>
+        <p:nvCxnSpPr>
+          <p:cNvPr id="72" name="Straight Arrow Connector 71">
+            <a:extLst>
+              <a:ext uri="{FF2B5EF4-FFF2-40B4-BE49-F238E27FC236}">
+                <a16:creationId xmlns:a16="http://schemas.microsoft.com/office/drawing/2014/main" id="{08637EDE-11C1-3878-7689-F233ACA6C3CF}"/>
+              </a:ext>
+            </a:extLst>
+          </p:cNvPr>
+          <p:cNvCxnSpPr>
+            <a:cxnSpLocks/>
+          </p:cNvCxnSpPr>
+          <p:nvPr/>
+        </p:nvCxnSpPr>
+        <p:spPr>
+          <a:xfrm flipV="1">
+            <a:off x="2494430" y="4848569"/>
+            <a:ext cx="4639971" cy="329521"/>
+          </a:xfrm>
+          <a:prstGeom prst="straightConnector1">
+            <a:avLst/>
+          </a:prstGeom>
+          <a:ln w="12700">
+            <a:prstDash val="sysDash"/>
+            <a:tailEnd type="triangle"/>
+          </a:ln>
+        </p:spPr>
+        <p:style>
+          <a:lnRef idx="2">
+            <a:schemeClr val="accent1"/>
+          </a:lnRef>
+          <a:fillRef idx="0">
+            <a:schemeClr val="accent1"/>
+          </a:fillRef>
+          <a:effectRef idx="1">
+            <a:schemeClr val="accent1"/>
+          </a:effectRef>
+          <a:fontRef idx="minor">
+            <a:schemeClr val="tx1"/>
+          </a:fontRef>
+        </p:style>
+      </p:cxnSp>
+      <p:sp>
+        <p:nvSpPr>
+          <p:cNvPr id="74" name="TextBox 73">
+            <a:extLst>
+              <a:ext uri="{FF2B5EF4-FFF2-40B4-BE49-F238E27FC236}">
+                <a16:creationId xmlns:a16="http://schemas.microsoft.com/office/drawing/2014/main" id="{0D52527D-DBFB-208C-4D10-5B203F0B1864}"/>
+              </a:ext>
+            </a:extLst>
+          </p:cNvPr>
+          <p:cNvSpPr txBox="1"/>
+          <p:nvPr/>
+        </p:nvSpPr>
+        <p:spPr>
+          <a:xfrm>
+            <a:off x="2655033" y="4886954"/>
+            <a:ext cx="1812385" cy="246221"/>
+          </a:xfrm>
+          <a:prstGeom prst="rect">
+            <a:avLst/>
+          </a:prstGeom>
+          <a:noFill/>
+        </p:spPr>
+        <p:txBody>
+          <a:bodyPr wrap="square" rtlCol="0">
+            <a:spAutoFit/>
+          </a:bodyPr>
+          <a:lstStyle/>
+          <a:p>
+            <a:r>
+              <a:rPr lang="en-US" sz="1000" dirty="0"/>
+              <a:t>Camera left detect distance</a:t>
+            </a:r>
+            <a:endParaRPr lang="en-SG" sz="1000" dirty="0"/>
+          </a:p>
+        </p:txBody>
+      </p:sp>
+      <p:cxnSp>
+        <p:nvCxnSpPr>
+          <p:cNvPr id="75" name="Straight Arrow Connector 74">
+            <a:extLst>
+              <a:ext uri="{FF2B5EF4-FFF2-40B4-BE49-F238E27FC236}">
+                <a16:creationId xmlns:a16="http://schemas.microsoft.com/office/drawing/2014/main" id="{3A8F1EC1-FA95-C671-B2EB-EA9B13D8BD58}"/>
+              </a:ext>
+            </a:extLst>
+          </p:cNvPr>
+          <p:cNvCxnSpPr>
+            <a:cxnSpLocks/>
+            <a:stCxn id="13" idx="3"/>
+          </p:cNvCxnSpPr>
+          <p:nvPr/>
+        </p:nvCxnSpPr>
+        <p:spPr>
+          <a:xfrm>
+            <a:off x="2580148" y="5178091"/>
+            <a:ext cx="3617664" cy="384958"/>
+          </a:xfrm>
+          <a:prstGeom prst="straightConnector1">
+            <a:avLst/>
+          </a:prstGeom>
+          <a:ln w="12700">
+            <a:prstDash val="sysDash"/>
+            <a:tailEnd type="triangle"/>
+          </a:ln>
+        </p:spPr>
+        <p:style>
+          <a:lnRef idx="2">
+            <a:schemeClr val="accent1"/>
+          </a:lnRef>
+          <a:fillRef idx="0">
+            <a:schemeClr val="accent1"/>
+          </a:fillRef>
+          <a:effectRef idx="1">
+            <a:schemeClr val="accent1"/>
+          </a:effectRef>
+          <a:fontRef idx="minor">
+            <a:schemeClr val="tx1"/>
+          </a:fontRef>
+        </p:style>
+      </p:cxnSp>
+      <p:sp>
+        <p:nvSpPr>
+          <p:cNvPr id="78" name="TextBox 77">
+            <a:extLst>
+              <a:ext uri="{FF2B5EF4-FFF2-40B4-BE49-F238E27FC236}">
+                <a16:creationId xmlns:a16="http://schemas.microsoft.com/office/drawing/2014/main" id="{0B1DBA61-E2EE-5F57-4C36-93FD66923EB7}"/>
+              </a:ext>
+            </a:extLst>
+          </p:cNvPr>
+          <p:cNvSpPr txBox="1"/>
+          <p:nvPr/>
+        </p:nvSpPr>
+        <p:spPr>
+          <a:xfrm>
+            <a:off x="2644634" y="5256990"/>
+            <a:ext cx="1812385" cy="246221"/>
+          </a:xfrm>
+          <a:prstGeom prst="rect">
+            <a:avLst/>
+          </a:prstGeom>
+          <a:noFill/>
+        </p:spPr>
+        <p:txBody>
+          <a:bodyPr wrap="square" rtlCol="0">
+            <a:spAutoFit/>
+          </a:bodyPr>
+          <a:lstStyle/>
+          <a:p>
+            <a:r>
+              <a:rPr lang="en-US" sz="1000" dirty="0"/>
+              <a:t>Camera right detect distance</a:t>
+            </a:r>
+            <a:endParaRPr lang="en-SG" sz="1000" dirty="0"/>
+          </a:p>
+        </p:txBody>
+      </p:sp>
+      <p:cxnSp>
+        <p:nvCxnSpPr>
+          <p:cNvPr id="79" name="Straight Arrow Connector 78">
+            <a:extLst>
+              <a:ext uri="{FF2B5EF4-FFF2-40B4-BE49-F238E27FC236}">
+                <a16:creationId xmlns:a16="http://schemas.microsoft.com/office/drawing/2014/main" id="{42BBC381-BFA6-5557-27CF-2050F4569AF6}"/>
+              </a:ext>
+            </a:extLst>
+          </p:cNvPr>
+          <p:cNvCxnSpPr>
+            <a:cxnSpLocks/>
+          </p:cNvCxnSpPr>
+          <p:nvPr/>
+        </p:nvCxnSpPr>
+        <p:spPr>
+          <a:xfrm>
+            <a:off x="2580148" y="5563049"/>
+            <a:ext cx="3617664" cy="0"/>
+          </a:xfrm>
+          <a:prstGeom prst="straightConnector1">
+            <a:avLst/>
+          </a:prstGeom>
+          <a:ln w="12700">
+            <a:prstDash val="sysDash"/>
+            <a:tailEnd type="triangle"/>
+          </a:ln>
+        </p:spPr>
+        <p:style>
+          <a:lnRef idx="2">
+            <a:schemeClr val="accent1"/>
+          </a:lnRef>
+          <a:fillRef idx="0">
+            <a:schemeClr val="accent1"/>
+          </a:fillRef>
+          <a:effectRef idx="1">
+            <a:schemeClr val="accent1"/>
+          </a:effectRef>
+          <a:fontRef idx="minor">
+            <a:schemeClr val="tx1"/>
+          </a:fontRef>
+        </p:style>
+      </p:cxnSp>
+      <p:sp>
+        <p:nvSpPr>
+          <p:cNvPr id="81" name="TextBox 80">
+            <a:extLst>
+              <a:ext uri="{FF2B5EF4-FFF2-40B4-BE49-F238E27FC236}">
+                <a16:creationId xmlns:a16="http://schemas.microsoft.com/office/drawing/2014/main" id="{F72E1EC8-3802-0F9F-17DC-31154E853376}"/>
+              </a:ext>
+            </a:extLst>
+          </p:cNvPr>
+          <p:cNvSpPr txBox="1"/>
+          <p:nvPr/>
+        </p:nvSpPr>
+        <p:spPr>
+          <a:xfrm>
+            <a:off x="2744077" y="5588579"/>
+            <a:ext cx="1812385" cy="246221"/>
+          </a:xfrm>
+          <a:prstGeom prst="rect">
+            <a:avLst/>
+          </a:prstGeom>
+          <a:noFill/>
+        </p:spPr>
+        <p:txBody>
+          <a:bodyPr wrap="square" rtlCol="0">
+            <a:spAutoFit/>
+          </a:bodyPr>
+          <a:lstStyle/>
+          <a:p>
+            <a:r>
+              <a:rPr lang="en-US" sz="1000" dirty="0"/>
+              <a:t>Lidar detect distance</a:t>
+            </a:r>
+            <a:endParaRPr lang="en-SG" sz="1000" dirty="0"/>
+          </a:p>
+        </p:txBody>
+      </p:sp>
+      <p:pic>
+        <p:nvPicPr>
+          <p:cNvPr id="82" name="Picture 81">
+            <a:extLst>
+              <a:ext uri="{FF2B5EF4-FFF2-40B4-BE49-F238E27FC236}">
+                <a16:creationId xmlns:a16="http://schemas.microsoft.com/office/drawing/2014/main" id="{FA86FDB7-C344-DA0F-539D-42DF539F8A2F}"/>
+              </a:ext>
+            </a:extLst>
+          </p:cNvPr>
+          <p:cNvPicPr>
+            <a:picLocks noChangeAspect="1"/>
+          </p:cNvPicPr>
+          <p:nvPr/>
+        </p:nvPicPr>
+        <p:blipFill>
+          <a:blip r:embed="rId9">
+            <a:duotone>
+              <a:schemeClr val="accent2">
+                <a:shade val="45000"/>
+                <a:satMod val="135000"/>
+              </a:schemeClr>
+              <a:prstClr val="white"/>
+            </a:duotone>
+          </a:blip>
+          <a:stretch>
+            <a:fillRect/>
+          </a:stretch>
+        </p:blipFill>
+        <p:spPr>
+          <a:xfrm>
+            <a:off x="6793970" y="5220960"/>
+            <a:ext cx="223452" cy="430230"/>
+          </a:xfrm>
+          <a:prstGeom prst="rect">
+            <a:avLst/>
+          </a:prstGeom>
+          <a:ln>
+            <a:solidFill>
+              <a:srgbClr val="FF0000"/>
+            </a:solidFill>
+          </a:ln>
+        </p:spPr>
+      </p:pic>
+      <p:pic>
+        <p:nvPicPr>
+          <p:cNvPr id="83" name="Graphic 82" descr="Radio microphone with solid fill">
+            <a:extLst>
+              <a:ext uri="{FF2B5EF4-FFF2-40B4-BE49-F238E27FC236}">
+                <a16:creationId xmlns:a16="http://schemas.microsoft.com/office/drawing/2014/main" id="{4211EC7D-59F7-3B14-EA5C-4B9C28042F10}"/>
+              </a:ext>
+            </a:extLst>
+          </p:cNvPr>
+          <p:cNvPicPr>
+            <a:picLocks noChangeAspect="1"/>
+          </p:cNvPicPr>
+          <p:nvPr/>
+        </p:nvPicPr>
+        <p:blipFill>
+          <a:blip r:embed="rId10">
+            <a:extLst>
+              <a:ext uri="{96DAC541-7B7A-43D3-8B79-37D633B846F1}">
+                <asvg:svgBlip xmlns:asvg="http://schemas.microsoft.com/office/drawing/2016/SVG/main" r:embed="rId11"/>
+              </a:ext>
+            </a:extLst>
+          </a:blip>
+          <a:stretch>
+            <a:fillRect/>
+          </a:stretch>
+        </p:blipFill>
+        <p:spPr>
+          <a:xfrm>
+            <a:off x="1359442" y="5211199"/>
+            <a:ext cx="322066" cy="322066"/>
+          </a:xfrm>
+          <a:prstGeom prst="rect">
+            <a:avLst/>
+          </a:prstGeom>
+        </p:spPr>
+      </p:pic>
+      <p:cxnSp>
+        <p:nvCxnSpPr>
+          <p:cNvPr id="84" name="Straight Arrow Connector 83">
+            <a:extLst>
+              <a:ext uri="{FF2B5EF4-FFF2-40B4-BE49-F238E27FC236}">
+                <a16:creationId xmlns:a16="http://schemas.microsoft.com/office/drawing/2014/main" id="{6B8EB073-2559-28AA-3793-BE5EE679BDD3}"/>
+              </a:ext>
+            </a:extLst>
+          </p:cNvPr>
+          <p:cNvCxnSpPr>
+            <a:cxnSpLocks/>
+          </p:cNvCxnSpPr>
+          <p:nvPr/>
+        </p:nvCxnSpPr>
+        <p:spPr>
+          <a:xfrm flipV="1">
+            <a:off x="1520475" y="5551517"/>
+            <a:ext cx="0" cy="173721"/>
+          </a:xfrm>
+          <a:prstGeom prst="straightConnector1">
+            <a:avLst/>
+          </a:prstGeom>
+          <a:ln>
+            <a:tailEnd type="triangle"/>
+          </a:ln>
+        </p:spPr>
+        <p:style>
+          <a:lnRef idx="2">
+            <a:schemeClr val="accent1"/>
+          </a:lnRef>
+          <a:fillRef idx="0">
+            <a:schemeClr val="accent1"/>
+          </a:fillRef>
+          <a:effectRef idx="1">
+            <a:schemeClr val="accent1"/>
+          </a:effectRef>
+          <a:fontRef idx="minor">
+            <a:schemeClr val="tx1"/>
+          </a:fontRef>
+        </p:style>
+      </p:cxnSp>
+      <p:sp>
+        <p:nvSpPr>
+          <p:cNvPr id="87" name="TextBox 86">
+            <a:extLst>
+              <a:ext uri="{FF2B5EF4-FFF2-40B4-BE49-F238E27FC236}">
+                <a16:creationId xmlns:a16="http://schemas.microsoft.com/office/drawing/2014/main" id="{E881672D-EF8F-AF67-4839-D9AB2092B761}"/>
+              </a:ext>
+            </a:extLst>
+          </p:cNvPr>
+          <p:cNvSpPr txBox="1"/>
+          <p:nvPr/>
+        </p:nvSpPr>
+        <p:spPr>
+          <a:xfrm>
+            <a:off x="6908113" y="4104495"/>
+            <a:ext cx="1088989" cy="400110"/>
+          </a:xfrm>
+          <a:prstGeom prst="rect">
+            <a:avLst/>
+          </a:prstGeom>
+          <a:noFill/>
+        </p:spPr>
+        <p:txBody>
+          <a:bodyPr wrap="square" rtlCol="0">
+            <a:spAutoFit/>
+          </a:bodyPr>
+          <a:lstStyle/>
+          <a:p>
+            <a:r>
+              <a:rPr lang="en-US" sz="1000" b="1" dirty="0">
+                <a:solidFill>
+                  <a:schemeClr val="accent6">
+                    <a:lumMod val="75000"/>
+                  </a:schemeClr>
+                </a:solidFill>
+              </a:rPr>
+              <a:t>Build wall area in matrix </a:t>
+            </a:r>
+            <a:endParaRPr lang="en-SG" sz="1000" b="1" dirty="0">
+              <a:solidFill>
+                <a:schemeClr val="accent6">
+                  <a:lumMod val="75000"/>
+                </a:schemeClr>
+              </a:solidFill>
+            </a:endParaRPr>
+          </a:p>
+        </p:txBody>
+      </p:sp>
+      <p:cxnSp>
+        <p:nvCxnSpPr>
+          <p:cNvPr id="88" name="Straight Arrow Connector 87">
+            <a:extLst>
+              <a:ext uri="{FF2B5EF4-FFF2-40B4-BE49-F238E27FC236}">
+                <a16:creationId xmlns:a16="http://schemas.microsoft.com/office/drawing/2014/main" id="{C5C2CC6F-3A90-FD8E-840E-CEA049A7477E}"/>
+              </a:ext>
+            </a:extLst>
+          </p:cNvPr>
+          <p:cNvCxnSpPr>
+            <a:cxnSpLocks/>
+          </p:cNvCxnSpPr>
+          <p:nvPr/>
+        </p:nvCxnSpPr>
+        <p:spPr>
+          <a:xfrm flipH="1">
+            <a:off x="1601256" y="5334891"/>
+            <a:ext cx="5169618" cy="31716"/>
+          </a:xfrm>
+          <a:prstGeom prst="straightConnector1">
+            <a:avLst/>
+          </a:prstGeom>
+          <a:ln w="12700">
+            <a:solidFill>
+              <a:srgbClr val="FF0000"/>
+            </a:solidFill>
+            <a:prstDash val="sysDash"/>
+            <a:tailEnd type="triangle"/>
+          </a:ln>
+        </p:spPr>
+        <p:style>
+          <a:lnRef idx="2">
+            <a:schemeClr val="accent1"/>
+          </a:lnRef>
+          <a:fillRef idx="0">
+            <a:schemeClr val="accent1"/>
+          </a:fillRef>
+          <a:effectRef idx="1">
+            <a:schemeClr val="accent1"/>
+          </a:effectRef>
+          <a:fontRef idx="minor">
+            <a:schemeClr val="tx1"/>
+          </a:fontRef>
+        </p:style>
+      </p:cxnSp>
+      <p:sp>
+        <p:nvSpPr>
+          <p:cNvPr id="89" name="TextBox 88">
+            <a:extLst>
+              <a:ext uri="{FF2B5EF4-FFF2-40B4-BE49-F238E27FC236}">
+                <a16:creationId xmlns:a16="http://schemas.microsoft.com/office/drawing/2014/main" id="{980A0F2D-AB1F-F53D-0F0C-080475A58D75}"/>
+              </a:ext>
+            </a:extLst>
+          </p:cNvPr>
+          <p:cNvSpPr txBox="1"/>
+          <p:nvPr/>
+        </p:nvSpPr>
+        <p:spPr>
+          <a:xfrm>
+            <a:off x="6162399" y="5178090"/>
+            <a:ext cx="416828" cy="246221"/>
+          </a:xfrm>
+          <a:prstGeom prst="rect">
+            <a:avLst/>
+          </a:prstGeom>
+          <a:noFill/>
+        </p:spPr>
+        <p:txBody>
+          <a:bodyPr wrap="square" rtlCol="0">
+            <a:spAutoFit/>
+          </a:bodyPr>
+          <a:lstStyle/>
+          <a:p>
+            <a:r>
+              <a:rPr lang="en-US" sz="1000" b="1" dirty="0"/>
+              <a:t>100</a:t>
+            </a:r>
+            <a:endParaRPr lang="en-SG" sz="1000" b="1" dirty="0"/>
+          </a:p>
+        </p:txBody>
+      </p:sp>
+      <p:sp>
+        <p:nvSpPr>
+          <p:cNvPr id="90" name="TextBox 89">
+            <a:extLst>
+              <a:ext uri="{FF2B5EF4-FFF2-40B4-BE49-F238E27FC236}">
+                <a16:creationId xmlns:a16="http://schemas.microsoft.com/office/drawing/2014/main" id="{E6C291E6-F030-B6E1-CA4B-DA7CEEA04861}"/>
+              </a:ext>
+            </a:extLst>
+          </p:cNvPr>
+          <p:cNvSpPr txBox="1"/>
+          <p:nvPr/>
+        </p:nvSpPr>
+        <p:spPr>
+          <a:xfrm>
+            <a:off x="1145442" y="5729519"/>
+            <a:ext cx="2429127" cy="246221"/>
+          </a:xfrm>
+          <a:prstGeom prst="rect">
+            <a:avLst/>
+          </a:prstGeom>
+          <a:noFill/>
+        </p:spPr>
+        <p:txBody>
+          <a:bodyPr wrap="square" rtlCol="0">
+            <a:spAutoFit/>
+          </a:bodyPr>
+          <a:lstStyle/>
+          <a:p>
+            <a:r>
+              <a:rPr lang="en-US" sz="1000" b="1" dirty="0"/>
+              <a:t>Robot microphones array</a:t>
+            </a:r>
+            <a:endParaRPr lang="en-SG" sz="1000" b="1" dirty="0"/>
+          </a:p>
+        </p:txBody>
+      </p:sp>
+      <p:sp>
+        <p:nvSpPr>
+          <p:cNvPr id="95" name="TextBox 94">
+            <a:extLst>
+              <a:ext uri="{FF2B5EF4-FFF2-40B4-BE49-F238E27FC236}">
+                <a16:creationId xmlns:a16="http://schemas.microsoft.com/office/drawing/2014/main" id="{9E07C2BE-2A08-C885-7223-146CED6862B2}"/>
+              </a:ext>
+            </a:extLst>
+          </p:cNvPr>
+          <p:cNvSpPr txBox="1"/>
+          <p:nvPr/>
+        </p:nvSpPr>
+        <p:spPr>
+          <a:xfrm>
+            <a:off x="4649559" y="4995616"/>
+            <a:ext cx="1303947" cy="400110"/>
+          </a:xfrm>
+          <a:prstGeom prst="rect">
+            <a:avLst/>
+          </a:prstGeom>
+          <a:noFill/>
+        </p:spPr>
+        <p:txBody>
+          <a:bodyPr wrap="square" rtlCol="0">
+            <a:spAutoFit/>
+          </a:bodyPr>
+          <a:lstStyle/>
+          <a:p>
+            <a:r>
+              <a:rPr lang="en-US" sz="1000" dirty="0">
+                <a:solidFill>
+                  <a:schemeClr val="accent2">
+                    <a:lumMod val="75000"/>
+                  </a:schemeClr>
+                </a:solidFill>
+              </a:rPr>
+              <a:t>Sound detection distance</a:t>
+            </a:r>
+            <a:endParaRPr lang="en-SG" sz="1000" dirty="0">
+              <a:solidFill>
+                <a:schemeClr val="accent2">
+                  <a:lumMod val="75000"/>
+                </a:schemeClr>
+              </a:solidFill>
+            </a:endParaRPr>
+          </a:p>
+        </p:txBody>
+      </p:sp>
+    </p:spTree>
+    <p:extLst>
+      <p:ext uri="{BB962C8B-B14F-4D97-AF65-F5344CB8AC3E}">
+        <p14:creationId xmlns:p14="http://schemas.microsoft.com/office/powerpoint/2010/main" val="646713909"/>
       </p:ext>
     </p:extLst>
   </p:cSld>

</xml_diff>

<commit_message>
update the map manager module and update the code enemy detection and prediction part.
</commit_message>
<xml_diff>
--- a/doc/designDoc.pptx
+++ b/doc/designDoc.pptx
@@ -5,7 +5,7 @@
     <p:sldMasterId id="2147483648" r:id="rId1"/>
   </p:sldMasterIdLst>
   <p:notesMasterIdLst>
-    <p:notesMasterId r:id="rId7"/>
+    <p:notesMasterId r:id="rId9"/>
   </p:notesMasterIdLst>
   <p:sldIdLst>
     <p:sldId id="256" r:id="rId2"/>
@@ -13,6 +13,8 @@
     <p:sldId id="258" r:id="rId4"/>
     <p:sldId id="259" r:id="rId5"/>
     <p:sldId id="260" r:id="rId6"/>
+    <p:sldId id="261" r:id="rId7"/>
+    <p:sldId id="262" r:id="rId8"/>
   </p:sldIdLst>
   <p:sldSz cx="12192000" cy="6858000"/>
   <p:notesSz cx="6858000" cy="9144000"/>
@@ -11636,6 +11638,3313 @@
     <p:extLst>
       <p:ext uri="{BB962C8B-B14F-4D97-AF65-F5344CB8AC3E}">
         <p14:creationId xmlns:p14="http://schemas.microsoft.com/office/powerpoint/2010/main" val="646713909"/>
+      </p:ext>
+    </p:extLst>
+  </p:cSld>
+  <p:clrMapOvr>
+    <a:masterClrMapping/>
+  </p:clrMapOvr>
+</p:sld>
+</file>
+
+<file path=ppt/slides/slide6.xml><?xml version="1.0" encoding="utf-8"?>
+<p:sld xmlns:a="http://schemas.openxmlformats.org/drawingml/2006/main" xmlns:r="http://schemas.openxmlformats.org/officeDocument/2006/relationships" xmlns:p="http://schemas.openxmlformats.org/presentationml/2006/main">
+  <p:cSld>
+    <p:spTree>
+      <p:nvGrpSpPr>
+        <p:cNvPr id="1" name=""/>
+        <p:cNvGrpSpPr/>
+        <p:nvPr/>
+      </p:nvGrpSpPr>
+      <p:grpSpPr>
+        <a:xfrm>
+          <a:off x="0" y="0"/>
+          <a:ext cx="0" cy="0"/>
+          <a:chOff x="0" y="0"/>
+          <a:chExt cx="0" cy="0"/>
+        </a:xfrm>
+      </p:grpSpPr>
+      <p:sp>
+        <p:nvSpPr>
+          <p:cNvPr id="10" name="Isosceles Triangle 9">
+            <a:extLst>
+              <a:ext uri="{FF2B5EF4-FFF2-40B4-BE49-F238E27FC236}">
+                <a16:creationId xmlns:a16="http://schemas.microsoft.com/office/drawing/2014/main" id="{CF8CAEE2-A640-1428-7D55-6AEC86A8394E}"/>
+              </a:ext>
+            </a:extLst>
+          </p:cNvPr>
+          <p:cNvSpPr/>
+          <p:nvPr/>
+        </p:nvSpPr>
+        <p:spPr>
+          <a:xfrm rot="16200000">
+            <a:off x="1683518" y="1571249"/>
+            <a:ext cx="2233467" cy="1955274"/>
+          </a:xfrm>
+          <a:prstGeom prst="triangle">
+            <a:avLst>
+              <a:gd name="adj" fmla="val 56313"/>
+            </a:avLst>
+          </a:prstGeom>
+          <a:solidFill>
+            <a:schemeClr val="accent6">
+              <a:lumMod val="20000"/>
+              <a:lumOff val="80000"/>
+            </a:schemeClr>
+          </a:solidFill>
+          <a:ln>
+            <a:solidFill>
+              <a:schemeClr val="bg1"/>
+            </a:solidFill>
+          </a:ln>
+        </p:spPr>
+        <p:style>
+          <a:lnRef idx="2">
+            <a:schemeClr val="accent1">
+              <a:shade val="15000"/>
+            </a:schemeClr>
+          </a:lnRef>
+          <a:fillRef idx="1">
+            <a:schemeClr val="accent1"/>
+          </a:fillRef>
+          <a:effectRef idx="0">
+            <a:schemeClr val="accent1"/>
+          </a:effectRef>
+          <a:fontRef idx="minor">
+            <a:schemeClr val="lt1"/>
+          </a:fontRef>
+        </p:style>
+        <p:txBody>
+          <a:bodyPr rtlCol="0" anchor="ctr"/>
+          <a:lstStyle/>
+          <a:p>
+            <a:pPr algn="ctr"/>
+            <a:endParaRPr lang="en-SG" dirty="0"/>
+          </a:p>
+        </p:txBody>
+      </p:sp>
+      <p:pic>
+        <p:nvPicPr>
+          <p:cNvPr id="4" name="Picture 3">
+            <a:extLst>
+              <a:ext uri="{FF2B5EF4-FFF2-40B4-BE49-F238E27FC236}">
+                <a16:creationId xmlns:a16="http://schemas.microsoft.com/office/drawing/2014/main" id="{D3340460-293B-1FDD-357B-CDBC29E61FBE}"/>
+              </a:ext>
+            </a:extLst>
+          </p:cNvPr>
+          <p:cNvPicPr>
+            <a:picLocks noChangeAspect="1"/>
+          </p:cNvPicPr>
+          <p:nvPr/>
+        </p:nvPicPr>
+        <p:blipFill>
+          <a:blip r:embed="rId2"/>
+          <a:stretch>
+            <a:fillRect/>
+          </a:stretch>
+        </p:blipFill>
+        <p:spPr>
+          <a:xfrm rot="10800000">
+            <a:off x="980336" y="2285344"/>
+            <a:ext cx="855287" cy="672778"/>
+          </a:xfrm>
+          <a:prstGeom prst="rect">
+            <a:avLst/>
+          </a:prstGeom>
+        </p:spPr>
+      </p:pic>
+      <p:pic>
+        <p:nvPicPr>
+          <p:cNvPr id="5" name="Picture 4">
+            <a:extLst>
+              <a:ext uri="{FF2B5EF4-FFF2-40B4-BE49-F238E27FC236}">
+                <a16:creationId xmlns:a16="http://schemas.microsoft.com/office/drawing/2014/main" id="{218691D7-6530-3F00-F901-B6C871591187}"/>
+              </a:ext>
+            </a:extLst>
+          </p:cNvPr>
+          <p:cNvPicPr>
+            <a:picLocks noChangeAspect="1"/>
+          </p:cNvPicPr>
+          <p:nvPr/>
+        </p:nvPicPr>
+        <p:blipFill>
+          <a:blip r:embed="rId3"/>
+          <a:stretch>
+            <a:fillRect/>
+          </a:stretch>
+        </p:blipFill>
+        <p:spPr>
+          <a:xfrm>
+            <a:off x="1769173" y="2621733"/>
+            <a:ext cx="331491" cy="265193"/>
+          </a:xfrm>
+          <a:prstGeom prst="rect">
+            <a:avLst/>
+          </a:prstGeom>
+        </p:spPr>
+      </p:pic>
+      <p:pic>
+        <p:nvPicPr>
+          <p:cNvPr id="6" name="Graphic 5" descr="Web cam with solid fill">
+            <a:extLst>
+              <a:ext uri="{FF2B5EF4-FFF2-40B4-BE49-F238E27FC236}">
+                <a16:creationId xmlns:a16="http://schemas.microsoft.com/office/drawing/2014/main" id="{3D842408-619E-385D-A8C2-9418DC3999EB}"/>
+              </a:ext>
+            </a:extLst>
+          </p:cNvPr>
+          <p:cNvPicPr>
+            <a:picLocks noChangeAspect="1"/>
+          </p:cNvPicPr>
+          <p:nvPr/>
+        </p:nvPicPr>
+        <p:blipFill>
+          <a:blip r:embed="rId4">
+            <a:extLst>
+              <a:ext uri="{96DAC541-7B7A-43D3-8B79-37D633B846F1}">
+                <asvg:svgBlip xmlns:asvg="http://schemas.microsoft.com/office/drawing/2016/SVG/main" r:embed="rId5"/>
+              </a:ext>
+            </a:extLst>
+          </a:blip>
+          <a:stretch>
+            <a:fillRect/>
+          </a:stretch>
+        </p:blipFill>
+        <p:spPr>
+          <a:xfrm>
+            <a:off x="1509239" y="2253227"/>
+            <a:ext cx="400623" cy="400623"/>
+          </a:xfrm>
+          <a:prstGeom prst="rect">
+            <a:avLst/>
+          </a:prstGeom>
+        </p:spPr>
+      </p:pic>
+      <p:pic>
+        <p:nvPicPr>
+          <p:cNvPr id="7" name="Picture 6">
+            <a:extLst>
+              <a:ext uri="{FF2B5EF4-FFF2-40B4-BE49-F238E27FC236}">
+                <a16:creationId xmlns:a16="http://schemas.microsoft.com/office/drawing/2014/main" id="{B49C20F2-1709-B86A-2B7D-7837E15090AC}"/>
+              </a:ext>
+            </a:extLst>
+          </p:cNvPr>
+          <p:cNvPicPr>
+            <a:picLocks noChangeAspect="1"/>
+          </p:cNvPicPr>
+          <p:nvPr/>
+        </p:nvPicPr>
+        <p:blipFill>
+          <a:blip r:embed="rId6">
+            <a:duotone>
+              <a:schemeClr val="accent2">
+                <a:shade val="45000"/>
+                <a:satMod val="135000"/>
+              </a:schemeClr>
+              <a:prstClr val="white"/>
+            </a:duotone>
+          </a:blip>
+          <a:stretch>
+            <a:fillRect/>
+          </a:stretch>
+        </p:blipFill>
+        <p:spPr>
+          <a:xfrm>
+            <a:off x="3437409" y="1893334"/>
+            <a:ext cx="313375" cy="603365"/>
+          </a:xfrm>
+          <a:prstGeom prst="rect">
+            <a:avLst/>
+          </a:prstGeom>
+          <a:ln>
+            <a:solidFill>
+              <a:srgbClr val="FF0000"/>
+            </a:solidFill>
+          </a:ln>
+        </p:spPr>
+      </p:pic>
+      <p:sp>
+        <p:nvSpPr>
+          <p:cNvPr id="11" name="TextBox 10">
+            <a:extLst>
+              <a:ext uri="{FF2B5EF4-FFF2-40B4-BE49-F238E27FC236}">
+                <a16:creationId xmlns:a16="http://schemas.microsoft.com/office/drawing/2014/main" id="{28F58DB3-FE52-9DFE-9037-2ABDA4EB9086}"/>
+              </a:ext>
+            </a:extLst>
+          </p:cNvPr>
+          <p:cNvSpPr txBox="1"/>
+          <p:nvPr/>
+        </p:nvSpPr>
+        <p:spPr>
+          <a:xfrm>
+            <a:off x="3077735" y="2734427"/>
+            <a:ext cx="1002931" cy="600164"/>
+          </a:xfrm>
+          <a:prstGeom prst="rect">
+            <a:avLst/>
+          </a:prstGeom>
+          <a:noFill/>
+        </p:spPr>
+        <p:txBody>
+          <a:bodyPr wrap="square" rtlCol="0">
+            <a:spAutoFit/>
+          </a:bodyPr>
+          <a:lstStyle/>
+          <a:p>
+            <a:r>
+              <a:rPr lang="en-US" sz="1100" b="1" dirty="0">
+                <a:solidFill>
+                  <a:schemeClr val="accent6">
+                    <a:lumMod val="75000"/>
+                  </a:schemeClr>
+                </a:solidFill>
+              </a:rPr>
+              <a:t>Camera Detection Sector</a:t>
+            </a:r>
+            <a:endParaRPr lang="en-SG" sz="1100" b="1" dirty="0">
+              <a:solidFill>
+                <a:schemeClr val="accent6">
+                  <a:lumMod val="75000"/>
+                </a:schemeClr>
+              </a:solidFill>
+            </a:endParaRPr>
+          </a:p>
+        </p:txBody>
+      </p:sp>
+      <p:cxnSp>
+        <p:nvCxnSpPr>
+          <p:cNvPr id="13" name="Straight Connector 12">
+            <a:extLst>
+              <a:ext uri="{FF2B5EF4-FFF2-40B4-BE49-F238E27FC236}">
+                <a16:creationId xmlns:a16="http://schemas.microsoft.com/office/drawing/2014/main" id="{0867EB48-805D-CCD2-3F8C-90CB4368D5B2}"/>
+              </a:ext>
+            </a:extLst>
+          </p:cNvPr>
+          <p:cNvCxnSpPr>
+            <a:stCxn id="10" idx="0"/>
+          </p:cNvCxnSpPr>
+          <p:nvPr/>
+        </p:nvCxnSpPr>
+        <p:spPr>
+          <a:xfrm flipV="1">
+            <a:off x="1822615" y="1893334"/>
+            <a:ext cx="1614794" cy="514554"/>
+          </a:xfrm>
+          <a:prstGeom prst="line">
+            <a:avLst/>
+          </a:prstGeom>
+          <a:ln w="12700">
+            <a:solidFill>
+              <a:srgbClr val="C00000"/>
+            </a:solidFill>
+            <a:prstDash val="sysDash"/>
+          </a:ln>
+        </p:spPr>
+        <p:style>
+          <a:lnRef idx="2">
+            <a:schemeClr val="accent1"/>
+          </a:lnRef>
+          <a:fillRef idx="0">
+            <a:schemeClr val="accent1"/>
+          </a:fillRef>
+          <a:effectRef idx="1">
+            <a:schemeClr val="accent1"/>
+          </a:effectRef>
+          <a:fontRef idx="minor">
+            <a:schemeClr val="tx1"/>
+          </a:fontRef>
+        </p:style>
+      </p:cxnSp>
+      <p:cxnSp>
+        <p:nvCxnSpPr>
+          <p:cNvPr id="14" name="Straight Connector 13">
+            <a:extLst>
+              <a:ext uri="{FF2B5EF4-FFF2-40B4-BE49-F238E27FC236}">
+                <a16:creationId xmlns:a16="http://schemas.microsoft.com/office/drawing/2014/main" id="{C1BB5FF4-9567-8363-28E7-DECE1BFDD695}"/>
+              </a:ext>
+            </a:extLst>
+          </p:cNvPr>
+          <p:cNvCxnSpPr>
+            <a:cxnSpLocks/>
+          </p:cNvCxnSpPr>
+          <p:nvPr/>
+        </p:nvCxnSpPr>
+        <p:spPr>
+          <a:xfrm>
+            <a:off x="1822613" y="2437711"/>
+            <a:ext cx="1614795" cy="91105"/>
+          </a:xfrm>
+          <a:prstGeom prst="line">
+            <a:avLst/>
+          </a:prstGeom>
+          <a:ln w="12700">
+            <a:solidFill>
+              <a:srgbClr val="C00000"/>
+            </a:solidFill>
+            <a:prstDash val="sysDash"/>
+          </a:ln>
+        </p:spPr>
+        <p:style>
+          <a:lnRef idx="2">
+            <a:schemeClr val="accent1"/>
+          </a:lnRef>
+          <a:fillRef idx="0">
+            <a:schemeClr val="accent1"/>
+          </a:fillRef>
+          <a:effectRef idx="1">
+            <a:schemeClr val="accent1"/>
+          </a:effectRef>
+          <a:fontRef idx="minor">
+            <a:schemeClr val="tx1"/>
+          </a:fontRef>
+        </p:style>
+      </p:cxnSp>
+      <p:pic>
+        <p:nvPicPr>
+          <p:cNvPr id="17" name="Graphic 16" descr="Badge Cross outline">
+            <a:extLst>
+              <a:ext uri="{FF2B5EF4-FFF2-40B4-BE49-F238E27FC236}">
+                <a16:creationId xmlns:a16="http://schemas.microsoft.com/office/drawing/2014/main" id="{A8E5BB69-580B-C0C4-3F34-2B96490B4823}"/>
+              </a:ext>
+            </a:extLst>
+          </p:cNvPr>
+          <p:cNvPicPr>
+            <a:picLocks noChangeAspect="1"/>
+          </p:cNvPicPr>
+          <p:nvPr/>
+        </p:nvPicPr>
+        <p:blipFill>
+          <a:blip r:embed="rId7">
+            <a:extLst>
+              <a:ext uri="{96DAC541-7B7A-43D3-8B79-37D633B846F1}">
+                <asvg:svgBlip xmlns:asvg="http://schemas.microsoft.com/office/drawing/2016/SVG/main" r:embed="rId8"/>
+              </a:ext>
+            </a:extLst>
+          </a:blip>
+          <a:stretch>
+            <a:fillRect/>
+          </a:stretch>
+        </p:blipFill>
+        <p:spPr>
+          <a:xfrm rot="2636227">
+            <a:off x="3346684" y="1960993"/>
+            <a:ext cx="487075" cy="487075"/>
+          </a:xfrm>
+          <a:prstGeom prst="rect">
+            <a:avLst/>
+          </a:prstGeom>
+        </p:spPr>
+      </p:pic>
+      <p:sp>
+        <p:nvSpPr>
+          <p:cNvPr id="19" name="TextBox 18">
+            <a:extLst>
+              <a:ext uri="{FF2B5EF4-FFF2-40B4-BE49-F238E27FC236}">
+                <a16:creationId xmlns:a16="http://schemas.microsoft.com/office/drawing/2014/main" id="{07458656-C917-B0EC-437F-9D094E54B46D}"/>
+              </a:ext>
+            </a:extLst>
+          </p:cNvPr>
+          <p:cNvSpPr txBox="1"/>
+          <p:nvPr/>
+        </p:nvSpPr>
+        <p:spPr>
+          <a:xfrm>
+            <a:off x="1116658" y="1867755"/>
+            <a:ext cx="1358471" cy="400110"/>
+          </a:xfrm>
+          <a:prstGeom prst="rect">
+            <a:avLst/>
+          </a:prstGeom>
+          <a:noFill/>
+        </p:spPr>
+        <p:txBody>
+          <a:bodyPr wrap="square" rtlCol="0">
+            <a:spAutoFit/>
+          </a:bodyPr>
+          <a:lstStyle/>
+          <a:p>
+            <a:r>
+              <a:rPr lang="en-US" sz="1000" b="1" dirty="0">
+                <a:solidFill>
+                  <a:schemeClr val="accent2">
+                    <a:lumMod val="75000"/>
+                  </a:schemeClr>
+                </a:solidFill>
+              </a:rPr>
+              <a:t>Camera Enemy  Direction Detection</a:t>
+            </a:r>
+            <a:endParaRPr lang="en-SG" sz="1000" b="1" dirty="0">
+              <a:solidFill>
+                <a:schemeClr val="accent2">
+                  <a:lumMod val="75000"/>
+                </a:schemeClr>
+              </a:solidFill>
+            </a:endParaRPr>
+          </a:p>
+        </p:txBody>
+      </p:sp>
+      <p:cxnSp>
+        <p:nvCxnSpPr>
+          <p:cNvPr id="22" name="Straight Connector 21">
+            <a:extLst>
+              <a:ext uri="{FF2B5EF4-FFF2-40B4-BE49-F238E27FC236}">
+                <a16:creationId xmlns:a16="http://schemas.microsoft.com/office/drawing/2014/main" id="{F8F8509C-15DB-112E-1233-BF91545EBABE}"/>
+              </a:ext>
+            </a:extLst>
+          </p:cNvPr>
+          <p:cNvCxnSpPr>
+            <a:stCxn id="5" idx="3"/>
+          </p:cNvCxnSpPr>
+          <p:nvPr/>
+        </p:nvCxnSpPr>
+        <p:spPr>
+          <a:xfrm flipV="1">
+            <a:off x="2100664" y="1893334"/>
+            <a:ext cx="1336744" cy="860996"/>
+          </a:xfrm>
+          <a:prstGeom prst="line">
+            <a:avLst/>
+          </a:prstGeom>
+        </p:spPr>
+        <p:style>
+          <a:lnRef idx="2">
+            <a:schemeClr val="accent1"/>
+          </a:lnRef>
+          <a:fillRef idx="0">
+            <a:schemeClr val="accent1"/>
+          </a:fillRef>
+          <a:effectRef idx="1">
+            <a:schemeClr val="accent1"/>
+          </a:effectRef>
+          <a:fontRef idx="minor">
+            <a:schemeClr val="tx1"/>
+          </a:fontRef>
+        </p:style>
+      </p:cxnSp>
+      <p:cxnSp>
+        <p:nvCxnSpPr>
+          <p:cNvPr id="23" name="Straight Connector 22">
+            <a:extLst>
+              <a:ext uri="{FF2B5EF4-FFF2-40B4-BE49-F238E27FC236}">
+                <a16:creationId xmlns:a16="http://schemas.microsoft.com/office/drawing/2014/main" id="{C54864A3-AFB9-FBD1-F1EB-84AE62E11CD2}"/>
+              </a:ext>
+            </a:extLst>
+          </p:cNvPr>
+          <p:cNvCxnSpPr>
+            <a:cxnSpLocks/>
+            <a:stCxn id="5" idx="3"/>
+          </p:cNvCxnSpPr>
+          <p:nvPr/>
+        </p:nvCxnSpPr>
+        <p:spPr>
+          <a:xfrm flipV="1">
+            <a:off x="2100664" y="2568226"/>
+            <a:ext cx="1309640" cy="186104"/>
+          </a:xfrm>
+          <a:prstGeom prst="line">
+            <a:avLst/>
+          </a:prstGeom>
+        </p:spPr>
+        <p:style>
+          <a:lnRef idx="2">
+            <a:schemeClr val="accent1"/>
+          </a:lnRef>
+          <a:fillRef idx="0">
+            <a:schemeClr val="accent1"/>
+          </a:fillRef>
+          <a:effectRef idx="1">
+            <a:schemeClr val="accent1"/>
+          </a:effectRef>
+          <a:fontRef idx="minor">
+            <a:schemeClr val="tx1"/>
+          </a:fontRef>
+        </p:style>
+      </p:cxnSp>
+      <p:sp>
+        <p:nvSpPr>
+          <p:cNvPr id="26" name="TextBox 25">
+            <a:extLst>
+              <a:ext uri="{FF2B5EF4-FFF2-40B4-BE49-F238E27FC236}">
+                <a16:creationId xmlns:a16="http://schemas.microsoft.com/office/drawing/2014/main" id="{3701EFDE-A02C-A939-CFB4-8420A15ECD6E}"/>
+              </a:ext>
+            </a:extLst>
+          </p:cNvPr>
+          <p:cNvSpPr txBox="1"/>
+          <p:nvPr/>
+        </p:nvSpPr>
+        <p:spPr>
+          <a:xfrm>
+            <a:off x="1822441" y="2886926"/>
+            <a:ext cx="1336004" cy="400110"/>
+          </a:xfrm>
+          <a:prstGeom prst="rect">
+            <a:avLst/>
+          </a:prstGeom>
+          <a:noFill/>
+        </p:spPr>
+        <p:txBody>
+          <a:bodyPr wrap="square" rtlCol="0">
+            <a:spAutoFit/>
+          </a:bodyPr>
+          <a:lstStyle/>
+          <a:p>
+            <a:r>
+              <a:rPr lang="en-US" sz="1000" b="1" dirty="0">
+                <a:solidFill>
+                  <a:schemeClr val="accent1"/>
+                </a:solidFill>
+              </a:rPr>
+              <a:t>Lidar Enemy Distance Detection</a:t>
+            </a:r>
+            <a:endParaRPr lang="en-SG" sz="1000" b="1" dirty="0">
+              <a:solidFill>
+                <a:schemeClr val="accent1"/>
+              </a:solidFill>
+            </a:endParaRPr>
+          </a:p>
+        </p:txBody>
+      </p:sp>
+      <p:pic>
+        <p:nvPicPr>
+          <p:cNvPr id="28" name="Picture 27">
+            <a:extLst>
+              <a:ext uri="{FF2B5EF4-FFF2-40B4-BE49-F238E27FC236}">
+                <a16:creationId xmlns:a16="http://schemas.microsoft.com/office/drawing/2014/main" id="{77EF5EFA-77F0-0C74-A242-5565D3BD090D}"/>
+              </a:ext>
+            </a:extLst>
+          </p:cNvPr>
+          <p:cNvPicPr>
+            <a:picLocks noChangeAspect="1"/>
+          </p:cNvPicPr>
+          <p:nvPr/>
+        </p:nvPicPr>
+        <p:blipFill>
+          <a:blip r:embed="rId9"/>
+          <a:stretch>
+            <a:fillRect/>
+          </a:stretch>
+        </p:blipFill>
+        <p:spPr>
+          <a:xfrm>
+            <a:off x="4091264" y="2103398"/>
+            <a:ext cx="3135446" cy="2343419"/>
+          </a:xfrm>
+          <a:prstGeom prst="rect">
+            <a:avLst/>
+          </a:prstGeom>
+          <a:ln w="9525">
+            <a:solidFill>
+              <a:schemeClr val="tx1"/>
+            </a:solidFill>
+          </a:ln>
+        </p:spPr>
+      </p:pic>
+      <p:pic>
+        <p:nvPicPr>
+          <p:cNvPr id="29" name="Picture 28">
+            <a:extLst>
+              <a:ext uri="{FF2B5EF4-FFF2-40B4-BE49-F238E27FC236}">
+                <a16:creationId xmlns:a16="http://schemas.microsoft.com/office/drawing/2014/main" id="{FEFF1F4C-D41C-AAA6-2872-357E5BCF7BCF}"/>
+              </a:ext>
+            </a:extLst>
+          </p:cNvPr>
+          <p:cNvPicPr>
+            <a:picLocks noChangeAspect="1"/>
+          </p:cNvPicPr>
+          <p:nvPr/>
+        </p:nvPicPr>
+        <p:blipFill>
+          <a:blip r:embed="rId10"/>
+          <a:stretch>
+            <a:fillRect/>
+          </a:stretch>
+        </p:blipFill>
+        <p:spPr>
+          <a:xfrm>
+            <a:off x="1577619" y="3646877"/>
+            <a:ext cx="855288" cy="842711"/>
+          </a:xfrm>
+          <a:prstGeom prst="rect">
+            <a:avLst/>
+          </a:prstGeom>
+        </p:spPr>
+      </p:pic>
+      <p:sp>
+        <p:nvSpPr>
+          <p:cNvPr id="30" name="TextBox 29">
+            <a:extLst>
+              <a:ext uri="{FF2B5EF4-FFF2-40B4-BE49-F238E27FC236}">
+                <a16:creationId xmlns:a16="http://schemas.microsoft.com/office/drawing/2014/main" id="{3C9B1DB3-B7B5-C0CF-BE1F-7E5B2376A70D}"/>
+              </a:ext>
+            </a:extLst>
+          </p:cNvPr>
+          <p:cNvSpPr txBox="1"/>
+          <p:nvPr/>
+        </p:nvSpPr>
+        <p:spPr>
+          <a:xfrm>
+            <a:off x="1509239" y="4446817"/>
+            <a:ext cx="1755883" cy="430887"/>
+          </a:xfrm>
+          <a:prstGeom prst="rect">
+            <a:avLst/>
+          </a:prstGeom>
+          <a:noFill/>
+        </p:spPr>
+        <p:txBody>
+          <a:bodyPr wrap="square" rtlCol="0">
+            <a:spAutoFit/>
+          </a:bodyPr>
+          <a:lstStyle/>
+          <a:p>
+            <a:r>
+              <a:rPr lang="en-US" sz="1100" b="1" dirty="0"/>
+              <a:t>Enemy detection data processer </a:t>
+            </a:r>
+            <a:endParaRPr lang="en-SG" sz="1100" b="1" dirty="0"/>
+          </a:p>
+        </p:txBody>
+      </p:sp>
+      <p:cxnSp>
+        <p:nvCxnSpPr>
+          <p:cNvPr id="32" name="Connector: Elbow 31">
+            <a:extLst>
+              <a:ext uri="{FF2B5EF4-FFF2-40B4-BE49-F238E27FC236}">
+                <a16:creationId xmlns:a16="http://schemas.microsoft.com/office/drawing/2014/main" id="{CA724C61-1D3E-7155-7B4B-2F859449286E}"/>
+              </a:ext>
+            </a:extLst>
+          </p:cNvPr>
+          <p:cNvCxnSpPr>
+            <a:cxnSpLocks/>
+            <a:stCxn id="6" idx="1"/>
+            <a:endCxn id="29" idx="1"/>
+          </p:cNvCxnSpPr>
+          <p:nvPr/>
+        </p:nvCxnSpPr>
+        <p:spPr>
+          <a:xfrm rot="10800000" flipH="1" flipV="1">
+            <a:off x="1509239" y="2453539"/>
+            <a:ext cx="68380" cy="1614694"/>
+          </a:xfrm>
+          <a:prstGeom prst="bentConnector3">
+            <a:avLst>
+              <a:gd name="adj1" fmla="val -334308"/>
+            </a:avLst>
+          </a:prstGeom>
+          <a:ln w="12700">
+            <a:tailEnd type="triangle"/>
+          </a:ln>
+        </p:spPr>
+        <p:style>
+          <a:lnRef idx="2">
+            <a:schemeClr val="accent1"/>
+          </a:lnRef>
+          <a:fillRef idx="0">
+            <a:schemeClr val="accent1"/>
+          </a:fillRef>
+          <a:effectRef idx="1">
+            <a:schemeClr val="accent1"/>
+          </a:effectRef>
+          <a:fontRef idx="minor">
+            <a:schemeClr val="tx1"/>
+          </a:fontRef>
+        </p:style>
+      </p:cxnSp>
+      <p:pic>
+        <p:nvPicPr>
+          <p:cNvPr id="38" name="Picture 37">
+            <a:extLst>
+              <a:ext uri="{FF2B5EF4-FFF2-40B4-BE49-F238E27FC236}">
+                <a16:creationId xmlns:a16="http://schemas.microsoft.com/office/drawing/2014/main" id="{FFE455DE-864E-6803-9169-9FF584A2123E}"/>
+              </a:ext>
+            </a:extLst>
+          </p:cNvPr>
+          <p:cNvPicPr>
+            <a:picLocks noChangeAspect="1"/>
+          </p:cNvPicPr>
+          <p:nvPr/>
+        </p:nvPicPr>
+        <p:blipFill>
+          <a:blip r:embed="rId11"/>
+          <a:stretch>
+            <a:fillRect/>
+          </a:stretch>
+        </p:blipFill>
+        <p:spPr>
+          <a:xfrm>
+            <a:off x="817399" y="2298954"/>
+            <a:ext cx="325870" cy="538543"/>
+          </a:xfrm>
+          <a:prstGeom prst="rect">
+            <a:avLst/>
+          </a:prstGeom>
+          <a:ln>
+            <a:solidFill>
+              <a:srgbClr val="0070C0"/>
+            </a:solidFill>
+          </a:ln>
+        </p:spPr>
+      </p:pic>
+      <p:cxnSp>
+        <p:nvCxnSpPr>
+          <p:cNvPr id="39" name="Connector: Elbow 38">
+            <a:extLst>
+              <a:ext uri="{FF2B5EF4-FFF2-40B4-BE49-F238E27FC236}">
+                <a16:creationId xmlns:a16="http://schemas.microsoft.com/office/drawing/2014/main" id="{AFA38B1B-521C-D267-5432-5A24A665C103}"/>
+              </a:ext>
+            </a:extLst>
+          </p:cNvPr>
+          <p:cNvCxnSpPr>
+            <a:cxnSpLocks/>
+            <a:stCxn id="38" idx="2"/>
+          </p:cNvCxnSpPr>
+          <p:nvPr/>
+        </p:nvCxnSpPr>
+        <p:spPr>
+          <a:xfrm rot="16200000" flipH="1">
+            <a:off x="737676" y="3080155"/>
+            <a:ext cx="1062382" cy="577066"/>
+          </a:xfrm>
+          <a:prstGeom prst="bentConnector3">
+            <a:avLst>
+              <a:gd name="adj1" fmla="val 101365"/>
+            </a:avLst>
+          </a:prstGeom>
+          <a:ln w="12700">
+            <a:tailEnd type="triangle"/>
+          </a:ln>
+        </p:spPr>
+        <p:style>
+          <a:lnRef idx="2">
+            <a:schemeClr val="accent1"/>
+          </a:lnRef>
+          <a:fillRef idx="0">
+            <a:schemeClr val="accent1"/>
+          </a:fillRef>
+          <a:effectRef idx="1">
+            <a:schemeClr val="accent1"/>
+          </a:effectRef>
+          <a:fontRef idx="minor">
+            <a:schemeClr val="tx1"/>
+          </a:fontRef>
+        </p:style>
+      </p:cxnSp>
+      <p:cxnSp>
+        <p:nvCxnSpPr>
+          <p:cNvPr id="43" name="Connector: Elbow 42">
+            <a:extLst>
+              <a:ext uri="{FF2B5EF4-FFF2-40B4-BE49-F238E27FC236}">
+                <a16:creationId xmlns:a16="http://schemas.microsoft.com/office/drawing/2014/main" id="{BA55775F-3BE6-ECCB-E8CB-093D8B815929}"/>
+              </a:ext>
+            </a:extLst>
+          </p:cNvPr>
+          <p:cNvCxnSpPr>
+            <a:cxnSpLocks/>
+            <a:stCxn id="5" idx="1"/>
+          </p:cNvCxnSpPr>
+          <p:nvPr/>
+        </p:nvCxnSpPr>
+        <p:spPr>
+          <a:xfrm rot="10800000" flipV="1">
+            <a:off x="1718175" y="2754330"/>
+            <a:ext cx="50999" cy="911290"/>
+          </a:xfrm>
+          <a:prstGeom prst="bentConnector2">
+            <a:avLst/>
+          </a:prstGeom>
+          <a:ln w="12700">
+            <a:tailEnd type="triangle"/>
+          </a:ln>
+        </p:spPr>
+        <p:style>
+          <a:lnRef idx="2">
+            <a:schemeClr val="accent1"/>
+          </a:lnRef>
+          <a:fillRef idx="0">
+            <a:schemeClr val="accent1"/>
+          </a:fillRef>
+          <a:effectRef idx="1">
+            <a:schemeClr val="accent1"/>
+          </a:effectRef>
+          <a:fontRef idx="minor">
+            <a:schemeClr val="tx1"/>
+          </a:fontRef>
+        </p:style>
+      </p:cxnSp>
+      <p:sp>
+        <p:nvSpPr>
+          <p:cNvPr id="47" name="TextBox 46">
+            <a:extLst>
+              <a:ext uri="{FF2B5EF4-FFF2-40B4-BE49-F238E27FC236}">
+                <a16:creationId xmlns:a16="http://schemas.microsoft.com/office/drawing/2014/main" id="{6F6201FB-0D5F-D161-1913-654D6D120B30}"/>
+              </a:ext>
+            </a:extLst>
+          </p:cNvPr>
+          <p:cNvSpPr txBox="1"/>
+          <p:nvPr/>
+        </p:nvSpPr>
+        <p:spPr>
+          <a:xfrm>
+            <a:off x="716570" y="3969663"/>
+            <a:ext cx="849414" cy="553998"/>
+          </a:xfrm>
+          <a:prstGeom prst="rect">
+            <a:avLst/>
+          </a:prstGeom>
+          <a:noFill/>
+        </p:spPr>
+        <p:txBody>
+          <a:bodyPr wrap="square" rtlCol="0">
+            <a:spAutoFit/>
+          </a:bodyPr>
+          <a:lstStyle/>
+          <a:p>
+            <a:r>
+              <a:rPr lang="en-US" sz="1000" dirty="0"/>
+              <a:t>Robot position data</a:t>
+            </a:r>
+            <a:endParaRPr lang="en-SG" sz="1000" dirty="0"/>
+          </a:p>
+        </p:txBody>
+      </p:sp>
+      <p:sp>
+        <p:nvSpPr>
+          <p:cNvPr id="48" name="TextBox 47">
+            <a:extLst>
+              <a:ext uri="{FF2B5EF4-FFF2-40B4-BE49-F238E27FC236}">
+                <a16:creationId xmlns:a16="http://schemas.microsoft.com/office/drawing/2014/main" id="{CD351504-B9E6-CFAF-9E32-98B9FE439112}"/>
+              </a:ext>
+            </a:extLst>
+          </p:cNvPr>
+          <p:cNvSpPr txBox="1"/>
+          <p:nvPr/>
+        </p:nvSpPr>
+        <p:spPr>
+          <a:xfrm>
+            <a:off x="1229967" y="2907280"/>
+            <a:ext cx="849414" cy="553998"/>
+          </a:xfrm>
+          <a:prstGeom prst="rect">
+            <a:avLst/>
+          </a:prstGeom>
+          <a:noFill/>
+        </p:spPr>
+        <p:txBody>
+          <a:bodyPr wrap="square" rtlCol="0">
+            <a:spAutoFit/>
+          </a:bodyPr>
+          <a:lstStyle/>
+          <a:p>
+            <a:r>
+              <a:rPr lang="en-US" sz="1000" dirty="0"/>
+              <a:t>Enemy direction data</a:t>
+            </a:r>
+            <a:endParaRPr lang="en-SG" sz="1000" dirty="0"/>
+          </a:p>
+        </p:txBody>
+      </p:sp>
+      <p:sp>
+        <p:nvSpPr>
+          <p:cNvPr id="49" name="TextBox 48">
+            <a:extLst>
+              <a:ext uri="{FF2B5EF4-FFF2-40B4-BE49-F238E27FC236}">
+                <a16:creationId xmlns:a16="http://schemas.microsoft.com/office/drawing/2014/main" id="{F81C65BA-DF63-1087-B665-8319F91B20EF}"/>
+              </a:ext>
+            </a:extLst>
+          </p:cNvPr>
+          <p:cNvSpPr txBox="1"/>
+          <p:nvPr/>
+        </p:nvSpPr>
+        <p:spPr>
+          <a:xfrm>
+            <a:off x="1664468" y="3239931"/>
+            <a:ext cx="979322" cy="400110"/>
+          </a:xfrm>
+          <a:prstGeom prst="rect">
+            <a:avLst/>
+          </a:prstGeom>
+          <a:noFill/>
+        </p:spPr>
+        <p:txBody>
+          <a:bodyPr wrap="square" rtlCol="0">
+            <a:spAutoFit/>
+          </a:bodyPr>
+          <a:lstStyle/>
+          <a:p>
+            <a:r>
+              <a:rPr lang="en-US" sz="1000" dirty="0"/>
+              <a:t>Object distance data</a:t>
+            </a:r>
+            <a:endParaRPr lang="en-SG" sz="1000" dirty="0"/>
+          </a:p>
+        </p:txBody>
+      </p:sp>
+      <p:cxnSp>
+        <p:nvCxnSpPr>
+          <p:cNvPr id="50" name="Connector: Elbow 49">
+            <a:extLst>
+              <a:ext uri="{FF2B5EF4-FFF2-40B4-BE49-F238E27FC236}">
+                <a16:creationId xmlns:a16="http://schemas.microsoft.com/office/drawing/2014/main" id="{36E24618-F06B-D79D-3EFC-6DFF58EFEEB6}"/>
+              </a:ext>
+            </a:extLst>
+          </p:cNvPr>
+          <p:cNvCxnSpPr>
+            <a:cxnSpLocks/>
+            <a:stCxn id="29" idx="3"/>
+          </p:cNvCxnSpPr>
+          <p:nvPr/>
+        </p:nvCxnSpPr>
+        <p:spPr>
+          <a:xfrm flipV="1">
+            <a:off x="2432907" y="3382146"/>
+            <a:ext cx="3503319" cy="686087"/>
+          </a:xfrm>
+          <a:prstGeom prst="bentConnector3">
+            <a:avLst>
+              <a:gd name="adj1" fmla="val 99887"/>
+            </a:avLst>
+          </a:prstGeom>
+          <a:ln w="12700">
+            <a:solidFill>
+              <a:srgbClr val="FF0000"/>
+            </a:solidFill>
+            <a:tailEnd type="triangle"/>
+          </a:ln>
+        </p:spPr>
+        <p:style>
+          <a:lnRef idx="2">
+            <a:schemeClr val="accent1"/>
+          </a:lnRef>
+          <a:fillRef idx="0">
+            <a:schemeClr val="accent1"/>
+          </a:fillRef>
+          <a:effectRef idx="1">
+            <a:schemeClr val="accent1"/>
+          </a:effectRef>
+          <a:fontRef idx="minor">
+            <a:schemeClr val="tx1"/>
+          </a:fontRef>
+        </p:style>
+      </p:cxnSp>
+      <p:sp>
+        <p:nvSpPr>
+          <p:cNvPr id="56" name="TextBox 55">
+            <a:extLst>
+              <a:ext uri="{FF2B5EF4-FFF2-40B4-BE49-F238E27FC236}">
+                <a16:creationId xmlns:a16="http://schemas.microsoft.com/office/drawing/2014/main" id="{3ADC64FA-9436-EFFE-D4D9-6D1A9546DAA6}"/>
+              </a:ext>
+            </a:extLst>
+          </p:cNvPr>
+          <p:cNvSpPr txBox="1"/>
+          <p:nvPr/>
+        </p:nvSpPr>
+        <p:spPr>
+          <a:xfrm>
+            <a:off x="2644176" y="3836028"/>
+            <a:ext cx="1559114" cy="246221"/>
+          </a:xfrm>
+          <a:prstGeom prst="rect">
+            <a:avLst/>
+          </a:prstGeom>
+          <a:noFill/>
+        </p:spPr>
+        <p:txBody>
+          <a:bodyPr wrap="square" rtlCol="0">
+            <a:spAutoFit/>
+          </a:bodyPr>
+          <a:lstStyle/>
+          <a:p>
+            <a:r>
+              <a:rPr lang="en-US" sz="1000" b="1" dirty="0">
+                <a:solidFill>
+                  <a:srgbClr val="C00000"/>
+                </a:solidFill>
+              </a:rPr>
+              <a:t>Enemy position data</a:t>
+            </a:r>
+            <a:endParaRPr lang="en-SG" sz="1000" b="1" dirty="0">
+              <a:solidFill>
+                <a:srgbClr val="C00000"/>
+              </a:solidFill>
+            </a:endParaRPr>
+          </a:p>
+        </p:txBody>
+      </p:sp>
+      <p:cxnSp>
+        <p:nvCxnSpPr>
+          <p:cNvPr id="58" name="Straight Arrow Connector 57">
+            <a:extLst>
+              <a:ext uri="{FF2B5EF4-FFF2-40B4-BE49-F238E27FC236}">
+                <a16:creationId xmlns:a16="http://schemas.microsoft.com/office/drawing/2014/main" id="{6E2A3537-327B-2373-2306-7617C2B08838}"/>
+              </a:ext>
+            </a:extLst>
+          </p:cNvPr>
+          <p:cNvCxnSpPr/>
+          <p:nvPr/>
+        </p:nvCxnSpPr>
+        <p:spPr>
+          <a:xfrm>
+            <a:off x="5523271" y="1736447"/>
+            <a:ext cx="0" cy="1239935"/>
+          </a:xfrm>
+          <a:prstGeom prst="straightConnector1">
+            <a:avLst/>
+          </a:prstGeom>
+          <a:ln w="12700">
+            <a:tailEnd type="triangle"/>
+          </a:ln>
+        </p:spPr>
+        <p:style>
+          <a:lnRef idx="2">
+            <a:schemeClr val="accent1"/>
+          </a:lnRef>
+          <a:fillRef idx="0">
+            <a:schemeClr val="accent1"/>
+          </a:fillRef>
+          <a:effectRef idx="1">
+            <a:schemeClr val="accent1"/>
+          </a:effectRef>
+          <a:fontRef idx="minor">
+            <a:schemeClr val="tx1"/>
+          </a:fontRef>
+        </p:style>
+      </p:cxnSp>
+      <p:sp>
+        <p:nvSpPr>
+          <p:cNvPr id="59" name="TextBox 58">
+            <a:extLst>
+              <a:ext uri="{FF2B5EF4-FFF2-40B4-BE49-F238E27FC236}">
+                <a16:creationId xmlns:a16="http://schemas.microsoft.com/office/drawing/2014/main" id="{D4AF8FB4-B0A6-58F1-1505-2C9C68386D98}"/>
+              </a:ext>
+            </a:extLst>
+          </p:cNvPr>
+          <p:cNvSpPr txBox="1"/>
+          <p:nvPr/>
+        </p:nvSpPr>
+        <p:spPr>
+          <a:xfrm>
+            <a:off x="5042781" y="1474837"/>
+            <a:ext cx="1053219" cy="261610"/>
+          </a:xfrm>
+          <a:prstGeom prst="rect">
+            <a:avLst/>
+          </a:prstGeom>
+          <a:noFill/>
+        </p:spPr>
+        <p:txBody>
+          <a:bodyPr wrap="square" rtlCol="0">
+            <a:spAutoFit/>
+          </a:bodyPr>
+          <a:lstStyle/>
+          <a:p>
+            <a:r>
+              <a:rPr lang="en-US" sz="1100" b="1" dirty="0"/>
+              <a:t>CQB Robot</a:t>
+            </a:r>
+            <a:endParaRPr lang="en-SG" sz="1100" b="1" dirty="0"/>
+          </a:p>
+        </p:txBody>
+      </p:sp>
+      <p:cxnSp>
+        <p:nvCxnSpPr>
+          <p:cNvPr id="60" name="Straight Arrow Connector 59">
+            <a:extLst>
+              <a:ext uri="{FF2B5EF4-FFF2-40B4-BE49-F238E27FC236}">
+                <a16:creationId xmlns:a16="http://schemas.microsoft.com/office/drawing/2014/main" id="{F6EFF554-A842-1D84-00F4-58234F4792C3}"/>
+              </a:ext>
+            </a:extLst>
+          </p:cNvPr>
+          <p:cNvCxnSpPr/>
+          <p:nvPr/>
+        </p:nvCxnSpPr>
+        <p:spPr>
+          <a:xfrm>
+            <a:off x="6199239" y="1928918"/>
+            <a:ext cx="0" cy="1239935"/>
+          </a:xfrm>
+          <a:prstGeom prst="straightConnector1">
+            <a:avLst/>
+          </a:prstGeom>
+          <a:ln w="12700">
+            <a:tailEnd type="triangle"/>
+          </a:ln>
+        </p:spPr>
+        <p:style>
+          <a:lnRef idx="2">
+            <a:schemeClr val="accent1"/>
+          </a:lnRef>
+          <a:fillRef idx="0">
+            <a:schemeClr val="accent1"/>
+          </a:fillRef>
+          <a:effectRef idx="1">
+            <a:schemeClr val="accent1"/>
+          </a:effectRef>
+          <a:fontRef idx="minor">
+            <a:schemeClr val="tx1"/>
+          </a:fontRef>
+        </p:style>
+      </p:cxnSp>
+      <p:cxnSp>
+        <p:nvCxnSpPr>
+          <p:cNvPr id="61" name="Straight Arrow Connector 60">
+            <a:extLst>
+              <a:ext uri="{FF2B5EF4-FFF2-40B4-BE49-F238E27FC236}">
+                <a16:creationId xmlns:a16="http://schemas.microsoft.com/office/drawing/2014/main" id="{401F8DE4-1938-F1C5-570B-68122AEB05EB}"/>
+              </a:ext>
+            </a:extLst>
+          </p:cNvPr>
+          <p:cNvCxnSpPr>
+            <a:cxnSpLocks/>
+          </p:cNvCxnSpPr>
+          <p:nvPr/>
+        </p:nvCxnSpPr>
+        <p:spPr>
+          <a:xfrm>
+            <a:off x="6359014" y="1928918"/>
+            <a:ext cx="0" cy="1762010"/>
+          </a:xfrm>
+          <a:prstGeom prst="straightConnector1">
+            <a:avLst/>
+          </a:prstGeom>
+          <a:ln w="12700">
+            <a:tailEnd type="triangle"/>
+          </a:ln>
+        </p:spPr>
+        <p:style>
+          <a:lnRef idx="2">
+            <a:schemeClr val="accent1"/>
+          </a:lnRef>
+          <a:fillRef idx="0">
+            <a:schemeClr val="accent1"/>
+          </a:fillRef>
+          <a:effectRef idx="1">
+            <a:schemeClr val="accent1"/>
+          </a:effectRef>
+          <a:fontRef idx="minor">
+            <a:schemeClr val="tx1"/>
+          </a:fontRef>
+        </p:style>
+      </p:cxnSp>
+      <p:sp>
+        <p:nvSpPr>
+          <p:cNvPr id="64" name="TextBox 63">
+            <a:extLst>
+              <a:ext uri="{FF2B5EF4-FFF2-40B4-BE49-F238E27FC236}">
+                <a16:creationId xmlns:a16="http://schemas.microsoft.com/office/drawing/2014/main" id="{DE2E2D45-FFC5-71F9-EC2E-97041EE69175}"/>
+              </a:ext>
+            </a:extLst>
+          </p:cNvPr>
+          <p:cNvSpPr txBox="1"/>
+          <p:nvPr/>
+        </p:nvSpPr>
+        <p:spPr>
+          <a:xfrm>
+            <a:off x="5851520" y="1479515"/>
+            <a:ext cx="1676487" cy="430887"/>
+          </a:xfrm>
+          <a:prstGeom prst="rect">
+            <a:avLst/>
+          </a:prstGeom>
+          <a:noFill/>
+        </p:spPr>
+        <p:txBody>
+          <a:bodyPr wrap="square" rtlCol="0">
+            <a:spAutoFit/>
+          </a:bodyPr>
+          <a:lstStyle/>
+          <a:p>
+            <a:r>
+              <a:rPr lang="en-US" sz="1100" b="1" dirty="0"/>
+              <a:t>Camera Visual Detection Area Sector</a:t>
+            </a:r>
+            <a:endParaRPr lang="en-SG" sz="1100" b="1" dirty="0"/>
+          </a:p>
+        </p:txBody>
+      </p:sp>
+      <p:cxnSp>
+        <p:nvCxnSpPr>
+          <p:cNvPr id="66" name="Straight Arrow Connector 65">
+            <a:extLst>
+              <a:ext uri="{FF2B5EF4-FFF2-40B4-BE49-F238E27FC236}">
+                <a16:creationId xmlns:a16="http://schemas.microsoft.com/office/drawing/2014/main" id="{BBEB364E-7AA2-E3B3-6CDC-2F1812BC9FC2}"/>
+              </a:ext>
+            </a:extLst>
+          </p:cNvPr>
+          <p:cNvCxnSpPr>
+            <a:cxnSpLocks/>
+          </p:cNvCxnSpPr>
+          <p:nvPr/>
+        </p:nvCxnSpPr>
+        <p:spPr>
+          <a:xfrm flipV="1">
+            <a:off x="5718688" y="3209975"/>
+            <a:ext cx="0" cy="1376773"/>
+          </a:xfrm>
+          <a:prstGeom prst="straightConnector1">
+            <a:avLst/>
+          </a:prstGeom>
+          <a:ln w="12700">
+            <a:tailEnd type="triangle"/>
+          </a:ln>
+        </p:spPr>
+        <p:style>
+          <a:lnRef idx="2">
+            <a:schemeClr val="accent1"/>
+          </a:lnRef>
+          <a:fillRef idx="0">
+            <a:schemeClr val="accent1"/>
+          </a:fillRef>
+          <a:effectRef idx="1">
+            <a:schemeClr val="accent1"/>
+          </a:effectRef>
+          <a:fontRef idx="minor">
+            <a:schemeClr val="tx1"/>
+          </a:fontRef>
+        </p:style>
+      </p:cxnSp>
+      <p:sp>
+        <p:nvSpPr>
+          <p:cNvPr id="69" name="TextBox 68">
+            <a:extLst>
+              <a:ext uri="{FF2B5EF4-FFF2-40B4-BE49-F238E27FC236}">
+                <a16:creationId xmlns:a16="http://schemas.microsoft.com/office/drawing/2014/main" id="{40A2F799-F90B-DEE3-D317-4EC122AB6292}"/>
+              </a:ext>
+            </a:extLst>
+          </p:cNvPr>
+          <p:cNvSpPr txBox="1"/>
+          <p:nvPr/>
+        </p:nvSpPr>
+        <p:spPr>
+          <a:xfrm>
+            <a:off x="4801100" y="4551053"/>
+            <a:ext cx="2270251" cy="261610"/>
+          </a:xfrm>
+          <a:prstGeom prst="rect">
+            <a:avLst/>
+          </a:prstGeom>
+          <a:noFill/>
+        </p:spPr>
+        <p:txBody>
+          <a:bodyPr wrap="square" rtlCol="0">
+            <a:spAutoFit/>
+          </a:bodyPr>
+          <a:lstStyle/>
+          <a:p>
+            <a:r>
+              <a:rPr lang="en-US" sz="1100" b="1" dirty="0"/>
+              <a:t>Lidar Object Detection Beam  </a:t>
+            </a:r>
+            <a:endParaRPr lang="en-SG" sz="1100" b="1" dirty="0"/>
+          </a:p>
+        </p:txBody>
+      </p:sp>
+      <p:cxnSp>
+        <p:nvCxnSpPr>
+          <p:cNvPr id="71" name="Straight Arrow Connector 70">
+            <a:extLst>
+              <a:ext uri="{FF2B5EF4-FFF2-40B4-BE49-F238E27FC236}">
+                <a16:creationId xmlns:a16="http://schemas.microsoft.com/office/drawing/2014/main" id="{09C5CE82-E5CB-05CC-2D17-594A6BC7F8D1}"/>
+              </a:ext>
+            </a:extLst>
+          </p:cNvPr>
+          <p:cNvCxnSpPr>
+            <a:cxnSpLocks/>
+          </p:cNvCxnSpPr>
+          <p:nvPr/>
+        </p:nvCxnSpPr>
+        <p:spPr>
+          <a:xfrm flipV="1">
+            <a:off x="6261921" y="3461278"/>
+            <a:ext cx="0" cy="1125470"/>
+          </a:xfrm>
+          <a:prstGeom prst="straightConnector1">
+            <a:avLst/>
+          </a:prstGeom>
+          <a:ln w="12700">
+            <a:tailEnd type="triangle"/>
+          </a:ln>
+        </p:spPr>
+        <p:style>
+          <a:lnRef idx="2">
+            <a:schemeClr val="accent1"/>
+          </a:lnRef>
+          <a:fillRef idx="0">
+            <a:schemeClr val="accent1"/>
+          </a:fillRef>
+          <a:effectRef idx="1">
+            <a:schemeClr val="accent1"/>
+          </a:effectRef>
+          <a:fontRef idx="minor">
+            <a:schemeClr val="tx1"/>
+          </a:fontRef>
+        </p:style>
+      </p:cxnSp>
+      <p:sp>
+        <p:nvSpPr>
+          <p:cNvPr id="73" name="TextBox 72">
+            <a:extLst>
+              <a:ext uri="{FF2B5EF4-FFF2-40B4-BE49-F238E27FC236}">
+                <a16:creationId xmlns:a16="http://schemas.microsoft.com/office/drawing/2014/main" id="{0AD65A81-DC2C-FF1A-0D27-13B6214CE612}"/>
+              </a:ext>
+            </a:extLst>
+          </p:cNvPr>
+          <p:cNvSpPr txBox="1"/>
+          <p:nvPr/>
+        </p:nvSpPr>
+        <p:spPr>
+          <a:xfrm>
+            <a:off x="726425" y="1476395"/>
+            <a:ext cx="2557676" cy="276999"/>
+          </a:xfrm>
+          <a:prstGeom prst="rect">
+            <a:avLst/>
+          </a:prstGeom>
+          <a:noFill/>
+          <a:ln w="12700">
+            <a:solidFill>
+              <a:schemeClr val="tx1"/>
+            </a:solidFill>
+            <a:prstDash val="sysDash"/>
+          </a:ln>
+        </p:spPr>
+        <p:txBody>
+          <a:bodyPr wrap="square" rtlCol="0">
+            <a:spAutoFit/>
+          </a:bodyPr>
+          <a:lstStyle/>
+          <a:p>
+            <a:r>
+              <a:rPr lang="en-US" sz="1200" b="1" dirty="0"/>
+              <a:t>Enemy Cam and Lidar Detection</a:t>
+            </a:r>
+            <a:endParaRPr lang="en-SG" sz="1200" b="1" dirty="0"/>
+          </a:p>
+        </p:txBody>
+      </p:sp>
+      <p:sp>
+        <p:nvSpPr>
+          <p:cNvPr id="74" name="TextBox 73">
+            <a:extLst>
+              <a:ext uri="{FF2B5EF4-FFF2-40B4-BE49-F238E27FC236}">
+                <a16:creationId xmlns:a16="http://schemas.microsoft.com/office/drawing/2014/main" id="{1CC8B888-43D4-9856-ACCE-F1BEC26248DE}"/>
+              </a:ext>
+            </a:extLst>
+          </p:cNvPr>
+          <p:cNvSpPr txBox="1"/>
+          <p:nvPr/>
+        </p:nvSpPr>
+        <p:spPr>
+          <a:xfrm>
+            <a:off x="4035093" y="1832573"/>
+            <a:ext cx="2223175" cy="261610"/>
+          </a:xfrm>
+          <a:prstGeom prst="rect">
+            <a:avLst/>
+          </a:prstGeom>
+          <a:noFill/>
+        </p:spPr>
+        <p:txBody>
+          <a:bodyPr wrap="square" rtlCol="0">
+            <a:spAutoFit/>
+          </a:bodyPr>
+          <a:lstStyle/>
+          <a:p>
+            <a:r>
+              <a:rPr lang="en-US" sz="1100" b="1" dirty="0">
+                <a:solidFill>
+                  <a:schemeClr val="bg1">
+                    <a:lumMod val="50000"/>
+                  </a:schemeClr>
+                </a:solidFill>
+              </a:rPr>
+              <a:t>CQB Real World Simulation</a:t>
+            </a:r>
+            <a:endParaRPr lang="en-SG" sz="1100" b="1" dirty="0">
+              <a:solidFill>
+                <a:schemeClr val="bg1">
+                  <a:lumMod val="50000"/>
+                </a:schemeClr>
+              </a:solidFill>
+            </a:endParaRPr>
+          </a:p>
+        </p:txBody>
+      </p:sp>
+    </p:spTree>
+    <p:extLst>
+      <p:ext uri="{BB962C8B-B14F-4D97-AF65-F5344CB8AC3E}">
+        <p14:creationId xmlns:p14="http://schemas.microsoft.com/office/powerpoint/2010/main" val="1332587555"/>
+      </p:ext>
+    </p:extLst>
+  </p:cSld>
+  <p:clrMapOvr>
+    <a:masterClrMapping/>
+  </p:clrMapOvr>
+</p:sld>
+</file>
+
+<file path=ppt/slides/slide7.xml><?xml version="1.0" encoding="utf-8"?>
+<p:sld xmlns:a="http://schemas.openxmlformats.org/drawingml/2006/main" xmlns:r="http://schemas.openxmlformats.org/officeDocument/2006/relationships" xmlns:p="http://schemas.openxmlformats.org/presentationml/2006/main">
+  <p:cSld>
+    <p:spTree>
+      <p:nvGrpSpPr>
+        <p:cNvPr id="1" name=""/>
+        <p:cNvGrpSpPr/>
+        <p:nvPr/>
+      </p:nvGrpSpPr>
+      <p:grpSpPr>
+        <a:xfrm>
+          <a:off x="0" y="0"/>
+          <a:ext cx="0" cy="0"/>
+          <a:chOff x="0" y="0"/>
+          <a:chExt cx="0" cy="0"/>
+        </a:xfrm>
+      </p:grpSpPr>
+      <p:cxnSp>
+        <p:nvCxnSpPr>
+          <p:cNvPr id="22" name="Straight Connector 21">
+            <a:extLst>
+              <a:ext uri="{FF2B5EF4-FFF2-40B4-BE49-F238E27FC236}">
+                <a16:creationId xmlns:a16="http://schemas.microsoft.com/office/drawing/2014/main" id="{F3446AFA-B606-5220-5E57-36CACBA9BC84}"/>
+              </a:ext>
+            </a:extLst>
+          </p:cNvPr>
+          <p:cNvCxnSpPr/>
+          <p:nvPr/>
+        </p:nvCxnSpPr>
+        <p:spPr>
+          <a:xfrm>
+            <a:off x="4167185" y="1728907"/>
+            <a:ext cx="0" cy="2996773"/>
+          </a:xfrm>
+          <a:prstGeom prst="line">
+            <a:avLst/>
+          </a:prstGeom>
+          <a:ln w="9525">
+            <a:solidFill>
+              <a:schemeClr val="tx1"/>
+            </a:solidFill>
+            <a:prstDash val="sysDash"/>
+          </a:ln>
+        </p:spPr>
+        <p:style>
+          <a:lnRef idx="2">
+            <a:schemeClr val="accent1"/>
+          </a:lnRef>
+          <a:fillRef idx="0">
+            <a:schemeClr val="accent1"/>
+          </a:fillRef>
+          <a:effectRef idx="1">
+            <a:schemeClr val="accent1"/>
+          </a:effectRef>
+          <a:fontRef idx="minor">
+            <a:schemeClr val="tx1"/>
+          </a:fontRef>
+        </p:style>
+      </p:cxnSp>
+      <p:cxnSp>
+        <p:nvCxnSpPr>
+          <p:cNvPr id="21" name="Straight Connector 20">
+            <a:extLst>
+              <a:ext uri="{FF2B5EF4-FFF2-40B4-BE49-F238E27FC236}">
+                <a16:creationId xmlns:a16="http://schemas.microsoft.com/office/drawing/2014/main" id="{874FA779-2795-E63A-E445-C532790A983F}"/>
+              </a:ext>
+            </a:extLst>
+          </p:cNvPr>
+          <p:cNvCxnSpPr/>
+          <p:nvPr/>
+        </p:nvCxnSpPr>
+        <p:spPr>
+          <a:xfrm>
+            <a:off x="1844035" y="1728908"/>
+            <a:ext cx="0" cy="2996773"/>
+          </a:xfrm>
+          <a:prstGeom prst="line">
+            <a:avLst/>
+          </a:prstGeom>
+          <a:ln w="9525">
+            <a:solidFill>
+              <a:schemeClr val="tx1"/>
+            </a:solidFill>
+            <a:prstDash val="sysDash"/>
+          </a:ln>
+        </p:spPr>
+        <p:style>
+          <a:lnRef idx="2">
+            <a:schemeClr val="accent1"/>
+          </a:lnRef>
+          <a:fillRef idx="0">
+            <a:schemeClr val="accent1"/>
+          </a:fillRef>
+          <a:effectRef idx="1">
+            <a:schemeClr val="accent1"/>
+          </a:effectRef>
+          <a:fontRef idx="minor">
+            <a:schemeClr val="tx1"/>
+          </a:fontRef>
+        </p:style>
+      </p:cxnSp>
+      <p:pic>
+        <p:nvPicPr>
+          <p:cNvPr id="4" name="Picture 3">
+            <a:extLst>
+              <a:ext uri="{FF2B5EF4-FFF2-40B4-BE49-F238E27FC236}">
+                <a16:creationId xmlns:a16="http://schemas.microsoft.com/office/drawing/2014/main" id="{8E8D4DAC-5BC2-0028-CDC6-BC1A1BB26D3D}"/>
+              </a:ext>
+            </a:extLst>
+          </p:cNvPr>
+          <p:cNvPicPr>
+            <a:picLocks noChangeAspect="1"/>
+          </p:cNvPicPr>
+          <p:nvPr/>
+        </p:nvPicPr>
+        <p:blipFill>
+          <a:blip r:embed="rId2"/>
+          <a:stretch>
+            <a:fillRect/>
+          </a:stretch>
+        </p:blipFill>
+        <p:spPr>
+          <a:xfrm rot="10800000">
+            <a:off x="1573524" y="2085319"/>
+            <a:ext cx="541025" cy="425576"/>
+          </a:xfrm>
+          <a:prstGeom prst="rect">
+            <a:avLst/>
+          </a:prstGeom>
+        </p:spPr>
+      </p:pic>
+      <p:pic>
+        <p:nvPicPr>
+          <p:cNvPr id="5" name="Graphic 4" descr="Radio microphone with solid fill">
+            <a:extLst>
+              <a:ext uri="{FF2B5EF4-FFF2-40B4-BE49-F238E27FC236}">
+                <a16:creationId xmlns:a16="http://schemas.microsoft.com/office/drawing/2014/main" id="{C34836A6-7F0C-FCB0-0F42-C3F0ADA9E036}"/>
+              </a:ext>
+            </a:extLst>
+          </p:cNvPr>
+          <p:cNvPicPr>
+            <a:picLocks noChangeAspect="1"/>
+          </p:cNvPicPr>
+          <p:nvPr/>
+        </p:nvPicPr>
+        <p:blipFill>
+          <a:blip r:embed="rId3">
+            <a:extLst>
+              <a:ext uri="{96DAC541-7B7A-43D3-8B79-37D633B846F1}">
+                <asvg:svgBlip xmlns:asvg="http://schemas.microsoft.com/office/drawing/2016/SVG/main" r:embed="rId4"/>
+              </a:ext>
+            </a:extLst>
+          </a:blip>
+          <a:stretch>
+            <a:fillRect/>
+          </a:stretch>
+        </p:blipFill>
+        <p:spPr>
+          <a:xfrm>
+            <a:off x="1652217" y="2085319"/>
+            <a:ext cx="383637" cy="383637"/>
+          </a:xfrm>
+          <a:prstGeom prst="rect">
+            <a:avLst/>
+          </a:prstGeom>
+        </p:spPr>
+      </p:pic>
+      <p:cxnSp>
+        <p:nvCxnSpPr>
+          <p:cNvPr id="11" name="Straight Arrow Connector 10">
+            <a:extLst>
+              <a:ext uri="{FF2B5EF4-FFF2-40B4-BE49-F238E27FC236}">
+                <a16:creationId xmlns:a16="http://schemas.microsoft.com/office/drawing/2014/main" id="{2524CE65-9304-97CA-8E9E-CB164F71FEBB}"/>
+              </a:ext>
+            </a:extLst>
+          </p:cNvPr>
+          <p:cNvCxnSpPr>
+            <a:cxnSpLocks/>
+          </p:cNvCxnSpPr>
+          <p:nvPr/>
+        </p:nvCxnSpPr>
+        <p:spPr>
+          <a:xfrm>
+            <a:off x="4167185" y="2298107"/>
+            <a:ext cx="2394980" cy="0"/>
+          </a:xfrm>
+          <a:prstGeom prst="straightConnector1">
+            <a:avLst/>
+          </a:prstGeom>
+          <a:ln>
+            <a:tailEnd type="triangle"/>
+          </a:ln>
+        </p:spPr>
+        <p:style>
+          <a:lnRef idx="2">
+            <a:schemeClr val="accent1"/>
+          </a:lnRef>
+          <a:fillRef idx="0">
+            <a:schemeClr val="accent1"/>
+          </a:fillRef>
+          <a:effectRef idx="1">
+            <a:schemeClr val="accent1"/>
+          </a:effectRef>
+          <a:fontRef idx="minor">
+            <a:schemeClr val="tx1"/>
+          </a:fontRef>
+        </p:style>
+      </p:cxnSp>
+      <p:pic>
+        <p:nvPicPr>
+          <p:cNvPr id="12" name="Picture 11">
+            <a:extLst>
+              <a:ext uri="{FF2B5EF4-FFF2-40B4-BE49-F238E27FC236}">
+                <a16:creationId xmlns:a16="http://schemas.microsoft.com/office/drawing/2014/main" id="{E1ED2159-E6CD-E3CF-BB71-A5D81B8CB011}"/>
+              </a:ext>
+            </a:extLst>
+          </p:cNvPr>
+          <p:cNvPicPr>
+            <a:picLocks noChangeAspect="1"/>
+          </p:cNvPicPr>
+          <p:nvPr/>
+        </p:nvPicPr>
+        <p:blipFill>
+          <a:blip r:embed="rId2"/>
+          <a:stretch>
+            <a:fillRect/>
+          </a:stretch>
+        </p:blipFill>
+        <p:spPr>
+          <a:xfrm rot="10800000">
+            <a:off x="3896674" y="2085319"/>
+            <a:ext cx="541025" cy="425576"/>
+          </a:xfrm>
+          <a:prstGeom prst="rect">
+            <a:avLst/>
+          </a:prstGeom>
+        </p:spPr>
+      </p:pic>
+      <p:pic>
+        <p:nvPicPr>
+          <p:cNvPr id="13" name="Graphic 12" descr="Radio microphone with solid fill">
+            <a:extLst>
+              <a:ext uri="{FF2B5EF4-FFF2-40B4-BE49-F238E27FC236}">
+                <a16:creationId xmlns:a16="http://schemas.microsoft.com/office/drawing/2014/main" id="{39572D64-0F19-10C0-4D9A-60B0A0A570D3}"/>
+              </a:ext>
+            </a:extLst>
+          </p:cNvPr>
+          <p:cNvPicPr>
+            <a:picLocks noChangeAspect="1"/>
+          </p:cNvPicPr>
+          <p:nvPr/>
+        </p:nvPicPr>
+        <p:blipFill>
+          <a:blip r:embed="rId3">
+            <a:extLst>
+              <a:ext uri="{96DAC541-7B7A-43D3-8B79-37D633B846F1}">
+                <asvg:svgBlip xmlns:asvg="http://schemas.microsoft.com/office/drawing/2016/SVG/main" r:embed="rId4"/>
+              </a:ext>
+            </a:extLst>
+          </a:blip>
+          <a:stretch>
+            <a:fillRect/>
+          </a:stretch>
+        </p:blipFill>
+        <p:spPr>
+          <a:xfrm>
+            <a:off x="3975367" y="2085319"/>
+            <a:ext cx="383637" cy="383637"/>
+          </a:xfrm>
+          <a:prstGeom prst="rect">
+            <a:avLst/>
+          </a:prstGeom>
+        </p:spPr>
+      </p:pic>
+      <p:sp>
+        <p:nvSpPr>
+          <p:cNvPr id="14" name="TextBox 13">
+            <a:extLst>
+              <a:ext uri="{FF2B5EF4-FFF2-40B4-BE49-F238E27FC236}">
+                <a16:creationId xmlns:a16="http://schemas.microsoft.com/office/drawing/2014/main" id="{69EBB578-3190-3522-597F-86051031DD85}"/>
+              </a:ext>
+            </a:extLst>
+          </p:cNvPr>
+          <p:cNvSpPr txBox="1"/>
+          <p:nvPr/>
+        </p:nvSpPr>
+        <p:spPr>
+          <a:xfrm>
+            <a:off x="4722854" y="2036497"/>
+            <a:ext cx="1911889" cy="261610"/>
+          </a:xfrm>
+          <a:prstGeom prst="rect">
+            <a:avLst/>
+          </a:prstGeom>
+          <a:noFill/>
+        </p:spPr>
+        <p:txBody>
+          <a:bodyPr wrap="square" rtlCol="0">
+            <a:spAutoFit/>
+          </a:bodyPr>
+          <a:lstStyle/>
+          <a:p>
+            <a:r>
+              <a:rPr lang="en-US" sz="1100" b="1" dirty="0"/>
+              <a:t>CQB Robot move direction</a:t>
+            </a:r>
+            <a:endParaRPr lang="en-SG" sz="1100" b="1" dirty="0"/>
+          </a:p>
+        </p:txBody>
+      </p:sp>
+      <p:cxnSp>
+        <p:nvCxnSpPr>
+          <p:cNvPr id="16" name="Straight Connector 15">
+            <a:extLst>
+              <a:ext uri="{FF2B5EF4-FFF2-40B4-BE49-F238E27FC236}">
+                <a16:creationId xmlns:a16="http://schemas.microsoft.com/office/drawing/2014/main" id="{B16618FA-72BC-34FA-6659-40F9C5BE0962}"/>
+              </a:ext>
+            </a:extLst>
+          </p:cNvPr>
+          <p:cNvCxnSpPr>
+            <a:stCxn id="4" idx="1"/>
+            <a:endCxn id="12" idx="3"/>
+          </p:cNvCxnSpPr>
+          <p:nvPr/>
+        </p:nvCxnSpPr>
+        <p:spPr>
+          <a:xfrm>
+            <a:off x="2114549" y="2298107"/>
+            <a:ext cx="1782125" cy="0"/>
+          </a:xfrm>
+          <a:prstGeom prst="line">
+            <a:avLst/>
+          </a:prstGeom>
+          <a:ln>
+            <a:solidFill>
+              <a:srgbClr val="C00000"/>
+            </a:solidFill>
+            <a:prstDash val="sysDash"/>
+          </a:ln>
+        </p:spPr>
+        <p:style>
+          <a:lnRef idx="2">
+            <a:schemeClr val="accent1"/>
+          </a:lnRef>
+          <a:fillRef idx="0">
+            <a:schemeClr val="accent1"/>
+          </a:fillRef>
+          <a:effectRef idx="1">
+            <a:schemeClr val="accent1"/>
+          </a:effectRef>
+          <a:fontRef idx="minor">
+            <a:schemeClr val="tx1"/>
+          </a:fontRef>
+        </p:style>
+      </p:cxnSp>
+      <p:sp>
+        <p:nvSpPr>
+          <p:cNvPr id="18" name="TextBox 17">
+            <a:extLst>
+              <a:ext uri="{FF2B5EF4-FFF2-40B4-BE49-F238E27FC236}">
+                <a16:creationId xmlns:a16="http://schemas.microsoft.com/office/drawing/2014/main" id="{5C758F0D-F954-458D-7B07-6070B6ACE7E1}"/>
+              </a:ext>
+            </a:extLst>
+          </p:cNvPr>
+          <p:cNvSpPr txBox="1"/>
+          <p:nvPr/>
+        </p:nvSpPr>
+        <p:spPr>
+          <a:xfrm>
+            <a:off x="2123587" y="1821053"/>
+            <a:ext cx="1400197" cy="430887"/>
+          </a:xfrm>
+          <a:prstGeom prst="rect">
+            <a:avLst/>
+          </a:prstGeom>
+          <a:noFill/>
+        </p:spPr>
+        <p:txBody>
+          <a:bodyPr wrap="square" rtlCol="0">
+            <a:spAutoFit/>
+          </a:bodyPr>
+          <a:lstStyle/>
+          <a:p>
+            <a:r>
+              <a:rPr lang="en-US" sz="1100" b="1" dirty="0"/>
+              <a:t>Robot trajectory record data</a:t>
+            </a:r>
+            <a:endParaRPr lang="en-SG" sz="1100" b="1" dirty="0"/>
+          </a:p>
+        </p:txBody>
+      </p:sp>
+      <p:sp>
+        <p:nvSpPr>
+          <p:cNvPr id="19" name="TextBox 18">
+            <a:extLst>
+              <a:ext uri="{FF2B5EF4-FFF2-40B4-BE49-F238E27FC236}">
+                <a16:creationId xmlns:a16="http://schemas.microsoft.com/office/drawing/2014/main" id="{6B657DEB-C3F7-C232-C4ED-4E51A4EC64EA}"/>
+              </a:ext>
+            </a:extLst>
+          </p:cNvPr>
+          <p:cNvSpPr txBox="1"/>
+          <p:nvPr/>
+        </p:nvSpPr>
+        <p:spPr>
+          <a:xfrm>
+            <a:off x="2823685" y="2304512"/>
+            <a:ext cx="336584" cy="261610"/>
+          </a:xfrm>
+          <a:prstGeom prst="rect">
+            <a:avLst/>
+          </a:prstGeom>
+          <a:noFill/>
+        </p:spPr>
+        <p:txBody>
+          <a:bodyPr wrap="square" rtlCol="0">
+            <a:spAutoFit/>
+          </a:bodyPr>
+          <a:lstStyle/>
+          <a:p>
+            <a:r>
+              <a:rPr lang="en-US" sz="1100" b="1" dirty="0">
+                <a:solidFill>
+                  <a:srgbClr val="C00000"/>
+                </a:solidFill>
+              </a:rPr>
+              <a:t>X</a:t>
+            </a:r>
+            <a:endParaRPr lang="en-SG" sz="1100" b="1" dirty="0">
+              <a:solidFill>
+                <a:srgbClr val="C00000"/>
+              </a:solidFill>
+            </a:endParaRPr>
+          </a:p>
+        </p:txBody>
+      </p:sp>
+      <p:pic>
+        <p:nvPicPr>
+          <p:cNvPr id="23" name="Picture 22">
+            <a:extLst>
+              <a:ext uri="{FF2B5EF4-FFF2-40B4-BE49-F238E27FC236}">
+                <a16:creationId xmlns:a16="http://schemas.microsoft.com/office/drawing/2014/main" id="{417E4F11-0F34-6E8E-971B-44687AABF5F7}"/>
+              </a:ext>
+            </a:extLst>
+          </p:cNvPr>
+          <p:cNvPicPr>
+            <a:picLocks noChangeAspect="1"/>
+          </p:cNvPicPr>
+          <p:nvPr/>
+        </p:nvPicPr>
+        <p:blipFill>
+          <a:blip r:embed="rId5">
+            <a:duotone>
+              <a:schemeClr val="accent2">
+                <a:shade val="45000"/>
+                <a:satMod val="135000"/>
+              </a:schemeClr>
+              <a:prstClr val="white"/>
+            </a:duotone>
+          </a:blip>
+          <a:stretch>
+            <a:fillRect/>
+          </a:stretch>
+        </p:blipFill>
+        <p:spPr>
+          <a:xfrm>
+            <a:off x="4948213" y="4285942"/>
+            <a:ext cx="284568" cy="547901"/>
+          </a:xfrm>
+          <a:prstGeom prst="rect">
+            <a:avLst/>
+          </a:prstGeom>
+          <a:ln>
+            <a:solidFill>
+              <a:srgbClr val="FF0000"/>
+            </a:solidFill>
+          </a:ln>
+        </p:spPr>
+      </p:pic>
+      <p:cxnSp>
+        <p:nvCxnSpPr>
+          <p:cNvPr id="30" name="Straight Arrow Connector 29">
+            <a:extLst>
+              <a:ext uri="{FF2B5EF4-FFF2-40B4-BE49-F238E27FC236}">
+                <a16:creationId xmlns:a16="http://schemas.microsoft.com/office/drawing/2014/main" id="{18462E41-8157-0F17-D800-D30CCD7874AD}"/>
+              </a:ext>
+            </a:extLst>
+          </p:cNvPr>
+          <p:cNvCxnSpPr>
+            <a:cxnSpLocks/>
+            <a:endCxn id="12" idx="0"/>
+          </p:cNvCxnSpPr>
+          <p:nvPr/>
+        </p:nvCxnSpPr>
+        <p:spPr>
+          <a:xfrm flipH="1" flipV="1">
+            <a:off x="4167186" y="2510895"/>
+            <a:ext cx="864575" cy="2201397"/>
+          </a:xfrm>
+          <a:prstGeom prst="straightConnector1">
+            <a:avLst/>
+          </a:prstGeom>
+          <a:ln w="9525">
+            <a:solidFill>
+              <a:srgbClr val="C00000"/>
+            </a:solidFill>
+            <a:prstDash val="dash"/>
+            <a:tailEnd type="triangle"/>
+          </a:ln>
+        </p:spPr>
+        <p:style>
+          <a:lnRef idx="2">
+            <a:schemeClr val="accent1"/>
+          </a:lnRef>
+          <a:fillRef idx="0">
+            <a:schemeClr val="accent1"/>
+          </a:fillRef>
+          <a:effectRef idx="1">
+            <a:schemeClr val="accent1"/>
+          </a:effectRef>
+          <a:fontRef idx="minor">
+            <a:schemeClr val="tx1"/>
+          </a:fontRef>
+        </p:style>
+      </p:cxnSp>
+      <p:sp>
+        <p:nvSpPr>
+          <p:cNvPr id="33" name="TextBox 32">
+            <a:extLst>
+              <a:ext uri="{FF2B5EF4-FFF2-40B4-BE49-F238E27FC236}">
+                <a16:creationId xmlns:a16="http://schemas.microsoft.com/office/drawing/2014/main" id="{9B8BCCED-FD39-3FDE-DFDE-8847BF75BCFE}"/>
+              </a:ext>
+            </a:extLst>
+          </p:cNvPr>
+          <p:cNvSpPr txBox="1"/>
+          <p:nvPr/>
+        </p:nvSpPr>
+        <p:spPr>
+          <a:xfrm>
+            <a:off x="1801776" y="1665571"/>
+            <a:ext cx="444940" cy="246221"/>
+          </a:xfrm>
+          <a:prstGeom prst="rect">
+            <a:avLst/>
+          </a:prstGeom>
+          <a:noFill/>
+        </p:spPr>
+        <p:txBody>
+          <a:bodyPr wrap="square" rtlCol="0">
+            <a:spAutoFit/>
+          </a:bodyPr>
+          <a:lstStyle/>
+          <a:p>
+            <a:r>
+              <a:rPr lang="en-US" sz="1000" b="1" dirty="0">
+                <a:solidFill>
+                  <a:schemeClr val="accent1"/>
+                </a:solidFill>
+              </a:rPr>
+              <a:t>T0 </a:t>
+            </a:r>
+            <a:endParaRPr lang="en-SG" sz="1000" b="1" dirty="0">
+              <a:solidFill>
+                <a:schemeClr val="accent1"/>
+              </a:solidFill>
+            </a:endParaRPr>
+          </a:p>
+        </p:txBody>
+      </p:sp>
+      <p:sp>
+        <p:nvSpPr>
+          <p:cNvPr id="34" name="TextBox 33">
+            <a:extLst>
+              <a:ext uri="{FF2B5EF4-FFF2-40B4-BE49-F238E27FC236}">
+                <a16:creationId xmlns:a16="http://schemas.microsoft.com/office/drawing/2014/main" id="{6520164C-E928-3E59-DCFB-15D6AB31D320}"/>
+              </a:ext>
+            </a:extLst>
+          </p:cNvPr>
+          <p:cNvSpPr txBox="1"/>
+          <p:nvPr/>
+        </p:nvSpPr>
+        <p:spPr>
+          <a:xfrm>
+            <a:off x="4136534" y="1683563"/>
+            <a:ext cx="444940" cy="246221"/>
+          </a:xfrm>
+          <a:prstGeom prst="rect">
+            <a:avLst/>
+          </a:prstGeom>
+          <a:noFill/>
+        </p:spPr>
+        <p:txBody>
+          <a:bodyPr wrap="square" rtlCol="0">
+            <a:spAutoFit/>
+          </a:bodyPr>
+          <a:lstStyle/>
+          <a:p>
+            <a:r>
+              <a:rPr lang="en-US" sz="1000" b="1" dirty="0">
+                <a:solidFill>
+                  <a:schemeClr val="accent1"/>
+                </a:solidFill>
+              </a:rPr>
+              <a:t>T1</a:t>
+            </a:r>
+            <a:endParaRPr lang="en-SG" sz="1000" b="1" dirty="0">
+              <a:solidFill>
+                <a:schemeClr val="accent1"/>
+              </a:solidFill>
+            </a:endParaRPr>
+          </a:p>
+        </p:txBody>
+      </p:sp>
+      <p:sp>
+        <p:nvSpPr>
+          <p:cNvPr id="35" name="TextBox 34">
+            <a:extLst>
+              <a:ext uri="{FF2B5EF4-FFF2-40B4-BE49-F238E27FC236}">
+                <a16:creationId xmlns:a16="http://schemas.microsoft.com/office/drawing/2014/main" id="{8AFE05C5-B6A0-E589-6973-3FC18CD03338}"/>
+              </a:ext>
+            </a:extLst>
+          </p:cNvPr>
+          <p:cNvSpPr txBox="1"/>
+          <p:nvPr/>
+        </p:nvSpPr>
+        <p:spPr>
+          <a:xfrm>
+            <a:off x="1312721" y="2512082"/>
+            <a:ext cx="521601" cy="246221"/>
+          </a:xfrm>
+          <a:prstGeom prst="rect">
+            <a:avLst/>
+          </a:prstGeom>
+          <a:noFill/>
+        </p:spPr>
+        <p:txBody>
+          <a:bodyPr wrap="square" rtlCol="0">
+            <a:spAutoFit/>
+          </a:bodyPr>
+          <a:lstStyle/>
+          <a:p>
+            <a:r>
+              <a:rPr lang="en-US" sz="1000" b="1" dirty="0">
+                <a:solidFill>
+                  <a:schemeClr val="accent1"/>
+                </a:solidFill>
+              </a:rPr>
+              <a:t>Pos-0</a:t>
+            </a:r>
+            <a:endParaRPr lang="en-SG" sz="1000" b="1" dirty="0">
+              <a:solidFill>
+                <a:schemeClr val="accent1"/>
+              </a:solidFill>
+            </a:endParaRPr>
+          </a:p>
+        </p:txBody>
+      </p:sp>
+      <p:sp>
+        <p:nvSpPr>
+          <p:cNvPr id="36" name="TextBox 35">
+            <a:extLst>
+              <a:ext uri="{FF2B5EF4-FFF2-40B4-BE49-F238E27FC236}">
+                <a16:creationId xmlns:a16="http://schemas.microsoft.com/office/drawing/2014/main" id="{01456F24-DAAB-4391-3DDC-C4816B85ABDF}"/>
+              </a:ext>
+            </a:extLst>
+          </p:cNvPr>
+          <p:cNvSpPr txBox="1"/>
+          <p:nvPr/>
+        </p:nvSpPr>
+        <p:spPr>
+          <a:xfrm>
+            <a:off x="3645584" y="2531698"/>
+            <a:ext cx="521601" cy="246221"/>
+          </a:xfrm>
+          <a:prstGeom prst="rect">
+            <a:avLst/>
+          </a:prstGeom>
+          <a:noFill/>
+        </p:spPr>
+        <p:txBody>
+          <a:bodyPr wrap="square" rtlCol="0">
+            <a:spAutoFit/>
+          </a:bodyPr>
+          <a:lstStyle/>
+          <a:p>
+            <a:r>
+              <a:rPr lang="en-US" sz="1000" b="1" dirty="0">
+                <a:solidFill>
+                  <a:schemeClr val="accent1"/>
+                </a:solidFill>
+              </a:rPr>
+              <a:t>Pos-1</a:t>
+            </a:r>
+            <a:endParaRPr lang="en-SG" sz="1000" b="1" dirty="0">
+              <a:solidFill>
+                <a:schemeClr val="accent1"/>
+              </a:solidFill>
+            </a:endParaRPr>
+          </a:p>
+        </p:txBody>
+      </p:sp>
+      <p:cxnSp>
+        <p:nvCxnSpPr>
+          <p:cNvPr id="37" name="Straight Connector 36">
+            <a:extLst>
+              <a:ext uri="{FF2B5EF4-FFF2-40B4-BE49-F238E27FC236}">
+                <a16:creationId xmlns:a16="http://schemas.microsoft.com/office/drawing/2014/main" id="{2BFBF7C8-0B36-0497-D6A2-7885FDA3F0C8}"/>
+              </a:ext>
+            </a:extLst>
+          </p:cNvPr>
+          <p:cNvCxnSpPr>
+            <a:cxnSpLocks/>
+          </p:cNvCxnSpPr>
+          <p:nvPr/>
+        </p:nvCxnSpPr>
+        <p:spPr>
+          <a:xfrm>
+            <a:off x="5090497" y="2298107"/>
+            <a:ext cx="0" cy="2396991"/>
+          </a:xfrm>
+          <a:prstGeom prst="line">
+            <a:avLst/>
+          </a:prstGeom>
+          <a:ln w="9525">
+            <a:solidFill>
+              <a:schemeClr val="tx1"/>
+            </a:solidFill>
+            <a:prstDash val="sysDash"/>
+          </a:ln>
+        </p:spPr>
+        <p:style>
+          <a:lnRef idx="2">
+            <a:schemeClr val="accent1"/>
+          </a:lnRef>
+          <a:fillRef idx="0">
+            <a:schemeClr val="accent1"/>
+          </a:fillRef>
+          <a:effectRef idx="1">
+            <a:schemeClr val="accent1"/>
+          </a:effectRef>
+          <a:fontRef idx="minor">
+            <a:schemeClr val="tx1"/>
+          </a:fontRef>
+        </p:style>
+      </p:cxnSp>
+      <p:sp>
+        <p:nvSpPr>
+          <p:cNvPr id="41" name="TextBox 40">
+            <a:extLst>
+              <a:ext uri="{FF2B5EF4-FFF2-40B4-BE49-F238E27FC236}">
+                <a16:creationId xmlns:a16="http://schemas.microsoft.com/office/drawing/2014/main" id="{0BC2F10D-CD35-AE5D-5252-013742EBD229}"/>
+              </a:ext>
+            </a:extLst>
+          </p:cNvPr>
+          <p:cNvSpPr txBox="1"/>
+          <p:nvPr/>
+        </p:nvSpPr>
+        <p:spPr>
+          <a:xfrm>
+            <a:off x="4605466" y="2338151"/>
+            <a:ext cx="336584" cy="261610"/>
+          </a:xfrm>
+          <a:prstGeom prst="rect">
+            <a:avLst/>
+          </a:prstGeom>
+          <a:noFill/>
+        </p:spPr>
+        <p:txBody>
+          <a:bodyPr wrap="square" rtlCol="0">
+            <a:spAutoFit/>
+          </a:bodyPr>
+          <a:lstStyle/>
+          <a:p>
+            <a:r>
+              <a:rPr lang="en-US" sz="1100" b="1" dirty="0"/>
+              <a:t>Y</a:t>
+            </a:r>
+            <a:endParaRPr lang="en-SG" sz="1100" b="1" dirty="0"/>
+          </a:p>
+        </p:txBody>
+      </p:sp>
+      <p:sp>
+        <p:nvSpPr>
+          <p:cNvPr id="42" name="TextBox 41">
+            <a:extLst>
+              <a:ext uri="{FF2B5EF4-FFF2-40B4-BE49-F238E27FC236}">
+                <a16:creationId xmlns:a16="http://schemas.microsoft.com/office/drawing/2014/main" id="{D1C80D5C-E25E-9ECC-80B3-5E3E4117BDC1}"/>
+              </a:ext>
+            </a:extLst>
+          </p:cNvPr>
+          <p:cNvSpPr txBox="1"/>
+          <p:nvPr/>
+        </p:nvSpPr>
+        <p:spPr>
+          <a:xfrm>
+            <a:off x="5121557" y="3267614"/>
+            <a:ext cx="336584" cy="261610"/>
+          </a:xfrm>
+          <a:prstGeom prst="rect">
+            <a:avLst/>
+          </a:prstGeom>
+          <a:noFill/>
+        </p:spPr>
+        <p:txBody>
+          <a:bodyPr wrap="square" rtlCol="0">
+            <a:spAutoFit/>
+          </a:bodyPr>
+          <a:lstStyle/>
+          <a:p>
+            <a:r>
+              <a:rPr lang="en-US" sz="1100" b="1" dirty="0"/>
+              <a:t>Z</a:t>
+            </a:r>
+            <a:endParaRPr lang="en-SG" sz="1100" b="1" dirty="0"/>
+          </a:p>
+        </p:txBody>
+      </p:sp>
+      <p:cxnSp>
+        <p:nvCxnSpPr>
+          <p:cNvPr id="44" name="Straight Arrow Connector 43">
+            <a:extLst>
+              <a:ext uri="{FF2B5EF4-FFF2-40B4-BE49-F238E27FC236}">
+                <a16:creationId xmlns:a16="http://schemas.microsoft.com/office/drawing/2014/main" id="{5CD6A74B-D89C-A8CD-2008-56FD42B9B179}"/>
+              </a:ext>
+            </a:extLst>
+          </p:cNvPr>
+          <p:cNvCxnSpPr/>
+          <p:nvPr/>
+        </p:nvCxnSpPr>
+        <p:spPr>
+          <a:xfrm>
+            <a:off x="2535731" y="2356046"/>
+            <a:ext cx="0" cy="420152"/>
+          </a:xfrm>
+          <a:prstGeom prst="straightConnector1">
+            <a:avLst/>
+          </a:prstGeom>
+          <a:ln w="9525">
+            <a:solidFill>
+              <a:schemeClr val="accent6">
+                <a:lumMod val="75000"/>
+              </a:schemeClr>
+            </a:solidFill>
+            <a:headEnd type="triangle"/>
+            <a:tailEnd type="triangle"/>
+          </a:ln>
+        </p:spPr>
+        <p:style>
+          <a:lnRef idx="2">
+            <a:schemeClr val="accent1"/>
+          </a:lnRef>
+          <a:fillRef idx="0">
+            <a:schemeClr val="accent1"/>
+          </a:fillRef>
+          <a:effectRef idx="1">
+            <a:schemeClr val="accent1"/>
+          </a:effectRef>
+          <a:fontRef idx="minor">
+            <a:schemeClr val="tx1"/>
+          </a:fontRef>
+        </p:style>
+      </p:cxnSp>
+      <p:sp>
+        <p:nvSpPr>
+          <p:cNvPr id="45" name="TextBox 44">
+            <a:extLst>
+              <a:ext uri="{FF2B5EF4-FFF2-40B4-BE49-F238E27FC236}">
+                <a16:creationId xmlns:a16="http://schemas.microsoft.com/office/drawing/2014/main" id="{532A6A2B-B035-D5F5-908D-05B5461E1EED}"/>
+              </a:ext>
+            </a:extLst>
+          </p:cNvPr>
+          <p:cNvSpPr txBox="1"/>
+          <p:nvPr/>
+        </p:nvSpPr>
+        <p:spPr>
+          <a:xfrm>
+            <a:off x="2314362" y="2433955"/>
+            <a:ext cx="998861" cy="261610"/>
+          </a:xfrm>
+          <a:prstGeom prst="rect">
+            <a:avLst/>
+          </a:prstGeom>
+          <a:noFill/>
+        </p:spPr>
+        <p:txBody>
+          <a:bodyPr wrap="square" rtlCol="0">
+            <a:spAutoFit/>
+          </a:bodyPr>
+          <a:lstStyle/>
+          <a:p>
+            <a:r>
+              <a:rPr lang="en-US" sz="1100" b="1" dirty="0">
+                <a:solidFill>
+                  <a:schemeClr val="accent6">
+                    <a:lumMod val="75000"/>
+                  </a:schemeClr>
+                </a:solidFill>
+              </a:rPr>
+              <a:t>Angle a</a:t>
+            </a:r>
+            <a:endParaRPr lang="en-SG" sz="1100" b="1" dirty="0">
+              <a:solidFill>
+                <a:schemeClr val="accent6">
+                  <a:lumMod val="75000"/>
+                </a:schemeClr>
+              </a:solidFill>
+            </a:endParaRPr>
+          </a:p>
+        </p:txBody>
+      </p:sp>
+      <p:cxnSp>
+        <p:nvCxnSpPr>
+          <p:cNvPr id="46" name="Straight Arrow Connector 45">
+            <a:extLst>
+              <a:ext uri="{FF2B5EF4-FFF2-40B4-BE49-F238E27FC236}">
+                <a16:creationId xmlns:a16="http://schemas.microsoft.com/office/drawing/2014/main" id="{7AF30985-3CCD-87B2-2D52-61BA6662663A}"/>
+              </a:ext>
+            </a:extLst>
+          </p:cNvPr>
+          <p:cNvCxnSpPr>
+            <a:cxnSpLocks/>
+          </p:cNvCxnSpPr>
+          <p:nvPr/>
+        </p:nvCxnSpPr>
+        <p:spPr>
+          <a:xfrm>
+            <a:off x="4516931" y="2338151"/>
+            <a:ext cx="0" cy="929463"/>
+          </a:xfrm>
+          <a:prstGeom prst="straightConnector1">
+            <a:avLst/>
+          </a:prstGeom>
+          <a:ln w="9525">
+            <a:solidFill>
+              <a:schemeClr val="accent6">
+                <a:lumMod val="75000"/>
+              </a:schemeClr>
+            </a:solidFill>
+            <a:headEnd type="triangle"/>
+            <a:tailEnd type="triangle"/>
+          </a:ln>
+        </p:spPr>
+        <p:style>
+          <a:lnRef idx="2">
+            <a:schemeClr val="accent1"/>
+          </a:lnRef>
+          <a:fillRef idx="0">
+            <a:schemeClr val="accent1"/>
+          </a:fillRef>
+          <a:effectRef idx="1">
+            <a:schemeClr val="accent1"/>
+          </a:effectRef>
+          <a:fontRef idx="minor">
+            <a:schemeClr val="tx1"/>
+          </a:fontRef>
+        </p:style>
+      </p:cxnSp>
+      <p:sp>
+        <p:nvSpPr>
+          <p:cNvPr id="48" name="TextBox 47">
+            <a:extLst>
+              <a:ext uri="{FF2B5EF4-FFF2-40B4-BE49-F238E27FC236}">
+                <a16:creationId xmlns:a16="http://schemas.microsoft.com/office/drawing/2014/main" id="{8C1457B9-F0F2-547C-8E37-59B6FED93321}"/>
+              </a:ext>
+            </a:extLst>
+          </p:cNvPr>
+          <p:cNvSpPr txBox="1"/>
+          <p:nvPr/>
+        </p:nvSpPr>
+        <p:spPr>
+          <a:xfrm>
+            <a:off x="4306299" y="2619434"/>
+            <a:ext cx="998861" cy="261610"/>
+          </a:xfrm>
+          <a:prstGeom prst="rect">
+            <a:avLst/>
+          </a:prstGeom>
+          <a:noFill/>
+        </p:spPr>
+        <p:txBody>
+          <a:bodyPr wrap="square" rtlCol="0">
+            <a:spAutoFit/>
+          </a:bodyPr>
+          <a:lstStyle/>
+          <a:p>
+            <a:r>
+              <a:rPr lang="en-US" sz="1100" b="1" dirty="0">
+                <a:solidFill>
+                  <a:schemeClr val="accent6">
+                    <a:lumMod val="75000"/>
+                  </a:schemeClr>
+                </a:solidFill>
+              </a:rPr>
+              <a:t>Angle b</a:t>
+            </a:r>
+            <a:endParaRPr lang="en-SG" sz="1100" b="1" dirty="0">
+              <a:solidFill>
+                <a:schemeClr val="accent6">
+                  <a:lumMod val="75000"/>
+                </a:schemeClr>
+              </a:solidFill>
+            </a:endParaRPr>
+          </a:p>
+        </p:txBody>
+      </p:sp>
+      <p:sp>
+        <p:nvSpPr>
+          <p:cNvPr id="49" name="TextBox 48">
+            <a:extLst>
+              <a:ext uri="{FF2B5EF4-FFF2-40B4-BE49-F238E27FC236}">
+                <a16:creationId xmlns:a16="http://schemas.microsoft.com/office/drawing/2014/main" id="{DC553378-EEFA-F490-89AA-0508B48C3E9A}"/>
+              </a:ext>
+            </a:extLst>
+          </p:cNvPr>
+          <p:cNvSpPr txBox="1"/>
+          <p:nvPr/>
+        </p:nvSpPr>
+        <p:spPr>
+          <a:xfrm>
+            <a:off x="2295614" y="3334594"/>
+            <a:ext cx="1281710" cy="553998"/>
+          </a:xfrm>
+          <a:prstGeom prst="rect">
+            <a:avLst/>
+          </a:prstGeom>
+          <a:noFill/>
+        </p:spPr>
+        <p:txBody>
+          <a:bodyPr wrap="square" rtlCol="0">
+            <a:spAutoFit/>
+          </a:bodyPr>
+          <a:lstStyle/>
+          <a:p>
+            <a:r>
+              <a:rPr lang="en-US" sz="1000" b="1" dirty="0">
+                <a:solidFill>
+                  <a:srgbClr val="C00000"/>
+                </a:solidFill>
+              </a:rPr>
+              <a:t>Enemy sound direction  detection  at T0</a:t>
+            </a:r>
+            <a:endParaRPr lang="en-SG" sz="1000" b="1" dirty="0">
+              <a:solidFill>
+                <a:srgbClr val="C00000"/>
+              </a:solidFill>
+            </a:endParaRPr>
+          </a:p>
+        </p:txBody>
+      </p:sp>
+      <p:sp>
+        <p:nvSpPr>
+          <p:cNvPr id="50" name="TextBox 49">
+            <a:extLst>
+              <a:ext uri="{FF2B5EF4-FFF2-40B4-BE49-F238E27FC236}">
+                <a16:creationId xmlns:a16="http://schemas.microsoft.com/office/drawing/2014/main" id="{98722DAD-5E8C-D684-ED94-2CCCE4FEB81E}"/>
+              </a:ext>
+            </a:extLst>
+          </p:cNvPr>
+          <p:cNvSpPr txBox="1"/>
+          <p:nvPr/>
+        </p:nvSpPr>
+        <p:spPr>
+          <a:xfrm>
+            <a:off x="3951071" y="3286578"/>
+            <a:ext cx="1281710" cy="553998"/>
+          </a:xfrm>
+          <a:prstGeom prst="rect">
+            <a:avLst/>
+          </a:prstGeom>
+          <a:noFill/>
+        </p:spPr>
+        <p:txBody>
+          <a:bodyPr wrap="square" rtlCol="0">
+            <a:spAutoFit/>
+          </a:bodyPr>
+          <a:lstStyle/>
+          <a:p>
+            <a:r>
+              <a:rPr lang="en-US" sz="1000" b="1" dirty="0">
+                <a:solidFill>
+                  <a:srgbClr val="C00000"/>
+                </a:solidFill>
+              </a:rPr>
+              <a:t>Enemy sound direction  detection  at T1</a:t>
+            </a:r>
+            <a:endParaRPr lang="en-SG" sz="1000" b="1" dirty="0">
+              <a:solidFill>
+                <a:srgbClr val="C00000"/>
+              </a:solidFill>
+            </a:endParaRPr>
+          </a:p>
+        </p:txBody>
+      </p:sp>
+      <p:pic>
+        <p:nvPicPr>
+          <p:cNvPr id="51" name="Picture 50">
+            <a:extLst>
+              <a:ext uri="{FF2B5EF4-FFF2-40B4-BE49-F238E27FC236}">
+                <a16:creationId xmlns:a16="http://schemas.microsoft.com/office/drawing/2014/main" id="{65E7A575-293D-AB8D-EAEB-160FA50629FB}"/>
+              </a:ext>
+            </a:extLst>
+          </p:cNvPr>
+          <p:cNvPicPr>
+            <a:picLocks noChangeAspect="1"/>
+          </p:cNvPicPr>
+          <p:nvPr/>
+        </p:nvPicPr>
+        <p:blipFill>
+          <a:blip r:embed="rId5">
+            <a:duotone>
+              <a:schemeClr val="bg2">
+                <a:shade val="45000"/>
+                <a:satMod val="135000"/>
+              </a:schemeClr>
+              <a:prstClr val="white"/>
+            </a:duotone>
+          </a:blip>
+          <a:stretch>
+            <a:fillRect/>
+          </a:stretch>
+        </p:blipFill>
+        <p:spPr>
+          <a:xfrm>
+            <a:off x="4494016" y="4349235"/>
+            <a:ext cx="311713" cy="600164"/>
+          </a:xfrm>
+          <a:prstGeom prst="rect">
+            <a:avLst/>
+          </a:prstGeom>
+          <a:ln>
+            <a:solidFill>
+              <a:schemeClr val="tx2">
+                <a:lumMod val="75000"/>
+                <a:lumOff val="25000"/>
+              </a:schemeClr>
+            </a:solidFill>
+          </a:ln>
+        </p:spPr>
+      </p:pic>
+      <p:sp>
+        <p:nvSpPr>
+          <p:cNvPr id="52" name="TextBox 51">
+            <a:extLst>
+              <a:ext uri="{FF2B5EF4-FFF2-40B4-BE49-F238E27FC236}">
+                <a16:creationId xmlns:a16="http://schemas.microsoft.com/office/drawing/2014/main" id="{92CDB68C-3466-372D-1B4C-32F2F13D3FC8}"/>
+              </a:ext>
+            </a:extLst>
+          </p:cNvPr>
+          <p:cNvSpPr txBox="1"/>
+          <p:nvPr/>
+        </p:nvSpPr>
+        <p:spPr>
+          <a:xfrm>
+            <a:off x="3770753" y="4395016"/>
+            <a:ext cx="1032962" cy="600164"/>
+          </a:xfrm>
+          <a:prstGeom prst="rect">
+            <a:avLst/>
+          </a:prstGeom>
+          <a:noFill/>
+        </p:spPr>
+        <p:txBody>
+          <a:bodyPr wrap="square" rtlCol="0">
+            <a:spAutoFit/>
+          </a:bodyPr>
+          <a:lstStyle/>
+          <a:p>
+            <a:r>
+              <a:rPr lang="en-US" sz="1100" b="1" dirty="0">
+                <a:solidFill>
+                  <a:schemeClr val="accent1">
+                    <a:lumMod val="75000"/>
+                  </a:schemeClr>
+                </a:solidFill>
+              </a:rPr>
+              <a:t>Predict Enemy Position </a:t>
+            </a:r>
+            <a:endParaRPr lang="en-SG" sz="1100" b="1" dirty="0">
+              <a:solidFill>
+                <a:schemeClr val="accent1">
+                  <a:lumMod val="75000"/>
+                </a:schemeClr>
+              </a:solidFill>
+            </a:endParaRPr>
+          </a:p>
+        </p:txBody>
+      </p:sp>
+      <p:sp>
+        <p:nvSpPr>
+          <p:cNvPr id="53" name="TextBox 52">
+            <a:extLst>
+              <a:ext uri="{FF2B5EF4-FFF2-40B4-BE49-F238E27FC236}">
+                <a16:creationId xmlns:a16="http://schemas.microsoft.com/office/drawing/2014/main" id="{6A79602C-E371-65DC-7789-A8514549A746}"/>
+              </a:ext>
+            </a:extLst>
+          </p:cNvPr>
+          <p:cNvSpPr txBox="1"/>
+          <p:nvPr/>
+        </p:nvSpPr>
+        <p:spPr>
+          <a:xfrm>
+            <a:off x="1794366" y="4521220"/>
+            <a:ext cx="2389814" cy="461665"/>
+          </a:xfrm>
+          <a:prstGeom prst="rect">
+            <a:avLst/>
+          </a:prstGeom>
+          <a:noFill/>
+        </p:spPr>
+        <p:txBody>
+          <a:bodyPr wrap="square" rtlCol="0">
+            <a:spAutoFit/>
+          </a:bodyPr>
+          <a:lstStyle/>
+          <a:p>
+            <a:r>
+              <a:rPr lang="en-US" sz="1200" b="1" dirty="0"/>
+              <a:t>Tan(a) = Z/(X+Y)</a:t>
+            </a:r>
+          </a:p>
+          <a:p>
+            <a:r>
+              <a:rPr lang="en-US" sz="1200" b="1" dirty="0"/>
+              <a:t>Tan(b) = Z/Y</a:t>
+            </a:r>
+            <a:endParaRPr lang="en-SG" sz="1200" b="1" dirty="0"/>
+          </a:p>
+        </p:txBody>
+      </p:sp>
+      <p:sp>
+        <p:nvSpPr>
+          <p:cNvPr id="54" name="TextBox 53">
+            <a:extLst>
+              <a:ext uri="{FF2B5EF4-FFF2-40B4-BE49-F238E27FC236}">
+                <a16:creationId xmlns:a16="http://schemas.microsoft.com/office/drawing/2014/main" id="{A62EC13D-DC51-B442-A0F6-5D03A9A28227}"/>
+              </a:ext>
+            </a:extLst>
+          </p:cNvPr>
+          <p:cNvSpPr txBox="1"/>
+          <p:nvPr/>
+        </p:nvSpPr>
+        <p:spPr>
+          <a:xfrm>
+            <a:off x="5232781" y="4400951"/>
+            <a:ext cx="1032962" cy="600164"/>
+          </a:xfrm>
+          <a:prstGeom prst="rect">
+            <a:avLst/>
+          </a:prstGeom>
+          <a:noFill/>
+        </p:spPr>
+        <p:txBody>
+          <a:bodyPr wrap="square" rtlCol="0">
+            <a:spAutoFit/>
+          </a:bodyPr>
+          <a:lstStyle/>
+          <a:p>
+            <a:r>
+              <a:rPr lang="en-US" sz="1100" b="1" dirty="0">
+                <a:solidFill>
+                  <a:srgbClr val="C00000"/>
+                </a:solidFill>
+              </a:rPr>
+              <a:t>Enemy Actual Position </a:t>
+            </a:r>
+            <a:endParaRPr lang="en-SG" sz="1100" b="1" dirty="0">
+              <a:solidFill>
+                <a:srgbClr val="C00000"/>
+              </a:solidFill>
+            </a:endParaRPr>
+          </a:p>
+        </p:txBody>
+      </p:sp>
+      <p:pic>
+        <p:nvPicPr>
+          <p:cNvPr id="56" name="Picture 55">
+            <a:extLst>
+              <a:ext uri="{FF2B5EF4-FFF2-40B4-BE49-F238E27FC236}">
+                <a16:creationId xmlns:a16="http://schemas.microsoft.com/office/drawing/2014/main" id="{84B24BDA-6874-BDEF-D473-29F5C85D5DD3}"/>
+              </a:ext>
+            </a:extLst>
+          </p:cNvPr>
+          <p:cNvPicPr>
+            <a:picLocks noChangeAspect="1"/>
+          </p:cNvPicPr>
+          <p:nvPr/>
+        </p:nvPicPr>
+        <p:blipFill>
+          <a:blip r:embed="rId6"/>
+          <a:stretch>
+            <a:fillRect/>
+          </a:stretch>
+        </p:blipFill>
+        <p:spPr>
+          <a:xfrm flipV="1">
+            <a:off x="6760848" y="1691628"/>
+            <a:ext cx="2866667" cy="3295238"/>
+          </a:xfrm>
+          <a:prstGeom prst="rect">
+            <a:avLst/>
+          </a:prstGeom>
+          <a:ln w="9525">
+            <a:solidFill>
+              <a:schemeClr val="tx1"/>
+            </a:solidFill>
+          </a:ln>
+        </p:spPr>
+      </p:pic>
+      <p:cxnSp>
+        <p:nvCxnSpPr>
+          <p:cNvPr id="58" name="Straight Arrow Connector 57">
+            <a:extLst>
+              <a:ext uri="{FF2B5EF4-FFF2-40B4-BE49-F238E27FC236}">
+                <a16:creationId xmlns:a16="http://schemas.microsoft.com/office/drawing/2014/main" id="{83F6E474-01D6-3472-4407-C0E5DAE3E267}"/>
+              </a:ext>
+            </a:extLst>
+          </p:cNvPr>
+          <p:cNvCxnSpPr>
+            <a:cxnSpLocks/>
+          </p:cNvCxnSpPr>
+          <p:nvPr/>
+        </p:nvCxnSpPr>
+        <p:spPr>
+          <a:xfrm flipV="1">
+            <a:off x="5778222" y="4524804"/>
+            <a:ext cx="2249817" cy="5935"/>
+          </a:xfrm>
+          <a:prstGeom prst="straightConnector1">
+            <a:avLst/>
+          </a:prstGeom>
+          <a:ln w="9525">
+            <a:solidFill>
+              <a:srgbClr val="C00000"/>
+            </a:solidFill>
+            <a:tailEnd type="triangle"/>
+          </a:ln>
+        </p:spPr>
+        <p:style>
+          <a:lnRef idx="2">
+            <a:schemeClr val="accent1"/>
+          </a:lnRef>
+          <a:fillRef idx="0">
+            <a:schemeClr val="accent1"/>
+          </a:fillRef>
+          <a:effectRef idx="1">
+            <a:schemeClr val="accent1"/>
+          </a:effectRef>
+          <a:fontRef idx="minor">
+            <a:schemeClr val="tx1"/>
+          </a:fontRef>
+        </p:style>
+      </p:cxnSp>
+      <p:cxnSp>
+        <p:nvCxnSpPr>
+          <p:cNvPr id="60" name="Connector: Elbow 59">
+            <a:extLst>
+              <a:ext uri="{FF2B5EF4-FFF2-40B4-BE49-F238E27FC236}">
+                <a16:creationId xmlns:a16="http://schemas.microsoft.com/office/drawing/2014/main" id="{A57DFE53-8816-A767-2C32-4CCFF6C146EA}"/>
+              </a:ext>
+            </a:extLst>
+          </p:cNvPr>
+          <p:cNvCxnSpPr/>
+          <p:nvPr/>
+        </p:nvCxnSpPr>
+        <p:spPr>
+          <a:xfrm flipV="1">
+            <a:off x="4722854" y="4725680"/>
+            <a:ext cx="3706531" cy="223719"/>
+          </a:xfrm>
+          <a:prstGeom prst="bentConnector3">
+            <a:avLst>
+              <a:gd name="adj1" fmla="val 99962"/>
+            </a:avLst>
+          </a:prstGeom>
+          <a:ln>
+            <a:tailEnd type="triangle"/>
+          </a:ln>
+        </p:spPr>
+        <p:style>
+          <a:lnRef idx="2">
+            <a:schemeClr val="accent1"/>
+          </a:lnRef>
+          <a:fillRef idx="0">
+            <a:schemeClr val="accent1"/>
+          </a:fillRef>
+          <a:effectRef idx="1">
+            <a:schemeClr val="accent1"/>
+          </a:effectRef>
+          <a:fontRef idx="minor">
+            <a:schemeClr val="tx1"/>
+          </a:fontRef>
+        </p:style>
+      </p:cxnSp>
+      <p:cxnSp>
+        <p:nvCxnSpPr>
+          <p:cNvPr id="63" name="Straight Arrow Connector 62">
+            <a:extLst>
+              <a:ext uri="{FF2B5EF4-FFF2-40B4-BE49-F238E27FC236}">
+                <a16:creationId xmlns:a16="http://schemas.microsoft.com/office/drawing/2014/main" id="{CBB0B368-A99A-5B4A-4D7C-5B58E9DB6376}"/>
+              </a:ext>
+            </a:extLst>
+          </p:cNvPr>
+          <p:cNvCxnSpPr>
+            <a:cxnSpLocks/>
+          </p:cNvCxnSpPr>
+          <p:nvPr/>
+        </p:nvCxnSpPr>
+        <p:spPr>
+          <a:xfrm flipH="1" flipV="1">
+            <a:off x="2275987" y="2663295"/>
+            <a:ext cx="2908174" cy="2184203"/>
+          </a:xfrm>
+          <a:prstGeom prst="straightConnector1">
+            <a:avLst/>
+          </a:prstGeom>
+          <a:ln w="9525">
+            <a:solidFill>
+              <a:srgbClr val="C00000"/>
+            </a:solidFill>
+            <a:prstDash val="dash"/>
+            <a:tailEnd type="triangle"/>
+          </a:ln>
+        </p:spPr>
+        <p:style>
+          <a:lnRef idx="2">
+            <a:schemeClr val="accent1"/>
+          </a:lnRef>
+          <a:fillRef idx="0">
+            <a:schemeClr val="accent1"/>
+          </a:fillRef>
+          <a:effectRef idx="1">
+            <a:schemeClr val="accent1"/>
+          </a:effectRef>
+          <a:fontRef idx="minor">
+            <a:schemeClr val="tx1"/>
+          </a:fontRef>
+        </p:style>
+      </p:cxnSp>
+      <p:cxnSp>
+        <p:nvCxnSpPr>
+          <p:cNvPr id="26" name="Straight Arrow Connector 25">
+            <a:extLst>
+              <a:ext uri="{FF2B5EF4-FFF2-40B4-BE49-F238E27FC236}">
+                <a16:creationId xmlns:a16="http://schemas.microsoft.com/office/drawing/2014/main" id="{35656457-4E9E-BD81-9A96-52B8AB6228EF}"/>
+              </a:ext>
+            </a:extLst>
+          </p:cNvPr>
+          <p:cNvCxnSpPr>
+            <a:cxnSpLocks/>
+          </p:cNvCxnSpPr>
+          <p:nvPr/>
+        </p:nvCxnSpPr>
+        <p:spPr>
+          <a:xfrm flipH="1" flipV="1">
+            <a:off x="7497638" y="2304512"/>
+            <a:ext cx="656506" cy="2090504"/>
+          </a:xfrm>
+          <a:prstGeom prst="straightConnector1">
+            <a:avLst/>
+          </a:prstGeom>
+          <a:ln w="9525">
+            <a:solidFill>
+              <a:srgbClr val="C00000"/>
+            </a:solidFill>
+            <a:prstDash val="dash"/>
+            <a:tailEnd type="triangle"/>
+          </a:ln>
+        </p:spPr>
+        <p:style>
+          <a:lnRef idx="2">
+            <a:schemeClr val="accent1"/>
+          </a:lnRef>
+          <a:fillRef idx="0">
+            <a:schemeClr val="accent1"/>
+          </a:fillRef>
+          <a:effectRef idx="1">
+            <a:schemeClr val="accent1"/>
+          </a:effectRef>
+          <a:fontRef idx="minor">
+            <a:schemeClr val="tx1"/>
+          </a:fontRef>
+        </p:style>
+      </p:cxnSp>
+      <p:cxnSp>
+        <p:nvCxnSpPr>
+          <p:cNvPr id="66" name="Straight Arrow Connector 65">
+            <a:extLst>
+              <a:ext uri="{FF2B5EF4-FFF2-40B4-BE49-F238E27FC236}">
+                <a16:creationId xmlns:a16="http://schemas.microsoft.com/office/drawing/2014/main" id="{8094F18C-5678-F486-4171-C4D402C33112}"/>
+              </a:ext>
+            </a:extLst>
+          </p:cNvPr>
+          <p:cNvCxnSpPr>
+            <a:cxnSpLocks/>
+          </p:cNvCxnSpPr>
+          <p:nvPr/>
+        </p:nvCxnSpPr>
+        <p:spPr>
+          <a:xfrm flipV="1">
+            <a:off x="8194181" y="2356046"/>
+            <a:ext cx="242290" cy="2038970"/>
+          </a:xfrm>
+          <a:prstGeom prst="straightConnector1">
+            <a:avLst/>
+          </a:prstGeom>
+          <a:ln w="9525">
+            <a:solidFill>
+              <a:srgbClr val="C00000"/>
+            </a:solidFill>
+            <a:prstDash val="dash"/>
+            <a:tailEnd type="triangle"/>
+          </a:ln>
+        </p:spPr>
+        <p:style>
+          <a:lnRef idx="2">
+            <a:schemeClr val="accent1"/>
+          </a:lnRef>
+          <a:fillRef idx="0">
+            <a:schemeClr val="accent1"/>
+          </a:fillRef>
+          <a:effectRef idx="1">
+            <a:schemeClr val="accent1"/>
+          </a:effectRef>
+          <a:fontRef idx="minor">
+            <a:schemeClr val="tx1"/>
+          </a:fontRef>
+        </p:style>
+      </p:cxnSp>
+      <p:sp>
+        <p:nvSpPr>
+          <p:cNvPr id="69" name="TextBox 68">
+            <a:extLst>
+              <a:ext uri="{FF2B5EF4-FFF2-40B4-BE49-F238E27FC236}">
+                <a16:creationId xmlns:a16="http://schemas.microsoft.com/office/drawing/2014/main" id="{F5793746-0E54-C13E-F387-49CBDD58B2D1}"/>
+              </a:ext>
+            </a:extLst>
+          </p:cNvPr>
+          <p:cNvSpPr txBox="1"/>
+          <p:nvPr/>
+        </p:nvSpPr>
+        <p:spPr>
+          <a:xfrm>
+            <a:off x="6760848" y="1474918"/>
+            <a:ext cx="2223175" cy="261610"/>
+          </a:xfrm>
+          <a:prstGeom prst="rect">
+            <a:avLst/>
+          </a:prstGeom>
+          <a:noFill/>
+        </p:spPr>
+        <p:txBody>
+          <a:bodyPr wrap="square" rtlCol="0">
+            <a:spAutoFit/>
+          </a:bodyPr>
+          <a:lstStyle/>
+          <a:p>
+            <a:r>
+              <a:rPr lang="en-US" sz="1100" b="1" dirty="0">
+                <a:solidFill>
+                  <a:schemeClr val="bg1">
+                    <a:lumMod val="50000"/>
+                  </a:schemeClr>
+                </a:solidFill>
+              </a:rPr>
+              <a:t>CQB Real World Simulation</a:t>
+            </a:r>
+            <a:endParaRPr lang="en-SG" sz="1100" b="1" dirty="0">
+              <a:solidFill>
+                <a:schemeClr val="bg1">
+                  <a:lumMod val="50000"/>
+                </a:schemeClr>
+              </a:solidFill>
+            </a:endParaRPr>
+          </a:p>
+        </p:txBody>
+      </p:sp>
+      <p:cxnSp>
+        <p:nvCxnSpPr>
+          <p:cNvPr id="70" name="Straight Arrow Connector 69">
+            <a:extLst>
+              <a:ext uri="{FF2B5EF4-FFF2-40B4-BE49-F238E27FC236}">
+                <a16:creationId xmlns:a16="http://schemas.microsoft.com/office/drawing/2014/main" id="{0381CBFE-45A8-747C-B33E-776AD0807AD3}"/>
+              </a:ext>
+            </a:extLst>
+          </p:cNvPr>
+          <p:cNvCxnSpPr>
+            <a:cxnSpLocks/>
+            <a:stCxn id="71" idx="2"/>
+          </p:cNvCxnSpPr>
+          <p:nvPr/>
+        </p:nvCxnSpPr>
+        <p:spPr>
+          <a:xfrm>
+            <a:off x="7124408" y="2101956"/>
+            <a:ext cx="290684" cy="180762"/>
+          </a:xfrm>
+          <a:prstGeom prst="straightConnector1">
+            <a:avLst/>
+          </a:prstGeom>
+          <a:ln w="12700">
+            <a:tailEnd type="triangle"/>
+          </a:ln>
+        </p:spPr>
+        <p:style>
+          <a:lnRef idx="2">
+            <a:schemeClr val="accent1"/>
+          </a:lnRef>
+          <a:fillRef idx="0">
+            <a:schemeClr val="accent1"/>
+          </a:fillRef>
+          <a:effectRef idx="1">
+            <a:schemeClr val="accent1"/>
+          </a:effectRef>
+          <a:fontRef idx="minor">
+            <a:schemeClr val="tx1"/>
+          </a:fontRef>
+        </p:style>
+      </p:cxnSp>
+      <p:sp>
+        <p:nvSpPr>
+          <p:cNvPr id="71" name="TextBox 70">
+            <a:extLst>
+              <a:ext uri="{FF2B5EF4-FFF2-40B4-BE49-F238E27FC236}">
+                <a16:creationId xmlns:a16="http://schemas.microsoft.com/office/drawing/2014/main" id="{9828A0DD-59D7-BC1B-37DB-FEE5210D4E0A}"/>
+              </a:ext>
+            </a:extLst>
+          </p:cNvPr>
+          <p:cNvSpPr txBox="1"/>
+          <p:nvPr/>
+        </p:nvSpPr>
+        <p:spPr>
+          <a:xfrm>
+            <a:off x="6751177" y="1671069"/>
+            <a:ext cx="746462" cy="430887"/>
+          </a:xfrm>
+          <a:prstGeom prst="rect">
+            <a:avLst/>
+          </a:prstGeom>
+          <a:noFill/>
+        </p:spPr>
+        <p:txBody>
+          <a:bodyPr wrap="square" rtlCol="0">
+            <a:spAutoFit/>
+          </a:bodyPr>
+          <a:lstStyle/>
+          <a:p>
+            <a:r>
+              <a:rPr lang="en-US" sz="1100" b="1" dirty="0"/>
+              <a:t>Robot T0 Position</a:t>
+            </a:r>
+            <a:endParaRPr lang="en-SG" sz="1100" b="1" dirty="0"/>
+          </a:p>
+        </p:txBody>
+      </p:sp>
+      <p:sp>
+        <p:nvSpPr>
+          <p:cNvPr id="78" name="TextBox 77">
+            <a:extLst>
+              <a:ext uri="{FF2B5EF4-FFF2-40B4-BE49-F238E27FC236}">
+                <a16:creationId xmlns:a16="http://schemas.microsoft.com/office/drawing/2014/main" id="{22C9A08F-5440-50EC-D062-D8522D06EE11}"/>
+              </a:ext>
+            </a:extLst>
+          </p:cNvPr>
+          <p:cNvSpPr txBox="1"/>
+          <p:nvPr/>
+        </p:nvSpPr>
+        <p:spPr>
+          <a:xfrm>
+            <a:off x="7568864" y="1660892"/>
+            <a:ext cx="746462" cy="430887"/>
+          </a:xfrm>
+          <a:prstGeom prst="rect">
+            <a:avLst/>
+          </a:prstGeom>
+          <a:noFill/>
+        </p:spPr>
+        <p:txBody>
+          <a:bodyPr wrap="square" rtlCol="0">
+            <a:spAutoFit/>
+          </a:bodyPr>
+          <a:lstStyle/>
+          <a:p>
+            <a:r>
+              <a:rPr lang="en-US" sz="1100" b="1" dirty="0"/>
+              <a:t>Robot T1 Position</a:t>
+            </a:r>
+            <a:endParaRPr lang="en-SG" sz="1100" b="1" dirty="0"/>
+          </a:p>
+        </p:txBody>
+      </p:sp>
+      <p:cxnSp>
+        <p:nvCxnSpPr>
+          <p:cNvPr id="79" name="Straight Arrow Connector 78">
+            <a:extLst>
+              <a:ext uri="{FF2B5EF4-FFF2-40B4-BE49-F238E27FC236}">
+                <a16:creationId xmlns:a16="http://schemas.microsoft.com/office/drawing/2014/main" id="{BC959D11-6EE0-104E-905A-B8541E843F69}"/>
+              </a:ext>
+            </a:extLst>
+          </p:cNvPr>
+          <p:cNvCxnSpPr>
+            <a:cxnSpLocks/>
+          </p:cNvCxnSpPr>
+          <p:nvPr/>
+        </p:nvCxnSpPr>
+        <p:spPr>
+          <a:xfrm>
+            <a:off x="8095867" y="2045796"/>
+            <a:ext cx="290684" cy="180762"/>
+          </a:xfrm>
+          <a:prstGeom prst="straightConnector1">
+            <a:avLst/>
+          </a:prstGeom>
+          <a:ln w="12700">
+            <a:tailEnd type="triangle"/>
+          </a:ln>
+        </p:spPr>
+        <p:style>
+          <a:lnRef idx="2">
+            <a:schemeClr val="accent1"/>
+          </a:lnRef>
+          <a:fillRef idx="0">
+            <a:schemeClr val="accent1"/>
+          </a:fillRef>
+          <a:effectRef idx="1">
+            <a:schemeClr val="accent1"/>
+          </a:effectRef>
+          <a:fontRef idx="minor">
+            <a:schemeClr val="tx1"/>
+          </a:fontRef>
+        </p:style>
+      </p:cxnSp>
+      <p:sp>
+        <p:nvSpPr>
+          <p:cNvPr id="80" name="TextBox 79">
+            <a:extLst>
+              <a:ext uri="{FF2B5EF4-FFF2-40B4-BE49-F238E27FC236}">
+                <a16:creationId xmlns:a16="http://schemas.microsoft.com/office/drawing/2014/main" id="{8B5572FC-F3BC-E0E7-8502-8FB11421B947}"/>
+              </a:ext>
+            </a:extLst>
+          </p:cNvPr>
+          <p:cNvSpPr txBox="1"/>
+          <p:nvPr/>
+        </p:nvSpPr>
+        <p:spPr>
+          <a:xfrm>
+            <a:off x="6827122" y="2472206"/>
+            <a:ext cx="1281710" cy="553998"/>
+          </a:xfrm>
+          <a:prstGeom prst="rect">
+            <a:avLst/>
+          </a:prstGeom>
+          <a:noFill/>
+        </p:spPr>
+        <p:txBody>
+          <a:bodyPr wrap="square" rtlCol="0">
+            <a:spAutoFit/>
+          </a:bodyPr>
+          <a:lstStyle/>
+          <a:p>
+            <a:r>
+              <a:rPr lang="en-US" sz="1000" b="1" dirty="0">
+                <a:solidFill>
+                  <a:srgbClr val="C00000"/>
+                </a:solidFill>
+              </a:rPr>
+              <a:t>Enemy sound direction  detection  at T0</a:t>
+            </a:r>
+            <a:endParaRPr lang="en-SG" sz="1000" b="1" dirty="0">
+              <a:solidFill>
+                <a:srgbClr val="C00000"/>
+              </a:solidFill>
+            </a:endParaRPr>
+          </a:p>
+        </p:txBody>
+      </p:sp>
+      <p:sp>
+        <p:nvSpPr>
+          <p:cNvPr id="81" name="TextBox 80">
+            <a:extLst>
+              <a:ext uri="{FF2B5EF4-FFF2-40B4-BE49-F238E27FC236}">
+                <a16:creationId xmlns:a16="http://schemas.microsoft.com/office/drawing/2014/main" id="{BCBF5B8A-2205-97F6-F995-9003D5B45E2C}"/>
+              </a:ext>
+            </a:extLst>
+          </p:cNvPr>
+          <p:cNvSpPr txBox="1"/>
+          <p:nvPr/>
+        </p:nvSpPr>
+        <p:spPr>
+          <a:xfrm>
+            <a:off x="8028039" y="3009579"/>
+            <a:ext cx="1281710" cy="553998"/>
+          </a:xfrm>
+          <a:prstGeom prst="rect">
+            <a:avLst/>
+          </a:prstGeom>
+          <a:noFill/>
+        </p:spPr>
+        <p:txBody>
+          <a:bodyPr wrap="square" rtlCol="0">
+            <a:spAutoFit/>
+          </a:bodyPr>
+          <a:lstStyle/>
+          <a:p>
+            <a:r>
+              <a:rPr lang="en-US" sz="1000" b="1" dirty="0">
+                <a:solidFill>
+                  <a:srgbClr val="C00000"/>
+                </a:solidFill>
+              </a:rPr>
+              <a:t>Enemy sound direction  detection  at T1</a:t>
+            </a:r>
+            <a:endParaRPr lang="en-SG" sz="1000" b="1" dirty="0">
+              <a:solidFill>
+                <a:srgbClr val="C00000"/>
+              </a:solidFill>
+            </a:endParaRPr>
+          </a:p>
+        </p:txBody>
+      </p:sp>
+      <p:sp>
+        <p:nvSpPr>
+          <p:cNvPr id="82" name="TextBox 81">
+            <a:extLst>
+              <a:ext uri="{FF2B5EF4-FFF2-40B4-BE49-F238E27FC236}">
+                <a16:creationId xmlns:a16="http://schemas.microsoft.com/office/drawing/2014/main" id="{5EAE9500-8B00-FF80-076E-C069DD0EF312}"/>
+              </a:ext>
+            </a:extLst>
+          </p:cNvPr>
+          <p:cNvSpPr txBox="1"/>
+          <p:nvPr/>
+        </p:nvSpPr>
+        <p:spPr>
+          <a:xfrm>
+            <a:off x="1840408" y="1412402"/>
+            <a:ext cx="3598580" cy="276999"/>
+          </a:xfrm>
+          <a:prstGeom prst="rect">
+            <a:avLst/>
+          </a:prstGeom>
+          <a:noFill/>
+          <a:ln w="12700">
+            <a:solidFill>
+              <a:schemeClr val="tx1"/>
+            </a:solidFill>
+            <a:prstDash val="sysDash"/>
+          </a:ln>
+        </p:spPr>
+        <p:txBody>
+          <a:bodyPr wrap="square" rtlCol="0">
+            <a:spAutoFit/>
+          </a:bodyPr>
+          <a:lstStyle/>
+          <a:p>
+            <a:r>
+              <a:rPr lang="en-US" sz="1200" b="1" dirty="0"/>
+              <a:t>Enemy Prediction Based on Sound Sensors</a:t>
+            </a:r>
+            <a:endParaRPr lang="en-SG" sz="1200" b="1" dirty="0"/>
+          </a:p>
+        </p:txBody>
+      </p:sp>
+    </p:spTree>
+    <p:extLst>
+      <p:ext uri="{BB962C8B-B14F-4D97-AF65-F5344CB8AC3E}">
+        <p14:creationId xmlns:p14="http://schemas.microsoft.com/office/powerpoint/2010/main" val="3718302830"/>
       </p:ext>
     </p:extLst>
   </p:cSld>

</xml_diff>